<commit_message>
fix & added img
</commit_message>
<xml_diff>
--- a/slides/slides.pptx
+++ b/slides/slides.pptx
@@ -18,6 +18,8 @@
     <p:sldId id="262" r:id="rId11"/>
     <p:sldId id="263" r:id="rId12"/>
     <p:sldId id="264" r:id="rId13"/>
+    <p:sldId id="265" r:id="rId14"/>
+    <p:sldId id="266" r:id="rId15"/>
   </p:sldIdLst>
   <p:sldSz cx="9144000" cy="6858000"/>
   <p:notesSz cx="7099300" cy="10234612"/>
@@ -193,7 +195,7 @@
           <a:bodyPr lIns="0" rIns="0" tIns="0" bIns="0" anchor="b"/>
           <a:p>
             <a:pPr algn="r"/>
-            <a:fld id="{7E1343E2-52D6-4CDF-B3CD-BED92A11F728}" type="slidenum">
+            <a:fld id="{7FEC75C1-D241-451C-B417-C827B78EAF70}" type="slidenum">
               <a:rPr lang="en-US" sz="1400">
                 <a:latin typeface="Times New Roman"/>
               </a:rPr>
@@ -228,7 +230,7 @@
       </p:grpSpPr>
       <p:sp>
         <p:nvSpPr>
-          <p:cNvPr id="133" name="PlaceHolder 1"/>
+          <p:cNvPr id="143" name="PlaceHolder 1"/>
           <p:cNvSpPr>
             <a:spLocks noGrp="1"/>
           </p:cNvSpPr>
@@ -239,7 +241,7 @@
         <p:spPr>
           <a:xfrm>
             <a:off x="946080" y="4861080"/>
-            <a:ext cx="5205240" cy="4601880"/>
+            <a:ext cx="5204880" cy="4601520"/>
           </a:xfrm>
           <a:prstGeom prst="rect">
             <a:avLst/>
@@ -254,14 +256,14 @@
       </p:sp>
       <p:sp>
         <p:nvSpPr>
-          <p:cNvPr id="134" name="CustomShape 2"/>
+          <p:cNvPr id="144" name="CustomShape 2"/>
           <p:cNvSpPr/>
           <p:nvPr/>
         </p:nvSpPr>
         <p:spPr>
           <a:xfrm>
             <a:off x="4024440" y="9725040"/>
-            <a:ext cx="3073320" cy="507960"/>
+            <a:ext cx="3072960" cy="507600"/>
           </a:xfrm>
           <a:prstGeom prst="rect">
             <a:avLst/>
@@ -279,7 +281,96 @@
                 <a:spcPct val="100000"/>
               </a:lnSpc>
             </a:pPr>
-            <a:fld id="{DE7341AB-114C-446A-940A-04EAA6FE98BE}" type="slidenum">
+            <a:fld id="{8C6F0923-43C3-4CD3-B67D-220A46F829EA}" type="slidenum">
+              <a:rPr lang="en-US" sz="1200">
+                <a:solidFill>
+                  <a:srgbClr val="000000"/>
+                </a:solidFill>
+                <a:latin typeface="Times New Roman"/>
+                <a:ea typeface="ＭＳ Ｐゴシック"/>
+              </a:rPr>
+              <a:t>&lt;number&gt;</a:t>
+            </a:fld>
+            <a:endParaRPr/>
+          </a:p>
+        </p:txBody>
+      </p:sp>
+    </p:spTree>
+  </p:cSld>
+</p:notes>
+</file>
+
+<file path=ppt/notesSlides/notesSlide11.xml><?xml version="1.0" encoding="utf-8"?>
+<p:notes xmlns:a="http://schemas.openxmlformats.org/drawingml/2006/main" xmlns:p="http://schemas.openxmlformats.org/presentationml/2006/main" xmlns:r="http://schemas.openxmlformats.org/officeDocument/2006/relationships">
+  <p:cSld>
+    <p:spTree>
+      <p:nvGrpSpPr>
+        <p:cNvPr id="1" name=""/>
+        <p:cNvGrpSpPr/>
+        <p:nvPr/>
+      </p:nvGrpSpPr>
+      <p:grpSpPr>
+        <a:xfrm>
+          <a:off x="0" y="0"/>
+          <a:ext cx="0" cy="0"/>
+          <a:chOff x="0" y="0"/>
+          <a:chExt cx="0" cy="0"/>
+        </a:xfrm>
+      </p:grpSpPr>
+      <p:sp>
+        <p:nvSpPr>
+          <p:cNvPr id="159" name="PlaceHolder 1"/>
+          <p:cNvSpPr>
+            <a:spLocks noGrp="1"/>
+          </p:cNvSpPr>
+          <p:nvPr>
+            <p:ph type="body"/>
+          </p:nvPr>
+        </p:nvSpPr>
+        <p:spPr>
+          <a:xfrm>
+            <a:off x="946080" y="4861080"/>
+            <a:ext cx="5205600" cy="4602240"/>
+          </a:xfrm>
+          <a:prstGeom prst="rect">
+            <a:avLst/>
+          </a:prstGeom>
+        </p:spPr>
+        <p:txBody>
+          <a:bodyPr lIns="95040" rIns="95040" tIns="47520" bIns="47520"/>
+          <a:p>
+            <a:endParaRPr/>
+          </a:p>
+        </p:txBody>
+      </p:sp>
+      <p:sp>
+        <p:nvSpPr>
+          <p:cNvPr id="160" name="CustomShape 2"/>
+          <p:cNvSpPr/>
+          <p:nvPr/>
+        </p:nvSpPr>
+        <p:spPr>
+          <a:xfrm>
+            <a:off x="4024440" y="9725040"/>
+            <a:ext cx="3073680" cy="508320"/>
+          </a:xfrm>
+          <a:prstGeom prst="rect">
+            <a:avLst/>
+          </a:prstGeom>
+          <a:noFill/>
+          <a:ln>
+            <a:noFill/>
+          </a:ln>
+        </p:spPr>
+        <p:txBody>
+          <a:bodyPr lIns="95040" rIns="95040" tIns="47520" bIns="47520" anchor="b"/>
+          <a:p>
+            <a:pPr>
+              <a:lnSpc>
+                <a:spcPct val="100000"/>
+              </a:lnSpc>
+            </a:pPr>
+            <a:fld id="{AA32F149-F61E-40CF-BEB0-4C0B0467E9AF}" type="slidenum">
               <a:rPr lang="en-US" sz="1200">
                 <a:solidFill>
                   <a:srgbClr val="000000"/>
@@ -317,7 +408,7 @@
       </p:grpSpPr>
       <p:sp>
         <p:nvSpPr>
-          <p:cNvPr id="135" name="PlaceHolder 1"/>
+          <p:cNvPr id="145" name="PlaceHolder 1"/>
           <p:cNvSpPr>
             <a:spLocks noGrp="1"/>
           </p:cNvSpPr>
@@ -328,7 +419,7 @@
         <p:spPr>
           <a:xfrm>
             <a:off x="946080" y="4861080"/>
-            <a:ext cx="5205960" cy="4602600"/>
+            <a:ext cx="5205600" cy="4602240"/>
           </a:xfrm>
           <a:prstGeom prst="rect">
             <a:avLst/>
@@ -343,14 +434,14 @@
       </p:sp>
       <p:sp>
         <p:nvSpPr>
-          <p:cNvPr id="136" name="CustomShape 2"/>
+          <p:cNvPr id="146" name="CustomShape 2"/>
           <p:cNvSpPr/>
           <p:nvPr/>
         </p:nvSpPr>
         <p:spPr>
           <a:xfrm>
             <a:off x="4024440" y="9725040"/>
-            <a:ext cx="3074040" cy="508680"/>
+            <a:ext cx="3073680" cy="508320"/>
           </a:xfrm>
           <a:prstGeom prst="rect">
             <a:avLst/>
@@ -368,7 +459,7 @@
                 <a:spcPct val="100000"/>
               </a:lnSpc>
             </a:pPr>
-            <a:fld id="{C2F507A9-27AD-43BE-A578-8378B9C90CB0}" type="slidenum">
+            <a:fld id="{B5C66480-5B42-4CCE-9531-E9378E7430EB}" type="slidenum">
               <a:rPr lang="en-US" sz="1200">
                 <a:solidFill>
                   <a:srgbClr val="000000"/>
@@ -406,7 +497,7 @@
       </p:grpSpPr>
       <p:sp>
         <p:nvSpPr>
-          <p:cNvPr id="137" name="PlaceHolder 1"/>
+          <p:cNvPr id="147" name="PlaceHolder 1"/>
           <p:cNvSpPr>
             <a:spLocks noGrp="1"/>
           </p:cNvSpPr>
@@ -417,7 +508,7 @@
         <p:spPr>
           <a:xfrm>
             <a:off x="946080" y="4861080"/>
-            <a:ext cx="5205960" cy="4602600"/>
+            <a:ext cx="5205600" cy="4602240"/>
           </a:xfrm>
           <a:prstGeom prst="rect">
             <a:avLst/>
@@ -432,14 +523,14 @@
       </p:sp>
       <p:sp>
         <p:nvSpPr>
-          <p:cNvPr id="138" name="CustomShape 2"/>
+          <p:cNvPr id="148" name="CustomShape 2"/>
           <p:cNvSpPr/>
           <p:nvPr/>
         </p:nvSpPr>
         <p:spPr>
           <a:xfrm>
             <a:off x="4024440" y="9725040"/>
-            <a:ext cx="3074040" cy="508680"/>
+            <a:ext cx="3073680" cy="508320"/>
           </a:xfrm>
           <a:prstGeom prst="rect">
             <a:avLst/>
@@ -457,7 +548,7 @@
                 <a:spcPct val="100000"/>
               </a:lnSpc>
             </a:pPr>
-            <a:fld id="{468A379E-E5E3-4419-9BC0-ED10FFDB823B}" type="slidenum">
+            <a:fld id="{B075B3FA-898D-4B62-B84D-28A2A9AB444C}" type="slidenum">
               <a:rPr lang="en-US" sz="1200">
                 <a:solidFill>
                   <a:srgbClr val="000000"/>
@@ -495,7 +586,7 @@
       </p:grpSpPr>
       <p:sp>
         <p:nvSpPr>
-          <p:cNvPr id="139" name="PlaceHolder 1"/>
+          <p:cNvPr id="149" name="PlaceHolder 1"/>
           <p:cNvSpPr>
             <a:spLocks noGrp="1"/>
           </p:cNvSpPr>
@@ -506,7 +597,7 @@
         <p:spPr>
           <a:xfrm>
             <a:off x="946080" y="4861080"/>
-            <a:ext cx="5205960" cy="4602600"/>
+            <a:ext cx="5205600" cy="4602240"/>
           </a:xfrm>
           <a:prstGeom prst="rect">
             <a:avLst/>
@@ -521,14 +612,14 @@
       </p:sp>
       <p:sp>
         <p:nvSpPr>
-          <p:cNvPr id="140" name="CustomShape 2"/>
+          <p:cNvPr id="150" name="CustomShape 2"/>
           <p:cNvSpPr/>
           <p:nvPr/>
         </p:nvSpPr>
         <p:spPr>
           <a:xfrm>
             <a:off x="4024440" y="9725040"/>
-            <a:ext cx="3074040" cy="508680"/>
+            <a:ext cx="3073680" cy="508320"/>
           </a:xfrm>
           <a:prstGeom prst="rect">
             <a:avLst/>
@@ -546,7 +637,7 @@
                 <a:spcPct val="100000"/>
               </a:lnSpc>
             </a:pPr>
-            <a:fld id="{EFB7B660-85C2-446C-A734-CDD48EE61509}" type="slidenum">
+            <a:fld id="{1E1F5C92-2E78-483E-8167-BEFD3B729391}" type="slidenum">
               <a:rPr lang="en-US" sz="1200">
                 <a:solidFill>
                   <a:srgbClr val="000000"/>
@@ -584,7 +675,7 @@
       </p:grpSpPr>
       <p:sp>
         <p:nvSpPr>
-          <p:cNvPr id="141" name="PlaceHolder 1"/>
+          <p:cNvPr id="151" name="PlaceHolder 1"/>
           <p:cNvSpPr>
             <a:spLocks noGrp="1"/>
           </p:cNvSpPr>
@@ -595,7 +686,7 @@
         <p:spPr>
           <a:xfrm>
             <a:off x="946080" y="4861080"/>
-            <a:ext cx="5205960" cy="4602600"/>
+            <a:ext cx="5205600" cy="4602240"/>
           </a:xfrm>
           <a:prstGeom prst="rect">
             <a:avLst/>
@@ -610,14 +701,14 @@
       </p:sp>
       <p:sp>
         <p:nvSpPr>
-          <p:cNvPr id="142" name="CustomShape 2"/>
+          <p:cNvPr id="152" name="CustomShape 2"/>
           <p:cNvSpPr/>
           <p:nvPr/>
         </p:nvSpPr>
         <p:spPr>
           <a:xfrm>
             <a:off x="4024440" y="9725040"/>
-            <a:ext cx="3074040" cy="508680"/>
+            <a:ext cx="3073680" cy="508320"/>
           </a:xfrm>
           <a:prstGeom prst="rect">
             <a:avLst/>
@@ -635,7 +726,7 @@
                 <a:spcPct val="100000"/>
               </a:lnSpc>
             </a:pPr>
-            <a:fld id="{3E5F37B6-3017-48F5-96F5-8F42098FB8A7}" type="slidenum">
+            <a:fld id="{8E9884C4-5FA2-4B9D-A2A6-BCEB7B999E37}" type="slidenum">
               <a:rPr lang="en-US" sz="1200">
                 <a:solidFill>
                   <a:srgbClr val="000000"/>
@@ -673,7 +764,7 @@
       </p:grpSpPr>
       <p:sp>
         <p:nvSpPr>
-          <p:cNvPr id="143" name="PlaceHolder 1"/>
+          <p:cNvPr id="153" name="PlaceHolder 1"/>
           <p:cNvSpPr>
             <a:spLocks noGrp="1"/>
           </p:cNvSpPr>
@@ -684,7 +775,7 @@
         <p:spPr>
           <a:xfrm>
             <a:off x="946080" y="4861080"/>
-            <a:ext cx="5205960" cy="4602600"/>
+            <a:ext cx="5205600" cy="4602240"/>
           </a:xfrm>
           <a:prstGeom prst="rect">
             <a:avLst/>
@@ -699,14 +790,14 @@
       </p:sp>
       <p:sp>
         <p:nvSpPr>
-          <p:cNvPr id="144" name="CustomShape 2"/>
+          <p:cNvPr id="154" name="CustomShape 2"/>
           <p:cNvSpPr/>
           <p:nvPr/>
         </p:nvSpPr>
         <p:spPr>
           <a:xfrm>
             <a:off x="4024440" y="9725040"/>
-            <a:ext cx="3074040" cy="508680"/>
+            <a:ext cx="3073680" cy="508320"/>
           </a:xfrm>
           <a:prstGeom prst="rect">
             <a:avLst/>
@@ -724,7 +815,7 @@
                 <a:spcPct val="100000"/>
               </a:lnSpc>
             </a:pPr>
-            <a:fld id="{F0F32756-72E8-4795-9DCD-7EACFFFB0A7F}" type="slidenum">
+            <a:fld id="{6B86F8AC-736C-425C-866F-F9041624792D}" type="slidenum">
               <a:rPr lang="en-US" sz="1200">
                 <a:solidFill>
                   <a:srgbClr val="000000"/>
@@ -762,7 +853,7 @@
       </p:grpSpPr>
       <p:sp>
         <p:nvSpPr>
-          <p:cNvPr id="145" name="PlaceHolder 1"/>
+          <p:cNvPr id="155" name="PlaceHolder 1"/>
           <p:cNvSpPr>
             <a:spLocks noGrp="1"/>
           </p:cNvSpPr>
@@ -773,7 +864,7 @@
         <p:spPr>
           <a:xfrm>
             <a:off x="946080" y="4861080"/>
-            <a:ext cx="5205960" cy="4602600"/>
+            <a:ext cx="5205600" cy="4602240"/>
           </a:xfrm>
           <a:prstGeom prst="rect">
             <a:avLst/>
@@ -788,14 +879,14 @@
       </p:sp>
       <p:sp>
         <p:nvSpPr>
-          <p:cNvPr id="146" name="CustomShape 2"/>
+          <p:cNvPr id="156" name="CustomShape 2"/>
           <p:cNvSpPr/>
           <p:nvPr/>
         </p:nvSpPr>
         <p:spPr>
           <a:xfrm>
             <a:off x="4024440" y="9725040"/>
-            <a:ext cx="3074040" cy="508680"/>
+            <a:ext cx="3073680" cy="508320"/>
           </a:xfrm>
           <a:prstGeom prst="rect">
             <a:avLst/>
@@ -813,7 +904,96 @@
                 <a:spcPct val="100000"/>
               </a:lnSpc>
             </a:pPr>
-            <a:fld id="{0E5040BF-EC53-4DD6-94EC-0EE159CB8231}" type="slidenum">
+            <a:fld id="{7E79624A-5F0D-4AFB-9864-F163B88D9624}" type="slidenum">
+              <a:rPr lang="en-US" sz="1200">
+                <a:solidFill>
+                  <a:srgbClr val="000000"/>
+                </a:solidFill>
+                <a:latin typeface="Times New Roman"/>
+                <a:ea typeface="ＭＳ Ｐゴシック"/>
+              </a:rPr>
+              <a:t>&lt;number&gt;</a:t>
+            </a:fld>
+            <a:endParaRPr/>
+          </a:p>
+        </p:txBody>
+      </p:sp>
+    </p:spTree>
+  </p:cSld>
+</p:notes>
+</file>
+
+<file path=ppt/notesSlides/notesSlide9.xml><?xml version="1.0" encoding="utf-8"?>
+<p:notes xmlns:a="http://schemas.openxmlformats.org/drawingml/2006/main" xmlns:p="http://schemas.openxmlformats.org/presentationml/2006/main" xmlns:r="http://schemas.openxmlformats.org/officeDocument/2006/relationships">
+  <p:cSld>
+    <p:spTree>
+      <p:nvGrpSpPr>
+        <p:cNvPr id="1" name=""/>
+        <p:cNvGrpSpPr/>
+        <p:nvPr/>
+      </p:nvGrpSpPr>
+      <p:grpSpPr>
+        <a:xfrm>
+          <a:off x="0" y="0"/>
+          <a:ext cx="0" cy="0"/>
+          <a:chOff x="0" y="0"/>
+          <a:chExt cx="0" cy="0"/>
+        </a:xfrm>
+      </p:grpSpPr>
+      <p:sp>
+        <p:nvSpPr>
+          <p:cNvPr id="157" name="PlaceHolder 1"/>
+          <p:cNvSpPr>
+            <a:spLocks noGrp="1"/>
+          </p:cNvSpPr>
+          <p:nvPr>
+            <p:ph type="body"/>
+          </p:nvPr>
+        </p:nvSpPr>
+        <p:spPr>
+          <a:xfrm>
+            <a:off x="946080" y="4861080"/>
+            <a:ext cx="5205600" cy="4602240"/>
+          </a:xfrm>
+          <a:prstGeom prst="rect">
+            <a:avLst/>
+          </a:prstGeom>
+        </p:spPr>
+        <p:txBody>
+          <a:bodyPr lIns="95040" rIns="95040" tIns="47520" bIns="47520"/>
+          <a:p>
+            <a:endParaRPr/>
+          </a:p>
+        </p:txBody>
+      </p:sp>
+      <p:sp>
+        <p:nvSpPr>
+          <p:cNvPr id="158" name="CustomShape 2"/>
+          <p:cNvSpPr/>
+          <p:nvPr/>
+        </p:nvSpPr>
+        <p:spPr>
+          <a:xfrm>
+            <a:off x="4024440" y="9725040"/>
+            <a:ext cx="3073680" cy="508320"/>
+          </a:xfrm>
+          <a:prstGeom prst="rect">
+            <a:avLst/>
+          </a:prstGeom>
+          <a:noFill/>
+          <a:ln>
+            <a:noFill/>
+          </a:ln>
+        </p:spPr>
+        <p:txBody>
+          <a:bodyPr lIns="95040" rIns="95040" tIns="47520" bIns="47520" anchor="b"/>
+          <a:p>
+            <a:pPr>
+              <a:lnSpc>
+                <a:spcPct val="100000"/>
+              </a:lnSpc>
+            </a:pPr>
+            <a:fld id="{610335B4-A8E8-4EDA-8A15-906AD75A4353}" type="slidenum">
               <a:rPr lang="en-US" sz="1200">
                 <a:solidFill>
                   <a:srgbClr val="000000"/>
@@ -3181,7 +3361,7 @@
         <p:spPr>
           <a:xfrm>
             <a:off x="0" y="932760"/>
-            <a:ext cx="9142200" cy="113400"/>
+            <a:ext cx="9141840" cy="113040"/>
           </a:xfrm>
           <a:prstGeom prst="rect">
             <a:avLst/>
@@ -3203,7 +3383,7 @@
         <p:spPr>
           <a:xfrm>
             <a:off x="7707960" y="6564960"/>
-            <a:ext cx="912600" cy="912600"/>
+            <a:ext cx="912240" cy="912240"/>
           </a:xfrm>
           <a:prstGeom prst="rect">
             <a:avLst/>
@@ -3229,7 +3409,7 @@
         <p:spPr>
           <a:xfrm>
             <a:off x="0" y="0"/>
-            <a:ext cx="9151560" cy="1385640"/>
+            <a:ext cx="9151200" cy="1385280"/>
           </a:xfrm>
           <a:prstGeom prst="rect">
             <a:avLst/>
@@ -3250,7 +3430,7 @@
         </p:nvPicPr>
         <p:blipFill>
           <a:blip r:embed="rId3"/>
-          <a:srcRect l="0" t="0" r="49938" b="45191"/>
+          <a:srcRect l="0" t="0" r="49934" b="45180"/>
           <a:stretch>
             <a:fillRect/>
           </a:stretch>
@@ -3258,7 +3438,7 @@
         <p:spPr>
           <a:xfrm>
             <a:off x="6619320" y="1393560"/>
-            <a:ext cx="2520720" cy="958320"/>
+            <a:ext cx="2520360" cy="957960"/>
           </a:xfrm>
           <a:prstGeom prst="rect">
             <a:avLst/>
@@ -3276,7 +3456,7 @@
         </p:nvPicPr>
         <p:blipFill>
           <a:blip r:embed="rId4"/>
-          <a:srcRect l="0" t="0" r="2340" b="13742"/>
+          <a:srcRect l="0" t="0" r="2328" b="13697"/>
           <a:stretch>
             <a:fillRect/>
           </a:stretch>
@@ -3284,7 +3464,7 @@
         <p:spPr>
           <a:xfrm>
             <a:off x="0" y="1393560"/>
-            <a:ext cx="3398760" cy="881640"/>
+            <a:ext cx="3398400" cy="881280"/>
           </a:xfrm>
           <a:prstGeom prst="rect">
             <a:avLst/>
@@ -3501,7 +3681,7 @@
         <p:spPr>
           <a:xfrm>
             <a:off x="0" y="932760"/>
-            <a:ext cx="9142920" cy="114120"/>
+            <a:ext cx="9142560" cy="113760"/>
           </a:xfrm>
           <a:prstGeom prst="rect">
             <a:avLst/>
@@ -3523,7 +3703,7 @@
         <p:spPr>
           <a:xfrm>
             <a:off x="7707960" y="6564960"/>
-            <a:ext cx="913320" cy="913320"/>
+            <a:ext cx="912960" cy="912960"/>
           </a:xfrm>
           <a:prstGeom prst="rect">
             <a:avLst/>
@@ -3734,7 +3914,7 @@
         <p:spPr>
           <a:xfrm>
             <a:off x="720" y="2377440"/>
-            <a:ext cx="9142200" cy="1739880"/>
+            <a:ext cx="9141840" cy="1739520"/>
           </a:xfrm>
           <a:prstGeom prst="rect">
             <a:avLst/>
@@ -3791,7 +3971,7 @@
         <p:spPr>
           <a:xfrm>
             <a:off x="1189440" y="4480560"/>
-            <a:ext cx="6764760" cy="547200"/>
+            <a:ext cx="6764400" cy="546840"/>
           </a:xfrm>
           <a:prstGeom prst="rect">
             <a:avLst/>
@@ -3831,7 +4011,7 @@
         <p:spPr>
           <a:xfrm>
             <a:off x="10207080" y="2718720"/>
-            <a:ext cx="182880" cy="459720"/>
+            <a:ext cx="182520" cy="459360"/>
           </a:xfrm>
           <a:prstGeom prst="rect">
             <a:avLst/>
@@ -3851,7 +4031,7 @@
         <p:spPr>
           <a:xfrm>
             <a:off x="1855800" y="5852160"/>
-            <a:ext cx="6399000" cy="444960"/>
+            <a:ext cx="6398640" cy="444600"/>
           </a:xfrm>
           <a:prstGeom prst="rect">
             <a:avLst/>
@@ -3900,7 +4080,7 @@
         <p:spPr>
           <a:xfrm>
             <a:off x="1330920" y="2082960"/>
-            <a:ext cx="912600" cy="912600"/>
+            <a:ext cx="912240" cy="912240"/>
           </a:xfrm>
           <a:prstGeom prst="rect">
             <a:avLst/>
@@ -3920,7 +4100,7 @@
         <p:spPr>
           <a:xfrm>
             <a:off x="1855800" y="5486400"/>
-            <a:ext cx="6399000" cy="444960"/>
+            <a:ext cx="6398640" cy="444600"/>
           </a:xfrm>
           <a:prstGeom prst="rect">
             <a:avLst/>
@@ -3969,7 +4149,7 @@
         <p:spPr>
           <a:xfrm>
             <a:off x="6035040" y="1828800"/>
-            <a:ext cx="2925000" cy="1004760"/>
+            <a:ext cx="2924640" cy="1004400"/>
           </a:xfrm>
           <a:prstGeom prst="rect">
             <a:avLst/>
@@ -3989,7 +4169,7 @@
         <p:spPr>
           <a:xfrm>
             <a:off x="6309360" y="2194560"/>
-            <a:ext cx="1461960" cy="364680"/>
+            <a:ext cx="1461600" cy="364320"/>
           </a:xfrm>
           <a:prstGeom prst="rect">
             <a:avLst/>
@@ -4009,7 +4189,7 @@
         <p:spPr>
           <a:xfrm>
             <a:off x="1371600" y="3657600"/>
-            <a:ext cx="2925000" cy="1096200"/>
+            <a:ext cx="2924640" cy="1095840"/>
           </a:xfrm>
           <a:prstGeom prst="rect">
             <a:avLst/>
@@ -4029,7 +4209,7 @@
         <p:spPr>
           <a:xfrm>
             <a:off x="6547680" y="1463040"/>
-            <a:ext cx="2559240" cy="913320"/>
+            <a:ext cx="2558880" cy="912960"/>
           </a:xfrm>
           <a:prstGeom prst="rect">
             <a:avLst/>
@@ -4051,6 +4231,243 @@
           <p:childTnLst>
             <p:seq>
               <p:cTn id="2" nodeType="mainSeq"/>
+              <p:prevCondLst>
+                <p:cond delay="0" evt="onPrev">
+                  <p:tgtEl>
+                    <p:sldTgt/>
+                  </p:tgtEl>
+                </p:cond>
+              </p:prevCondLst>
+              <p:nextCondLst>
+                <p:cond delay="0" evt="onNext">
+                  <p:tgtEl>
+                    <p:sldTgt/>
+                  </p:tgtEl>
+                </p:cond>
+              </p:nextCondLst>
+            </p:seq>
+          </p:childTnLst>
+        </p:cTn>
+      </p:par>
+    </p:tnLst>
+  </p:timing>
+</p:sld>
+</file>
+
+<file path=ppt/slides/slide10.xml><?xml version="1.0" encoding="utf-8"?>
+<p:sld xmlns:a="http://schemas.openxmlformats.org/drawingml/2006/main" xmlns:p="http://schemas.openxmlformats.org/presentationml/2006/main" xmlns:r="http://schemas.openxmlformats.org/officeDocument/2006/relationships">
+  <p:cSld>
+    <p:spTree>
+      <p:nvGrpSpPr>
+        <p:cNvPr id="1" name=""/>
+        <p:cNvGrpSpPr/>
+        <p:nvPr/>
+      </p:nvGrpSpPr>
+      <p:grpSpPr>
+        <a:xfrm>
+          <a:off x="0" y="0"/>
+          <a:ext cx="0" cy="0"/>
+          <a:chOff x="0" y="0"/>
+          <a:chExt cx="0" cy="0"/>
+        </a:xfrm>
+      </p:grpSpPr>
+      <p:sp>
+        <p:nvSpPr>
+          <p:cNvPr id="139" name="CustomShape 1"/>
+          <p:cNvSpPr/>
+          <p:nvPr/>
+        </p:nvSpPr>
+        <p:spPr>
+          <a:xfrm>
+            <a:off x="875160" y="2755800"/>
+            <a:ext cx="7393320" cy="716400"/>
+          </a:xfrm>
+          <a:prstGeom prst="rect">
+            <a:avLst/>
+          </a:prstGeom>
+          <a:noFill/>
+          <a:ln>
+            <a:noFill/>
+          </a:ln>
+        </p:spPr>
+        <p:txBody>
+          <a:bodyPr lIns="90000" rIns="90000" tIns="45000" bIns="45000"/>
+          <a:p>
+            <a:r>
+              <a:rPr lang="en-US" sz="4400">
+                <a:solidFill>
+                  <a:srgbClr val="3465a4"/>
+                </a:solidFill>
+                <a:latin typeface="Arial"/>
+              </a:rPr>
+              <a:t>Thank you for your attention!</a:t>
+            </a:r>
+            <a:endParaRPr/>
+          </a:p>
+        </p:txBody>
+      </p:sp>
+    </p:spTree>
+  </p:cSld>
+  <p:timing>
+    <p:tnLst>
+      <p:par>
+        <p:cTn id="19" dur="indefinite" restart="never" nodeType="tmRoot">
+          <p:childTnLst>
+            <p:seq>
+              <p:cTn id="20" nodeType="mainSeq"/>
+              <p:prevCondLst>
+                <p:cond delay="0" evt="onPrev">
+                  <p:tgtEl>
+                    <p:sldTgt/>
+                  </p:tgtEl>
+                </p:cond>
+              </p:prevCondLst>
+              <p:nextCondLst>
+                <p:cond delay="0" evt="onNext">
+                  <p:tgtEl>
+                    <p:sldTgt/>
+                  </p:tgtEl>
+                </p:cond>
+              </p:nextCondLst>
+            </p:seq>
+          </p:childTnLst>
+        </p:cTn>
+      </p:par>
+    </p:tnLst>
+  </p:timing>
+</p:sld>
+</file>
+
+<file path=ppt/slides/slide11.xml><?xml version="1.0" encoding="utf-8"?>
+<p:sld xmlns:a="http://schemas.openxmlformats.org/drawingml/2006/main" xmlns:p="http://schemas.openxmlformats.org/presentationml/2006/main" xmlns:r="http://schemas.openxmlformats.org/officeDocument/2006/relationships">
+  <p:cSld>
+    <p:spTree>
+      <p:nvGrpSpPr>
+        <p:cNvPr id="1" name=""/>
+        <p:cNvGrpSpPr/>
+        <p:nvPr/>
+      </p:nvGrpSpPr>
+      <p:grpSpPr>
+        <a:xfrm>
+          <a:off x="0" y="0"/>
+          <a:ext cx="0" cy="0"/>
+          <a:chOff x="0" y="0"/>
+          <a:chExt cx="0" cy="0"/>
+        </a:xfrm>
+      </p:grpSpPr>
+      <p:sp>
+        <p:nvSpPr>
+          <p:cNvPr id="140" name="CustomShape 1"/>
+          <p:cNvSpPr/>
+          <p:nvPr/>
+        </p:nvSpPr>
+        <p:spPr>
+          <a:xfrm>
+            <a:off x="457200" y="164520"/>
+            <a:ext cx="8228160" cy="637200"/>
+          </a:xfrm>
+          <a:prstGeom prst="rect">
+            <a:avLst/>
+          </a:prstGeom>
+          <a:noFill/>
+          <a:ln>
+            <a:noFill/>
+          </a:ln>
+        </p:spPr>
+        <p:txBody>
+          <a:bodyPr lIns="90000" rIns="90000" tIns="45000" bIns="45000" anchor="ctr"/>
+          <a:p>
+            <a:pPr algn="ctr">
+              <a:lnSpc>
+                <a:spcPct val="100000"/>
+              </a:lnSpc>
+            </a:pPr>
+            <a:r>
+              <a:rPr lang="en-US" sz="4400">
+                <a:solidFill>
+                  <a:srgbClr val="4f81bd"/>
+                </a:solidFill>
+                <a:latin typeface="Calibri"/>
+              </a:rPr>
+              <a:t>Generic transition matrix</a:t>
+            </a:r>
+            <a:endParaRPr/>
+          </a:p>
+        </p:txBody>
+      </p:sp>
+      <p:sp>
+        <p:nvSpPr>
+          <p:cNvPr id="141" name="CustomShape 2"/>
+          <p:cNvSpPr/>
+          <p:nvPr/>
+        </p:nvSpPr>
+        <p:spPr>
+          <a:xfrm>
+            <a:off x="6553080" y="6356520"/>
+            <a:ext cx="2132280" cy="363600"/>
+          </a:xfrm>
+          <a:prstGeom prst="rect">
+            <a:avLst/>
+          </a:prstGeom>
+          <a:noFill/>
+          <a:ln>
+            <a:noFill/>
+          </a:ln>
+        </p:spPr>
+        <p:txBody>
+          <a:bodyPr lIns="90000" rIns="90000" tIns="45000" bIns="45000" anchor="ctr"/>
+          <a:p>
+            <a:pPr algn="r">
+              <a:lnSpc>
+                <a:spcPct val="100000"/>
+              </a:lnSpc>
+            </a:pPr>
+            <a:endParaRPr/>
+          </a:p>
+          <a:p>
+            <a:pPr algn="r">
+              <a:lnSpc>
+                <a:spcPct val="100000"/>
+              </a:lnSpc>
+            </a:pPr>
+            <a:endParaRPr/>
+          </a:p>
+        </p:txBody>
+      </p:sp>
+      <p:pic>
+        <p:nvPicPr>
+          <p:cNvPr id="142" name="" descr=""/>
+          <p:cNvPicPr/>
+          <p:nvPr/>
+        </p:nvPicPr>
+        <p:blipFill>
+          <a:blip r:embed="rId1"/>
+          <a:stretch>
+            <a:fillRect/>
+          </a:stretch>
+        </p:blipFill>
+        <p:spPr>
+          <a:xfrm>
+            <a:off x="75600" y="1958040"/>
+            <a:ext cx="8993160" cy="3378600"/>
+          </a:xfrm>
+          <a:prstGeom prst="rect">
+            <a:avLst/>
+          </a:prstGeom>
+          <a:ln>
+            <a:noFill/>
+          </a:ln>
+        </p:spPr>
+      </p:pic>
+    </p:spTree>
+  </p:cSld>
+  <p:timing>
+    <p:tnLst>
+      <p:par>
+        <p:cTn id="21" dur="indefinite" restart="never" nodeType="tmRoot">
+          <p:childTnLst>
+            <p:seq>
+              <p:cTn id="22" nodeType="mainSeq"/>
               <p:prevCondLst>
                 <p:cond delay="0" evt="onPrev">
                   <p:tgtEl>
@@ -4100,7 +4517,7 @@
         <p:spPr>
           <a:xfrm>
             <a:off x="457200" y="164520"/>
-            <a:ext cx="8228520" cy="637560"/>
+            <a:ext cx="8228160" cy="637200"/>
           </a:xfrm>
           <a:prstGeom prst="rect">
             <a:avLst/>
@@ -4140,7 +4557,7 @@
         <p:spPr>
           <a:xfrm>
             <a:off x="457200" y="1744200"/>
-            <a:ext cx="8228520" cy="4524840"/>
+            <a:ext cx="8228160" cy="4524480"/>
           </a:xfrm>
           <a:prstGeom prst="rect">
             <a:avLst/>
@@ -4258,7 +4675,7 @@
         <p:spPr>
           <a:xfrm>
             <a:off x="6553080" y="6356520"/>
-            <a:ext cx="2132640" cy="363960"/>
+            <a:ext cx="2132280" cy="363600"/>
           </a:xfrm>
           <a:prstGeom prst="rect">
             <a:avLst/>
@@ -4284,7 +4701,7 @@
                 <a:spcPct val="100000"/>
               </a:lnSpc>
             </a:pPr>
-            <a:fld id="{798D4F6A-4FB9-4173-91FE-AF98624ACCFD}" type="slidenum">
+            <a:r>
               <a:rPr lang="en-US" sz="1200">
                 <a:solidFill>
                   <a:srgbClr val="404040"/>
@@ -4292,8 +4709,8 @@
                 <a:latin typeface="Arial"/>
                 <a:ea typeface="ＭＳ Ｐゴシック"/>
               </a:rPr>
-              <a:t>&lt;number&gt;</a:t>
-            </a:fld>
+              <a:t>1</a:t>
+            </a:r>
             <a:endParaRPr/>
           </a:p>
         </p:txBody>
@@ -4356,7 +4773,7 @@
         <p:spPr>
           <a:xfrm>
             <a:off x="457200" y="164520"/>
-            <a:ext cx="8228520" cy="637560"/>
+            <a:ext cx="8228160" cy="637200"/>
           </a:xfrm>
           <a:prstGeom prst="rect">
             <a:avLst/>
@@ -4396,7 +4813,7 @@
         <p:spPr>
           <a:xfrm>
             <a:off x="6553080" y="6356520"/>
-            <a:ext cx="2132640" cy="363960"/>
+            <a:ext cx="2132280" cy="363600"/>
           </a:xfrm>
           <a:prstGeom prst="rect">
             <a:avLst/>
@@ -4422,7 +4839,7 @@
                 <a:spcPct val="100000"/>
               </a:lnSpc>
             </a:pPr>
-            <a:fld id="{F95A12FE-FC52-40CD-9F9E-2F026CA77934}" type="slidenum">
+            <a:r>
               <a:rPr lang="en-US" sz="1200">
                 <a:solidFill>
                   <a:srgbClr val="404040"/>
@@ -4430,8 +4847,8 @@
                 <a:latin typeface="Arial"/>
                 <a:ea typeface="ＭＳ Ｐゴシック"/>
               </a:rPr>
-              <a:t>&lt;number&gt;</a:t>
-            </a:fld>
+              <a:t>2</a:t>
+            </a:r>
             <a:endParaRPr/>
           </a:p>
         </p:txBody>
@@ -4451,7 +4868,7 @@
         <p:spPr>
           <a:xfrm>
             <a:off x="365760" y="2568240"/>
-            <a:ext cx="2193840" cy="1736640"/>
+            <a:ext cx="2193480" cy="1736280"/>
           </a:xfrm>
           <a:prstGeom prst="rect">
             <a:avLst/>
@@ -4476,7 +4893,7 @@
         <p:spPr>
           <a:xfrm>
             <a:off x="2615760" y="2194560"/>
-            <a:ext cx="1864080" cy="2559600"/>
+            <a:ext cx="1863720" cy="2559240"/>
           </a:xfrm>
           <a:prstGeom prst="rect">
             <a:avLst/>
@@ -4495,7 +4912,7 @@
         <p:spPr>
           <a:xfrm>
             <a:off x="640080" y="5311440"/>
-            <a:ext cx="3656880" cy="446400"/>
+            <a:ext cx="3656520" cy="446040"/>
           </a:xfrm>
           <a:prstGeom prst="rect">
             <a:avLst/>
@@ -4536,7 +4953,7 @@
         <p:spPr>
           <a:xfrm>
             <a:off x="5120640" y="2139120"/>
-            <a:ext cx="3782880" cy="1279440"/>
+            <a:ext cx="3782520" cy="1279080"/>
           </a:xfrm>
           <a:prstGeom prst="rect">
             <a:avLst/>
@@ -4561,7 +4978,7 @@
         <p:spPr>
           <a:xfrm>
             <a:off x="6126480" y="3455280"/>
-            <a:ext cx="1791000" cy="1736640"/>
+            <a:ext cx="1790640" cy="1736280"/>
           </a:xfrm>
           <a:prstGeom prst="rect">
             <a:avLst/>
@@ -4580,7 +4997,7 @@
         <p:spPr>
           <a:xfrm>
             <a:off x="5056560" y="5300280"/>
-            <a:ext cx="3864960" cy="446400"/>
+            <a:ext cx="3864600" cy="446040"/>
           </a:xfrm>
           <a:prstGeom prst="rect">
             <a:avLst/>
@@ -4615,7 +5032,7 @@
         <p:spPr>
           <a:xfrm>
             <a:off x="1264680" y="1230480"/>
-            <a:ext cx="6615000" cy="627120"/>
+            <a:ext cx="6614640" cy="626760"/>
           </a:xfrm>
           <a:prstGeom prst="rect">
             <a:avLst/>
@@ -4720,7 +5137,7 @@
         <p:spPr>
           <a:xfrm>
             <a:off x="457200" y="164520"/>
-            <a:ext cx="8228520" cy="637560"/>
+            <a:ext cx="8228160" cy="637200"/>
           </a:xfrm>
           <a:prstGeom prst="rect">
             <a:avLst/>
@@ -4760,7 +5177,7 @@
         <p:spPr>
           <a:xfrm>
             <a:off x="6553080" y="6356520"/>
-            <a:ext cx="2132640" cy="363960"/>
+            <a:ext cx="2132280" cy="363600"/>
           </a:xfrm>
           <a:prstGeom prst="rect">
             <a:avLst/>
@@ -4786,7 +5203,7 @@
                 <a:spcPct val="100000"/>
               </a:lnSpc>
             </a:pPr>
-            <a:fld id="{9512F201-42E3-4215-9345-5077BF1581E8}" type="slidenum">
+            <a:r>
               <a:rPr lang="en-US" sz="1200">
                 <a:solidFill>
                   <a:srgbClr val="404040"/>
@@ -4794,8 +5211,8 @@
                 <a:latin typeface="Arial"/>
                 <a:ea typeface="ＭＳ Ｐゴシック"/>
               </a:rPr>
-              <a:t>&lt;number&gt;</a:t>
-            </a:fld>
+              <a:t>3</a:t>
+            </a:r>
             <a:endParaRPr/>
           </a:p>
         </p:txBody>
@@ -4809,7 +5226,7 @@
         <p:spPr>
           <a:xfrm>
             <a:off x="457560" y="1384560"/>
-            <a:ext cx="8503560" cy="4924800"/>
+            <a:ext cx="8503200" cy="4924440"/>
           </a:xfrm>
           <a:prstGeom prst="rect">
             <a:avLst/>
@@ -4993,7 +5410,7 @@
         <p:spPr>
           <a:xfrm>
             <a:off x="457200" y="164520"/>
-            <a:ext cx="8228520" cy="637560"/>
+            <a:ext cx="8228160" cy="637200"/>
           </a:xfrm>
           <a:prstGeom prst="rect">
             <a:avLst/>
@@ -5033,7 +5450,7 @@
         <p:spPr>
           <a:xfrm>
             <a:off x="6553080" y="6356520"/>
-            <a:ext cx="2132640" cy="363960"/>
+            <a:ext cx="2132280" cy="363600"/>
           </a:xfrm>
           <a:prstGeom prst="rect">
             <a:avLst/>
@@ -5059,7 +5476,7 @@
                 <a:spcPct val="100000"/>
               </a:lnSpc>
             </a:pPr>
-            <a:fld id="{414E3C5F-A0DB-4645-86D7-9E4679A7C4B6}" type="slidenum">
+            <a:r>
               <a:rPr lang="en-US" sz="1200">
                 <a:solidFill>
                   <a:srgbClr val="404040"/>
@@ -5067,8 +5484,8 @@
                 <a:latin typeface="Arial"/>
                 <a:ea typeface="ＭＳ Ｐゴシック"/>
               </a:rPr>
-              <a:t>&lt;number&gt;</a:t>
-            </a:fld>
+              <a:t>4</a:t>
+            </a:r>
             <a:endParaRPr/>
           </a:p>
         </p:txBody>
@@ -5082,7 +5499,7 @@
         <p:spPr>
           <a:xfrm>
             <a:off x="457560" y="1384560"/>
-            <a:ext cx="8228520" cy="2460960"/>
+            <a:ext cx="8228160" cy="2460600"/>
           </a:xfrm>
           <a:prstGeom prst="rect">
             <a:avLst/>
@@ -5122,11 +5539,20 @@
             <a:r>
               <a:rPr lang="en-US" sz="3200">
                 <a:solidFill>
+                  <a:srgbClr val="ff6600"/>
+                </a:solidFill>
+                <a:latin typeface="Calibri"/>
+              </a:rPr>
+              <a:t>Synthesis</a:t>
+            </a:r>
+            <a:r>
+              <a:rPr lang="en-US" sz="3200">
+                <a:solidFill>
                   <a:srgbClr val="3465a4"/>
                 </a:solidFill>
                 <a:latin typeface="Calibri"/>
               </a:rPr>
-              <a:t>Synthesis: </a:t>
+              <a:t>: </a:t>
             </a:r>
             <a:r>
               <a:rPr lang="en-US" sz="2500">
@@ -5150,11 +5576,20 @@
             <a:r>
               <a:rPr lang="en-US" sz="3200">
                 <a:solidFill>
+                  <a:srgbClr val="ff6600"/>
+                </a:solidFill>
+                <a:latin typeface="Calibri"/>
+              </a:rPr>
+              <a:t>Analysis</a:t>
+            </a:r>
+            <a:r>
+              <a:rPr lang="en-US" sz="3200">
+                <a:solidFill>
                   <a:srgbClr val="3465a4"/>
                 </a:solidFill>
                 <a:latin typeface="Calibri"/>
               </a:rPr>
-              <a:t>Analysis: </a:t>
+              <a:t>: </a:t>
             </a:r>
             <a:r>
               <a:rPr lang="en-US" sz="2500">
@@ -5202,7 +5637,7 @@
         <p:spPr>
           <a:xfrm>
             <a:off x="2073600" y="4216320"/>
-            <a:ext cx="4996080" cy="1851120"/>
+            <a:ext cx="4995720" cy="1850760"/>
           </a:xfrm>
           <a:prstGeom prst="rect">
             <a:avLst/>
@@ -5270,7 +5705,7 @@
         <p:spPr>
           <a:xfrm>
             <a:off x="457200" y="164520"/>
-            <a:ext cx="8228520" cy="637560"/>
+            <a:ext cx="8228160" cy="637200"/>
           </a:xfrm>
           <a:prstGeom prst="rect">
             <a:avLst/>
@@ -5295,7 +5730,7 @@
                 </a:solidFill>
                 <a:latin typeface="Calibri"/>
               </a:rPr>
-              <a:t>RR as Markov chain</a:t>
+              <a:t>The tool</a:t>
             </a:r>
             <a:endParaRPr/>
           </a:p>
@@ -5310,7 +5745,7 @@
         <p:spPr>
           <a:xfrm>
             <a:off x="6553080" y="6356520"/>
-            <a:ext cx="2132640" cy="363960"/>
+            <a:ext cx="2132280" cy="363600"/>
           </a:xfrm>
           <a:prstGeom prst="rect">
             <a:avLst/>
@@ -5336,7 +5771,7 @@
                 <a:spcPct val="100000"/>
               </a:lnSpc>
             </a:pPr>
-            <a:fld id="{86A345B9-2690-472F-9A13-22F78F09AA3B}" type="slidenum">
+            <a:r>
               <a:rPr lang="en-US" sz="1200">
                 <a:solidFill>
                   <a:srgbClr val="404040"/>
@@ -5344,8 +5779,8 @@
                 <a:latin typeface="Arial"/>
                 <a:ea typeface="ＭＳ Ｐゴシック"/>
               </a:rPr>
-              <a:t>&lt;number&gt;</a:t>
-            </a:fld>
+              <a:t>5</a:t>
+            </a:r>
             <a:endParaRPr/>
           </a:p>
         </p:txBody>
@@ -5358,8 +5793,8 @@
         </p:nvSpPr>
         <p:spPr>
           <a:xfrm>
-            <a:off x="366120" y="1384560"/>
-            <a:ext cx="8411760" cy="1175400"/>
+            <a:off x="457560" y="1384560"/>
+            <a:ext cx="8503200" cy="4924440"/>
           </a:xfrm>
           <a:prstGeom prst="rect">
             <a:avLst/>
@@ -5372,7 +5807,7 @@
         <p:txBody>
           <a:bodyPr lIns="90000" rIns="90000" tIns="45000" bIns="45000"/>
           <a:p>
-            <a:pPr algn="just">
+            <a:pPr>
               <a:lnSpc>
                 <a:spcPct val="100000"/>
               </a:lnSpc>
@@ -5384,189 +5819,168 @@
                 </a:solidFill>
                 <a:latin typeface="Calibri"/>
               </a:rPr>
-              <a:t>The transition matrix P for a resource reservation task:</a:t>
-            </a:r>
-            <a:endParaRPr/>
-          </a:p>
-        </p:txBody>
-      </p:sp>
-      <p:pic>
-        <p:nvPicPr>
-          <p:cNvPr id="116" name="" descr=""/>
-          <p:cNvPicPr/>
-          <p:nvPr/>
-        </p:nvPicPr>
-        <p:blipFill>
-          <a:blip r:embed="rId1"/>
-          <a:stretch>
-            <a:fillRect/>
-          </a:stretch>
-        </p:blipFill>
-        <p:spPr>
-          <a:xfrm>
-            <a:off x="2555640" y="2549880"/>
-            <a:ext cx="4032360" cy="2396160"/>
-          </a:xfrm>
-          <a:prstGeom prst="rect">
-            <a:avLst/>
-          </a:prstGeom>
-          <a:ln>
-            <a:noFill/>
-          </a:ln>
-        </p:spPr>
-      </p:pic>
-      <p:sp>
-        <p:nvSpPr>
-          <p:cNvPr id="117" name="CustomShape 4"/>
-          <p:cNvSpPr/>
-          <p:nvPr/>
-        </p:nvSpPr>
-        <p:spPr>
-          <a:xfrm>
-            <a:off x="3255840" y="2640960"/>
-            <a:ext cx="1005480" cy="750600"/>
-          </a:xfrm>
-          <a:prstGeom prst="rect">
-            <a:avLst/>
-          </a:prstGeom>
-          <a:noFill/>
-          <a:ln w="29160">
-            <a:solidFill>
-              <a:srgbClr val="ff3333"/>
-            </a:solidFill>
-            <a:round/>
-          </a:ln>
-        </p:spPr>
-      </p:sp>
-      <p:sp>
-        <p:nvSpPr>
-          <p:cNvPr id="118" name="CustomShape 5"/>
-          <p:cNvSpPr/>
-          <p:nvPr/>
-        </p:nvSpPr>
-        <p:spPr>
-          <a:xfrm>
-            <a:off x="690120" y="5195880"/>
-            <a:ext cx="3382560" cy="655920"/>
-          </a:xfrm>
-          <a:prstGeom prst="rect">
-            <a:avLst/>
-          </a:prstGeom>
-          <a:noFill/>
-          <a:ln>
-            <a:noFill/>
-          </a:ln>
-        </p:spPr>
-        <p:txBody>
-          <a:bodyPr lIns="90000" rIns="90000" tIns="45000" bIns="45000"/>
-          <a:p>
-            <a:pPr algn="ctr">
-              <a:lnSpc>
-                <a:spcPct val="100000"/>
-              </a:lnSpc>
-            </a:pPr>
-            <a:r>
-              <a:rPr lang="en-US" sz="3200">
+              <a:t>Steps to obtain probability value:</a:t>
+            </a:r>
+            <a:endParaRPr/>
+          </a:p>
+          <a:p>
+            <a:pPr>
+              <a:lnSpc>
+                <a:spcPct val="100000"/>
+              </a:lnSpc>
+              <a:buFont typeface="Arial"/>
+              <a:buChar char="•"/>
+            </a:pPr>
+            <a:r>
+              <a:rPr i="1" lang="en-US" sz="3200">
+                <a:solidFill>
+                  <a:srgbClr val="ff6600"/>
+                </a:solidFill>
+                <a:latin typeface="Calibri"/>
+              </a:rPr>
+              <a:t>pre_process()</a:t>
+            </a:r>
+            <a:r>
+              <a:rPr i="1" lang="en-US" sz="3200">
                 <a:solidFill>
                   <a:srgbClr val="3465a4"/>
                 </a:solidFill>
                 <a:latin typeface="Calibri"/>
               </a:rPr>
-              <a:t>Inner block structure </a:t>
-            </a:r>
-            <a:endParaRPr/>
-          </a:p>
-        </p:txBody>
-      </p:sp>
-      <p:sp>
-        <p:nvSpPr>
-          <p:cNvPr id="119" name="CustomShape 6"/>
-          <p:cNvSpPr/>
-          <p:nvPr/>
-        </p:nvSpPr>
-        <p:spPr>
-          <a:xfrm>
-            <a:off x="4812840" y="5195160"/>
-            <a:ext cx="3812400" cy="655920"/>
-          </a:xfrm>
-          <a:prstGeom prst="rect">
-            <a:avLst/>
-          </a:prstGeom>
-          <a:noFill/>
-          <a:ln>
-            <a:noFill/>
-          </a:ln>
-        </p:spPr>
-        <p:txBody>
-          <a:bodyPr lIns="90000" rIns="90000" tIns="45000" bIns="45000"/>
-          <a:p>
-            <a:pPr algn="ctr">
-              <a:lnSpc>
-                <a:spcPct val="100000"/>
-              </a:lnSpc>
-            </a:pPr>
-            <a:r>
-              <a:rPr lang="en-US" sz="3200">
+              <a:t>: </a:t>
+            </a:r>
+            <a:r>
+              <a:rPr lang="en-US" sz="2500">
                 <a:solidFill>
                   <a:srgbClr val="3465a4"/>
                 </a:solidFill>
                 <a:latin typeface="Calibri"/>
               </a:rPr>
-              <a:t>Quasi-birth-death process</a:t>
-            </a:r>
-            <a:endParaRPr/>
-          </a:p>
-        </p:txBody>
-      </p:sp>
-      <p:sp>
-        <p:nvSpPr>
-          <p:cNvPr id="120" name="CustomShape 7"/>
-          <p:cNvSpPr/>
-          <p:nvPr/>
-        </p:nvSpPr>
-        <p:spPr>
-          <a:xfrm>
-            <a:off x="3882240" y="5577840"/>
-            <a:ext cx="731520" cy="365760"/>
-          </a:xfrm>
-          <a:prstGeom prst="rightArrow">
-            <a:avLst>
-              <a:gd name="adj1" fmla="val 16200"/>
-              <a:gd name="adj2" fmla="val 5400"/>
-            </a:avLst>
-          </a:prstGeom>
-          <a:solidFill>
-            <a:srgbClr val="729fcf"/>
-          </a:solidFill>
-          <a:ln>
-            <a:solidFill>
-              <a:srgbClr val="3465a4"/>
-            </a:solidFill>
-          </a:ln>
-        </p:spPr>
-      </p:sp>
-      <p:sp>
-        <p:nvSpPr>
-          <p:cNvPr id="121" name="Line 8"/>
-          <p:cNvSpPr/>
-          <p:nvPr/>
-        </p:nvSpPr>
-        <p:spPr>
-          <a:xfrm>
-            <a:off x="4261320" y="3391560"/>
-            <a:ext cx="310680" cy="266040"/>
-          </a:xfrm>
-          <a:prstGeom prst="line">
-            <a:avLst/>
-          </a:prstGeom>
-          <a:ln w="19080">
-            <a:solidFill>
-              <a:srgbClr val="ff3333"/>
-            </a:solidFill>
-            <a:round/>
-            <a:tailEnd len="med" type="triangle" w="med"/>
-          </a:ln>
-        </p:spPr>
+              <a:t>creates the transition matrix</a:t>
+            </a:r>
+            <a:endParaRPr/>
+          </a:p>
+          <a:p>
+            <a:pPr>
+              <a:lnSpc>
+                <a:spcPct val="100000"/>
+              </a:lnSpc>
+              <a:buFont typeface="Arial"/>
+              <a:buChar char="•"/>
+            </a:pPr>
+            <a:r>
+              <a:rPr i="1" lang="en-US" sz="3200">
+                <a:solidFill>
+                  <a:srgbClr val="ff6600"/>
+                </a:solidFill>
+                <a:latin typeface="Calibri"/>
+              </a:rPr>
+              <a:t>compute_pi()</a:t>
+            </a:r>
+            <a:r>
+              <a:rPr i="1" lang="en-US" sz="3200">
+                <a:solidFill>
+                  <a:srgbClr val="3465a4"/>
+                </a:solidFill>
+                <a:latin typeface="Calibri"/>
+              </a:rPr>
+              <a:t>: </a:t>
+            </a:r>
+            <a:r>
+              <a:rPr lang="en-US" sz="2500">
+                <a:solidFill>
+                  <a:srgbClr val="3465a4"/>
+                </a:solidFill>
+                <a:latin typeface="Calibri"/>
+              </a:rPr>
+              <a:t>compute probability from the transition matrix</a:t>
+            </a:r>
+            <a:r>
+              <a:rPr i="1" lang="en-US" sz="3200">
+                <a:solidFill>
+                  <a:srgbClr val="3465a4"/>
+                </a:solidFill>
+                <a:latin typeface="Calibri"/>
+              </a:rPr>
+              <a:t> </a:t>
+            </a:r>
+            <a:endParaRPr/>
+          </a:p>
+          <a:p>
+            <a:pPr>
+              <a:lnSpc>
+                <a:spcPct val="100000"/>
+              </a:lnSpc>
+              <a:buFont typeface="Arial"/>
+              <a:buChar char="•"/>
+            </a:pPr>
+            <a:r>
+              <a:rPr i="1" lang="en-US" sz="3200">
+                <a:solidFill>
+                  <a:srgbClr val="ff6600"/>
+                </a:solidFill>
+                <a:latin typeface="Calibri"/>
+              </a:rPr>
+              <a:t>post_process()</a:t>
+            </a:r>
+            <a:r>
+              <a:rPr i="1" lang="en-US" sz="3200">
+                <a:solidFill>
+                  <a:srgbClr val="3465a4"/>
+                </a:solidFill>
+                <a:latin typeface="Calibri"/>
+              </a:rPr>
+              <a:t>: </a:t>
+            </a:r>
+            <a:r>
+              <a:rPr lang="en-US" sz="2500">
+                <a:solidFill>
+                  <a:srgbClr val="3465a4"/>
+                </a:solidFill>
+                <a:latin typeface="Calibri"/>
+              </a:rPr>
+              <a:t>checks the algorithm's output</a:t>
+            </a:r>
+            <a:endParaRPr/>
+          </a:p>
+          <a:p>
+            <a:pPr>
+              <a:lnSpc>
+                <a:spcPct val="100000"/>
+              </a:lnSpc>
+              <a:buFont typeface="Arial"/>
+              <a:buChar char="•"/>
+            </a:pPr>
+            <a:r>
+              <a:rPr i="1" lang="en-US" sz="3200">
+                <a:solidFill>
+                  <a:srgbClr val="ff6600"/>
+                </a:solidFill>
+                <a:latin typeface="Calibri"/>
+              </a:rPr>
+              <a:t>fill_in_probability_map()</a:t>
+            </a:r>
+            <a:r>
+              <a:rPr i="1" lang="en-US" sz="3200">
+                <a:solidFill>
+                  <a:srgbClr val="3465a4"/>
+                </a:solidFill>
+                <a:latin typeface="Calibri"/>
+              </a:rPr>
+              <a:t>: </a:t>
+            </a:r>
+            <a:r>
+              <a:rPr lang="en-US" sz="2500">
+                <a:solidFill>
+                  <a:srgbClr val="3465a4"/>
+                </a:solidFill>
+                <a:latin typeface="Calibri"/>
+              </a:rPr>
+              <a:t>stores results in a map</a:t>
+            </a:r>
+            <a:endParaRPr/>
+          </a:p>
+        </p:txBody>
       </p:sp>
     </p:spTree>
   </p:cSld>
@@ -5619,14 +6033,14 @@
       </p:grpSpPr>
       <p:sp>
         <p:nvSpPr>
-          <p:cNvPr id="122" name="CustomShape 1"/>
+          <p:cNvPr id="116" name="CustomShape 1"/>
           <p:cNvSpPr/>
           <p:nvPr/>
         </p:nvSpPr>
         <p:spPr>
           <a:xfrm>
             <a:off x="457200" y="164520"/>
-            <a:ext cx="8228520" cy="637560"/>
+            <a:ext cx="8228160" cy="637200"/>
           </a:xfrm>
           <a:prstGeom prst="rect">
             <a:avLst/>
@@ -5651,22 +6065,22 @@
                 </a:solidFill>
                 <a:latin typeface="Calibri"/>
               </a:rPr>
-              <a:t>Transition matrix creation</a:t>
-            </a:r>
-            <a:endParaRPr/>
-          </a:p>
-        </p:txBody>
-      </p:sp>
-      <p:sp>
-        <p:nvSpPr>
-          <p:cNvPr id="123" name="CustomShape 2"/>
+              <a:t>RR as Markov chain</a:t>
+            </a:r>
+            <a:endParaRPr/>
+          </a:p>
+        </p:txBody>
+      </p:sp>
+      <p:sp>
+        <p:nvSpPr>
+          <p:cNvPr id="117" name="CustomShape 2"/>
           <p:cNvSpPr/>
           <p:nvPr/>
         </p:nvSpPr>
         <p:spPr>
           <a:xfrm>
             <a:off x="6553080" y="6356520"/>
-            <a:ext cx="2132640" cy="363960"/>
+            <a:ext cx="2132280" cy="363600"/>
           </a:xfrm>
           <a:prstGeom prst="rect">
             <a:avLst/>
@@ -5692,7 +6106,7 @@
                 <a:spcPct val="100000"/>
               </a:lnSpc>
             </a:pPr>
-            <a:fld id="{8E774D30-1DDC-4177-880A-F21E8A71C82C}" type="slidenum">
+            <a:r>
               <a:rPr lang="en-US" sz="1200">
                 <a:solidFill>
                   <a:srgbClr val="404040"/>
@@ -5700,22 +6114,22 @@
                 <a:latin typeface="Arial"/>
                 <a:ea typeface="ＭＳ Ｐゴシック"/>
               </a:rPr>
-              <a:t>&lt;number&gt;</a:t>
-            </a:fld>
-            <a:endParaRPr/>
-          </a:p>
-        </p:txBody>
-      </p:sp>
-      <p:sp>
-        <p:nvSpPr>
-          <p:cNvPr id="124" name="CustomShape 3"/>
+              <a:t>6</a:t>
+            </a:r>
+            <a:endParaRPr/>
+          </a:p>
+        </p:txBody>
+      </p:sp>
+      <p:sp>
+        <p:nvSpPr>
+          <p:cNvPr id="118" name="CustomShape 3"/>
           <p:cNvSpPr/>
           <p:nvPr/>
         </p:nvSpPr>
         <p:spPr>
           <a:xfrm>
-            <a:off x="1623240" y="1384560"/>
-            <a:ext cx="5897520" cy="627120"/>
+            <a:off x="366120" y="1384560"/>
+            <a:ext cx="8411400" cy="1175040"/>
           </a:xfrm>
           <a:prstGeom prst="rect">
             <a:avLst/>
@@ -5728,7 +6142,7 @@
         <p:txBody>
           <a:bodyPr lIns="90000" rIns="90000" tIns="45000" bIns="45000"/>
           <a:p>
-            <a:pPr>
+            <a:pPr algn="just">
               <a:lnSpc>
                 <a:spcPct val="100000"/>
               </a:lnSpc>
@@ -5740,40 +6154,175 @@
                 </a:solidFill>
                 <a:latin typeface="Calibri"/>
               </a:rPr>
-              <a:t>Exploiting internal structure</a:t>
-            </a:r>
-            <a:endParaRPr/>
-          </a:p>
-          <a:p>
-            <a:pPr>
-              <a:lnSpc>
-                <a:spcPct val="100000"/>
-              </a:lnSpc>
-            </a:pPr>
-            <a:endParaRPr/>
-          </a:p>
-          <a:p>
-            <a:pPr>
-              <a:lnSpc>
-                <a:spcPct val="100000"/>
-              </a:lnSpc>
-            </a:pPr>
-            <a:endParaRPr/>
-          </a:p>
-        </p:txBody>
-      </p:sp>
-      <p:sp>
-        <p:nvSpPr>
-          <p:cNvPr id="125" name="CustomShape 4"/>
+              <a:t>The transition matrix P for a resource reservation task:</a:t>
+            </a:r>
+            <a:endParaRPr/>
+          </a:p>
+        </p:txBody>
+      </p:sp>
+      <p:pic>
+        <p:nvPicPr>
+          <p:cNvPr id="119" name="" descr=""/>
+          <p:cNvPicPr/>
+          <p:nvPr/>
+        </p:nvPicPr>
+        <p:blipFill>
+          <a:blip r:embed="rId1"/>
+          <a:stretch>
+            <a:fillRect/>
+          </a:stretch>
+        </p:blipFill>
+        <p:spPr>
+          <a:xfrm>
+            <a:off x="2555640" y="2549880"/>
+            <a:ext cx="4032000" cy="2395800"/>
+          </a:xfrm>
+          <a:prstGeom prst="rect">
+            <a:avLst/>
+          </a:prstGeom>
+          <a:ln>
+            <a:noFill/>
+          </a:ln>
+        </p:spPr>
+      </p:pic>
+      <p:sp>
+        <p:nvSpPr>
+          <p:cNvPr id="120" name="CustomShape 4"/>
           <p:cNvSpPr/>
           <p:nvPr/>
         </p:nvSpPr>
         <p:spPr>
           <a:xfrm>
-            <a:off x="4389120" y="2011680"/>
-            <a:ext cx="365760" cy="640080"/>
-          </a:xfrm>
-          <a:prstGeom prst="downArrow">
+            <a:off x="3255840" y="2640960"/>
+            <a:ext cx="1005120" cy="750240"/>
+          </a:xfrm>
+          <a:prstGeom prst="rect">
+            <a:avLst/>
+          </a:prstGeom>
+          <a:noFill/>
+          <a:ln w="29160">
+            <a:solidFill>
+              <a:srgbClr val="ff3333"/>
+            </a:solidFill>
+            <a:round/>
+          </a:ln>
+        </p:spPr>
+      </p:sp>
+      <p:sp>
+        <p:nvSpPr>
+          <p:cNvPr id="121" name="CustomShape 5"/>
+          <p:cNvSpPr/>
+          <p:nvPr/>
+        </p:nvSpPr>
+        <p:spPr>
+          <a:xfrm>
+            <a:off x="690120" y="5195880"/>
+            <a:ext cx="3382200" cy="655560"/>
+          </a:xfrm>
+          <a:prstGeom prst="rect">
+            <a:avLst/>
+          </a:prstGeom>
+          <a:noFill/>
+          <a:ln>
+            <a:noFill/>
+          </a:ln>
+        </p:spPr>
+        <p:txBody>
+          <a:bodyPr lIns="90000" rIns="90000" tIns="45000" bIns="45000"/>
+          <a:p>
+            <a:pPr algn="ctr">
+              <a:lnSpc>
+                <a:spcPct val="100000"/>
+              </a:lnSpc>
+            </a:pPr>
+            <a:r>
+              <a:rPr lang="en-US" sz="3200">
+                <a:solidFill>
+                  <a:srgbClr val="3465a4"/>
+                </a:solidFill>
+                <a:latin typeface="Calibri"/>
+              </a:rPr>
+              <a:t>Inner block structure </a:t>
+            </a:r>
+            <a:endParaRPr/>
+          </a:p>
+        </p:txBody>
+      </p:sp>
+      <p:sp>
+        <p:nvSpPr>
+          <p:cNvPr id="122" name="CustomShape 6"/>
+          <p:cNvSpPr/>
+          <p:nvPr/>
+        </p:nvSpPr>
+        <p:spPr>
+          <a:xfrm>
+            <a:off x="4812840" y="5195160"/>
+            <a:ext cx="3812040" cy="655560"/>
+          </a:xfrm>
+          <a:prstGeom prst="rect">
+            <a:avLst/>
+          </a:prstGeom>
+          <a:noFill/>
+          <a:ln>
+            <a:noFill/>
+          </a:ln>
+        </p:spPr>
+        <p:txBody>
+          <a:bodyPr lIns="90000" rIns="90000" tIns="45000" bIns="45000"/>
+          <a:p>
+            <a:pPr algn="ctr">
+              <a:lnSpc>
+                <a:spcPct val="100000"/>
+              </a:lnSpc>
+            </a:pPr>
+            <a:r>
+              <a:rPr lang="en-US" sz="3200">
+                <a:solidFill>
+                  <a:srgbClr val="3465a4"/>
+                </a:solidFill>
+                <a:latin typeface="Calibri"/>
+              </a:rPr>
+              <a:t>Quasi-birth-death process</a:t>
+            </a:r>
+            <a:endParaRPr/>
+          </a:p>
+        </p:txBody>
+      </p:sp>
+      <p:sp>
+        <p:nvSpPr>
+          <p:cNvPr id="123" name="Line 7"/>
+          <p:cNvSpPr/>
+          <p:nvPr/>
+        </p:nvSpPr>
+        <p:spPr>
+          <a:xfrm>
+            <a:off x="4261320" y="3391560"/>
+            <a:ext cx="310680" cy="266040"/>
+          </a:xfrm>
+          <a:prstGeom prst="line">
+            <a:avLst/>
+          </a:prstGeom>
+          <a:ln w="19080">
+            <a:solidFill>
+              <a:srgbClr val="ff3333"/>
+            </a:solidFill>
+            <a:round/>
+            <a:tailEnd len="med" type="triangle" w="med"/>
+          </a:ln>
+        </p:spPr>
+      </p:sp>
+      <p:sp>
+        <p:nvSpPr>
+          <p:cNvPr id="124" name="CustomShape 8"/>
+          <p:cNvSpPr/>
+          <p:nvPr/>
+        </p:nvSpPr>
+        <p:spPr>
+          <a:xfrm>
+            <a:off x="3931920" y="5577840"/>
+            <a:ext cx="731520" cy="365760"/>
+          </a:xfrm>
+          <a:prstGeom prst="rightArrow">
             <a:avLst>
               <a:gd name="adj1" fmla="val 16200"/>
               <a:gd name="adj2" fmla="val 5400"/>
@@ -5788,145 +6337,6 @@
             </a:solidFill>
           </a:ln>
         </p:spPr>
-      </p:sp>
-      <p:sp>
-        <p:nvSpPr>
-          <p:cNvPr id="126" name="CustomShape 5"/>
-          <p:cNvSpPr/>
-          <p:nvPr/>
-        </p:nvSpPr>
-        <p:spPr>
-          <a:xfrm>
-            <a:off x="1218960" y="2634480"/>
-            <a:ext cx="6706440" cy="627120"/>
-          </a:xfrm>
-          <a:prstGeom prst="rect">
-            <a:avLst/>
-          </a:prstGeom>
-          <a:noFill/>
-          <a:ln>
-            <a:noFill/>
-          </a:ln>
-        </p:spPr>
-        <p:txBody>
-          <a:bodyPr lIns="90000" rIns="90000" tIns="45000" bIns="45000"/>
-          <a:p>
-            <a:pPr>
-              <a:lnSpc>
-                <a:spcPct val="100000"/>
-              </a:lnSpc>
-            </a:pPr>
-            <a:r>
-              <a:rPr lang="en-US" sz="3200">
-                <a:solidFill>
-                  <a:srgbClr val="3465a4"/>
-                </a:solidFill>
-                <a:latin typeface="Calibri"/>
-              </a:rPr>
-              <a:t>Do not create matrix cell by cell</a:t>
-            </a:r>
-            <a:endParaRPr/>
-          </a:p>
-          <a:p>
-            <a:pPr>
-              <a:lnSpc>
-                <a:spcPct val="100000"/>
-              </a:lnSpc>
-            </a:pPr>
-            <a:endParaRPr/>
-          </a:p>
-          <a:p>
-            <a:pPr>
-              <a:lnSpc>
-                <a:spcPct val="100000"/>
-              </a:lnSpc>
-            </a:pPr>
-            <a:endParaRPr/>
-          </a:p>
-        </p:txBody>
-      </p:sp>
-      <p:sp>
-        <p:nvSpPr>
-          <p:cNvPr id="127" name="CustomShape 6"/>
-          <p:cNvSpPr/>
-          <p:nvPr/>
-        </p:nvSpPr>
-        <p:spPr>
-          <a:xfrm>
-            <a:off x="4389120" y="3344040"/>
-            <a:ext cx="365760" cy="640080"/>
-          </a:xfrm>
-          <a:prstGeom prst="downArrow">
-            <a:avLst>
-              <a:gd name="adj1" fmla="val 16200"/>
-              <a:gd name="adj2" fmla="val 5400"/>
-            </a:avLst>
-          </a:prstGeom>
-          <a:solidFill>
-            <a:srgbClr val="729fcf"/>
-          </a:solidFill>
-          <a:ln>
-            <a:solidFill>
-              <a:srgbClr val="3465a4"/>
-            </a:solidFill>
-          </a:ln>
-        </p:spPr>
-      </p:sp>
-      <p:sp>
-        <p:nvSpPr>
-          <p:cNvPr id="128" name="CustomShape 7"/>
-          <p:cNvSpPr/>
-          <p:nvPr/>
-        </p:nvSpPr>
-        <p:spPr>
-          <a:xfrm>
-            <a:off x="1218960" y="4064400"/>
-            <a:ext cx="6706440" cy="627120"/>
-          </a:xfrm>
-          <a:prstGeom prst="rect">
-            <a:avLst/>
-          </a:prstGeom>
-          <a:noFill/>
-          <a:ln>
-            <a:noFill/>
-          </a:ln>
-        </p:spPr>
-        <p:txBody>
-          <a:bodyPr lIns="90000" rIns="90000" tIns="45000" bIns="45000"/>
-          <a:p>
-            <a:pPr algn="ctr">
-              <a:lnSpc>
-                <a:spcPct val="100000"/>
-              </a:lnSpc>
-            </a:pPr>
-            <a:r>
-              <a:rPr lang="en-US" sz="3200">
-                <a:solidFill>
-                  <a:srgbClr val="3465a4"/>
-                </a:solidFill>
-                <a:latin typeface="Calibri"/>
-              </a:rPr>
-              <a:t>Huge performance boost</a:t>
-            </a:r>
-            <a:endParaRPr/>
-          </a:p>
-          <a:p>
-            <a:pPr>
-              <a:lnSpc>
-                <a:spcPct val="100000"/>
-              </a:lnSpc>
-            </a:pPr>
-            <a:endParaRPr/>
-          </a:p>
-          <a:p>
-            <a:pPr>
-              <a:lnSpc>
-                <a:spcPct val="100000"/>
-              </a:lnSpc>
-            </a:pPr>
-            <a:endParaRPr/>
-          </a:p>
-        </p:txBody>
       </p:sp>
     </p:spTree>
   </p:cSld>
@@ -5979,14 +6389,14 @@
       </p:grpSpPr>
       <p:sp>
         <p:nvSpPr>
-          <p:cNvPr id="129" name="CustomShape 1"/>
+          <p:cNvPr id="125" name="CustomShape 1"/>
           <p:cNvSpPr/>
           <p:nvPr/>
         </p:nvSpPr>
         <p:spPr>
           <a:xfrm>
             <a:off x="457200" y="164520"/>
-            <a:ext cx="8228520" cy="637560"/>
+            <a:ext cx="8228160" cy="637200"/>
           </a:xfrm>
           <a:prstGeom prst="rect">
             <a:avLst/>
@@ -6011,22 +6421,22 @@
                 </a:solidFill>
                 <a:latin typeface="Calibri"/>
               </a:rPr>
-              <a:t>Performance comparison</a:t>
-            </a:r>
-            <a:endParaRPr/>
-          </a:p>
-        </p:txBody>
-      </p:sp>
-      <p:sp>
-        <p:nvSpPr>
-          <p:cNvPr id="130" name="CustomShape 2"/>
+              <a:t>Transition matrix creation</a:t>
+            </a:r>
+            <a:endParaRPr/>
+          </a:p>
+        </p:txBody>
+      </p:sp>
+      <p:sp>
+        <p:nvSpPr>
+          <p:cNvPr id="126" name="CustomShape 2"/>
           <p:cNvSpPr/>
           <p:nvPr/>
         </p:nvSpPr>
         <p:spPr>
           <a:xfrm>
             <a:off x="6553080" y="6356520"/>
-            <a:ext cx="2132640" cy="363960"/>
+            <a:ext cx="2132280" cy="363600"/>
           </a:xfrm>
           <a:prstGeom prst="rect">
             <a:avLst/>
@@ -6052,7 +6462,7 @@
                 <a:spcPct val="100000"/>
               </a:lnSpc>
             </a:pPr>
-            <a:fld id="{BCA78C8F-3FA5-43C6-B0C9-329CEDA04CF2}" type="slidenum">
+            <a:r>
               <a:rPr lang="en-US" sz="1200">
                 <a:solidFill>
                   <a:srgbClr val="404040"/>
@@ -6060,37 +6470,420 @@
                 <a:latin typeface="Arial"/>
                 <a:ea typeface="ＭＳ Ｐゴシック"/>
               </a:rPr>
-              <a:t>&lt;number&gt;</a:t>
-            </a:fld>
-            <a:endParaRPr/>
-          </a:p>
-        </p:txBody>
-      </p:sp>
-      <p:pic>
-        <p:nvPicPr>
-          <p:cNvPr id="131" name="" descr=""/>
-          <p:cNvPicPr/>
-          <p:nvPr/>
-        </p:nvPicPr>
-        <p:blipFill>
-          <a:blip r:embed="rId1"/>
-          <a:stretch>
-            <a:fillRect/>
-          </a:stretch>
-        </p:blipFill>
-        <p:spPr>
-          <a:xfrm>
-            <a:off x="892080" y="1083960"/>
-            <a:ext cx="7424280" cy="5595480"/>
-          </a:xfrm>
-          <a:prstGeom prst="rect">
-            <a:avLst/>
-          </a:prstGeom>
+              <a:t>7</a:t>
+            </a:r>
+            <a:endParaRPr/>
+          </a:p>
+        </p:txBody>
+      </p:sp>
+      <p:sp>
+        <p:nvSpPr>
+          <p:cNvPr id="127" name="CustomShape 3"/>
+          <p:cNvSpPr/>
+          <p:nvPr/>
+        </p:nvSpPr>
+        <p:spPr>
+          <a:xfrm>
+            <a:off x="1623240" y="1060560"/>
+            <a:ext cx="5897160" cy="626760"/>
+          </a:xfrm>
+          <a:prstGeom prst="rect">
+            <a:avLst/>
+          </a:prstGeom>
+          <a:noFill/>
           <a:ln>
             <a:noFill/>
           </a:ln>
         </p:spPr>
-      </p:pic>
+        <p:txBody>
+          <a:bodyPr lIns="90000" rIns="90000" tIns="45000" bIns="45000"/>
+          <a:p>
+            <a:pPr>
+              <a:lnSpc>
+                <a:spcPct val="100000"/>
+              </a:lnSpc>
+            </a:pPr>
+            <a:r>
+              <a:rPr lang="en-US" sz="3200">
+                <a:solidFill>
+                  <a:srgbClr val="3465a4"/>
+                </a:solidFill>
+                <a:latin typeface="Calibri"/>
+              </a:rPr>
+              <a:t>Exploiting internal structure</a:t>
+            </a:r>
+            <a:endParaRPr/>
+          </a:p>
+          <a:p>
+            <a:pPr>
+              <a:lnSpc>
+                <a:spcPct val="100000"/>
+              </a:lnSpc>
+            </a:pPr>
+            <a:endParaRPr/>
+          </a:p>
+          <a:p>
+            <a:pPr>
+              <a:lnSpc>
+                <a:spcPct val="100000"/>
+              </a:lnSpc>
+            </a:pPr>
+            <a:endParaRPr/>
+          </a:p>
+        </p:txBody>
+      </p:sp>
+      <p:sp>
+        <p:nvSpPr>
+          <p:cNvPr id="128" name="CustomShape 4"/>
+          <p:cNvSpPr/>
+          <p:nvPr/>
+        </p:nvSpPr>
+        <p:spPr>
+          <a:xfrm>
+            <a:off x="1218960" y="2130480"/>
+            <a:ext cx="6706080" cy="626760"/>
+          </a:xfrm>
+          <a:prstGeom prst="rect">
+            <a:avLst/>
+          </a:prstGeom>
+          <a:noFill/>
+          <a:ln>
+            <a:noFill/>
+          </a:ln>
+        </p:spPr>
+        <p:txBody>
+          <a:bodyPr lIns="90000" rIns="90000" tIns="45000" bIns="45000"/>
+          <a:p>
+            <a:pPr>
+              <a:lnSpc>
+                <a:spcPct val="100000"/>
+              </a:lnSpc>
+            </a:pPr>
+            <a:r>
+              <a:rPr lang="en-US" sz="3200">
+                <a:solidFill>
+                  <a:srgbClr val="3465a4"/>
+                </a:solidFill>
+                <a:latin typeface="Calibri"/>
+              </a:rPr>
+              <a:t>Do not create matrix cell by cell</a:t>
+            </a:r>
+            <a:endParaRPr/>
+          </a:p>
+          <a:p>
+            <a:pPr>
+              <a:lnSpc>
+                <a:spcPct val="100000"/>
+              </a:lnSpc>
+            </a:pPr>
+            <a:endParaRPr/>
+          </a:p>
+          <a:p>
+            <a:pPr>
+              <a:lnSpc>
+                <a:spcPct val="100000"/>
+              </a:lnSpc>
+            </a:pPr>
+            <a:endParaRPr/>
+          </a:p>
+        </p:txBody>
+      </p:sp>
+      <p:sp>
+        <p:nvSpPr>
+          <p:cNvPr id="129" name="CustomShape 5"/>
+          <p:cNvSpPr/>
+          <p:nvPr/>
+        </p:nvSpPr>
+        <p:spPr>
+          <a:xfrm>
+            <a:off x="1218960" y="3308400"/>
+            <a:ext cx="6706080" cy="626760"/>
+          </a:xfrm>
+          <a:prstGeom prst="rect">
+            <a:avLst/>
+          </a:prstGeom>
+          <a:noFill/>
+          <a:ln>
+            <a:noFill/>
+          </a:ln>
+        </p:spPr>
+        <p:txBody>
+          <a:bodyPr lIns="90000" rIns="90000" tIns="45000" bIns="45000"/>
+          <a:p>
+            <a:pPr algn="ctr">
+              <a:lnSpc>
+                <a:spcPct val="100000"/>
+              </a:lnSpc>
+            </a:pPr>
+            <a:r>
+              <a:rPr lang="en-US" sz="3200">
+                <a:solidFill>
+                  <a:srgbClr val="3465a4"/>
+                </a:solidFill>
+                <a:latin typeface="Calibri"/>
+              </a:rPr>
+              <a:t>Huge </a:t>
+            </a:r>
+            <a:r>
+              <a:rPr lang="en-US" sz="3200">
+                <a:solidFill>
+                  <a:srgbClr val="ff6600"/>
+                </a:solidFill>
+                <a:latin typeface="Calibri"/>
+              </a:rPr>
+              <a:t>performance</a:t>
+            </a:r>
+            <a:r>
+              <a:rPr lang="en-US" sz="3200">
+                <a:solidFill>
+                  <a:srgbClr val="3465a4"/>
+                </a:solidFill>
+                <a:latin typeface="Calibri"/>
+              </a:rPr>
+              <a:t> boost</a:t>
+            </a:r>
+            <a:endParaRPr/>
+          </a:p>
+          <a:p>
+            <a:pPr>
+              <a:lnSpc>
+                <a:spcPct val="100000"/>
+              </a:lnSpc>
+            </a:pPr>
+            <a:endParaRPr/>
+          </a:p>
+          <a:p>
+            <a:pPr>
+              <a:lnSpc>
+                <a:spcPct val="100000"/>
+              </a:lnSpc>
+            </a:pPr>
+            <a:endParaRPr/>
+          </a:p>
+        </p:txBody>
+      </p:sp>
+      <p:sp>
+        <p:nvSpPr>
+          <p:cNvPr id="130" name="CustomShape 6"/>
+          <p:cNvSpPr/>
+          <p:nvPr/>
+        </p:nvSpPr>
+        <p:spPr>
+          <a:xfrm>
+            <a:off x="4434840" y="1635120"/>
+            <a:ext cx="274320" cy="548640"/>
+          </a:xfrm>
+          <a:prstGeom prst="downArrow">
+            <a:avLst>
+              <a:gd name="adj1" fmla="val 16200"/>
+              <a:gd name="adj2" fmla="val 5400"/>
+            </a:avLst>
+          </a:prstGeom>
+          <a:solidFill>
+            <a:srgbClr val="729fcf"/>
+          </a:solidFill>
+          <a:ln>
+            <a:solidFill>
+              <a:srgbClr val="3465a4"/>
+            </a:solidFill>
+          </a:ln>
+        </p:spPr>
+      </p:sp>
+      <p:sp>
+        <p:nvSpPr>
+          <p:cNvPr id="131" name="CustomShape 7"/>
+          <p:cNvSpPr/>
+          <p:nvPr/>
+        </p:nvSpPr>
+        <p:spPr>
+          <a:xfrm>
+            <a:off x="4435200" y="2787480"/>
+            <a:ext cx="274320" cy="548640"/>
+          </a:xfrm>
+          <a:prstGeom prst="downArrow">
+            <a:avLst>
+              <a:gd name="adj1" fmla="val 16200"/>
+              <a:gd name="adj2" fmla="val 5400"/>
+            </a:avLst>
+          </a:prstGeom>
+          <a:solidFill>
+            <a:srgbClr val="729fcf"/>
+          </a:solidFill>
+          <a:ln>
+            <a:solidFill>
+              <a:srgbClr val="3465a4"/>
+            </a:solidFill>
+          </a:ln>
+        </p:spPr>
+      </p:sp>
+      <p:sp>
+        <p:nvSpPr>
+          <p:cNvPr id="132" name="CustomShape 8"/>
+          <p:cNvSpPr/>
+          <p:nvPr/>
+        </p:nvSpPr>
+        <p:spPr>
+          <a:xfrm>
+            <a:off x="4435560" y="3939840"/>
+            <a:ext cx="274320" cy="548640"/>
+          </a:xfrm>
+          <a:prstGeom prst="downArrow">
+            <a:avLst>
+              <a:gd name="adj1" fmla="val 16200"/>
+              <a:gd name="adj2" fmla="val 5400"/>
+            </a:avLst>
+          </a:prstGeom>
+          <a:solidFill>
+            <a:srgbClr val="729fcf"/>
+          </a:solidFill>
+          <a:ln>
+            <a:solidFill>
+              <a:srgbClr val="3465a4"/>
+            </a:solidFill>
+          </a:ln>
+        </p:spPr>
+      </p:sp>
+      <p:sp>
+        <p:nvSpPr>
+          <p:cNvPr id="133" name="CustomShape 9"/>
+          <p:cNvSpPr/>
+          <p:nvPr/>
+        </p:nvSpPr>
+        <p:spPr>
+          <a:xfrm>
+            <a:off x="1233720" y="4450320"/>
+            <a:ext cx="6706080" cy="626760"/>
+          </a:xfrm>
+          <a:prstGeom prst="rect">
+            <a:avLst/>
+          </a:prstGeom>
+          <a:noFill/>
+          <a:ln>
+            <a:noFill/>
+          </a:ln>
+        </p:spPr>
+        <p:txBody>
+          <a:bodyPr lIns="90000" rIns="90000" tIns="45000" bIns="45000"/>
+          <a:p>
+            <a:pPr algn="ctr">
+              <a:lnSpc>
+                <a:spcPct val="100000"/>
+              </a:lnSpc>
+            </a:pPr>
+            <a:r>
+              <a:rPr lang="en-US" sz="3200">
+                <a:solidFill>
+                  <a:srgbClr val="3465a4"/>
+                </a:solidFill>
+                <a:latin typeface="Calibri"/>
+              </a:rPr>
+              <a:t>Bigger matrix can be handled</a:t>
+            </a:r>
+            <a:endParaRPr/>
+          </a:p>
+          <a:p>
+            <a:pPr>
+              <a:lnSpc>
+                <a:spcPct val="100000"/>
+              </a:lnSpc>
+            </a:pPr>
+            <a:endParaRPr/>
+          </a:p>
+        </p:txBody>
+      </p:sp>
+      <p:sp>
+        <p:nvSpPr>
+          <p:cNvPr id="134" name="CustomShape 10"/>
+          <p:cNvSpPr/>
+          <p:nvPr/>
+        </p:nvSpPr>
+        <p:spPr>
+          <a:xfrm>
+            <a:off x="1234440" y="5592240"/>
+            <a:ext cx="6706080" cy="626760"/>
+          </a:xfrm>
+          <a:prstGeom prst="rect">
+            <a:avLst/>
+          </a:prstGeom>
+          <a:noFill/>
+          <a:ln>
+            <a:noFill/>
+          </a:ln>
+        </p:spPr>
+        <p:txBody>
+          <a:bodyPr lIns="90000" rIns="90000" tIns="45000" bIns="45000"/>
+          <a:p>
+            <a:pPr algn="ctr">
+              <a:lnSpc>
+                <a:spcPct val="100000"/>
+              </a:lnSpc>
+            </a:pPr>
+            <a:r>
+              <a:rPr lang="en-US" sz="3200">
+                <a:solidFill>
+                  <a:srgbClr val="3465a4"/>
+                </a:solidFill>
+                <a:latin typeface="Calibri"/>
+              </a:rPr>
+              <a:t>More </a:t>
+            </a:r>
+            <a:r>
+              <a:rPr lang="en-US" sz="3200">
+                <a:solidFill>
+                  <a:srgbClr val="ff6600"/>
+                </a:solidFill>
+                <a:latin typeface="Calibri"/>
+              </a:rPr>
+              <a:t>precision</a:t>
+            </a:r>
+            <a:r>
+              <a:rPr lang="en-US" sz="3200">
+                <a:solidFill>
+                  <a:srgbClr val="3465a4"/>
+                </a:solidFill>
+                <a:latin typeface="Calibri"/>
+              </a:rPr>
+              <a:t> for the results</a:t>
+            </a:r>
+            <a:endParaRPr/>
+          </a:p>
+          <a:p>
+            <a:pPr>
+              <a:lnSpc>
+                <a:spcPct val="100000"/>
+              </a:lnSpc>
+            </a:pPr>
+            <a:endParaRPr/>
+          </a:p>
+        </p:txBody>
+      </p:sp>
+      <p:sp>
+        <p:nvSpPr>
+          <p:cNvPr id="135" name="CustomShape 11"/>
+          <p:cNvSpPr/>
+          <p:nvPr/>
+        </p:nvSpPr>
+        <p:spPr>
+          <a:xfrm>
+            <a:off x="4435920" y="5056200"/>
+            <a:ext cx="274320" cy="548640"/>
+          </a:xfrm>
+          <a:prstGeom prst="downArrow">
+            <a:avLst>
+              <a:gd name="adj1" fmla="val 16200"/>
+              <a:gd name="adj2" fmla="val 5400"/>
+            </a:avLst>
+          </a:prstGeom>
+          <a:solidFill>
+            <a:srgbClr val="729fcf"/>
+          </a:solidFill>
+          <a:ln>
+            <a:solidFill>
+              <a:srgbClr val="3465a4"/>
+            </a:solidFill>
+          </a:ln>
+        </p:spPr>
+      </p:sp>
     </p:spTree>
   </p:cSld>
   <p:timing>
@@ -6142,35 +6935,118 @@
       </p:grpSpPr>
       <p:sp>
         <p:nvSpPr>
-          <p:cNvPr id="132" name="TextShape 1"/>
-          <p:cNvSpPr txBox="1"/>
-          <p:nvPr/>
-        </p:nvSpPr>
-        <p:spPr>
-          <a:xfrm>
-            <a:off x="875160" y="2755800"/>
-            <a:ext cx="7393680" cy="716760"/>
-          </a:xfrm>
-          <a:prstGeom prst="rect">
-            <a:avLst/>
-          </a:prstGeom>
-        </p:spPr>
-        <p:txBody>
-          <a:bodyPr lIns="90000" rIns="90000" tIns="45000" bIns="45000"/>
-          <a:p>
+          <p:cNvPr id="136" name="CustomShape 1"/>
+          <p:cNvSpPr/>
+          <p:nvPr/>
+        </p:nvSpPr>
+        <p:spPr>
+          <a:xfrm>
+            <a:off x="457200" y="164520"/>
+            <a:ext cx="8228160" cy="637200"/>
+          </a:xfrm>
+          <a:prstGeom prst="rect">
+            <a:avLst/>
+          </a:prstGeom>
+          <a:noFill/>
+          <a:ln>
+            <a:noFill/>
+          </a:ln>
+        </p:spPr>
+        <p:txBody>
+          <a:bodyPr lIns="90000" rIns="90000" tIns="45000" bIns="45000" anchor="ctr"/>
+          <a:p>
+            <a:pPr algn="ctr">
+              <a:lnSpc>
+                <a:spcPct val="100000"/>
+              </a:lnSpc>
+            </a:pPr>
             <a:r>
               <a:rPr lang="en-US" sz="4400">
                 <a:solidFill>
-                  <a:srgbClr val="3465a4"/>
+                  <a:srgbClr val="4f81bd"/>
+                </a:solidFill>
+                <a:latin typeface="Calibri"/>
+              </a:rPr>
+              <a:t>Performance comparison</a:t>
+            </a:r>
+            <a:endParaRPr/>
+          </a:p>
+        </p:txBody>
+      </p:sp>
+      <p:sp>
+        <p:nvSpPr>
+          <p:cNvPr id="137" name="CustomShape 2"/>
+          <p:cNvSpPr/>
+          <p:nvPr/>
+        </p:nvSpPr>
+        <p:spPr>
+          <a:xfrm>
+            <a:off x="6553080" y="6356520"/>
+            <a:ext cx="2132280" cy="363600"/>
+          </a:xfrm>
+          <a:prstGeom prst="rect">
+            <a:avLst/>
+          </a:prstGeom>
+          <a:noFill/>
+          <a:ln>
+            <a:noFill/>
+          </a:ln>
+        </p:spPr>
+        <p:txBody>
+          <a:bodyPr lIns="90000" rIns="90000" tIns="45000" bIns="45000" anchor="ctr"/>
+          <a:p>
+            <a:pPr algn="r">
+              <a:lnSpc>
+                <a:spcPct val="100000"/>
+              </a:lnSpc>
+            </a:pPr>
+            <a:endParaRPr/>
+          </a:p>
+          <a:p>
+            <a:pPr algn="r">
+              <a:lnSpc>
+                <a:spcPct val="100000"/>
+              </a:lnSpc>
+            </a:pPr>
+            <a:r>
+              <a:rPr lang="en-US" sz="1200">
+                <a:solidFill>
+                  <a:srgbClr val="404040"/>
                 </a:solidFill>
                 <a:latin typeface="Arial"/>
-              </a:rPr>
-              <a:t>Thank you for your attention!</a:t>
-            </a:r>
-            <a:endParaRPr/>
-          </a:p>
-        </p:txBody>
-      </p:sp>
+                <a:ea typeface="ＭＳ Ｐゴシック"/>
+              </a:rPr>
+              <a:t>8</a:t>
+            </a:r>
+            <a:endParaRPr/>
+          </a:p>
+        </p:txBody>
+      </p:sp>
+      <p:pic>
+        <p:nvPicPr>
+          <p:cNvPr id="138" name="" descr=""/>
+          <p:cNvPicPr/>
+          <p:nvPr/>
+        </p:nvPicPr>
+        <p:blipFill>
+          <a:blip r:embed="rId1"/>
+          <a:stretch>
+            <a:fillRect/>
+          </a:stretch>
+        </p:blipFill>
+        <p:spPr>
+          <a:xfrm>
+            <a:off x="892080" y="1083960"/>
+            <a:ext cx="7423920" cy="5595120"/>
+          </a:xfrm>
+          <a:prstGeom prst="rect">
+            <a:avLst/>
+          </a:prstGeom>
+          <a:ln>
+            <a:noFill/>
+          </a:ln>
+        </p:spPr>
+      </p:pic>
     </p:spTree>
   </p:cSld>
   <p:timing>

</xml_diff>

<commit_message>
added slides for task model & RR
</commit_message>
<xml_diff>
--- a/slides/slides.pptx
+++ b/slides/slides.pptx
@@ -20,6 +20,8 @@
     <p:sldId id="264" r:id="rId13"/>
     <p:sldId id="265" r:id="rId14"/>
     <p:sldId id="266" r:id="rId15"/>
+    <p:sldId id="267" r:id="rId16"/>
+    <p:sldId id="268" r:id="rId17"/>
   </p:sldIdLst>
   <p:sldSz cx="9144000" cy="6858000"/>
   <p:notesSz cx="7099300" cy="10234612"/>
@@ -195,7 +197,7 @@
           <a:bodyPr lIns="0" rIns="0" tIns="0" bIns="0" anchor="b"/>
           <a:p>
             <a:pPr algn="r"/>
-            <a:fld id="{7FEC75C1-D241-451C-B417-C827B78EAF70}" type="slidenum">
+            <a:fld id="{95456169-D006-4A13-9C27-D4E1B0FEC82F}" type="slidenum">
               <a:rPr lang="en-US" sz="1400">
                 <a:latin typeface="Times New Roman"/>
               </a:rPr>
@@ -230,7 +232,7 @@
       </p:grpSpPr>
       <p:sp>
         <p:nvSpPr>
-          <p:cNvPr id="143" name="PlaceHolder 1"/>
+          <p:cNvPr id="154" name="PlaceHolder 1"/>
           <p:cNvSpPr>
             <a:spLocks noGrp="1"/>
           </p:cNvSpPr>
@@ -241,7 +243,7 @@
         <p:spPr>
           <a:xfrm>
             <a:off x="946080" y="4861080"/>
-            <a:ext cx="5204880" cy="4601520"/>
+            <a:ext cx="5204160" cy="4600800"/>
           </a:xfrm>
           <a:prstGeom prst="rect">
             <a:avLst/>
@@ -256,14 +258,14 @@
       </p:sp>
       <p:sp>
         <p:nvSpPr>
-          <p:cNvPr id="144" name="CustomShape 2"/>
+          <p:cNvPr id="155" name="CustomShape 2"/>
           <p:cNvSpPr/>
           <p:nvPr/>
         </p:nvSpPr>
         <p:spPr>
           <a:xfrm>
             <a:off x="4024440" y="9725040"/>
-            <a:ext cx="3072960" cy="507600"/>
+            <a:ext cx="3072240" cy="506880"/>
           </a:xfrm>
           <a:prstGeom prst="rect">
             <a:avLst/>
@@ -281,7 +283,96 @@
                 <a:spcPct val="100000"/>
               </a:lnSpc>
             </a:pPr>
-            <a:fld id="{8C6F0923-43C3-4CD3-B67D-220A46F829EA}" type="slidenum">
+            <a:fld id="{42FFD8CA-16BA-422E-94A0-481C36058C0C}" type="slidenum">
+              <a:rPr lang="en-US" sz="1200">
+                <a:solidFill>
+                  <a:srgbClr val="000000"/>
+                </a:solidFill>
+                <a:latin typeface="Times New Roman"/>
+                <a:ea typeface="ＭＳ Ｐゴシック"/>
+              </a:rPr>
+              <a:t>&lt;number&gt;</a:t>
+            </a:fld>
+            <a:endParaRPr/>
+          </a:p>
+        </p:txBody>
+      </p:sp>
+    </p:spTree>
+  </p:cSld>
+</p:notes>
+</file>
+
+<file path=ppt/notesSlides/notesSlide10.xml><?xml version="1.0" encoding="utf-8"?>
+<p:notes xmlns:a="http://schemas.openxmlformats.org/drawingml/2006/main" xmlns:p="http://schemas.openxmlformats.org/presentationml/2006/main" xmlns:r="http://schemas.openxmlformats.org/officeDocument/2006/relationships">
+  <p:cSld>
+    <p:spTree>
+      <p:nvGrpSpPr>
+        <p:cNvPr id="1" name=""/>
+        <p:cNvGrpSpPr/>
+        <p:nvPr/>
+      </p:nvGrpSpPr>
+      <p:grpSpPr>
+        <a:xfrm>
+          <a:off x="0" y="0"/>
+          <a:ext cx="0" cy="0"/>
+          <a:chOff x="0" y="0"/>
+          <a:chExt cx="0" cy="0"/>
+        </a:xfrm>
+      </p:grpSpPr>
+      <p:sp>
+        <p:nvSpPr>
+          <p:cNvPr id="170" name="PlaceHolder 1"/>
+          <p:cNvSpPr>
+            <a:spLocks noGrp="1"/>
+          </p:cNvSpPr>
+          <p:nvPr>
+            <p:ph type="body"/>
+          </p:nvPr>
+        </p:nvSpPr>
+        <p:spPr>
+          <a:xfrm>
+            <a:off x="946080" y="4861080"/>
+            <a:ext cx="5204880" cy="4601520"/>
+          </a:xfrm>
+          <a:prstGeom prst="rect">
+            <a:avLst/>
+          </a:prstGeom>
+        </p:spPr>
+        <p:txBody>
+          <a:bodyPr lIns="95040" rIns="95040" tIns="47520" bIns="47520"/>
+          <a:p>
+            <a:endParaRPr/>
+          </a:p>
+        </p:txBody>
+      </p:sp>
+      <p:sp>
+        <p:nvSpPr>
+          <p:cNvPr id="171" name="CustomShape 2"/>
+          <p:cNvSpPr/>
+          <p:nvPr/>
+        </p:nvSpPr>
+        <p:spPr>
+          <a:xfrm>
+            <a:off x="4024440" y="9725040"/>
+            <a:ext cx="3072960" cy="507600"/>
+          </a:xfrm>
+          <a:prstGeom prst="rect">
+            <a:avLst/>
+          </a:prstGeom>
+          <a:noFill/>
+          <a:ln>
+            <a:noFill/>
+          </a:ln>
+        </p:spPr>
+        <p:txBody>
+          <a:bodyPr lIns="95040" rIns="95040" tIns="47520" bIns="47520" anchor="b"/>
+          <a:p>
+            <a:pPr>
+              <a:lnSpc>
+                <a:spcPct val="100000"/>
+              </a:lnSpc>
+            </a:pPr>
+            <a:fld id="{8B0A1BCF-5FB8-4DF0-86F1-650936E6DFCD}" type="slidenum">
               <a:rPr lang="en-US" sz="1200">
                 <a:solidFill>
                   <a:srgbClr val="000000"/>
@@ -319,7 +410,7 @@
       </p:grpSpPr>
       <p:sp>
         <p:nvSpPr>
-          <p:cNvPr id="159" name="PlaceHolder 1"/>
+          <p:cNvPr id="172" name="PlaceHolder 1"/>
           <p:cNvSpPr>
             <a:spLocks noGrp="1"/>
           </p:cNvSpPr>
@@ -330,7 +421,7 @@
         <p:spPr>
           <a:xfrm>
             <a:off x="946080" y="4861080"/>
-            <a:ext cx="5205600" cy="4602240"/>
+            <a:ext cx="5204880" cy="4601520"/>
           </a:xfrm>
           <a:prstGeom prst="rect">
             <a:avLst/>
@@ -345,14 +436,14 @@
       </p:sp>
       <p:sp>
         <p:nvSpPr>
-          <p:cNvPr id="160" name="CustomShape 2"/>
+          <p:cNvPr id="173" name="CustomShape 2"/>
           <p:cNvSpPr/>
           <p:nvPr/>
         </p:nvSpPr>
         <p:spPr>
           <a:xfrm>
             <a:off x="4024440" y="9725040"/>
-            <a:ext cx="3073680" cy="508320"/>
+            <a:ext cx="3072960" cy="507600"/>
           </a:xfrm>
           <a:prstGeom prst="rect">
             <a:avLst/>
@@ -370,7 +461,96 @@
                 <a:spcPct val="100000"/>
               </a:lnSpc>
             </a:pPr>
-            <a:fld id="{AA32F149-F61E-40CF-BEB0-4C0B0467E9AF}" type="slidenum">
+            <a:fld id="{93476D06-D8CA-4844-875A-0239C102356C}" type="slidenum">
+              <a:rPr lang="en-US" sz="1200">
+                <a:solidFill>
+                  <a:srgbClr val="000000"/>
+                </a:solidFill>
+                <a:latin typeface="Times New Roman"/>
+                <a:ea typeface="ＭＳ Ｐゴシック"/>
+              </a:rPr>
+              <a:t>&lt;number&gt;</a:t>
+            </a:fld>
+            <a:endParaRPr/>
+          </a:p>
+        </p:txBody>
+      </p:sp>
+    </p:spTree>
+  </p:cSld>
+</p:notes>
+</file>
+
+<file path=ppt/notesSlides/notesSlide13.xml><?xml version="1.0" encoding="utf-8"?>
+<p:notes xmlns:a="http://schemas.openxmlformats.org/drawingml/2006/main" xmlns:p="http://schemas.openxmlformats.org/presentationml/2006/main" xmlns:r="http://schemas.openxmlformats.org/officeDocument/2006/relationships">
+  <p:cSld>
+    <p:spTree>
+      <p:nvGrpSpPr>
+        <p:cNvPr id="1" name=""/>
+        <p:cNvGrpSpPr/>
+        <p:nvPr/>
+      </p:nvGrpSpPr>
+      <p:grpSpPr>
+        <a:xfrm>
+          <a:off x="0" y="0"/>
+          <a:ext cx="0" cy="0"/>
+          <a:chOff x="0" y="0"/>
+          <a:chExt cx="0" cy="0"/>
+        </a:xfrm>
+      </p:grpSpPr>
+      <p:sp>
+        <p:nvSpPr>
+          <p:cNvPr id="174" name="PlaceHolder 1"/>
+          <p:cNvSpPr>
+            <a:spLocks noGrp="1"/>
+          </p:cNvSpPr>
+          <p:nvPr>
+            <p:ph type="body"/>
+          </p:nvPr>
+        </p:nvSpPr>
+        <p:spPr>
+          <a:xfrm>
+            <a:off x="946080" y="4861080"/>
+            <a:ext cx="5204880" cy="4601520"/>
+          </a:xfrm>
+          <a:prstGeom prst="rect">
+            <a:avLst/>
+          </a:prstGeom>
+        </p:spPr>
+        <p:txBody>
+          <a:bodyPr lIns="95040" rIns="95040" tIns="47520" bIns="47520"/>
+          <a:p>
+            <a:endParaRPr/>
+          </a:p>
+        </p:txBody>
+      </p:sp>
+      <p:sp>
+        <p:nvSpPr>
+          <p:cNvPr id="175" name="CustomShape 2"/>
+          <p:cNvSpPr/>
+          <p:nvPr/>
+        </p:nvSpPr>
+        <p:spPr>
+          <a:xfrm>
+            <a:off x="4024440" y="9725040"/>
+            <a:ext cx="3072960" cy="507600"/>
+          </a:xfrm>
+          <a:prstGeom prst="rect">
+            <a:avLst/>
+          </a:prstGeom>
+          <a:noFill/>
+          <a:ln>
+            <a:noFill/>
+          </a:ln>
+        </p:spPr>
+        <p:txBody>
+          <a:bodyPr lIns="95040" rIns="95040" tIns="47520" bIns="47520" anchor="b"/>
+          <a:p>
+            <a:pPr>
+              <a:lnSpc>
+                <a:spcPct val="100000"/>
+              </a:lnSpc>
+            </a:pPr>
+            <a:fld id="{C15AF0BC-1734-41E8-B6B3-8DD0381459F6}" type="slidenum">
               <a:rPr lang="en-US" sz="1200">
                 <a:solidFill>
                   <a:srgbClr val="000000"/>
@@ -408,7 +588,7 @@
       </p:grpSpPr>
       <p:sp>
         <p:nvSpPr>
-          <p:cNvPr id="145" name="PlaceHolder 1"/>
+          <p:cNvPr id="156" name="PlaceHolder 1"/>
           <p:cNvSpPr>
             <a:spLocks noGrp="1"/>
           </p:cNvSpPr>
@@ -419,7 +599,7 @@
         <p:spPr>
           <a:xfrm>
             <a:off x="946080" y="4861080"/>
-            <a:ext cx="5205600" cy="4602240"/>
+            <a:ext cx="5204880" cy="4601520"/>
           </a:xfrm>
           <a:prstGeom prst="rect">
             <a:avLst/>
@@ -434,14 +614,14 @@
       </p:sp>
       <p:sp>
         <p:nvSpPr>
-          <p:cNvPr id="146" name="CustomShape 2"/>
+          <p:cNvPr id="157" name="CustomShape 2"/>
           <p:cNvSpPr/>
           <p:nvPr/>
         </p:nvSpPr>
         <p:spPr>
           <a:xfrm>
             <a:off x="4024440" y="9725040"/>
-            <a:ext cx="3073680" cy="508320"/>
+            <a:ext cx="3072960" cy="507600"/>
           </a:xfrm>
           <a:prstGeom prst="rect">
             <a:avLst/>
@@ -459,7 +639,7 @@
                 <a:spcPct val="100000"/>
               </a:lnSpc>
             </a:pPr>
-            <a:fld id="{B5C66480-5B42-4CCE-9531-E9378E7430EB}" type="slidenum">
+            <a:fld id="{AE2FCB13-3491-49DA-9F61-8102F4236D87}" type="slidenum">
               <a:rPr lang="en-US" sz="1200">
                 <a:solidFill>
                   <a:srgbClr val="000000"/>
@@ -497,7 +677,7 @@
       </p:grpSpPr>
       <p:sp>
         <p:nvSpPr>
-          <p:cNvPr id="147" name="PlaceHolder 1"/>
+          <p:cNvPr id="158" name="PlaceHolder 1"/>
           <p:cNvSpPr>
             <a:spLocks noGrp="1"/>
           </p:cNvSpPr>
@@ -508,7 +688,7 @@
         <p:spPr>
           <a:xfrm>
             <a:off x="946080" y="4861080"/>
-            <a:ext cx="5205600" cy="4602240"/>
+            <a:ext cx="5204880" cy="4601520"/>
           </a:xfrm>
           <a:prstGeom prst="rect">
             <a:avLst/>
@@ -523,14 +703,14 @@
       </p:sp>
       <p:sp>
         <p:nvSpPr>
-          <p:cNvPr id="148" name="CustomShape 2"/>
+          <p:cNvPr id="159" name="CustomShape 2"/>
           <p:cNvSpPr/>
           <p:nvPr/>
         </p:nvSpPr>
         <p:spPr>
           <a:xfrm>
             <a:off x="4024440" y="9725040"/>
-            <a:ext cx="3073680" cy="508320"/>
+            <a:ext cx="3072960" cy="507600"/>
           </a:xfrm>
           <a:prstGeom prst="rect">
             <a:avLst/>
@@ -548,7 +728,7 @@
                 <a:spcPct val="100000"/>
               </a:lnSpc>
             </a:pPr>
-            <a:fld id="{B075B3FA-898D-4B62-B84D-28A2A9AB444C}" type="slidenum">
+            <a:fld id="{B4919E17-FEA1-4382-BFD1-6CE18A0BD604}" type="slidenum">
               <a:rPr lang="en-US" sz="1200">
                 <a:solidFill>
                   <a:srgbClr val="000000"/>
@@ -586,7 +766,7 @@
       </p:grpSpPr>
       <p:sp>
         <p:nvSpPr>
-          <p:cNvPr id="149" name="PlaceHolder 1"/>
+          <p:cNvPr id="160" name="PlaceHolder 1"/>
           <p:cNvSpPr>
             <a:spLocks noGrp="1"/>
           </p:cNvSpPr>
@@ -597,7 +777,7 @@
         <p:spPr>
           <a:xfrm>
             <a:off x="946080" y="4861080"/>
-            <a:ext cx="5205600" cy="4602240"/>
+            <a:ext cx="5204880" cy="4601520"/>
           </a:xfrm>
           <a:prstGeom prst="rect">
             <a:avLst/>
@@ -612,14 +792,14 @@
       </p:sp>
       <p:sp>
         <p:nvSpPr>
-          <p:cNvPr id="150" name="CustomShape 2"/>
+          <p:cNvPr id="161" name="CustomShape 2"/>
           <p:cNvSpPr/>
           <p:nvPr/>
         </p:nvSpPr>
         <p:spPr>
           <a:xfrm>
             <a:off x="4024440" y="9725040"/>
-            <a:ext cx="3073680" cy="508320"/>
+            <a:ext cx="3072960" cy="507600"/>
           </a:xfrm>
           <a:prstGeom prst="rect">
             <a:avLst/>
@@ -637,7 +817,7 @@
                 <a:spcPct val="100000"/>
               </a:lnSpc>
             </a:pPr>
-            <a:fld id="{1E1F5C92-2E78-483E-8167-BEFD3B729391}" type="slidenum">
+            <a:fld id="{D6577803-653A-4A8E-BA77-1C68BB8C10D5}" type="slidenum">
               <a:rPr lang="en-US" sz="1200">
                 <a:solidFill>
                   <a:srgbClr val="000000"/>
@@ -675,7 +855,7 @@
       </p:grpSpPr>
       <p:sp>
         <p:nvSpPr>
-          <p:cNvPr id="151" name="PlaceHolder 1"/>
+          <p:cNvPr id="162" name="PlaceHolder 1"/>
           <p:cNvSpPr>
             <a:spLocks noGrp="1"/>
           </p:cNvSpPr>
@@ -686,7 +866,7 @@
         <p:spPr>
           <a:xfrm>
             <a:off x="946080" y="4861080"/>
-            <a:ext cx="5205600" cy="4602240"/>
+            <a:ext cx="5204880" cy="4601520"/>
           </a:xfrm>
           <a:prstGeom prst="rect">
             <a:avLst/>
@@ -701,14 +881,14 @@
       </p:sp>
       <p:sp>
         <p:nvSpPr>
-          <p:cNvPr id="152" name="CustomShape 2"/>
+          <p:cNvPr id="163" name="CustomShape 2"/>
           <p:cNvSpPr/>
           <p:nvPr/>
         </p:nvSpPr>
         <p:spPr>
           <a:xfrm>
             <a:off x="4024440" y="9725040"/>
-            <a:ext cx="3073680" cy="508320"/>
+            <a:ext cx="3072960" cy="507600"/>
           </a:xfrm>
           <a:prstGeom prst="rect">
             <a:avLst/>
@@ -726,7 +906,7 @@
                 <a:spcPct val="100000"/>
               </a:lnSpc>
             </a:pPr>
-            <a:fld id="{8E9884C4-5FA2-4B9D-A2A6-BCEB7B999E37}" type="slidenum">
+            <a:fld id="{FC9A5461-F91E-4801-B29E-5A38855499C3}" type="slidenum">
               <a:rPr lang="en-US" sz="1200">
                 <a:solidFill>
                   <a:srgbClr val="000000"/>
@@ -764,7 +944,7 @@
       </p:grpSpPr>
       <p:sp>
         <p:nvSpPr>
-          <p:cNvPr id="153" name="PlaceHolder 1"/>
+          <p:cNvPr id="164" name="PlaceHolder 1"/>
           <p:cNvSpPr>
             <a:spLocks noGrp="1"/>
           </p:cNvSpPr>
@@ -775,7 +955,7 @@
         <p:spPr>
           <a:xfrm>
             <a:off x="946080" y="4861080"/>
-            <a:ext cx="5205600" cy="4602240"/>
+            <a:ext cx="5204880" cy="4601520"/>
           </a:xfrm>
           <a:prstGeom prst="rect">
             <a:avLst/>
@@ -790,14 +970,14 @@
       </p:sp>
       <p:sp>
         <p:nvSpPr>
-          <p:cNvPr id="154" name="CustomShape 2"/>
+          <p:cNvPr id="165" name="CustomShape 2"/>
           <p:cNvSpPr/>
           <p:nvPr/>
         </p:nvSpPr>
         <p:spPr>
           <a:xfrm>
             <a:off x="4024440" y="9725040"/>
-            <a:ext cx="3073680" cy="508320"/>
+            <a:ext cx="3072960" cy="507600"/>
           </a:xfrm>
           <a:prstGeom prst="rect">
             <a:avLst/>
@@ -815,7 +995,7 @@
                 <a:spcPct val="100000"/>
               </a:lnSpc>
             </a:pPr>
-            <a:fld id="{6B86F8AC-736C-425C-866F-F9041624792D}" type="slidenum">
+            <a:fld id="{618C61A5-E744-4D83-BAC1-40167177C82C}" type="slidenum">
               <a:rPr lang="en-US" sz="1200">
                 <a:solidFill>
                   <a:srgbClr val="000000"/>
@@ -853,7 +1033,7 @@
       </p:grpSpPr>
       <p:sp>
         <p:nvSpPr>
-          <p:cNvPr id="155" name="PlaceHolder 1"/>
+          <p:cNvPr id="166" name="PlaceHolder 1"/>
           <p:cNvSpPr>
             <a:spLocks noGrp="1"/>
           </p:cNvSpPr>
@@ -864,7 +1044,7 @@
         <p:spPr>
           <a:xfrm>
             <a:off x="946080" y="4861080"/>
-            <a:ext cx="5205600" cy="4602240"/>
+            <a:ext cx="5204880" cy="4601520"/>
           </a:xfrm>
           <a:prstGeom prst="rect">
             <a:avLst/>
@@ -879,14 +1059,14 @@
       </p:sp>
       <p:sp>
         <p:nvSpPr>
-          <p:cNvPr id="156" name="CustomShape 2"/>
+          <p:cNvPr id="167" name="CustomShape 2"/>
           <p:cNvSpPr/>
           <p:nvPr/>
         </p:nvSpPr>
         <p:spPr>
           <a:xfrm>
             <a:off x="4024440" y="9725040"/>
-            <a:ext cx="3073680" cy="508320"/>
+            <a:ext cx="3072960" cy="507600"/>
           </a:xfrm>
           <a:prstGeom prst="rect">
             <a:avLst/>
@@ -904,7 +1084,7 @@
                 <a:spcPct val="100000"/>
               </a:lnSpc>
             </a:pPr>
-            <a:fld id="{7E79624A-5F0D-4AFB-9864-F163B88D9624}" type="slidenum">
+            <a:fld id="{F3E35AD6-3953-4CA1-8489-4452F8F8A0A1}" type="slidenum">
               <a:rPr lang="en-US" sz="1200">
                 <a:solidFill>
                   <a:srgbClr val="000000"/>
@@ -942,7 +1122,7 @@
       </p:grpSpPr>
       <p:sp>
         <p:nvSpPr>
-          <p:cNvPr id="157" name="PlaceHolder 1"/>
+          <p:cNvPr id="168" name="PlaceHolder 1"/>
           <p:cNvSpPr>
             <a:spLocks noGrp="1"/>
           </p:cNvSpPr>
@@ -953,7 +1133,7 @@
         <p:spPr>
           <a:xfrm>
             <a:off x="946080" y="4861080"/>
-            <a:ext cx="5205600" cy="4602240"/>
+            <a:ext cx="5204880" cy="4601520"/>
           </a:xfrm>
           <a:prstGeom prst="rect">
             <a:avLst/>
@@ -968,14 +1148,14 @@
       </p:sp>
       <p:sp>
         <p:nvSpPr>
-          <p:cNvPr id="158" name="CustomShape 2"/>
+          <p:cNvPr id="169" name="CustomShape 2"/>
           <p:cNvSpPr/>
           <p:nvPr/>
         </p:nvSpPr>
         <p:spPr>
           <a:xfrm>
             <a:off x="4024440" y="9725040"/>
-            <a:ext cx="3073680" cy="508320"/>
+            <a:ext cx="3072960" cy="507600"/>
           </a:xfrm>
           <a:prstGeom prst="rect">
             <a:avLst/>
@@ -993,7 +1173,7 @@
                 <a:spcPct val="100000"/>
               </a:lnSpc>
             </a:pPr>
-            <a:fld id="{610335B4-A8E8-4EDA-8A15-906AD75A4353}" type="slidenum">
+            <a:fld id="{D80F3CE6-7420-4847-A236-207788EE56DE}" type="slidenum">
               <a:rPr lang="en-US" sz="1200">
                 <a:solidFill>
                   <a:srgbClr val="000000"/>
@@ -3361,7 +3541,7 @@
         <p:spPr>
           <a:xfrm>
             <a:off x="0" y="932760"/>
-            <a:ext cx="9141840" cy="113040"/>
+            <a:ext cx="9141120" cy="112320"/>
           </a:xfrm>
           <a:prstGeom prst="rect">
             <a:avLst/>
@@ -3383,7 +3563,7 @@
         <p:spPr>
           <a:xfrm>
             <a:off x="7707960" y="6564960"/>
-            <a:ext cx="912240" cy="912240"/>
+            <a:ext cx="911520" cy="911520"/>
           </a:xfrm>
           <a:prstGeom prst="rect">
             <a:avLst/>
@@ -3409,7 +3589,7 @@
         <p:spPr>
           <a:xfrm>
             <a:off x="0" y="0"/>
-            <a:ext cx="9151200" cy="1385280"/>
+            <a:ext cx="9150480" cy="1384560"/>
           </a:xfrm>
           <a:prstGeom prst="rect">
             <a:avLst/>
@@ -3430,7 +3610,7 @@
         </p:nvPicPr>
         <p:blipFill>
           <a:blip r:embed="rId3"/>
-          <a:srcRect l="0" t="0" r="49934" b="45180"/>
+          <a:srcRect l="0" t="0" r="49926" b="45157"/>
           <a:stretch>
             <a:fillRect/>
           </a:stretch>
@@ -3438,7 +3618,7 @@
         <p:spPr>
           <a:xfrm>
             <a:off x="6619320" y="1393560"/>
-            <a:ext cx="2520360" cy="957960"/>
+            <a:ext cx="2519640" cy="957240"/>
           </a:xfrm>
           <a:prstGeom prst="rect">
             <a:avLst/>
@@ -3456,7 +3636,7 @@
         </p:nvPicPr>
         <p:blipFill>
           <a:blip r:embed="rId4"/>
-          <a:srcRect l="0" t="0" r="2328" b="13697"/>
+          <a:srcRect l="0" t="0" r="2304" b="13607"/>
           <a:stretch>
             <a:fillRect/>
           </a:stretch>
@@ -3464,7 +3644,7 @@
         <p:spPr>
           <a:xfrm>
             <a:off x="0" y="1393560"/>
-            <a:ext cx="3398400" cy="881280"/>
+            <a:ext cx="3397680" cy="880560"/>
           </a:xfrm>
           <a:prstGeom prst="rect">
             <a:avLst/>
@@ -3681,7 +3861,7 @@
         <p:spPr>
           <a:xfrm>
             <a:off x="0" y="932760"/>
-            <a:ext cx="9142560" cy="113760"/>
+            <a:ext cx="9141840" cy="113040"/>
           </a:xfrm>
           <a:prstGeom prst="rect">
             <a:avLst/>
@@ -3703,7 +3883,7 @@
         <p:spPr>
           <a:xfrm>
             <a:off x="7707960" y="6564960"/>
-            <a:ext cx="912960" cy="912960"/>
+            <a:ext cx="912240" cy="912240"/>
           </a:xfrm>
           <a:prstGeom prst="rect">
             <a:avLst/>
@@ -3914,7 +4094,7 @@
         <p:spPr>
           <a:xfrm>
             <a:off x="720" y="2377440"/>
-            <a:ext cx="9141840" cy="1739520"/>
+            <a:ext cx="9141120" cy="1738800"/>
           </a:xfrm>
           <a:prstGeom prst="rect">
             <a:avLst/>
@@ -3971,7 +4151,7 @@
         <p:spPr>
           <a:xfrm>
             <a:off x="1189440" y="4480560"/>
-            <a:ext cx="6764400" cy="546840"/>
+            <a:ext cx="6763680" cy="546120"/>
           </a:xfrm>
           <a:prstGeom prst="rect">
             <a:avLst/>
@@ -4011,7 +4191,7 @@
         <p:spPr>
           <a:xfrm>
             <a:off x="10207080" y="2718720"/>
-            <a:ext cx="182520" cy="459360"/>
+            <a:ext cx="181800" cy="458640"/>
           </a:xfrm>
           <a:prstGeom prst="rect">
             <a:avLst/>
@@ -4031,7 +4211,7 @@
         <p:spPr>
           <a:xfrm>
             <a:off x="1855800" y="5852160"/>
-            <a:ext cx="6398640" cy="444600"/>
+            <a:ext cx="6397920" cy="443880"/>
           </a:xfrm>
           <a:prstGeom prst="rect">
             <a:avLst/>
@@ -4080,7 +4260,7 @@
         <p:spPr>
           <a:xfrm>
             <a:off x="1330920" y="2082960"/>
-            <a:ext cx="912240" cy="912240"/>
+            <a:ext cx="911520" cy="911520"/>
           </a:xfrm>
           <a:prstGeom prst="rect">
             <a:avLst/>
@@ -4100,7 +4280,7 @@
         <p:spPr>
           <a:xfrm>
             <a:off x="1855800" y="5486400"/>
-            <a:ext cx="6398640" cy="444600"/>
+            <a:ext cx="6397920" cy="443880"/>
           </a:xfrm>
           <a:prstGeom prst="rect">
             <a:avLst/>
@@ -4149,7 +4329,7 @@
         <p:spPr>
           <a:xfrm>
             <a:off x="6035040" y="1828800"/>
-            <a:ext cx="2924640" cy="1004400"/>
+            <a:ext cx="2923920" cy="1003680"/>
           </a:xfrm>
           <a:prstGeom prst="rect">
             <a:avLst/>
@@ -4169,7 +4349,7 @@
         <p:spPr>
           <a:xfrm>
             <a:off x="6309360" y="2194560"/>
-            <a:ext cx="1461600" cy="364320"/>
+            <a:ext cx="1460880" cy="363600"/>
           </a:xfrm>
           <a:prstGeom prst="rect">
             <a:avLst/>
@@ -4189,7 +4369,7 @@
         <p:spPr>
           <a:xfrm>
             <a:off x="1371600" y="3657600"/>
-            <a:ext cx="2924640" cy="1095840"/>
+            <a:ext cx="2923920" cy="1095120"/>
           </a:xfrm>
           <a:prstGeom prst="rect">
             <a:avLst/>
@@ -4209,7 +4389,7 @@
         <p:spPr>
           <a:xfrm>
             <a:off x="6547680" y="1463040"/>
-            <a:ext cx="2558880" cy="912960"/>
+            <a:ext cx="2558160" cy="912240"/>
           </a:xfrm>
           <a:prstGeom prst="rect">
             <a:avLst/>
@@ -4273,14 +4453,14 @@
       </p:grpSpPr>
       <p:sp>
         <p:nvSpPr>
-          <p:cNvPr id="139" name="CustomShape 1"/>
+          <p:cNvPr id="142" name="CustomShape 1"/>
           <p:cNvSpPr/>
           <p:nvPr/>
         </p:nvSpPr>
         <p:spPr>
           <a:xfrm>
-            <a:off x="875160" y="2755800"/>
-            <a:ext cx="7393320" cy="716400"/>
+            <a:off x="457200" y="164520"/>
+            <a:ext cx="8227440" cy="636480"/>
           </a:xfrm>
           <a:prstGeom prst="rect">
             <a:avLst/>
@@ -4291,20 +4471,241 @@
           </a:ln>
         </p:spPr>
         <p:txBody>
+          <a:bodyPr lIns="90000" rIns="90000" tIns="45000" bIns="45000" anchor="ctr"/>
+          <a:p>
+            <a:pPr algn="ctr">
+              <a:lnSpc>
+                <a:spcPct val="100000"/>
+              </a:lnSpc>
+            </a:pPr>
+            <a:r>
+              <a:rPr lang="en-US" sz="4400">
+                <a:solidFill>
+                  <a:srgbClr val="4f81bd"/>
+                </a:solidFill>
+                <a:latin typeface="Calibri"/>
+              </a:rPr>
+              <a:t>Transition matrix creation</a:t>
+            </a:r>
+            <a:endParaRPr/>
+          </a:p>
+        </p:txBody>
+      </p:sp>
+      <p:sp>
+        <p:nvSpPr>
+          <p:cNvPr id="143" name="CustomShape 2"/>
+          <p:cNvSpPr/>
+          <p:nvPr/>
+        </p:nvSpPr>
+        <p:spPr>
+          <a:xfrm>
+            <a:off x="6553080" y="6356520"/>
+            <a:ext cx="2131560" cy="362880"/>
+          </a:xfrm>
+          <a:prstGeom prst="rect">
+            <a:avLst/>
+          </a:prstGeom>
+          <a:noFill/>
+          <a:ln>
+            <a:noFill/>
+          </a:ln>
+        </p:spPr>
+        <p:txBody>
+          <a:bodyPr lIns="90000" rIns="90000" tIns="45000" bIns="45000" anchor="ctr"/>
+          <a:p>
+            <a:pPr algn="r">
+              <a:lnSpc>
+                <a:spcPct val="100000"/>
+              </a:lnSpc>
+            </a:pPr>
+            <a:endParaRPr/>
+          </a:p>
+          <a:p>
+            <a:pPr algn="r">
+              <a:lnSpc>
+                <a:spcPct val="100000"/>
+              </a:lnSpc>
+            </a:pPr>
+            <a:r>
+              <a:rPr lang="en-US" sz="1200">
+                <a:solidFill>
+                  <a:srgbClr val="404040"/>
+                </a:solidFill>
+                <a:latin typeface="Arial"/>
+                <a:ea typeface="ＭＳ Ｐゴシック"/>
+              </a:rPr>
+              <a:t>9</a:t>
+            </a:r>
+            <a:endParaRPr/>
+          </a:p>
+        </p:txBody>
+      </p:sp>
+      <p:sp>
+        <p:nvSpPr>
+          <p:cNvPr id="144" name="CustomShape 3"/>
+          <p:cNvSpPr/>
+          <p:nvPr/>
+        </p:nvSpPr>
+        <p:spPr>
+          <a:xfrm>
+            <a:off x="411480" y="1636560"/>
+            <a:ext cx="8321040" cy="1649520"/>
+          </a:xfrm>
+          <a:prstGeom prst="rect">
+            <a:avLst/>
+          </a:prstGeom>
+          <a:noFill/>
+          <a:ln>
+            <a:noFill/>
+          </a:ln>
+        </p:spPr>
+        <p:txBody>
           <a:bodyPr lIns="90000" rIns="90000" tIns="45000" bIns="45000"/>
           <a:p>
-            <a:r>
-              <a:rPr lang="en-US" sz="4400">
+            <a:pPr>
+              <a:lnSpc>
+                <a:spcPct val="100000"/>
+              </a:lnSpc>
+            </a:pPr>
+            <a:r>
+              <a:rPr lang="en-US" sz="3200">
                 <a:solidFill>
                   <a:srgbClr val="3465a4"/>
                 </a:solidFill>
-                <a:latin typeface="Arial"/>
-              </a:rPr>
-              <a:t>Thank you for your attention!</a:t>
-            </a:r>
-            <a:endParaRPr/>
-          </a:p>
-        </p:txBody>
+                <a:latin typeface="Calibri"/>
+              </a:rPr>
+              <a:t>Exploiting the internal structure implies a huge </a:t>
+            </a:r>
+            <a:r>
+              <a:rPr lang="en-US" sz="3200">
+                <a:solidFill>
+                  <a:srgbClr val="ff6600"/>
+                </a:solidFill>
+                <a:latin typeface="Calibri"/>
+              </a:rPr>
+              <a:t>performance</a:t>
+            </a:r>
+            <a:r>
+              <a:rPr lang="en-US" sz="3200">
+                <a:solidFill>
+                  <a:srgbClr val="3465a4"/>
+                </a:solidFill>
+                <a:latin typeface="Calibri"/>
+              </a:rPr>
+              <a:t> boost, since the matrix is not created cell by cell</a:t>
+            </a:r>
+            <a:endParaRPr/>
+          </a:p>
+          <a:p>
+            <a:pPr>
+              <a:lnSpc>
+                <a:spcPct val="100000"/>
+              </a:lnSpc>
+            </a:pPr>
+            <a:endParaRPr/>
+          </a:p>
+          <a:p>
+            <a:pPr>
+              <a:lnSpc>
+                <a:spcPct val="100000"/>
+              </a:lnSpc>
+            </a:pPr>
+            <a:endParaRPr/>
+          </a:p>
+        </p:txBody>
+      </p:sp>
+      <p:sp>
+        <p:nvSpPr>
+          <p:cNvPr id="145" name="CustomShape 4"/>
+          <p:cNvSpPr/>
+          <p:nvPr/>
+        </p:nvSpPr>
+        <p:spPr>
+          <a:xfrm>
+            <a:off x="411480" y="4450320"/>
+            <a:ext cx="8321040" cy="2041920"/>
+          </a:xfrm>
+          <a:prstGeom prst="rect">
+            <a:avLst/>
+          </a:prstGeom>
+          <a:noFill/>
+          <a:ln>
+            <a:noFill/>
+          </a:ln>
+        </p:spPr>
+        <p:txBody>
+          <a:bodyPr lIns="90000" rIns="90000" tIns="45000" bIns="45000"/>
+          <a:p>
+            <a:pPr>
+              <a:lnSpc>
+                <a:spcPct val="100000"/>
+              </a:lnSpc>
+            </a:pPr>
+            <a:r>
+              <a:rPr lang="en-US" sz="3200">
+                <a:solidFill>
+                  <a:srgbClr val="3465a4"/>
+                </a:solidFill>
+                <a:latin typeface="Calibri"/>
+              </a:rPr>
+              <a:t>Bigger matrix can be handled and more </a:t>
+            </a:r>
+            <a:r>
+              <a:rPr lang="en-US" sz="3200">
+                <a:solidFill>
+                  <a:srgbClr val="ff6600"/>
+                </a:solidFill>
+                <a:latin typeface="Calibri"/>
+              </a:rPr>
+              <a:t>precision</a:t>
+            </a:r>
+            <a:r>
+              <a:rPr lang="en-US" sz="3200">
+                <a:solidFill>
+                  <a:srgbClr val="3465a4"/>
+                </a:solidFill>
+                <a:latin typeface="Calibri"/>
+              </a:rPr>
+              <a:t> for the results</a:t>
+            </a:r>
+            <a:endParaRPr/>
+          </a:p>
+          <a:p>
+            <a:pPr>
+              <a:lnSpc>
+                <a:spcPct val="100000"/>
+              </a:lnSpc>
+            </a:pPr>
+            <a:endParaRPr/>
+          </a:p>
+        </p:txBody>
+      </p:sp>
+      <p:sp>
+        <p:nvSpPr>
+          <p:cNvPr id="146" name="CustomShape 5"/>
+          <p:cNvSpPr/>
+          <p:nvPr/>
+        </p:nvSpPr>
+        <p:spPr>
+          <a:xfrm>
+            <a:off x="4389120" y="3468960"/>
+            <a:ext cx="365760" cy="731520"/>
+          </a:xfrm>
+          <a:prstGeom prst="downArrow">
+            <a:avLst>
+              <a:gd name="adj1" fmla="val 16200"/>
+              <a:gd name="adj2" fmla="val 5400"/>
+            </a:avLst>
+          </a:prstGeom>
+          <a:solidFill>
+            <a:srgbClr val="729fcf"/>
+          </a:solidFill>
+          <a:ln>
+            <a:solidFill>
+              <a:srgbClr val="3465a4"/>
+            </a:solidFill>
+          </a:ln>
+        </p:spPr>
       </p:sp>
     </p:spTree>
   </p:cSld>
@@ -4357,14 +4758,14 @@
       </p:grpSpPr>
       <p:sp>
         <p:nvSpPr>
-          <p:cNvPr id="140" name="CustomShape 1"/>
+          <p:cNvPr id="147" name="CustomShape 1"/>
           <p:cNvSpPr/>
           <p:nvPr/>
         </p:nvSpPr>
         <p:spPr>
           <a:xfrm>
             <a:off x="457200" y="164520"/>
-            <a:ext cx="8228160" cy="637200"/>
+            <a:ext cx="8227440" cy="636480"/>
           </a:xfrm>
           <a:prstGeom prst="rect">
             <a:avLst/>
@@ -4389,22 +4790,22 @@
                 </a:solidFill>
                 <a:latin typeface="Calibri"/>
               </a:rPr>
-              <a:t>Generic transition matrix</a:t>
-            </a:r>
-            <a:endParaRPr/>
-          </a:p>
-        </p:txBody>
-      </p:sp>
-      <p:sp>
-        <p:nvSpPr>
-          <p:cNvPr id="141" name="CustomShape 2"/>
+              <a:t>Performance comparison</a:t>
+            </a:r>
+            <a:endParaRPr/>
+          </a:p>
+        </p:txBody>
+      </p:sp>
+      <p:sp>
+        <p:nvSpPr>
+          <p:cNvPr id="148" name="CustomShape 2"/>
           <p:cNvSpPr/>
           <p:nvPr/>
         </p:nvSpPr>
         <p:spPr>
           <a:xfrm>
             <a:off x="6553080" y="6356520"/>
-            <a:ext cx="2132280" cy="363600"/>
+            <a:ext cx="2131560" cy="362880"/>
           </a:xfrm>
           <a:prstGeom prst="rect">
             <a:avLst/>
@@ -4430,13 +4831,23 @@
                 <a:spcPct val="100000"/>
               </a:lnSpc>
             </a:pPr>
+            <a:r>
+              <a:rPr lang="en-US" sz="1200">
+                <a:solidFill>
+                  <a:srgbClr val="404040"/>
+                </a:solidFill>
+                <a:latin typeface="Arial"/>
+                <a:ea typeface="ＭＳ Ｐゴシック"/>
+              </a:rPr>
+              <a:t>10</a:t>
+            </a:r>
             <a:endParaRPr/>
           </a:p>
         </p:txBody>
       </p:sp>
       <p:pic>
         <p:nvPicPr>
-          <p:cNvPr id="142" name="" descr=""/>
+          <p:cNvPr id="149" name="" descr=""/>
           <p:cNvPicPr/>
           <p:nvPr/>
         </p:nvPicPr>
@@ -4448,8 +4859,8 @@
         </p:blipFill>
         <p:spPr>
           <a:xfrm>
-            <a:off x="75600" y="1958040"/>
-            <a:ext cx="8993160" cy="3378600"/>
+            <a:off x="892080" y="1083960"/>
+            <a:ext cx="7423200" cy="5594400"/>
           </a:xfrm>
           <a:prstGeom prst="rect">
             <a:avLst/>
@@ -4468,6 +4879,243 @@
           <p:childTnLst>
             <p:seq>
               <p:cTn id="22" nodeType="mainSeq"/>
+              <p:prevCondLst>
+                <p:cond delay="0" evt="onPrev">
+                  <p:tgtEl>
+                    <p:sldTgt/>
+                  </p:tgtEl>
+                </p:cond>
+              </p:prevCondLst>
+              <p:nextCondLst>
+                <p:cond delay="0" evt="onNext">
+                  <p:tgtEl>
+                    <p:sldTgt/>
+                  </p:tgtEl>
+                </p:cond>
+              </p:nextCondLst>
+            </p:seq>
+          </p:childTnLst>
+        </p:cTn>
+      </p:par>
+    </p:tnLst>
+  </p:timing>
+</p:sld>
+</file>
+
+<file path=ppt/slides/slide12.xml><?xml version="1.0" encoding="utf-8"?>
+<p:sld xmlns:a="http://schemas.openxmlformats.org/drawingml/2006/main" xmlns:p="http://schemas.openxmlformats.org/presentationml/2006/main" xmlns:r="http://schemas.openxmlformats.org/officeDocument/2006/relationships">
+  <p:cSld>
+    <p:spTree>
+      <p:nvGrpSpPr>
+        <p:cNvPr id="1" name=""/>
+        <p:cNvGrpSpPr/>
+        <p:nvPr/>
+      </p:nvGrpSpPr>
+      <p:grpSpPr>
+        <a:xfrm>
+          <a:off x="0" y="0"/>
+          <a:ext cx="0" cy="0"/>
+          <a:chOff x="0" y="0"/>
+          <a:chExt cx="0" cy="0"/>
+        </a:xfrm>
+      </p:grpSpPr>
+      <p:sp>
+        <p:nvSpPr>
+          <p:cNvPr id="150" name="CustomShape 1"/>
+          <p:cNvSpPr/>
+          <p:nvPr/>
+        </p:nvSpPr>
+        <p:spPr>
+          <a:xfrm>
+            <a:off x="875160" y="3151800"/>
+            <a:ext cx="7392600" cy="715680"/>
+          </a:xfrm>
+          <a:prstGeom prst="rect">
+            <a:avLst/>
+          </a:prstGeom>
+          <a:noFill/>
+          <a:ln>
+            <a:noFill/>
+          </a:ln>
+        </p:spPr>
+        <p:txBody>
+          <a:bodyPr lIns="90000" rIns="90000" tIns="45000" bIns="45000"/>
+          <a:p>
+            <a:r>
+              <a:rPr lang="en-US" sz="4400">
+                <a:solidFill>
+                  <a:srgbClr val="3465a4"/>
+                </a:solidFill>
+                <a:latin typeface="Arial"/>
+              </a:rPr>
+              <a:t>Thank you for your attention!</a:t>
+            </a:r>
+            <a:endParaRPr/>
+          </a:p>
+        </p:txBody>
+      </p:sp>
+    </p:spTree>
+  </p:cSld>
+  <p:timing>
+    <p:tnLst>
+      <p:par>
+        <p:cTn id="23" dur="indefinite" restart="never" nodeType="tmRoot">
+          <p:childTnLst>
+            <p:seq>
+              <p:cTn id="24" nodeType="mainSeq"/>
+              <p:prevCondLst>
+                <p:cond delay="0" evt="onPrev">
+                  <p:tgtEl>
+                    <p:sldTgt/>
+                  </p:tgtEl>
+                </p:cond>
+              </p:prevCondLst>
+              <p:nextCondLst>
+                <p:cond delay="0" evt="onNext">
+                  <p:tgtEl>
+                    <p:sldTgt/>
+                  </p:tgtEl>
+                </p:cond>
+              </p:nextCondLst>
+            </p:seq>
+          </p:childTnLst>
+        </p:cTn>
+      </p:par>
+    </p:tnLst>
+  </p:timing>
+</p:sld>
+</file>
+
+<file path=ppt/slides/slide13.xml><?xml version="1.0" encoding="utf-8"?>
+<p:sld xmlns:a="http://schemas.openxmlformats.org/drawingml/2006/main" xmlns:p="http://schemas.openxmlformats.org/presentationml/2006/main" xmlns:r="http://schemas.openxmlformats.org/officeDocument/2006/relationships">
+  <p:cSld>
+    <p:spTree>
+      <p:nvGrpSpPr>
+        <p:cNvPr id="1" name=""/>
+        <p:cNvGrpSpPr/>
+        <p:nvPr/>
+      </p:nvGrpSpPr>
+      <p:grpSpPr>
+        <a:xfrm>
+          <a:off x="0" y="0"/>
+          <a:ext cx="0" cy="0"/>
+          <a:chOff x="0" y="0"/>
+          <a:chExt cx="0" cy="0"/>
+        </a:xfrm>
+      </p:grpSpPr>
+      <p:sp>
+        <p:nvSpPr>
+          <p:cNvPr id="151" name="CustomShape 1"/>
+          <p:cNvSpPr/>
+          <p:nvPr/>
+        </p:nvSpPr>
+        <p:spPr>
+          <a:xfrm>
+            <a:off x="457200" y="164520"/>
+            <a:ext cx="8227440" cy="636480"/>
+          </a:xfrm>
+          <a:prstGeom prst="rect">
+            <a:avLst/>
+          </a:prstGeom>
+          <a:noFill/>
+          <a:ln>
+            <a:noFill/>
+          </a:ln>
+        </p:spPr>
+        <p:txBody>
+          <a:bodyPr lIns="90000" rIns="90000" tIns="45000" bIns="45000" anchor="ctr"/>
+          <a:p>
+            <a:pPr algn="ctr">
+              <a:lnSpc>
+                <a:spcPct val="100000"/>
+              </a:lnSpc>
+            </a:pPr>
+            <a:r>
+              <a:rPr lang="en-US" sz="4400">
+                <a:solidFill>
+                  <a:srgbClr val="4f81bd"/>
+                </a:solidFill>
+                <a:latin typeface="Calibri"/>
+              </a:rPr>
+              <a:t>Generic transition matrix</a:t>
+            </a:r>
+            <a:endParaRPr/>
+          </a:p>
+        </p:txBody>
+      </p:sp>
+      <p:sp>
+        <p:nvSpPr>
+          <p:cNvPr id="152" name="CustomShape 2"/>
+          <p:cNvSpPr/>
+          <p:nvPr/>
+        </p:nvSpPr>
+        <p:spPr>
+          <a:xfrm>
+            <a:off x="6553080" y="6356520"/>
+            <a:ext cx="2131560" cy="362880"/>
+          </a:xfrm>
+          <a:prstGeom prst="rect">
+            <a:avLst/>
+          </a:prstGeom>
+          <a:noFill/>
+          <a:ln>
+            <a:noFill/>
+          </a:ln>
+        </p:spPr>
+        <p:txBody>
+          <a:bodyPr lIns="90000" rIns="90000" tIns="45000" bIns="45000" anchor="ctr"/>
+          <a:p>
+            <a:pPr algn="r">
+              <a:lnSpc>
+                <a:spcPct val="100000"/>
+              </a:lnSpc>
+            </a:pPr>
+            <a:endParaRPr/>
+          </a:p>
+          <a:p>
+            <a:pPr algn="r">
+              <a:lnSpc>
+                <a:spcPct val="100000"/>
+              </a:lnSpc>
+            </a:pPr>
+            <a:endParaRPr/>
+          </a:p>
+        </p:txBody>
+      </p:sp>
+      <p:pic>
+        <p:nvPicPr>
+          <p:cNvPr id="153" name="" descr=""/>
+          <p:cNvPicPr/>
+          <p:nvPr/>
+        </p:nvPicPr>
+        <p:blipFill>
+          <a:blip r:embed="rId1"/>
+          <a:stretch>
+            <a:fillRect/>
+          </a:stretch>
+        </p:blipFill>
+        <p:spPr>
+          <a:xfrm>
+            <a:off x="75600" y="1958040"/>
+            <a:ext cx="8992440" cy="3377880"/>
+          </a:xfrm>
+          <a:prstGeom prst="rect">
+            <a:avLst/>
+          </a:prstGeom>
+          <a:ln>
+            <a:noFill/>
+          </a:ln>
+        </p:spPr>
+      </p:pic>
+    </p:spTree>
+  </p:cSld>
+  <p:timing>
+    <p:tnLst>
+      <p:par>
+        <p:cTn id="25" dur="indefinite" restart="never" nodeType="tmRoot">
+          <p:childTnLst>
+            <p:seq>
+              <p:cTn id="26" nodeType="mainSeq"/>
               <p:prevCondLst>
                 <p:cond delay="0" evt="onPrev">
                   <p:tgtEl>
@@ -4517,7 +5165,7 @@
         <p:spPr>
           <a:xfrm>
             <a:off x="457200" y="164520"/>
-            <a:ext cx="8228160" cy="637200"/>
+            <a:ext cx="8227440" cy="636480"/>
           </a:xfrm>
           <a:prstGeom prst="rect">
             <a:avLst/>
@@ -4557,7 +5205,7 @@
         <p:spPr>
           <a:xfrm>
             <a:off x="457200" y="1744200"/>
-            <a:ext cx="8228160" cy="4524480"/>
+            <a:ext cx="8227440" cy="4523760"/>
           </a:xfrm>
           <a:prstGeom prst="rect">
             <a:avLst/>
@@ -4622,7 +5270,7 @@
                 </a:solidFill>
                 <a:latin typeface="Calibri"/>
               </a:rPr>
-              <a:t>RR as Markov chain</a:t>
+              <a:t>Task model</a:t>
             </a:r>
             <a:endParaRPr/>
           </a:p>
@@ -4641,7 +5289,7 @@
                 </a:solidFill>
                 <a:latin typeface="Calibri"/>
               </a:rPr>
-              <a:t>Transition matrix creation</a:t>
+              <a:t>Resource reservation scheduling</a:t>
             </a:r>
             <a:endParaRPr/>
           </a:p>
@@ -4660,6 +5308,25 @@
                 </a:solidFill>
                 <a:latin typeface="Calibri"/>
               </a:rPr>
+              <a:t>Transition matrix creation</a:t>
+            </a:r>
+            <a:endParaRPr/>
+          </a:p>
+          <a:p>
+            <a:pPr>
+              <a:lnSpc>
+                <a:spcPct val="100000"/>
+              </a:lnSpc>
+              <a:buFont typeface="Arial"/>
+              <a:buChar char="•"/>
+            </a:pPr>
+            <a:r>
+              <a:rPr lang="en-US" sz="3200">
+                <a:solidFill>
+                  <a:srgbClr val="3465a4"/>
+                </a:solidFill>
+                <a:latin typeface="Calibri"/>
+              </a:rPr>
               <a:t>Conclusion</a:t>
             </a:r>
             <a:endParaRPr/>
@@ -4675,7 +5342,7 @@
         <p:spPr>
           <a:xfrm>
             <a:off x="6553080" y="6356520"/>
-            <a:ext cx="2132280" cy="363600"/>
+            <a:ext cx="2131560" cy="362880"/>
           </a:xfrm>
           <a:prstGeom prst="rect">
             <a:avLst/>
@@ -4773,7 +5440,7 @@
         <p:spPr>
           <a:xfrm>
             <a:off x="457200" y="164520"/>
-            <a:ext cx="8228160" cy="637200"/>
+            <a:ext cx="8227440" cy="636480"/>
           </a:xfrm>
           <a:prstGeom prst="rect">
             <a:avLst/>
@@ -4813,7 +5480,7 @@
         <p:spPr>
           <a:xfrm>
             <a:off x="6553080" y="6356520"/>
-            <a:ext cx="2132280" cy="363600"/>
+            <a:ext cx="2131560" cy="362880"/>
           </a:xfrm>
           <a:prstGeom prst="rect">
             <a:avLst/>
@@ -4868,7 +5535,7 @@
         <p:spPr>
           <a:xfrm>
             <a:off x="365760" y="2568240"/>
-            <a:ext cx="2193480" cy="1736280"/>
+            <a:ext cx="2192760" cy="1735560"/>
           </a:xfrm>
           <a:prstGeom prst="rect">
             <a:avLst/>
@@ -4893,7 +5560,7 @@
         <p:spPr>
           <a:xfrm>
             <a:off x="2615760" y="2194560"/>
-            <a:ext cx="1863720" cy="2559240"/>
+            <a:ext cx="1863000" cy="2558520"/>
           </a:xfrm>
           <a:prstGeom prst="rect">
             <a:avLst/>
@@ -4912,7 +5579,7 @@
         <p:spPr>
           <a:xfrm>
             <a:off x="640080" y="5311440"/>
-            <a:ext cx="3656520" cy="446040"/>
+            <a:ext cx="3655800" cy="445320"/>
           </a:xfrm>
           <a:prstGeom prst="rect">
             <a:avLst/>
@@ -4953,7 +5620,7 @@
         <p:spPr>
           <a:xfrm>
             <a:off x="5120640" y="2139120"/>
-            <a:ext cx="3782520" cy="1279080"/>
+            <a:ext cx="3781800" cy="1278360"/>
           </a:xfrm>
           <a:prstGeom prst="rect">
             <a:avLst/>
@@ -4978,7 +5645,7 @@
         <p:spPr>
           <a:xfrm>
             <a:off x="6126480" y="3455280"/>
-            <a:ext cx="1790640" cy="1736280"/>
+            <a:ext cx="1789920" cy="1735560"/>
           </a:xfrm>
           <a:prstGeom prst="rect">
             <a:avLst/>
@@ -4997,7 +5664,7 @@
         <p:spPr>
           <a:xfrm>
             <a:off x="5056560" y="5300280"/>
-            <a:ext cx="3864600" cy="446040"/>
+            <a:ext cx="3863880" cy="445320"/>
           </a:xfrm>
           <a:prstGeom prst="rect">
             <a:avLst/>
@@ -5032,7 +5699,7 @@
         <p:spPr>
           <a:xfrm>
             <a:off x="1264680" y="1230480"/>
-            <a:ext cx="6614640" cy="626760"/>
+            <a:ext cx="6613920" cy="626040"/>
           </a:xfrm>
           <a:prstGeom prst="rect">
             <a:avLst/>
@@ -5137,7 +5804,7 @@
         <p:spPr>
           <a:xfrm>
             <a:off x="457200" y="164520"/>
-            <a:ext cx="8228160" cy="637200"/>
+            <a:ext cx="8227440" cy="636480"/>
           </a:xfrm>
           <a:prstGeom prst="rect">
             <a:avLst/>
@@ -5177,7 +5844,7 @@
         <p:spPr>
           <a:xfrm>
             <a:off x="6553080" y="6356520"/>
-            <a:ext cx="2132280" cy="363600"/>
+            <a:ext cx="2131560" cy="362880"/>
           </a:xfrm>
           <a:prstGeom prst="rect">
             <a:avLst/>
@@ -5225,8 +5892,8 @@
         </p:nvSpPr>
         <p:spPr>
           <a:xfrm>
-            <a:off x="457560" y="1384560"/>
-            <a:ext cx="8503200" cy="4924440"/>
+            <a:off x="457560" y="1737360"/>
+            <a:ext cx="8502480" cy="4570920"/>
           </a:xfrm>
           <a:prstGeom prst="rect">
             <a:avLst/>
@@ -5410,7 +6077,7 @@
         <p:spPr>
           <a:xfrm>
             <a:off x="457200" y="164520"/>
-            <a:ext cx="8228160" cy="637200"/>
+            <a:ext cx="8227440" cy="636480"/>
           </a:xfrm>
           <a:prstGeom prst="rect">
             <a:avLst/>
@@ -5450,7 +6117,7 @@
         <p:spPr>
           <a:xfrm>
             <a:off x="6553080" y="6356520"/>
-            <a:ext cx="2132280" cy="363600"/>
+            <a:ext cx="2131560" cy="362880"/>
           </a:xfrm>
           <a:prstGeom prst="rect">
             <a:avLst/>
@@ -5499,7 +6166,7 @@
         <p:spPr>
           <a:xfrm>
             <a:off x="457560" y="1384560"/>
-            <a:ext cx="8228160" cy="2460600"/>
+            <a:ext cx="8227440" cy="2459880"/>
           </a:xfrm>
           <a:prstGeom prst="rect">
             <a:avLst/>
@@ -5637,7 +6304,7 @@
         <p:spPr>
           <a:xfrm>
             <a:off x="2073600" y="4216320"/>
-            <a:ext cx="4995720" cy="1850760"/>
+            <a:ext cx="4995000" cy="1850040"/>
           </a:xfrm>
           <a:prstGeom prst="rect">
             <a:avLst/>
@@ -5705,7 +6372,7 @@
         <p:spPr>
           <a:xfrm>
             <a:off x="457200" y="164520"/>
-            <a:ext cx="8228160" cy="637200"/>
+            <a:ext cx="8227440" cy="636480"/>
           </a:xfrm>
           <a:prstGeom prst="rect">
             <a:avLst/>
@@ -5745,7 +6412,7 @@
         <p:spPr>
           <a:xfrm>
             <a:off x="6553080" y="6356520"/>
-            <a:ext cx="2132280" cy="363600"/>
+            <a:ext cx="2131560" cy="362880"/>
           </a:xfrm>
           <a:prstGeom prst="rect">
             <a:avLst/>
@@ -5794,7 +6461,7 @@
         <p:spPr>
           <a:xfrm>
             <a:off x="457560" y="1384560"/>
-            <a:ext cx="8503200" cy="4924440"/>
+            <a:ext cx="8502480" cy="4923720"/>
           </a:xfrm>
           <a:prstGeom prst="rect">
             <a:avLst/>
@@ -6040,7 +6707,7 @@
         <p:spPr>
           <a:xfrm>
             <a:off x="457200" y="164520"/>
-            <a:ext cx="8228160" cy="637200"/>
+            <a:ext cx="8227440" cy="636480"/>
           </a:xfrm>
           <a:prstGeom prst="rect">
             <a:avLst/>
@@ -6065,7 +6732,7 @@
                 </a:solidFill>
                 <a:latin typeface="Calibri"/>
               </a:rPr>
-              <a:t>RR as Markov chain</a:t>
+              <a:t>Task model</a:t>
             </a:r>
             <a:endParaRPr/>
           </a:p>
@@ -6080,7 +6747,7 @@
         <p:spPr>
           <a:xfrm>
             <a:off x="6553080" y="6356520"/>
-            <a:ext cx="2132280" cy="363600"/>
+            <a:ext cx="2131560" cy="362880"/>
           </a:xfrm>
           <a:prstGeom prst="rect">
             <a:avLst/>
@@ -6120,49 +6787,9 @@
           </a:p>
         </p:txBody>
       </p:sp>
-      <p:sp>
-        <p:nvSpPr>
-          <p:cNvPr id="118" name="CustomShape 3"/>
-          <p:cNvSpPr/>
-          <p:nvPr/>
-        </p:nvSpPr>
-        <p:spPr>
-          <a:xfrm>
-            <a:off x="366120" y="1384560"/>
-            <a:ext cx="8411400" cy="1175040"/>
-          </a:xfrm>
-          <a:prstGeom prst="rect">
-            <a:avLst/>
-          </a:prstGeom>
-          <a:noFill/>
-          <a:ln>
-            <a:noFill/>
-          </a:ln>
-        </p:spPr>
-        <p:txBody>
-          <a:bodyPr lIns="90000" rIns="90000" tIns="45000" bIns="45000"/>
-          <a:p>
-            <a:pPr algn="just">
-              <a:lnSpc>
-                <a:spcPct val="100000"/>
-              </a:lnSpc>
-            </a:pPr>
-            <a:r>
-              <a:rPr lang="en-US" sz="3200">
-                <a:solidFill>
-                  <a:srgbClr val="3465a4"/>
-                </a:solidFill>
-                <a:latin typeface="Calibri"/>
-              </a:rPr>
-              <a:t>The transition matrix P for a resource reservation task:</a:t>
-            </a:r>
-            <a:endParaRPr/>
-          </a:p>
-        </p:txBody>
-      </p:sp>
       <p:pic>
         <p:nvPicPr>
-          <p:cNvPr id="119" name="" descr=""/>
+          <p:cNvPr id="118" name="" descr=""/>
           <p:cNvPicPr/>
           <p:nvPr/>
         </p:nvPicPr>
@@ -6174,8 +6801,8 @@
         </p:blipFill>
         <p:spPr>
           <a:xfrm>
-            <a:off x="2555640" y="2549880"/>
-            <a:ext cx="4032000" cy="2395800"/>
+            <a:off x="2070720" y="1640160"/>
+            <a:ext cx="5002920" cy="1645920"/>
           </a:xfrm>
           <a:prstGeom prst="rect">
             <a:avLst/>
@@ -6187,37 +6814,368 @@
       </p:pic>
       <p:sp>
         <p:nvSpPr>
-          <p:cNvPr id="120" name="CustomShape 4"/>
+          <p:cNvPr id="119" name="Line 3"/>
           <p:cNvSpPr/>
           <p:nvPr/>
         </p:nvSpPr>
         <p:spPr>
-          <a:xfrm>
-            <a:off x="3255840" y="2640960"/>
-            <a:ext cx="1005120" cy="750240"/>
-          </a:xfrm>
-          <a:prstGeom prst="rect">
-            <a:avLst/>
-          </a:prstGeom>
-          <a:noFill/>
-          <a:ln w="29160">
+          <a:xfrm flipV="1">
+            <a:off x="1974960" y="3122640"/>
+            <a:ext cx="438480" cy="218880"/>
+          </a:xfrm>
+          <a:prstGeom prst="line">
+            <a:avLst/>
+          </a:prstGeom>
+          <a:ln>
             <a:solidFill>
-              <a:srgbClr val="ff3333"/>
+              <a:srgbClr val="000000"/>
             </a:solidFill>
-            <a:round/>
-          </a:ln>
-        </p:spPr>
-      </p:sp>
-      <p:sp>
-        <p:nvSpPr>
-          <p:cNvPr id="121" name="CustomShape 5"/>
+            <a:custDash>
+              <a:ds d="51000" sp="51000"/>
+              <a:ds d="51000" sp="51000"/>
+            </a:custDash>
+            <a:tailEnd len="med" type="triangle" w="med"/>
+          </a:ln>
+        </p:spPr>
+      </p:sp>
+      <p:sp>
+        <p:nvSpPr>
+          <p:cNvPr id="120" name="TextShape 4"/>
+          <p:cNvSpPr txBox="1"/>
+          <p:nvPr/>
+        </p:nvSpPr>
+        <p:spPr>
+          <a:xfrm>
+            <a:off x="1047600" y="3091320"/>
+            <a:ext cx="927360" cy="602280"/>
+          </a:xfrm>
+          <a:prstGeom prst="rect">
+            <a:avLst/>
+          </a:prstGeom>
+        </p:spPr>
+        <p:txBody>
+          <a:bodyPr lIns="90000" rIns="90000" tIns="45000" bIns="45000"/>
+          <a:p>
+            <a:r>
+              <a:rPr lang="en-US">
+                <a:solidFill>
+                  <a:srgbClr val="3465a4"/>
+                </a:solidFill>
+                <a:latin typeface="Arial"/>
+              </a:rPr>
+              <a:t>release</a:t>
+            </a:r>
+            <a:r>
+              <a:rPr lang="en-US">
+                <a:solidFill>
+                  <a:srgbClr val="3465a4"/>
+                </a:solidFill>
+                <a:latin typeface="Arial"/>
+              </a:rPr>
+              <a:t>
+</a:t>
+            </a:r>
+            <a:r>
+              <a:rPr lang="en-US">
+                <a:solidFill>
+                  <a:srgbClr val="3465a4"/>
+                </a:solidFill>
+                <a:latin typeface="Arial"/>
+              </a:rPr>
+              <a:t>time</a:t>
+            </a:r>
+            <a:endParaRPr/>
+          </a:p>
+        </p:txBody>
+      </p:sp>
+      <p:sp>
+        <p:nvSpPr>
+          <p:cNvPr id="121" name="Line 5"/>
           <p:cNvSpPr/>
           <p:nvPr/>
         </p:nvSpPr>
         <p:spPr>
-          <a:xfrm>
-            <a:off x="690120" y="5195880"/>
-            <a:ext cx="3382200" cy="655560"/>
+          <a:xfrm flipV="1">
+            <a:off x="5394960" y="3286080"/>
+            <a:ext cx="0" cy="421200"/>
+          </a:xfrm>
+          <a:prstGeom prst="line">
+            <a:avLst/>
+          </a:prstGeom>
+          <a:ln>
+            <a:solidFill>
+              <a:srgbClr val="000000"/>
+            </a:solidFill>
+            <a:custDash>
+              <a:ds d="51000" sp="51000"/>
+              <a:ds d="51000" sp="51000"/>
+            </a:custDash>
+            <a:tailEnd len="med" type="triangle" w="med"/>
+          </a:ln>
+        </p:spPr>
+      </p:sp>
+      <p:sp>
+        <p:nvSpPr>
+          <p:cNvPr id="122" name="Line 6"/>
+          <p:cNvSpPr/>
+          <p:nvPr/>
+        </p:nvSpPr>
+        <p:spPr>
+          <a:xfrm flipH="1" flipV="1">
+            <a:off x="6458760" y="3108960"/>
+            <a:ext cx="526680" cy="177120"/>
+          </a:xfrm>
+          <a:prstGeom prst="line">
+            <a:avLst/>
+          </a:prstGeom>
+          <a:ln>
+            <a:solidFill>
+              <a:srgbClr val="000000"/>
+            </a:solidFill>
+            <a:custDash>
+              <a:ds d="51000" sp="51000"/>
+              <a:ds d="51000" sp="51000"/>
+            </a:custDash>
+            <a:tailEnd len="med" type="triangle" w="med"/>
+          </a:ln>
+        </p:spPr>
+      </p:sp>
+      <p:sp>
+        <p:nvSpPr>
+          <p:cNvPr id="123" name="Line 7"/>
+          <p:cNvSpPr/>
+          <p:nvPr/>
+        </p:nvSpPr>
+        <p:spPr>
+          <a:xfrm flipV="1">
+            <a:off x="4297680" y="2446560"/>
+            <a:ext cx="0" cy="707760"/>
+          </a:xfrm>
+          <a:prstGeom prst="line">
+            <a:avLst/>
+          </a:prstGeom>
+          <a:ln>
+            <a:solidFill>
+              <a:srgbClr val="000000"/>
+            </a:solidFill>
+            <a:custDash>
+              <a:ds d="51000" sp="51000"/>
+              <a:ds d="51000" sp="51000"/>
+            </a:custDash>
+            <a:tailEnd len="med" type="triangle" w="med"/>
+          </a:ln>
+        </p:spPr>
+      </p:sp>
+      <p:sp>
+        <p:nvSpPr>
+          <p:cNvPr id="124" name="TextShape 8"/>
+          <p:cNvSpPr txBox="1"/>
+          <p:nvPr/>
+        </p:nvSpPr>
+        <p:spPr>
+          <a:xfrm>
+            <a:off x="3567600" y="3163680"/>
+            <a:ext cx="1422720" cy="602280"/>
+          </a:xfrm>
+          <a:prstGeom prst="rect">
+            <a:avLst/>
+          </a:prstGeom>
+        </p:spPr>
+        <p:txBody>
+          <a:bodyPr lIns="90000" rIns="90000" tIns="45000" bIns="45000"/>
+          <a:p>
+            <a:r>
+              <a:rPr lang="en-US">
+                <a:solidFill>
+                  <a:srgbClr val="3465a4"/>
+                </a:solidFill>
+                <a:latin typeface="Arial"/>
+              </a:rPr>
+              <a:t>computation</a:t>
+            </a:r>
+            <a:r>
+              <a:rPr lang="en-US">
+                <a:solidFill>
+                  <a:srgbClr val="3465a4"/>
+                </a:solidFill>
+                <a:latin typeface="Arial"/>
+              </a:rPr>
+              <a:t>
+</a:t>
+            </a:r>
+            <a:r>
+              <a:rPr lang="en-US">
+                <a:solidFill>
+                  <a:srgbClr val="3465a4"/>
+                </a:solidFill>
+                <a:latin typeface="Arial"/>
+              </a:rPr>
+              <a:t>time</a:t>
+            </a:r>
+            <a:endParaRPr/>
+          </a:p>
+        </p:txBody>
+      </p:sp>
+      <p:sp>
+        <p:nvSpPr>
+          <p:cNvPr id="125" name="TextShape 9"/>
+          <p:cNvSpPr txBox="1"/>
+          <p:nvPr/>
+        </p:nvSpPr>
+        <p:spPr>
+          <a:xfrm>
+            <a:off x="4899600" y="3703680"/>
+            <a:ext cx="1015920" cy="602280"/>
+          </a:xfrm>
+          <a:prstGeom prst="rect">
+            <a:avLst/>
+          </a:prstGeom>
+        </p:spPr>
+        <p:txBody>
+          <a:bodyPr lIns="90000" rIns="90000" tIns="45000" bIns="45000"/>
+          <a:p>
+            <a:r>
+              <a:rPr lang="en-US">
+                <a:solidFill>
+                  <a:srgbClr val="3465a4"/>
+                </a:solidFill>
+                <a:latin typeface="Arial"/>
+              </a:rPr>
+              <a:t>finishing</a:t>
+            </a:r>
+            <a:r>
+              <a:rPr lang="en-US">
+                <a:solidFill>
+                  <a:srgbClr val="3465a4"/>
+                </a:solidFill>
+                <a:latin typeface="Arial"/>
+              </a:rPr>
+              <a:t>
+</a:t>
+            </a:r>
+            <a:r>
+              <a:rPr lang="en-US">
+                <a:solidFill>
+                  <a:srgbClr val="3465a4"/>
+                </a:solidFill>
+                <a:latin typeface="Arial"/>
+              </a:rPr>
+              <a:t>time</a:t>
+            </a:r>
+            <a:endParaRPr/>
+          </a:p>
+        </p:txBody>
+      </p:sp>
+      <p:sp>
+        <p:nvSpPr>
+          <p:cNvPr id="126" name="TextShape 10"/>
+          <p:cNvSpPr txBox="1"/>
+          <p:nvPr/>
+        </p:nvSpPr>
+        <p:spPr>
+          <a:xfrm>
+            <a:off x="1047600" y="3091680"/>
+            <a:ext cx="927360" cy="602280"/>
+          </a:xfrm>
+          <a:prstGeom prst="rect">
+            <a:avLst/>
+          </a:prstGeom>
+        </p:spPr>
+        <p:txBody>
+          <a:bodyPr lIns="90000" rIns="90000" tIns="45000" bIns="45000"/>
+          <a:p>
+            <a:r>
+              <a:rPr lang="en-US">
+                <a:solidFill>
+                  <a:srgbClr val="3465a4"/>
+                </a:solidFill>
+                <a:latin typeface="Arial"/>
+              </a:rPr>
+              <a:t>release</a:t>
+            </a:r>
+            <a:r>
+              <a:rPr lang="en-US">
+                <a:solidFill>
+                  <a:srgbClr val="3465a4"/>
+                </a:solidFill>
+                <a:latin typeface="Arial"/>
+              </a:rPr>
+              <a:t>
+</a:t>
+            </a:r>
+            <a:r>
+              <a:rPr lang="en-US">
+                <a:solidFill>
+                  <a:srgbClr val="3465a4"/>
+                </a:solidFill>
+                <a:latin typeface="Arial"/>
+              </a:rPr>
+              <a:t>time</a:t>
+            </a:r>
+            <a:endParaRPr/>
+          </a:p>
+        </p:txBody>
+      </p:sp>
+      <p:sp>
+        <p:nvSpPr>
+          <p:cNvPr id="127" name="TextShape 11"/>
+          <p:cNvSpPr txBox="1"/>
+          <p:nvPr/>
+        </p:nvSpPr>
+        <p:spPr>
+          <a:xfrm>
+            <a:off x="6985440" y="3036960"/>
+            <a:ext cx="1040400" cy="602280"/>
+          </a:xfrm>
+          <a:prstGeom prst="rect">
+            <a:avLst/>
+          </a:prstGeom>
+        </p:spPr>
+        <p:txBody>
+          <a:bodyPr lIns="90000" rIns="90000" tIns="45000" bIns="45000"/>
+          <a:p>
+            <a:r>
+              <a:rPr lang="en-US">
+                <a:solidFill>
+                  <a:srgbClr val="3465a4"/>
+                </a:solidFill>
+                <a:latin typeface="Arial"/>
+              </a:rPr>
+              <a:t>relative</a:t>
+            </a:r>
+            <a:r>
+              <a:rPr lang="en-US">
+                <a:solidFill>
+                  <a:srgbClr val="3465a4"/>
+                </a:solidFill>
+                <a:latin typeface="Arial"/>
+              </a:rPr>
+              <a:t>
+</a:t>
+            </a:r>
+            <a:r>
+              <a:rPr lang="en-US">
+                <a:solidFill>
+                  <a:srgbClr val="3465a4"/>
+                </a:solidFill>
+                <a:latin typeface="Arial"/>
+              </a:rPr>
+              <a:t>deadline</a:t>
+            </a:r>
+            <a:endParaRPr/>
+          </a:p>
+        </p:txBody>
+      </p:sp>
+      <p:sp>
+        <p:nvSpPr>
+          <p:cNvPr id="128" name="CustomShape 12"/>
+          <p:cNvSpPr/>
+          <p:nvPr/>
+        </p:nvSpPr>
+        <p:spPr>
+          <a:xfrm>
+            <a:off x="548640" y="5108760"/>
+            <a:ext cx="8046720" cy="626040"/>
           </a:xfrm>
           <a:prstGeom prst="rect">
             <a:avLst/>
@@ -6230,7 +7188,7 @@
         <p:txBody>
           <a:bodyPr lIns="90000" rIns="90000" tIns="45000" bIns="45000"/>
           <a:p>
-            <a:pPr algn="ctr">
+            <a:pPr>
               <a:lnSpc>
                 <a:spcPct val="100000"/>
               </a:lnSpc>
@@ -6242,101 +7200,19 @@
                 </a:solidFill>
                 <a:latin typeface="Calibri"/>
               </a:rPr>
-              <a:t>Inner block structure </a:t>
-            </a:r>
-            <a:endParaRPr/>
-          </a:p>
-        </p:txBody>
-      </p:sp>
-      <p:sp>
-        <p:nvSpPr>
-          <p:cNvPr id="122" name="CustomShape 6"/>
-          <p:cNvSpPr/>
-          <p:nvPr/>
-        </p:nvSpPr>
-        <p:spPr>
-          <a:xfrm>
-            <a:off x="4812840" y="5195160"/>
-            <a:ext cx="3812040" cy="655560"/>
-          </a:xfrm>
-          <a:prstGeom prst="rect">
-            <a:avLst/>
-          </a:prstGeom>
-          <a:noFill/>
-          <a:ln>
-            <a:noFill/>
-          </a:ln>
-        </p:spPr>
-        <p:txBody>
-          <a:bodyPr lIns="90000" rIns="90000" tIns="45000" bIns="45000"/>
-          <a:p>
-            <a:pPr algn="ctr">
+              <a:t>Probabilistic vs. deterministic deadline</a:t>
+            </a:r>
+            <a:endParaRPr/>
+          </a:p>
+          <a:p>
+            <a:pPr>
               <a:lnSpc>
                 <a:spcPct val="100000"/>
               </a:lnSpc>
             </a:pPr>
-            <a:r>
-              <a:rPr lang="en-US" sz="3200">
-                <a:solidFill>
-                  <a:srgbClr val="3465a4"/>
-                </a:solidFill>
-                <a:latin typeface="Calibri"/>
-              </a:rPr>
-              <a:t>Quasi-birth-death process</a:t>
-            </a:r>
-            <a:endParaRPr/>
-          </a:p>
-        </p:txBody>
-      </p:sp>
-      <p:sp>
-        <p:nvSpPr>
-          <p:cNvPr id="123" name="Line 7"/>
-          <p:cNvSpPr/>
-          <p:nvPr/>
-        </p:nvSpPr>
-        <p:spPr>
-          <a:xfrm>
-            <a:off x="4261320" y="3391560"/>
-            <a:ext cx="310680" cy="266040"/>
-          </a:xfrm>
-          <a:prstGeom prst="line">
-            <a:avLst/>
-          </a:prstGeom>
-          <a:ln w="19080">
-            <a:solidFill>
-              <a:srgbClr val="ff3333"/>
-            </a:solidFill>
-            <a:round/>
-            <a:tailEnd len="med" type="triangle" w="med"/>
-          </a:ln>
-        </p:spPr>
-      </p:sp>
-      <p:sp>
-        <p:nvSpPr>
-          <p:cNvPr id="124" name="CustomShape 8"/>
-          <p:cNvSpPr/>
-          <p:nvPr/>
-        </p:nvSpPr>
-        <p:spPr>
-          <a:xfrm>
-            <a:off x="3931920" y="5577840"/>
-            <a:ext cx="731520" cy="365760"/>
-          </a:xfrm>
-          <a:prstGeom prst="rightArrow">
-            <a:avLst>
-              <a:gd name="adj1" fmla="val 16200"/>
-              <a:gd name="adj2" fmla="val 5400"/>
-            </a:avLst>
-          </a:prstGeom>
-          <a:solidFill>
-            <a:srgbClr val="729fcf"/>
-          </a:solidFill>
-          <a:ln>
-            <a:solidFill>
-              <a:srgbClr val="3465a4"/>
-            </a:solidFill>
-          </a:ln>
-        </p:spPr>
+            <a:endParaRPr/>
+          </a:p>
+        </p:txBody>
       </p:sp>
     </p:spTree>
   </p:cSld>
@@ -6389,14 +7265,14 @@
       </p:grpSpPr>
       <p:sp>
         <p:nvSpPr>
-          <p:cNvPr id="125" name="CustomShape 1"/>
+          <p:cNvPr id="129" name="CustomShape 1"/>
           <p:cNvSpPr/>
           <p:nvPr/>
         </p:nvSpPr>
         <p:spPr>
           <a:xfrm>
             <a:off x="457200" y="164520"/>
-            <a:ext cx="8228160" cy="637200"/>
+            <a:ext cx="8227440" cy="636480"/>
           </a:xfrm>
           <a:prstGeom prst="rect">
             <a:avLst/>
@@ -6415,28 +7291,28 @@
               </a:lnSpc>
             </a:pPr>
             <a:r>
-              <a:rPr lang="en-US" sz="4400">
+              <a:rPr lang="en-US" sz="3890">
                 <a:solidFill>
                   <a:srgbClr val="4f81bd"/>
                 </a:solidFill>
                 <a:latin typeface="Calibri"/>
               </a:rPr>
-              <a:t>Transition matrix creation</a:t>
-            </a:r>
-            <a:endParaRPr/>
-          </a:p>
-        </p:txBody>
-      </p:sp>
-      <p:sp>
-        <p:nvSpPr>
-          <p:cNvPr id="126" name="CustomShape 2"/>
+              <a:t>Resource reservation scheduling</a:t>
+            </a:r>
+            <a:endParaRPr/>
+          </a:p>
+        </p:txBody>
+      </p:sp>
+      <p:sp>
+        <p:nvSpPr>
+          <p:cNvPr id="130" name="CustomShape 2"/>
           <p:cNvSpPr/>
           <p:nvPr/>
         </p:nvSpPr>
         <p:spPr>
           <a:xfrm>
             <a:off x="6553080" y="6356520"/>
-            <a:ext cx="2132280" cy="363600"/>
+            <a:ext cx="2131560" cy="362880"/>
           </a:xfrm>
           <a:prstGeom prst="rect">
             <a:avLst/>
@@ -6478,14 +7354,14 @@
       </p:sp>
       <p:sp>
         <p:nvSpPr>
-          <p:cNvPr id="127" name="CustomShape 3"/>
+          <p:cNvPr id="131" name="CustomShape 3"/>
           <p:cNvSpPr/>
           <p:nvPr/>
         </p:nvSpPr>
         <p:spPr>
           <a:xfrm>
-            <a:off x="1623240" y="1060560"/>
-            <a:ext cx="5897160" cy="626760"/>
+            <a:off x="320760" y="1544400"/>
+            <a:ext cx="8502480" cy="2110320"/>
           </a:xfrm>
           <a:prstGeom prst="rect">
             <a:avLst/>
@@ -6510,7 +7386,7 @@
                 </a:solidFill>
                 <a:latin typeface="Calibri"/>
               </a:rPr>
-              <a:t>Exploiting internal structure</a:t>
+              <a:t>This protocol assigns to each task a reservation (Q, T), where:</a:t>
             </a:r>
             <a:endParaRPr/>
           </a:p>
@@ -6519,7 +7395,36 @@
               <a:lnSpc>
                 <a:spcPct val="100000"/>
               </a:lnSpc>
-            </a:pPr>
+              <a:buFont typeface="Arial"/>
+              <a:buChar char="•"/>
+            </a:pPr>
+            <a:r>
+              <a:rPr lang="en-US" sz="3200">
+                <a:solidFill>
+                  <a:srgbClr val="3465a4"/>
+                </a:solidFill>
+                <a:latin typeface="Calibri"/>
+              </a:rPr>
+              <a:t>Q is the </a:t>
+            </a:r>
+            <a:r>
+              <a:rPr lang="en-US" sz="3200">
+                <a:solidFill>
+                  <a:srgbClr val="ff6600"/>
+                </a:solidFill>
+                <a:latin typeface="Calibri"/>
+              </a:rPr>
+              <a:t>budget</a:t>
+            </a:r>
+            <a:r>
+              <a:rPr lang="en-US" sz="3200">
+                <a:solidFill>
+                  <a:srgbClr val="3465a4"/>
+                </a:solidFill>
+                <a:latin typeface="Calibri"/>
+              </a:rPr>
+              <a:t> </a:t>
+            </a:r>
             <a:endParaRPr/>
           </a:p>
           <a:p>
@@ -6527,21 +7432,41 @@
               <a:lnSpc>
                 <a:spcPct val="100000"/>
               </a:lnSpc>
-            </a:pPr>
-            <a:endParaRPr/>
-          </a:p>
-        </p:txBody>
-      </p:sp>
-      <p:sp>
-        <p:nvSpPr>
-          <p:cNvPr id="128" name="CustomShape 4"/>
+              <a:buFont typeface="Arial"/>
+              <a:buChar char="•"/>
+            </a:pPr>
+            <a:r>
+              <a:rPr lang="en-US" sz="3200">
+                <a:solidFill>
+                  <a:srgbClr val="3465a4"/>
+                </a:solidFill>
+                <a:latin typeface="Calibri"/>
+              </a:rPr>
+              <a:t>T is the </a:t>
+            </a:r>
+            <a:r>
+              <a:rPr lang="en-US" sz="3200">
+                <a:solidFill>
+                  <a:srgbClr val="ff6600"/>
+                </a:solidFill>
+                <a:latin typeface="Calibri"/>
+              </a:rPr>
+              <a:t>reservation period</a:t>
+            </a:r>
+            <a:endParaRPr/>
+          </a:p>
+        </p:txBody>
+      </p:sp>
+      <p:sp>
+        <p:nvSpPr>
+          <p:cNvPr id="132" name="CustomShape 4"/>
           <p:cNvSpPr/>
           <p:nvPr/>
         </p:nvSpPr>
         <p:spPr>
           <a:xfrm>
-            <a:off x="1218960" y="2130480"/>
-            <a:ext cx="6706080" cy="626760"/>
+            <a:off x="316080" y="4151880"/>
+            <a:ext cx="8502480" cy="1589400"/>
           </a:xfrm>
           <a:prstGeom prst="rect">
             <a:avLst/>
@@ -6554,11 +7479,6 @@
         <p:txBody>
           <a:bodyPr lIns="90000" rIns="90000" tIns="45000" bIns="45000"/>
           <a:p>
-            <a:pPr>
-              <a:lnSpc>
-                <a:spcPct val="100000"/>
-              </a:lnSpc>
-            </a:pPr>
             <a:r>
               <a:rPr lang="en-US" sz="3200">
                 <a:solidFill>
@@ -6566,323 +7486,29 @@
                 </a:solidFill>
                 <a:latin typeface="Calibri"/>
               </a:rPr>
-              <a:t>Do not create matrix cell by cell</a:t>
-            </a:r>
-            <a:endParaRPr/>
-          </a:p>
-          <a:p>
-            <a:pPr>
-              <a:lnSpc>
-                <a:spcPct val="100000"/>
-              </a:lnSpc>
-            </a:pPr>
-            <a:endParaRPr/>
-          </a:p>
-          <a:p>
-            <a:pPr>
-              <a:lnSpc>
-                <a:spcPct val="100000"/>
-              </a:lnSpc>
-            </a:pPr>
-            <a:endParaRPr/>
-          </a:p>
-        </p:txBody>
-      </p:sp>
-      <p:sp>
-        <p:nvSpPr>
-          <p:cNvPr id="129" name="CustomShape 5"/>
-          <p:cNvSpPr/>
-          <p:nvPr/>
-        </p:nvSpPr>
-        <p:spPr>
-          <a:xfrm>
-            <a:off x="1218960" y="3308400"/>
-            <a:ext cx="6706080" cy="626760"/>
-          </a:xfrm>
-          <a:prstGeom prst="rect">
-            <a:avLst/>
-          </a:prstGeom>
-          <a:noFill/>
-          <a:ln>
-            <a:noFill/>
-          </a:ln>
-        </p:spPr>
-        <p:txBody>
-          <a:bodyPr lIns="90000" rIns="90000" tIns="45000" bIns="45000"/>
-          <a:p>
-            <a:pPr algn="ctr">
-              <a:lnSpc>
-                <a:spcPct val="100000"/>
-              </a:lnSpc>
-            </a:pPr>
+              <a:t>A certain task can execute for Q time in every interval of length T (</a:t>
+            </a:r>
             <a:r>
               <a:rPr lang="en-US" sz="3200">
                 <a:solidFill>
+                  <a:srgbClr val="ff6600"/>
+                </a:solidFill>
+                <a:latin typeface="Calibri"/>
+              </a:rPr>
+              <a:t>temporal isolation</a:t>
+            </a:r>
+            <a:r>
+              <a:rPr lang="en-US" sz="3200">
+                <a:solidFill>
                   <a:srgbClr val="3465a4"/>
                 </a:solidFill>
                 <a:latin typeface="Calibri"/>
               </a:rPr>
-              <a:t>Huge </a:t>
-            </a:r>
-            <a:r>
-              <a:rPr lang="en-US" sz="3200">
-                <a:solidFill>
-                  <a:srgbClr val="ff6600"/>
-                </a:solidFill>
-                <a:latin typeface="Calibri"/>
-              </a:rPr>
-              <a:t>performance</a:t>
-            </a:r>
-            <a:r>
-              <a:rPr lang="en-US" sz="3200">
-                <a:solidFill>
-                  <a:srgbClr val="3465a4"/>
-                </a:solidFill>
-                <a:latin typeface="Calibri"/>
-              </a:rPr>
-              <a:t> boost</a:t>
-            </a:r>
-            <a:endParaRPr/>
-          </a:p>
-          <a:p>
-            <a:pPr>
-              <a:lnSpc>
-                <a:spcPct val="100000"/>
-              </a:lnSpc>
-            </a:pPr>
-            <a:endParaRPr/>
-          </a:p>
-          <a:p>
-            <a:pPr>
-              <a:lnSpc>
-                <a:spcPct val="100000"/>
-              </a:lnSpc>
-            </a:pPr>
-            <a:endParaRPr/>
-          </a:p>
-        </p:txBody>
-      </p:sp>
-      <p:sp>
-        <p:nvSpPr>
-          <p:cNvPr id="130" name="CustomShape 6"/>
-          <p:cNvSpPr/>
-          <p:nvPr/>
-        </p:nvSpPr>
-        <p:spPr>
-          <a:xfrm>
-            <a:off x="4434840" y="1635120"/>
-            <a:ext cx="274320" cy="548640"/>
-          </a:xfrm>
-          <a:prstGeom prst="downArrow">
-            <a:avLst>
-              <a:gd name="adj1" fmla="val 16200"/>
-              <a:gd name="adj2" fmla="val 5400"/>
-            </a:avLst>
-          </a:prstGeom>
-          <a:solidFill>
-            <a:srgbClr val="729fcf"/>
-          </a:solidFill>
-          <a:ln>
-            <a:solidFill>
-              <a:srgbClr val="3465a4"/>
-            </a:solidFill>
-          </a:ln>
-        </p:spPr>
-      </p:sp>
-      <p:sp>
-        <p:nvSpPr>
-          <p:cNvPr id="131" name="CustomShape 7"/>
-          <p:cNvSpPr/>
-          <p:nvPr/>
-        </p:nvSpPr>
-        <p:spPr>
-          <a:xfrm>
-            <a:off x="4435200" y="2787480"/>
-            <a:ext cx="274320" cy="548640"/>
-          </a:xfrm>
-          <a:prstGeom prst="downArrow">
-            <a:avLst>
-              <a:gd name="adj1" fmla="val 16200"/>
-              <a:gd name="adj2" fmla="val 5400"/>
-            </a:avLst>
-          </a:prstGeom>
-          <a:solidFill>
-            <a:srgbClr val="729fcf"/>
-          </a:solidFill>
-          <a:ln>
-            <a:solidFill>
-              <a:srgbClr val="3465a4"/>
-            </a:solidFill>
-          </a:ln>
-        </p:spPr>
-      </p:sp>
-      <p:sp>
-        <p:nvSpPr>
-          <p:cNvPr id="132" name="CustomShape 8"/>
-          <p:cNvSpPr/>
-          <p:nvPr/>
-        </p:nvSpPr>
-        <p:spPr>
-          <a:xfrm>
-            <a:off x="4435560" y="3939840"/>
-            <a:ext cx="274320" cy="548640"/>
-          </a:xfrm>
-          <a:prstGeom prst="downArrow">
-            <a:avLst>
-              <a:gd name="adj1" fmla="val 16200"/>
-              <a:gd name="adj2" fmla="val 5400"/>
-            </a:avLst>
-          </a:prstGeom>
-          <a:solidFill>
-            <a:srgbClr val="729fcf"/>
-          </a:solidFill>
-          <a:ln>
-            <a:solidFill>
-              <a:srgbClr val="3465a4"/>
-            </a:solidFill>
-          </a:ln>
-        </p:spPr>
-      </p:sp>
-      <p:sp>
-        <p:nvSpPr>
-          <p:cNvPr id="133" name="CustomShape 9"/>
-          <p:cNvSpPr/>
-          <p:nvPr/>
-        </p:nvSpPr>
-        <p:spPr>
-          <a:xfrm>
-            <a:off x="1233720" y="4450320"/>
-            <a:ext cx="6706080" cy="626760"/>
-          </a:xfrm>
-          <a:prstGeom prst="rect">
-            <a:avLst/>
-          </a:prstGeom>
-          <a:noFill/>
-          <a:ln>
-            <a:noFill/>
-          </a:ln>
-        </p:spPr>
-        <p:txBody>
-          <a:bodyPr lIns="90000" rIns="90000" tIns="45000" bIns="45000"/>
-          <a:p>
-            <a:pPr algn="ctr">
-              <a:lnSpc>
-                <a:spcPct val="100000"/>
-              </a:lnSpc>
-            </a:pPr>
-            <a:r>
-              <a:rPr lang="en-US" sz="3200">
-                <a:solidFill>
-                  <a:srgbClr val="3465a4"/>
-                </a:solidFill>
-                <a:latin typeface="Calibri"/>
-              </a:rPr>
-              <a:t>Bigger matrix can be handled</a:t>
-            </a:r>
-            <a:endParaRPr/>
-          </a:p>
-          <a:p>
-            <a:pPr>
-              <a:lnSpc>
-                <a:spcPct val="100000"/>
-              </a:lnSpc>
-            </a:pPr>
-            <a:endParaRPr/>
-          </a:p>
-        </p:txBody>
-      </p:sp>
-      <p:sp>
-        <p:nvSpPr>
-          <p:cNvPr id="134" name="CustomShape 10"/>
-          <p:cNvSpPr/>
-          <p:nvPr/>
-        </p:nvSpPr>
-        <p:spPr>
-          <a:xfrm>
-            <a:off x="1234440" y="5592240"/>
-            <a:ext cx="6706080" cy="626760"/>
-          </a:xfrm>
-          <a:prstGeom prst="rect">
-            <a:avLst/>
-          </a:prstGeom>
-          <a:noFill/>
-          <a:ln>
-            <a:noFill/>
-          </a:ln>
-        </p:spPr>
-        <p:txBody>
-          <a:bodyPr lIns="90000" rIns="90000" tIns="45000" bIns="45000"/>
-          <a:p>
-            <a:pPr algn="ctr">
-              <a:lnSpc>
-                <a:spcPct val="100000"/>
-              </a:lnSpc>
-            </a:pPr>
-            <a:r>
-              <a:rPr lang="en-US" sz="3200">
-                <a:solidFill>
-                  <a:srgbClr val="3465a4"/>
-                </a:solidFill>
-                <a:latin typeface="Calibri"/>
-              </a:rPr>
-              <a:t>More </a:t>
-            </a:r>
-            <a:r>
-              <a:rPr lang="en-US" sz="3200">
-                <a:solidFill>
-                  <a:srgbClr val="ff6600"/>
-                </a:solidFill>
-                <a:latin typeface="Calibri"/>
-              </a:rPr>
-              <a:t>precision</a:t>
-            </a:r>
-            <a:r>
-              <a:rPr lang="en-US" sz="3200">
-                <a:solidFill>
-                  <a:srgbClr val="3465a4"/>
-                </a:solidFill>
-                <a:latin typeface="Calibri"/>
-              </a:rPr>
-              <a:t> for the results</a:t>
-            </a:r>
-            <a:endParaRPr/>
-          </a:p>
-          <a:p>
-            <a:pPr>
-              <a:lnSpc>
-                <a:spcPct val="100000"/>
-              </a:lnSpc>
-            </a:pPr>
-            <a:endParaRPr/>
-          </a:p>
-        </p:txBody>
-      </p:sp>
-      <p:sp>
-        <p:nvSpPr>
-          <p:cNvPr id="135" name="CustomShape 11"/>
-          <p:cNvSpPr/>
-          <p:nvPr/>
-        </p:nvSpPr>
-        <p:spPr>
-          <a:xfrm>
-            <a:off x="4435920" y="5056200"/>
-            <a:ext cx="274320" cy="548640"/>
-          </a:xfrm>
-          <a:prstGeom prst="downArrow">
-            <a:avLst>
-              <a:gd name="adj1" fmla="val 16200"/>
-              <a:gd name="adj2" fmla="val 5400"/>
-            </a:avLst>
-          </a:prstGeom>
-          <a:solidFill>
-            <a:srgbClr val="729fcf"/>
-          </a:solidFill>
-          <a:ln>
-            <a:solidFill>
-              <a:srgbClr val="3465a4"/>
-            </a:solidFill>
-          </a:ln>
-        </p:spPr>
+              <a:t>)</a:t>
+            </a:r>
+            <a:endParaRPr/>
+          </a:p>
+        </p:txBody>
       </p:sp>
     </p:spTree>
   </p:cSld>
@@ -6935,14 +7561,14 @@
       </p:grpSpPr>
       <p:sp>
         <p:nvSpPr>
-          <p:cNvPr id="136" name="CustomShape 1"/>
+          <p:cNvPr id="133" name="CustomShape 1"/>
           <p:cNvSpPr/>
           <p:nvPr/>
         </p:nvSpPr>
         <p:spPr>
           <a:xfrm>
             <a:off x="457200" y="164520"/>
-            <a:ext cx="8228160" cy="637200"/>
+            <a:ext cx="8227440" cy="636480"/>
           </a:xfrm>
           <a:prstGeom prst="rect">
             <a:avLst/>
@@ -6967,22 +7593,22 @@
                 </a:solidFill>
                 <a:latin typeface="Calibri"/>
               </a:rPr>
-              <a:t>Performance comparison</a:t>
-            </a:r>
-            <a:endParaRPr/>
-          </a:p>
-        </p:txBody>
-      </p:sp>
-      <p:sp>
-        <p:nvSpPr>
-          <p:cNvPr id="137" name="CustomShape 2"/>
+              <a:t>RR as Markov chain</a:t>
+            </a:r>
+            <a:endParaRPr/>
+          </a:p>
+        </p:txBody>
+      </p:sp>
+      <p:sp>
+        <p:nvSpPr>
+          <p:cNvPr id="134" name="CustomShape 2"/>
           <p:cNvSpPr/>
           <p:nvPr/>
         </p:nvSpPr>
         <p:spPr>
           <a:xfrm>
             <a:off x="6553080" y="6356520"/>
-            <a:ext cx="2132280" cy="363600"/>
+            <a:ext cx="2131560" cy="362880"/>
           </a:xfrm>
           <a:prstGeom prst="rect">
             <a:avLst/>
@@ -7022,9 +7648,49 @@
           </a:p>
         </p:txBody>
       </p:sp>
+      <p:sp>
+        <p:nvSpPr>
+          <p:cNvPr id="135" name="CustomShape 3"/>
+          <p:cNvSpPr/>
+          <p:nvPr/>
+        </p:nvSpPr>
+        <p:spPr>
+          <a:xfrm>
+            <a:off x="366120" y="1384560"/>
+            <a:ext cx="8410680" cy="1174320"/>
+          </a:xfrm>
+          <a:prstGeom prst="rect">
+            <a:avLst/>
+          </a:prstGeom>
+          <a:noFill/>
+          <a:ln>
+            <a:noFill/>
+          </a:ln>
+        </p:spPr>
+        <p:txBody>
+          <a:bodyPr lIns="90000" rIns="90000" tIns="45000" bIns="45000"/>
+          <a:p>
+            <a:pPr algn="just">
+              <a:lnSpc>
+                <a:spcPct val="100000"/>
+              </a:lnSpc>
+            </a:pPr>
+            <a:r>
+              <a:rPr lang="en-US" sz="3200">
+                <a:solidFill>
+                  <a:srgbClr val="3465a4"/>
+                </a:solidFill>
+                <a:latin typeface="Calibri"/>
+              </a:rPr>
+              <a:t>The transition matrix P for a resource reservation task:</a:t>
+            </a:r>
+            <a:endParaRPr/>
+          </a:p>
+        </p:txBody>
+      </p:sp>
       <p:pic>
         <p:nvPicPr>
-          <p:cNvPr id="138" name="" descr=""/>
+          <p:cNvPr id="136" name="" descr=""/>
           <p:cNvPicPr/>
           <p:nvPr/>
         </p:nvPicPr>
@@ -7036,8 +7702,8 @@
         </p:blipFill>
         <p:spPr>
           <a:xfrm>
-            <a:off x="892080" y="1083960"/>
-            <a:ext cx="7423920" cy="5595120"/>
+            <a:off x="2555640" y="2549880"/>
+            <a:ext cx="4031280" cy="2395080"/>
           </a:xfrm>
           <a:prstGeom prst="rect">
             <a:avLst/>
@@ -7047,6 +7713,159 @@
           </a:ln>
         </p:spPr>
       </p:pic>
+      <p:sp>
+        <p:nvSpPr>
+          <p:cNvPr id="137" name="CustomShape 4"/>
+          <p:cNvSpPr/>
+          <p:nvPr/>
+        </p:nvSpPr>
+        <p:spPr>
+          <a:xfrm>
+            <a:off x="3255840" y="2640960"/>
+            <a:ext cx="1004400" cy="749520"/>
+          </a:xfrm>
+          <a:prstGeom prst="rect">
+            <a:avLst/>
+          </a:prstGeom>
+          <a:noFill/>
+          <a:ln w="29160">
+            <a:solidFill>
+              <a:srgbClr val="ff3333"/>
+            </a:solidFill>
+            <a:round/>
+          </a:ln>
+        </p:spPr>
+      </p:sp>
+      <p:sp>
+        <p:nvSpPr>
+          <p:cNvPr id="138" name="CustomShape 5"/>
+          <p:cNvSpPr/>
+          <p:nvPr/>
+        </p:nvSpPr>
+        <p:spPr>
+          <a:xfrm>
+            <a:off x="690120" y="5195880"/>
+            <a:ext cx="3381480" cy="654840"/>
+          </a:xfrm>
+          <a:prstGeom prst="rect">
+            <a:avLst/>
+          </a:prstGeom>
+          <a:noFill/>
+          <a:ln>
+            <a:noFill/>
+          </a:ln>
+        </p:spPr>
+        <p:txBody>
+          <a:bodyPr lIns="90000" rIns="90000" tIns="45000" bIns="45000"/>
+          <a:p>
+            <a:pPr algn="ctr">
+              <a:lnSpc>
+                <a:spcPct val="100000"/>
+              </a:lnSpc>
+            </a:pPr>
+            <a:r>
+              <a:rPr lang="en-US" sz="3200">
+                <a:solidFill>
+                  <a:srgbClr val="3465a4"/>
+                </a:solidFill>
+                <a:latin typeface="Calibri"/>
+              </a:rPr>
+              <a:t>Inner block structure </a:t>
+            </a:r>
+            <a:endParaRPr/>
+          </a:p>
+        </p:txBody>
+      </p:sp>
+      <p:sp>
+        <p:nvSpPr>
+          <p:cNvPr id="139" name="CustomShape 6"/>
+          <p:cNvSpPr/>
+          <p:nvPr/>
+        </p:nvSpPr>
+        <p:spPr>
+          <a:xfrm>
+            <a:off x="4812840" y="5195160"/>
+            <a:ext cx="3811320" cy="654840"/>
+          </a:xfrm>
+          <a:prstGeom prst="rect">
+            <a:avLst/>
+          </a:prstGeom>
+          <a:noFill/>
+          <a:ln>
+            <a:noFill/>
+          </a:ln>
+        </p:spPr>
+        <p:txBody>
+          <a:bodyPr lIns="90000" rIns="90000" tIns="45000" bIns="45000"/>
+          <a:p>
+            <a:pPr algn="ctr">
+              <a:lnSpc>
+                <a:spcPct val="100000"/>
+              </a:lnSpc>
+            </a:pPr>
+            <a:r>
+              <a:rPr lang="en-US" sz="3200">
+                <a:solidFill>
+                  <a:srgbClr val="3465a4"/>
+                </a:solidFill>
+                <a:latin typeface="Calibri"/>
+              </a:rPr>
+              <a:t>Quasi-birth-death process</a:t>
+            </a:r>
+            <a:endParaRPr/>
+          </a:p>
+        </p:txBody>
+      </p:sp>
+      <p:sp>
+        <p:nvSpPr>
+          <p:cNvPr id="140" name="Line 7"/>
+          <p:cNvSpPr/>
+          <p:nvPr/>
+        </p:nvSpPr>
+        <p:spPr>
+          <a:xfrm>
+            <a:off x="4261320" y="3391560"/>
+            <a:ext cx="310680" cy="266040"/>
+          </a:xfrm>
+          <a:prstGeom prst="line">
+            <a:avLst/>
+          </a:prstGeom>
+          <a:ln w="19080">
+            <a:solidFill>
+              <a:srgbClr val="ff3333"/>
+            </a:solidFill>
+            <a:round/>
+            <a:tailEnd len="med" type="triangle" w="med"/>
+          </a:ln>
+        </p:spPr>
+      </p:sp>
+      <p:sp>
+        <p:nvSpPr>
+          <p:cNvPr id="141" name="CustomShape 8"/>
+          <p:cNvSpPr/>
+          <p:nvPr/>
+        </p:nvSpPr>
+        <p:spPr>
+          <a:xfrm>
+            <a:off x="3945600" y="5580720"/>
+            <a:ext cx="640080" cy="365760"/>
+          </a:xfrm>
+          <a:prstGeom prst="rightArrow">
+            <a:avLst>
+              <a:gd name="adj1" fmla="val 16200"/>
+              <a:gd name="adj2" fmla="val 5400"/>
+            </a:avLst>
+          </a:prstGeom>
+          <a:solidFill>
+            <a:srgbClr val="729fcf"/>
+          </a:solidFill>
+          <a:ln>
+            <a:solidFill>
+              <a:srgbClr val="3465a4"/>
+            </a:solidFill>
+          </a:ln>
+        </p:spPr>
+      </p:sp>
     </p:spTree>
   </p:cSld>
   <p:timing>

</xml_diff>

<commit_message>
fixed slides # and minor fixes
</commit_message>
<xml_diff>
--- a/slides/slides.pptx
+++ b/slides/slides.pptx
@@ -198,7 +198,7 @@
           <a:bodyPr lIns="0" rIns="0" tIns="0" bIns="0" anchor="b"/>
           <a:p>
             <a:pPr algn="r"/>
-            <a:fld id="{4E2166DE-6663-4B72-8610-5EB37E7AD9F7}" type="slidenum">
+            <a:fld id="{CEE4FFBE-8256-4514-9E2E-4A41CDE6787A}" type="slidenum">
               <a:rPr lang="en-US" sz="1400">
                 <a:latin typeface="Times New Roman"/>
               </a:rPr>
@@ -233,7 +233,7 @@
       </p:grpSpPr>
       <p:sp>
         <p:nvSpPr>
-          <p:cNvPr id="157" name="PlaceHolder 1"/>
+          <p:cNvPr id="158" name="PlaceHolder 1"/>
           <p:cNvSpPr>
             <a:spLocks noGrp="1"/>
           </p:cNvSpPr>
@@ -244,7 +244,7 @@
         <p:spPr>
           <a:xfrm>
             <a:off x="946080" y="4861080"/>
-            <a:ext cx="5202360" cy="4599000"/>
+            <a:ext cx="5202000" cy="4598640"/>
           </a:xfrm>
           <a:prstGeom prst="rect">
             <a:avLst/>
@@ -259,14 +259,14 @@
       </p:sp>
       <p:sp>
         <p:nvSpPr>
-          <p:cNvPr id="158" name="CustomShape 2"/>
+          <p:cNvPr id="159" name="CustomShape 2"/>
           <p:cNvSpPr/>
           <p:nvPr/>
         </p:nvSpPr>
         <p:spPr>
           <a:xfrm>
             <a:off x="4024440" y="9725040"/>
-            <a:ext cx="3070440" cy="505080"/>
+            <a:ext cx="3070080" cy="504720"/>
           </a:xfrm>
           <a:prstGeom prst="rect">
             <a:avLst/>
@@ -284,7 +284,7 @@
                 <a:spcPct val="100000"/>
               </a:lnSpc>
             </a:pPr>
-            <a:fld id="{152D6588-B5E1-41F8-BA37-B98B710EA2C2}" type="slidenum">
+            <a:fld id="{9C625F3D-9172-453A-BC6C-B6AF3ACABB8A}" type="slidenum">
               <a:rPr lang="en-US" sz="1200">
                 <a:solidFill>
                   <a:srgbClr val="000000"/>
@@ -322,7 +322,7 @@
       </p:grpSpPr>
       <p:sp>
         <p:nvSpPr>
-          <p:cNvPr id="173" name="PlaceHolder 1"/>
+          <p:cNvPr id="174" name="PlaceHolder 1"/>
           <p:cNvSpPr>
             <a:spLocks noGrp="1"/>
           </p:cNvSpPr>
@@ -333,7 +333,7 @@
         <p:spPr>
           <a:xfrm>
             <a:off x="946080" y="4861080"/>
-            <a:ext cx="5203080" cy="4599720"/>
+            <a:ext cx="5202720" cy="4599360"/>
           </a:xfrm>
           <a:prstGeom prst="rect">
             <a:avLst/>
@@ -348,14 +348,14 @@
       </p:sp>
       <p:sp>
         <p:nvSpPr>
-          <p:cNvPr id="174" name="CustomShape 2"/>
+          <p:cNvPr id="175" name="CustomShape 2"/>
           <p:cNvSpPr/>
           <p:nvPr/>
         </p:nvSpPr>
         <p:spPr>
           <a:xfrm>
             <a:off x="4024440" y="9725040"/>
-            <a:ext cx="3071160" cy="505800"/>
+            <a:ext cx="3070800" cy="505440"/>
           </a:xfrm>
           <a:prstGeom prst="rect">
             <a:avLst/>
@@ -373,7 +373,7 @@
                 <a:spcPct val="100000"/>
               </a:lnSpc>
             </a:pPr>
-            <a:fld id="{E80AD1C8-9E8B-4348-8F5F-41FC77715115}" type="slidenum">
+            <a:fld id="{04EBBECC-7A82-4060-B557-506902DF2941}" type="slidenum">
               <a:rPr lang="en-US" sz="1200">
                 <a:solidFill>
                   <a:srgbClr val="000000"/>
@@ -411,7 +411,7 @@
       </p:grpSpPr>
       <p:sp>
         <p:nvSpPr>
-          <p:cNvPr id="175" name="PlaceHolder 1"/>
+          <p:cNvPr id="176" name="PlaceHolder 1"/>
           <p:cNvSpPr>
             <a:spLocks noGrp="1"/>
           </p:cNvSpPr>
@@ -422,7 +422,7 @@
         <p:spPr>
           <a:xfrm>
             <a:off x="946080" y="4861080"/>
-            <a:ext cx="5203080" cy="4599720"/>
+            <a:ext cx="5202720" cy="4599360"/>
           </a:xfrm>
           <a:prstGeom prst="rect">
             <a:avLst/>
@@ -437,14 +437,14 @@
       </p:sp>
       <p:sp>
         <p:nvSpPr>
-          <p:cNvPr id="176" name="CustomShape 2"/>
+          <p:cNvPr id="177" name="CustomShape 2"/>
           <p:cNvSpPr/>
           <p:nvPr/>
         </p:nvSpPr>
         <p:spPr>
           <a:xfrm>
             <a:off x="4024440" y="9725040"/>
-            <a:ext cx="3071160" cy="505800"/>
+            <a:ext cx="3070800" cy="505440"/>
           </a:xfrm>
           <a:prstGeom prst="rect">
             <a:avLst/>
@@ -462,7 +462,7 @@
                 <a:spcPct val="100000"/>
               </a:lnSpc>
             </a:pPr>
-            <a:fld id="{4B356D8F-5EAE-4773-BC2E-996A9B353852}" type="slidenum">
+            <a:fld id="{13D21D86-ECAB-4DAF-97AA-8051D949F353}" type="slidenum">
               <a:rPr lang="en-US" sz="1200">
                 <a:solidFill>
                   <a:srgbClr val="000000"/>
@@ -500,7 +500,7 @@
       </p:grpSpPr>
       <p:sp>
         <p:nvSpPr>
-          <p:cNvPr id="177" name="PlaceHolder 1"/>
+          <p:cNvPr id="178" name="PlaceHolder 1"/>
           <p:cNvSpPr>
             <a:spLocks noGrp="1"/>
           </p:cNvSpPr>
@@ -511,7 +511,7 @@
         <p:spPr>
           <a:xfrm>
             <a:off x="946080" y="4861080"/>
-            <a:ext cx="5203080" cy="4599720"/>
+            <a:ext cx="5202720" cy="4599360"/>
           </a:xfrm>
           <a:prstGeom prst="rect">
             <a:avLst/>
@@ -526,14 +526,14 @@
       </p:sp>
       <p:sp>
         <p:nvSpPr>
-          <p:cNvPr id="178" name="CustomShape 2"/>
+          <p:cNvPr id="179" name="CustomShape 2"/>
           <p:cNvSpPr/>
           <p:nvPr/>
         </p:nvSpPr>
         <p:spPr>
           <a:xfrm>
             <a:off x="4024440" y="9725040"/>
-            <a:ext cx="3071160" cy="505800"/>
+            <a:ext cx="3070800" cy="505440"/>
           </a:xfrm>
           <a:prstGeom prst="rect">
             <a:avLst/>
@@ -551,7 +551,7 @@
                 <a:spcPct val="100000"/>
               </a:lnSpc>
             </a:pPr>
-            <a:fld id="{310E24DE-D0F4-4C53-B25B-848E7E1BF38F}" type="slidenum">
+            <a:fld id="{39FC5045-70B0-4785-ADC5-BC4E6D632CF1}" type="slidenum">
               <a:rPr lang="en-US" sz="1200">
                 <a:solidFill>
                   <a:srgbClr val="000000"/>
@@ -589,7 +589,7 @@
       </p:grpSpPr>
       <p:sp>
         <p:nvSpPr>
-          <p:cNvPr id="179" name="PlaceHolder 1"/>
+          <p:cNvPr id="180" name="PlaceHolder 1"/>
           <p:cNvSpPr>
             <a:spLocks noGrp="1"/>
           </p:cNvSpPr>
@@ -600,7 +600,7 @@
         <p:spPr>
           <a:xfrm>
             <a:off x="946080" y="4861080"/>
-            <a:ext cx="5203080" cy="4599720"/>
+            <a:ext cx="5202720" cy="4599360"/>
           </a:xfrm>
           <a:prstGeom prst="rect">
             <a:avLst/>
@@ -615,14 +615,14 @@
       </p:sp>
       <p:sp>
         <p:nvSpPr>
-          <p:cNvPr id="180" name="CustomShape 2"/>
+          <p:cNvPr id="181" name="CustomShape 2"/>
           <p:cNvSpPr/>
           <p:nvPr/>
         </p:nvSpPr>
         <p:spPr>
           <a:xfrm>
             <a:off x="4024440" y="9725040"/>
-            <a:ext cx="3071160" cy="505800"/>
+            <a:ext cx="3070800" cy="505440"/>
           </a:xfrm>
           <a:prstGeom prst="rect">
             <a:avLst/>
@@ -640,7 +640,7 @@
                 <a:spcPct val="100000"/>
               </a:lnSpc>
             </a:pPr>
-            <a:fld id="{EC11EBDB-C566-45E4-8059-5613D1700151}" type="slidenum">
+            <a:fld id="{810AF03A-3B1D-4661-954E-A381EDB703CB}" type="slidenum">
               <a:rPr lang="en-US" sz="1200">
                 <a:solidFill>
                   <a:srgbClr val="000000"/>
@@ -678,7 +678,7 @@
       </p:grpSpPr>
       <p:sp>
         <p:nvSpPr>
-          <p:cNvPr id="159" name="PlaceHolder 1"/>
+          <p:cNvPr id="160" name="PlaceHolder 1"/>
           <p:cNvSpPr>
             <a:spLocks noGrp="1"/>
           </p:cNvSpPr>
@@ -689,7 +689,7 @@
         <p:spPr>
           <a:xfrm>
             <a:off x="946080" y="4861080"/>
-            <a:ext cx="5203080" cy="4599720"/>
+            <a:ext cx="5202720" cy="4599360"/>
           </a:xfrm>
           <a:prstGeom prst="rect">
             <a:avLst/>
@@ -704,14 +704,14 @@
       </p:sp>
       <p:sp>
         <p:nvSpPr>
-          <p:cNvPr id="160" name="CustomShape 2"/>
+          <p:cNvPr id="161" name="CustomShape 2"/>
           <p:cNvSpPr/>
           <p:nvPr/>
         </p:nvSpPr>
         <p:spPr>
           <a:xfrm>
             <a:off x="4024440" y="9725040"/>
-            <a:ext cx="3071160" cy="505800"/>
+            <a:ext cx="3070800" cy="505440"/>
           </a:xfrm>
           <a:prstGeom prst="rect">
             <a:avLst/>
@@ -729,7 +729,7 @@
                 <a:spcPct val="100000"/>
               </a:lnSpc>
             </a:pPr>
-            <a:fld id="{60112143-DCFF-4251-A3B6-228E6515C2F5}" type="slidenum">
+            <a:fld id="{C8E35A82-6EB2-432E-8A87-E67F5E3628A5}" type="slidenum">
               <a:rPr lang="en-US" sz="1200">
                 <a:solidFill>
                   <a:srgbClr val="000000"/>
@@ -767,7 +767,7 @@
       </p:grpSpPr>
       <p:sp>
         <p:nvSpPr>
-          <p:cNvPr id="161" name="PlaceHolder 1"/>
+          <p:cNvPr id="162" name="PlaceHolder 1"/>
           <p:cNvSpPr>
             <a:spLocks noGrp="1"/>
           </p:cNvSpPr>
@@ -778,7 +778,7 @@
         <p:spPr>
           <a:xfrm>
             <a:off x="946080" y="4861080"/>
-            <a:ext cx="5203080" cy="4599720"/>
+            <a:ext cx="5202720" cy="4599360"/>
           </a:xfrm>
           <a:prstGeom prst="rect">
             <a:avLst/>
@@ -793,14 +793,14 @@
       </p:sp>
       <p:sp>
         <p:nvSpPr>
-          <p:cNvPr id="162" name="CustomShape 2"/>
+          <p:cNvPr id="163" name="CustomShape 2"/>
           <p:cNvSpPr/>
           <p:nvPr/>
         </p:nvSpPr>
         <p:spPr>
           <a:xfrm>
             <a:off x="4024440" y="9725040"/>
-            <a:ext cx="3071160" cy="505800"/>
+            <a:ext cx="3070800" cy="505440"/>
           </a:xfrm>
           <a:prstGeom prst="rect">
             <a:avLst/>
@@ -818,7 +818,7 @@
                 <a:spcPct val="100000"/>
               </a:lnSpc>
             </a:pPr>
-            <a:fld id="{80C50B86-A78E-454E-BD9C-E2E2710C60E9}" type="slidenum">
+            <a:fld id="{96107861-C655-4E4B-A307-7C01E8222769}" type="slidenum">
               <a:rPr lang="en-US" sz="1200">
                 <a:solidFill>
                   <a:srgbClr val="000000"/>
@@ -856,7 +856,7 @@
       </p:grpSpPr>
       <p:sp>
         <p:nvSpPr>
-          <p:cNvPr id="163" name="PlaceHolder 1"/>
+          <p:cNvPr id="164" name="PlaceHolder 1"/>
           <p:cNvSpPr>
             <a:spLocks noGrp="1"/>
           </p:cNvSpPr>
@@ -867,7 +867,7 @@
         <p:spPr>
           <a:xfrm>
             <a:off x="946080" y="4861080"/>
-            <a:ext cx="5203080" cy="4599720"/>
+            <a:ext cx="5202720" cy="4599360"/>
           </a:xfrm>
           <a:prstGeom prst="rect">
             <a:avLst/>
@@ -882,14 +882,14 @@
       </p:sp>
       <p:sp>
         <p:nvSpPr>
-          <p:cNvPr id="164" name="CustomShape 2"/>
+          <p:cNvPr id="165" name="CustomShape 2"/>
           <p:cNvSpPr/>
           <p:nvPr/>
         </p:nvSpPr>
         <p:spPr>
           <a:xfrm>
             <a:off x="4024440" y="9725040"/>
-            <a:ext cx="3071160" cy="505800"/>
+            <a:ext cx="3070800" cy="505440"/>
           </a:xfrm>
           <a:prstGeom prst="rect">
             <a:avLst/>
@@ -907,7 +907,7 @@
                 <a:spcPct val="100000"/>
               </a:lnSpc>
             </a:pPr>
-            <a:fld id="{14D75DD8-5C76-4A76-9C8F-F68458CE7B30}" type="slidenum">
+            <a:fld id="{CAF0F1B7-E57C-4424-8890-79D3FBA2215D}" type="slidenum">
               <a:rPr lang="en-US" sz="1200">
                 <a:solidFill>
                   <a:srgbClr val="000000"/>
@@ -945,7 +945,7 @@
       </p:grpSpPr>
       <p:sp>
         <p:nvSpPr>
-          <p:cNvPr id="165" name="PlaceHolder 1"/>
+          <p:cNvPr id="166" name="PlaceHolder 1"/>
           <p:cNvSpPr>
             <a:spLocks noGrp="1"/>
           </p:cNvSpPr>
@@ -956,7 +956,7 @@
         <p:spPr>
           <a:xfrm>
             <a:off x="946080" y="4861080"/>
-            <a:ext cx="5203080" cy="4599720"/>
+            <a:ext cx="5202720" cy="4599360"/>
           </a:xfrm>
           <a:prstGeom prst="rect">
             <a:avLst/>
@@ -971,14 +971,14 @@
       </p:sp>
       <p:sp>
         <p:nvSpPr>
-          <p:cNvPr id="166" name="CustomShape 2"/>
+          <p:cNvPr id="167" name="CustomShape 2"/>
           <p:cNvSpPr/>
           <p:nvPr/>
         </p:nvSpPr>
         <p:spPr>
           <a:xfrm>
             <a:off x="4024440" y="9725040"/>
-            <a:ext cx="3071160" cy="505800"/>
+            <a:ext cx="3070800" cy="505440"/>
           </a:xfrm>
           <a:prstGeom prst="rect">
             <a:avLst/>
@@ -996,7 +996,7 @@
                 <a:spcPct val="100000"/>
               </a:lnSpc>
             </a:pPr>
-            <a:fld id="{A5BA057A-C5BF-44BC-A6FC-C13D61C586DF}" type="slidenum">
+            <a:fld id="{F1667151-ACF6-414F-98B6-00FAC604A2D7}" type="slidenum">
               <a:rPr lang="en-US" sz="1200">
                 <a:solidFill>
                   <a:srgbClr val="000000"/>
@@ -1034,7 +1034,7 @@
       </p:grpSpPr>
       <p:sp>
         <p:nvSpPr>
-          <p:cNvPr id="167" name="PlaceHolder 1"/>
+          <p:cNvPr id="168" name="PlaceHolder 1"/>
           <p:cNvSpPr>
             <a:spLocks noGrp="1"/>
           </p:cNvSpPr>
@@ -1045,7 +1045,7 @@
         <p:spPr>
           <a:xfrm>
             <a:off x="946080" y="4861080"/>
-            <a:ext cx="5203080" cy="4599720"/>
+            <a:ext cx="5202720" cy="4599360"/>
           </a:xfrm>
           <a:prstGeom prst="rect">
             <a:avLst/>
@@ -1060,14 +1060,14 @@
       </p:sp>
       <p:sp>
         <p:nvSpPr>
-          <p:cNvPr id="168" name="CustomShape 2"/>
+          <p:cNvPr id="169" name="CustomShape 2"/>
           <p:cNvSpPr/>
           <p:nvPr/>
         </p:nvSpPr>
         <p:spPr>
           <a:xfrm>
             <a:off x="4024440" y="9725040"/>
-            <a:ext cx="3071160" cy="505800"/>
+            <a:ext cx="3070800" cy="505440"/>
           </a:xfrm>
           <a:prstGeom prst="rect">
             <a:avLst/>
@@ -1085,7 +1085,7 @@
                 <a:spcPct val="100000"/>
               </a:lnSpc>
             </a:pPr>
-            <a:fld id="{C85DE5B0-CFAD-495F-8518-5D44FF890847}" type="slidenum">
+            <a:fld id="{80FF4224-1380-49AD-BD12-DE51313439A6}" type="slidenum">
               <a:rPr lang="en-US" sz="1200">
                 <a:solidFill>
                   <a:srgbClr val="000000"/>
@@ -1123,7 +1123,7 @@
       </p:grpSpPr>
       <p:sp>
         <p:nvSpPr>
-          <p:cNvPr id="169" name="PlaceHolder 1"/>
+          <p:cNvPr id="170" name="PlaceHolder 1"/>
           <p:cNvSpPr>
             <a:spLocks noGrp="1"/>
           </p:cNvSpPr>
@@ -1134,7 +1134,7 @@
         <p:spPr>
           <a:xfrm>
             <a:off x="946080" y="4861080"/>
-            <a:ext cx="5203080" cy="4599720"/>
+            <a:ext cx="5202720" cy="4599360"/>
           </a:xfrm>
           <a:prstGeom prst="rect">
             <a:avLst/>
@@ -1149,14 +1149,14 @@
       </p:sp>
       <p:sp>
         <p:nvSpPr>
-          <p:cNvPr id="170" name="CustomShape 2"/>
+          <p:cNvPr id="171" name="CustomShape 2"/>
           <p:cNvSpPr/>
           <p:nvPr/>
         </p:nvSpPr>
         <p:spPr>
           <a:xfrm>
             <a:off x="4024440" y="9725040"/>
-            <a:ext cx="3071160" cy="505800"/>
+            <a:ext cx="3070800" cy="505440"/>
           </a:xfrm>
           <a:prstGeom prst="rect">
             <a:avLst/>
@@ -1174,7 +1174,7 @@
                 <a:spcPct val="100000"/>
               </a:lnSpc>
             </a:pPr>
-            <a:fld id="{588AC1CD-F8D9-45F6-9260-D66848D56489}" type="slidenum">
+            <a:fld id="{56323A71-6709-449C-AF23-69186DABC37F}" type="slidenum">
               <a:rPr lang="en-US" sz="1200">
                 <a:solidFill>
                   <a:srgbClr val="000000"/>
@@ -1212,7 +1212,7 @@
       </p:grpSpPr>
       <p:sp>
         <p:nvSpPr>
-          <p:cNvPr id="171" name="PlaceHolder 1"/>
+          <p:cNvPr id="172" name="PlaceHolder 1"/>
           <p:cNvSpPr>
             <a:spLocks noGrp="1"/>
           </p:cNvSpPr>
@@ -1223,7 +1223,7 @@
         <p:spPr>
           <a:xfrm>
             <a:off x="946080" y="4861080"/>
-            <a:ext cx="5203080" cy="4599720"/>
+            <a:ext cx="5202720" cy="4599360"/>
           </a:xfrm>
           <a:prstGeom prst="rect">
             <a:avLst/>
@@ -1238,14 +1238,14 @@
       </p:sp>
       <p:sp>
         <p:nvSpPr>
-          <p:cNvPr id="172" name="CustomShape 2"/>
+          <p:cNvPr id="173" name="CustomShape 2"/>
           <p:cNvSpPr/>
           <p:nvPr/>
         </p:nvSpPr>
         <p:spPr>
           <a:xfrm>
             <a:off x="4024440" y="9725040"/>
-            <a:ext cx="3071160" cy="505800"/>
+            <a:ext cx="3070800" cy="505440"/>
           </a:xfrm>
           <a:prstGeom prst="rect">
             <a:avLst/>
@@ -1263,7 +1263,7 @@
                 <a:spcPct val="100000"/>
               </a:lnSpc>
             </a:pPr>
-            <a:fld id="{5BC74042-687A-4A0D-956B-09F43D1A7F71}" type="slidenum">
+            <a:fld id="{DA2F1FCC-DB43-4E03-906D-5737E4C8A9B3}" type="slidenum">
               <a:rPr lang="en-US" sz="1200">
                 <a:solidFill>
                   <a:srgbClr val="000000"/>
@@ -3631,7 +3631,7 @@
         <p:spPr>
           <a:xfrm>
             <a:off x="0" y="932760"/>
-            <a:ext cx="9139320" cy="110520"/>
+            <a:ext cx="9138960" cy="110160"/>
           </a:xfrm>
           <a:prstGeom prst="rect">
             <a:avLst/>
@@ -3653,7 +3653,7 @@
         <p:spPr>
           <a:xfrm>
             <a:off x="7707960" y="6564960"/>
-            <a:ext cx="909720" cy="909720"/>
+            <a:ext cx="909360" cy="909360"/>
           </a:xfrm>
           <a:prstGeom prst="rect">
             <a:avLst/>
@@ -3679,7 +3679,7 @@
         <p:spPr>
           <a:xfrm>
             <a:off x="0" y="0"/>
-            <a:ext cx="9148680" cy="1382760"/>
+            <a:ext cx="9148320" cy="1382400"/>
           </a:xfrm>
           <a:prstGeom prst="rect">
             <a:avLst/>
@@ -3700,7 +3700,7 @@
         </p:nvPicPr>
         <p:blipFill>
           <a:blip r:embed="rId3"/>
-          <a:srcRect l="0" t="0" r="49906" b="45099"/>
+          <a:srcRect l="0" t="0" r="49902" b="45088"/>
           <a:stretch>
             <a:fillRect/>
           </a:stretch>
@@ -3708,7 +3708,7 @@
         <p:spPr>
           <a:xfrm>
             <a:off x="6619320" y="1393560"/>
-            <a:ext cx="2517840" cy="955440"/>
+            <a:ext cx="2517480" cy="955080"/>
           </a:xfrm>
           <a:prstGeom prst="rect">
             <a:avLst/>
@@ -3726,7 +3726,7 @@
         </p:nvPicPr>
         <p:blipFill>
           <a:blip r:embed="rId4"/>
-          <a:srcRect l="0" t="0" r="2243" b="13384"/>
+          <a:srcRect l="0" t="0" r="2231" b="13339"/>
           <a:stretch>
             <a:fillRect/>
           </a:stretch>
@@ -3734,7 +3734,7 @@
         <p:spPr>
           <a:xfrm>
             <a:off x="0" y="1393560"/>
-            <a:ext cx="3395880" cy="878760"/>
+            <a:ext cx="3395520" cy="878400"/>
           </a:xfrm>
           <a:prstGeom prst="rect">
             <a:avLst/>
@@ -3951,7 +3951,7 @@
         <p:spPr>
           <a:xfrm>
             <a:off x="0" y="932760"/>
-            <a:ext cx="9140040" cy="111240"/>
+            <a:ext cx="9139680" cy="110880"/>
           </a:xfrm>
           <a:prstGeom prst="rect">
             <a:avLst/>
@@ -3973,7 +3973,7 @@
         <p:spPr>
           <a:xfrm>
             <a:off x="7707960" y="6564960"/>
-            <a:ext cx="910440" cy="910440"/>
+            <a:ext cx="910080" cy="910080"/>
           </a:xfrm>
           <a:prstGeom prst="rect">
             <a:avLst/>
@@ -4183,8 +4183,8 @@
         </p:nvSpPr>
         <p:spPr>
           <a:xfrm>
-            <a:off x="720" y="2377440"/>
-            <a:ext cx="9139320" cy="1737000"/>
+            <a:off x="720" y="2305440"/>
+            <a:ext cx="9138960" cy="1736640"/>
           </a:xfrm>
           <a:prstGeom prst="rect">
             <a:avLst/>
@@ -4203,7 +4203,7 @@
               </a:lnSpc>
             </a:pPr>
             <a:r>
-              <a:rPr lang="en-US" sz="4400">
+              <a:rPr lang="en-US" sz="4000">
                 <a:solidFill>
                   <a:srgbClr val="4f81bd"/>
                 </a:solidFill>
@@ -4240,8 +4240,8 @@
         </p:nvSpPr>
         <p:spPr>
           <a:xfrm>
-            <a:off x="1189440" y="4480560"/>
-            <a:ext cx="6761880" cy="544320"/>
+            <a:off x="1189440" y="4264560"/>
+            <a:ext cx="6761520" cy="543960"/>
           </a:xfrm>
           <a:prstGeom prst="rect">
             <a:avLst/>
@@ -4260,7 +4260,7 @@
               </a:lnSpc>
             </a:pPr>
             <a:r>
-              <a:rPr lang="en-US" sz="2500">
+              <a:rPr lang="en-US" sz="2300">
                 <a:solidFill>
                   <a:srgbClr val="000000"/>
                 </a:solidFill>
@@ -4281,7 +4281,7 @@
         <p:spPr>
           <a:xfrm>
             <a:off x="10207080" y="2718720"/>
-            <a:ext cx="180000" cy="456840"/>
+            <a:ext cx="179640" cy="456480"/>
           </a:xfrm>
           <a:prstGeom prst="rect">
             <a:avLst/>
@@ -4301,7 +4301,7 @@
         <p:spPr>
           <a:xfrm>
             <a:off x="1855800" y="5852160"/>
-            <a:ext cx="6396120" cy="442080"/>
+            <a:ext cx="6395760" cy="441720"/>
           </a:xfrm>
           <a:prstGeom prst="rect">
             <a:avLst/>
@@ -4350,7 +4350,7 @@
         <p:spPr>
           <a:xfrm>
             <a:off x="1330920" y="2082960"/>
-            <a:ext cx="909720" cy="909720"/>
+            <a:ext cx="909360" cy="909360"/>
           </a:xfrm>
           <a:prstGeom prst="rect">
             <a:avLst/>
@@ -4370,7 +4370,7 @@
         <p:spPr>
           <a:xfrm>
             <a:off x="1855800" y="5486400"/>
-            <a:ext cx="6396120" cy="442080"/>
+            <a:ext cx="6395760" cy="441720"/>
           </a:xfrm>
           <a:prstGeom prst="rect">
             <a:avLst/>
@@ -4419,7 +4419,7 @@
         <p:spPr>
           <a:xfrm>
             <a:off x="6035040" y="1828800"/>
-            <a:ext cx="2922120" cy="1001880"/>
+            <a:ext cx="2921760" cy="1001520"/>
           </a:xfrm>
           <a:prstGeom prst="rect">
             <a:avLst/>
@@ -4439,7 +4439,7 @@
         <p:spPr>
           <a:xfrm>
             <a:off x="6309360" y="2194560"/>
-            <a:ext cx="1459080" cy="361800"/>
+            <a:ext cx="1458720" cy="361440"/>
           </a:xfrm>
           <a:prstGeom prst="rect">
             <a:avLst/>
@@ -4459,7 +4459,7 @@
         <p:spPr>
           <a:xfrm>
             <a:off x="1371600" y="3657600"/>
-            <a:ext cx="2922120" cy="1093320"/>
+            <a:ext cx="2921760" cy="1092960"/>
           </a:xfrm>
           <a:prstGeom prst="rect">
             <a:avLst/>
@@ -4479,7 +4479,7 @@
         <p:spPr>
           <a:xfrm>
             <a:off x="6547680" y="1463040"/>
-            <a:ext cx="2556360" cy="910440"/>
+            <a:ext cx="2556000" cy="910080"/>
           </a:xfrm>
           <a:prstGeom prst="rect">
             <a:avLst/>
@@ -4491,6 +4491,34 @@
             <a:noFill/>
           </a:ln>
         </p:spPr>
+      </p:sp>
+      <p:sp>
+        <p:nvSpPr>
+          <p:cNvPr id="94" name="TextShape 11"/>
+          <p:cNvSpPr txBox="1"/>
+          <p:nvPr/>
+        </p:nvSpPr>
+        <p:spPr>
+          <a:xfrm>
+            <a:off x="3360600" y="4705200"/>
+            <a:ext cx="2423160" cy="433440"/>
+          </a:xfrm>
+          <a:prstGeom prst="rect">
+            <a:avLst/>
+          </a:prstGeom>
+        </p:spPr>
+        <p:txBody>
+          <a:bodyPr lIns="90000" rIns="90000" tIns="45000" bIns="45000"/>
+          <a:p>
+            <a:r>
+              <a:rPr lang="en-US" sz="2300">
+                <a:latin typeface="Calibri"/>
+              </a:rPr>
+              <a:t>A.Y. 2014/2015</a:t>
+            </a:r>
+            <a:endParaRPr/>
+          </a:p>
+        </p:txBody>
       </p:sp>
     </p:spTree>
   </p:cSld>
@@ -4543,14 +4571,14 @@
       </p:grpSpPr>
       <p:sp>
         <p:nvSpPr>
-          <p:cNvPr id="143" name="CustomShape 1"/>
+          <p:cNvPr id="144" name="CustomShape 1"/>
           <p:cNvSpPr/>
           <p:nvPr/>
         </p:nvSpPr>
         <p:spPr>
           <a:xfrm>
             <a:off x="457200" y="164520"/>
-            <a:ext cx="8225640" cy="634680"/>
+            <a:ext cx="8225280" cy="634320"/>
           </a:xfrm>
           <a:prstGeom prst="rect">
             <a:avLst/>
@@ -4583,14 +4611,14 @@
       </p:sp>
       <p:sp>
         <p:nvSpPr>
-          <p:cNvPr id="144" name="CustomShape 2"/>
+          <p:cNvPr id="145" name="CustomShape 2"/>
           <p:cNvSpPr/>
           <p:nvPr/>
         </p:nvSpPr>
         <p:spPr>
           <a:xfrm>
             <a:off x="6553080" y="6356520"/>
-            <a:ext cx="2129760" cy="361080"/>
+            <a:ext cx="2129400" cy="360720"/>
           </a:xfrm>
           <a:prstGeom prst="rect">
             <a:avLst/>
@@ -4632,14 +4660,14 @@
       </p:sp>
       <p:sp>
         <p:nvSpPr>
-          <p:cNvPr id="145" name="CustomShape 3"/>
+          <p:cNvPr id="146" name="CustomShape 3"/>
           <p:cNvSpPr/>
           <p:nvPr/>
         </p:nvSpPr>
         <p:spPr>
           <a:xfrm>
             <a:off x="411840" y="1636560"/>
-            <a:ext cx="8319240" cy="1647720"/>
+            <a:ext cx="8318880" cy="1647360"/>
           </a:xfrm>
           <a:prstGeom prst="rect">
             <a:avLst/>
@@ -4706,14 +4734,14 @@
       </p:sp>
       <p:sp>
         <p:nvSpPr>
-          <p:cNvPr id="146" name="CustomShape 4"/>
+          <p:cNvPr id="147" name="CustomShape 4"/>
           <p:cNvSpPr/>
           <p:nvPr/>
         </p:nvSpPr>
         <p:spPr>
           <a:xfrm>
             <a:off x="411840" y="4450320"/>
-            <a:ext cx="8319240" cy="1308960"/>
+            <a:ext cx="8318880" cy="1308600"/>
           </a:xfrm>
           <a:prstGeom prst="rect">
             <a:avLst/>
@@ -4772,14 +4800,14 @@
       </p:sp>
       <p:sp>
         <p:nvSpPr>
-          <p:cNvPr id="147" name="CustomShape 5"/>
+          <p:cNvPr id="148" name="CustomShape 5"/>
           <p:cNvSpPr/>
           <p:nvPr/>
         </p:nvSpPr>
         <p:spPr>
           <a:xfrm>
             <a:off x="4389120" y="3468960"/>
-            <a:ext cx="363960" cy="729720"/>
+            <a:ext cx="363600" cy="729360"/>
           </a:xfrm>
           <a:prstGeom prst="downArrow">
             <a:avLst>
@@ -4848,14 +4876,14 @@
       </p:grpSpPr>
       <p:sp>
         <p:nvSpPr>
-          <p:cNvPr id="148" name="CustomShape 1"/>
+          <p:cNvPr id="149" name="CustomShape 1"/>
           <p:cNvSpPr/>
           <p:nvPr/>
         </p:nvSpPr>
         <p:spPr>
           <a:xfrm>
             <a:off x="457200" y="164520"/>
-            <a:ext cx="8225640" cy="634680"/>
+            <a:ext cx="8225280" cy="634320"/>
           </a:xfrm>
           <a:prstGeom prst="rect">
             <a:avLst/>
@@ -4888,14 +4916,14 @@
       </p:sp>
       <p:sp>
         <p:nvSpPr>
-          <p:cNvPr id="149" name="CustomShape 2"/>
+          <p:cNvPr id="150" name="CustomShape 2"/>
           <p:cNvSpPr/>
           <p:nvPr/>
         </p:nvSpPr>
         <p:spPr>
           <a:xfrm>
             <a:off x="6553080" y="6356520"/>
-            <a:ext cx="2129760" cy="361080"/>
+            <a:ext cx="2129400" cy="360720"/>
           </a:xfrm>
           <a:prstGeom prst="rect">
             <a:avLst/>
@@ -4937,7 +4965,7 @@
       </p:sp>
       <p:pic>
         <p:nvPicPr>
-          <p:cNvPr id="150" name="" descr=""/>
+          <p:cNvPr id="151" name="" descr=""/>
           <p:cNvPicPr/>
           <p:nvPr/>
         </p:nvPicPr>
@@ -4950,7 +4978,7 @@
         <p:spPr>
           <a:xfrm>
             <a:off x="892080" y="1047960"/>
-            <a:ext cx="7421400" cy="5592600"/>
+            <a:ext cx="7421040" cy="5592240"/>
           </a:xfrm>
           <a:prstGeom prst="rect">
             <a:avLst/>
@@ -5011,14 +5039,14 @@
       </p:grpSpPr>
       <p:sp>
         <p:nvSpPr>
-          <p:cNvPr id="151" name="CustomShape 1"/>
+          <p:cNvPr id="152" name="CustomShape 1"/>
           <p:cNvSpPr/>
           <p:nvPr/>
         </p:nvSpPr>
         <p:spPr>
           <a:xfrm>
             <a:off x="875160" y="3151800"/>
-            <a:ext cx="7390800" cy="713880"/>
+            <a:ext cx="7390440" cy="713520"/>
           </a:xfrm>
           <a:prstGeom prst="rect">
             <a:avLst/>
@@ -5095,14 +5123,14 @@
       </p:grpSpPr>
       <p:sp>
         <p:nvSpPr>
-          <p:cNvPr id="152" name="CustomShape 1"/>
+          <p:cNvPr id="153" name="CustomShape 1"/>
           <p:cNvSpPr/>
           <p:nvPr/>
         </p:nvSpPr>
         <p:spPr>
           <a:xfrm>
             <a:off x="457200" y="164520"/>
-            <a:ext cx="8225640" cy="634680"/>
+            <a:ext cx="8225280" cy="634320"/>
           </a:xfrm>
           <a:prstGeom prst="rect">
             <a:avLst/>
@@ -5135,14 +5163,14 @@
       </p:sp>
       <p:sp>
         <p:nvSpPr>
-          <p:cNvPr id="153" name="CustomShape 2"/>
+          <p:cNvPr id="154" name="CustomShape 2"/>
           <p:cNvSpPr/>
           <p:nvPr/>
         </p:nvSpPr>
         <p:spPr>
           <a:xfrm>
             <a:off x="457200" y="1312200"/>
-            <a:ext cx="8225640" cy="4521960"/>
+            <a:ext cx="8225280" cy="4521600"/>
           </a:xfrm>
           <a:prstGeom prst="rect">
             <a:avLst/>
@@ -5270,14 +5298,14 @@
       </p:grpSpPr>
       <p:sp>
         <p:nvSpPr>
-          <p:cNvPr id="154" name="CustomShape 1"/>
+          <p:cNvPr id="155" name="CustomShape 1"/>
           <p:cNvSpPr/>
           <p:nvPr/>
         </p:nvSpPr>
         <p:spPr>
           <a:xfrm>
             <a:off x="457200" y="164520"/>
-            <a:ext cx="8225640" cy="634680"/>
+            <a:ext cx="8225280" cy="634320"/>
           </a:xfrm>
           <a:prstGeom prst="rect">
             <a:avLst/>
@@ -5310,14 +5338,14 @@
       </p:sp>
       <p:sp>
         <p:nvSpPr>
-          <p:cNvPr id="155" name="CustomShape 2"/>
+          <p:cNvPr id="156" name="CustomShape 2"/>
           <p:cNvSpPr/>
           <p:nvPr/>
         </p:nvSpPr>
         <p:spPr>
           <a:xfrm>
             <a:off x="6553080" y="6356520"/>
-            <a:ext cx="2129760" cy="361080"/>
+            <a:ext cx="2129400" cy="360720"/>
           </a:xfrm>
           <a:prstGeom prst="rect">
             <a:avLst/>
@@ -5349,7 +5377,7 @@
       </p:sp>
       <p:pic>
         <p:nvPicPr>
-          <p:cNvPr id="156" name="" descr=""/>
+          <p:cNvPr id="157" name="" descr=""/>
           <p:cNvPicPr/>
           <p:nvPr/>
         </p:nvPicPr>
@@ -5362,7 +5390,7 @@
         <p:spPr>
           <a:xfrm>
             <a:off x="75960" y="1958040"/>
-            <a:ext cx="8990640" cy="3376080"/>
+            <a:ext cx="8990280" cy="3375720"/>
           </a:xfrm>
           <a:prstGeom prst="rect">
             <a:avLst/>
@@ -5423,14 +5451,14 @@
       </p:grpSpPr>
       <p:sp>
         <p:nvSpPr>
-          <p:cNvPr id="94" name="CustomShape 1"/>
+          <p:cNvPr id="95" name="CustomShape 1"/>
           <p:cNvSpPr/>
           <p:nvPr/>
         </p:nvSpPr>
         <p:spPr>
           <a:xfrm>
             <a:off x="457200" y="164520"/>
-            <a:ext cx="8225640" cy="634680"/>
+            <a:ext cx="8225280" cy="634320"/>
           </a:xfrm>
           <a:prstGeom prst="rect">
             <a:avLst/>
@@ -5463,14 +5491,14 @@
       </p:sp>
       <p:sp>
         <p:nvSpPr>
-          <p:cNvPr id="95" name="CustomShape 2"/>
+          <p:cNvPr id="96" name="CustomShape 2"/>
           <p:cNvSpPr/>
           <p:nvPr/>
         </p:nvSpPr>
         <p:spPr>
           <a:xfrm>
             <a:off x="457200" y="1744200"/>
-            <a:ext cx="8225640" cy="4521960"/>
+            <a:ext cx="8225280" cy="4521600"/>
           </a:xfrm>
           <a:prstGeom prst="rect">
             <a:avLst/>
@@ -5600,14 +5628,14 @@
       </p:sp>
       <p:sp>
         <p:nvSpPr>
-          <p:cNvPr id="96" name="CustomShape 3"/>
+          <p:cNvPr id="97" name="CustomShape 3"/>
           <p:cNvSpPr/>
           <p:nvPr/>
         </p:nvSpPr>
         <p:spPr>
           <a:xfrm>
             <a:off x="6553080" y="6356520"/>
-            <a:ext cx="2129760" cy="361080"/>
+            <a:ext cx="2129400" cy="360720"/>
           </a:xfrm>
           <a:prstGeom prst="rect">
             <a:avLst/>
@@ -5698,14 +5726,14 @@
       </p:grpSpPr>
       <p:sp>
         <p:nvSpPr>
-          <p:cNvPr id="97" name="CustomShape 1"/>
+          <p:cNvPr id="98" name="CustomShape 1"/>
           <p:cNvSpPr/>
           <p:nvPr/>
         </p:nvSpPr>
         <p:spPr>
           <a:xfrm>
             <a:off x="457200" y="164520"/>
-            <a:ext cx="8225640" cy="634680"/>
+            <a:ext cx="8225280" cy="634320"/>
           </a:xfrm>
           <a:prstGeom prst="rect">
             <a:avLst/>
@@ -5738,14 +5766,14 @@
       </p:sp>
       <p:sp>
         <p:nvSpPr>
-          <p:cNvPr id="98" name="CustomShape 2"/>
+          <p:cNvPr id="99" name="CustomShape 2"/>
           <p:cNvSpPr/>
           <p:nvPr/>
         </p:nvSpPr>
         <p:spPr>
           <a:xfrm>
             <a:off x="6553080" y="6356520"/>
-            <a:ext cx="2129760" cy="361080"/>
+            <a:ext cx="2129400" cy="360720"/>
           </a:xfrm>
           <a:prstGeom prst="rect">
             <a:avLst/>
@@ -5787,7 +5815,7 @@
       </p:sp>
       <p:pic>
         <p:nvPicPr>
-          <p:cNvPr id="99" name="" descr=""/>
+          <p:cNvPr id="100" name="" descr=""/>
           <p:cNvPicPr/>
           <p:nvPr/>
         </p:nvPicPr>
@@ -5800,7 +5828,7 @@
         <p:spPr>
           <a:xfrm>
             <a:off x="2615760" y="2338560"/>
-            <a:ext cx="1861200" cy="2556720"/>
+            <a:ext cx="1860840" cy="2556360"/>
           </a:xfrm>
           <a:prstGeom prst="rect">
             <a:avLst/>
@@ -5812,14 +5840,14 @@
       </p:pic>
       <p:sp>
         <p:nvSpPr>
-          <p:cNvPr id="100" name="CustomShape 3"/>
+          <p:cNvPr id="101" name="CustomShape 3"/>
           <p:cNvSpPr/>
           <p:nvPr/>
         </p:nvSpPr>
         <p:spPr>
           <a:xfrm>
             <a:off x="640080" y="5455440"/>
-            <a:ext cx="3654000" cy="443520"/>
+            <a:ext cx="3653640" cy="443160"/>
           </a:xfrm>
           <a:prstGeom prst="rect">
             <a:avLst/>
@@ -5847,7 +5875,7 @@
       </p:sp>
       <p:pic>
         <p:nvPicPr>
-          <p:cNvPr id="101" name="" descr=""/>
+          <p:cNvPr id="102" name="" descr=""/>
           <p:cNvPicPr/>
           <p:nvPr/>
         </p:nvPicPr>
@@ -5860,7 +5888,7 @@
         <p:spPr>
           <a:xfrm>
             <a:off x="5120640" y="2283120"/>
-            <a:ext cx="3780000" cy="1276560"/>
+            <a:ext cx="3779640" cy="1276200"/>
           </a:xfrm>
           <a:prstGeom prst="rect">
             <a:avLst/>
@@ -5872,7 +5900,7 @@
       </p:pic>
       <p:pic>
         <p:nvPicPr>
-          <p:cNvPr id="102" name="" descr=""/>
+          <p:cNvPr id="103" name="" descr=""/>
           <p:cNvPicPr/>
           <p:nvPr/>
         </p:nvPicPr>
@@ -5885,7 +5913,7 @@
         <p:spPr>
           <a:xfrm>
             <a:off x="6126480" y="3599280"/>
-            <a:ext cx="1788120" cy="1733760"/>
+            <a:ext cx="1787760" cy="1733400"/>
           </a:xfrm>
           <a:prstGeom prst="rect">
             <a:avLst/>
@@ -5897,14 +5925,14 @@
       </p:pic>
       <p:sp>
         <p:nvSpPr>
-          <p:cNvPr id="103" name="CustomShape 4"/>
+          <p:cNvPr id="104" name="CustomShape 4"/>
           <p:cNvSpPr/>
           <p:nvPr/>
         </p:nvSpPr>
         <p:spPr>
           <a:xfrm>
             <a:off x="5056560" y="5444280"/>
-            <a:ext cx="3862080" cy="443520"/>
+            <a:ext cx="3861720" cy="443160"/>
           </a:xfrm>
           <a:prstGeom prst="rect">
             <a:avLst/>
@@ -5932,14 +5960,14 @@
       </p:sp>
       <p:sp>
         <p:nvSpPr>
-          <p:cNvPr id="104" name="CustomShape 5"/>
+          <p:cNvPr id="105" name="CustomShape 5"/>
           <p:cNvSpPr/>
           <p:nvPr/>
         </p:nvSpPr>
         <p:spPr>
           <a:xfrm>
             <a:off x="1264680" y="1338480"/>
-            <a:ext cx="6612120" cy="624240"/>
+            <a:ext cx="6611760" cy="623880"/>
           </a:xfrm>
           <a:prstGeom prst="rect">
             <a:avLst/>
@@ -5988,7 +6016,7 @@
       </p:sp>
       <p:pic>
         <p:nvPicPr>
-          <p:cNvPr id="105" name="" descr=""/>
+          <p:cNvPr id="106" name="" descr=""/>
           <p:cNvPicPr/>
           <p:nvPr/>
         </p:nvPicPr>
@@ -6001,7 +6029,7 @@
         <p:spPr>
           <a:xfrm>
             <a:off x="365760" y="2712240"/>
-            <a:ext cx="2190960" cy="1733760"/>
+            <a:ext cx="2190600" cy="1733400"/>
           </a:xfrm>
           <a:prstGeom prst="rect">
             <a:avLst/>
@@ -6062,14 +6090,14 @@
       </p:grpSpPr>
       <p:sp>
         <p:nvSpPr>
-          <p:cNvPr id="106" name="CustomShape 1"/>
+          <p:cNvPr id="107" name="CustomShape 1"/>
           <p:cNvSpPr/>
           <p:nvPr/>
         </p:nvSpPr>
         <p:spPr>
           <a:xfrm>
             <a:off x="457200" y="164520"/>
-            <a:ext cx="8225640" cy="634680"/>
+            <a:ext cx="8225280" cy="634320"/>
           </a:xfrm>
           <a:prstGeom prst="rect">
             <a:avLst/>
@@ -6102,14 +6130,14 @@
       </p:sp>
       <p:sp>
         <p:nvSpPr>
-          <p:cNvPr id="107" name="CustomShape 2"/>
+          <p:cNvPr id="108" name="CustomShape 2"/>
           <p:cNvSpPr/>
           <p:nvPr/>
         </p:nvSpPr>
         <p:spPr>
           <a:xfrm>
             <a:off x="6553080" y="6356520"/>
-            <a:ext cx="2129760" cy="361080"/>
+            <a:ext cx="2129400" cy="360720"/>
           </a:xfrm>
           <a:prstGeom prst="rect">
             <a:avLst/>
@@ -6143,7 +6171,7 @@
                 <a:latin typeface="Arial"/>
                 <a:ea typeface="ＭＳ Ｐゴシック"/>
               </a:rPr>
-              <a:t>6</a:t>
+              <a:t>3</a:t>
             </a:r>
             <a:endParaRPr/>
           </a:p>
@@ -6151,7 +6179,7 @@
       </p:sp>
       <p:pic>
         <p:nvPicPr>
-          <p:cNvPr id="108" name="" descr=""/>
+          <p:cNvPr id="109" name="" descr=""/>
           <p:cNvPicPr/>
           <p:nvPr/>
         </p:nvPicPr>
@@ -6164,7 +6192,7 @@
         <p:spPr>
           <a:xfrm>
             <a:off x="2070720" y="1712160"/>
-            <a:ext cx="5001120" cy="1644120"/>
+            <a:ext cx="5000760" cy="1643760"/>
           </a:xfrm>
           <a:prstGeom prst="rect">
             <a:avLst/>
@@ -6176,7 +6204,7 @@
       </p:pic>
       <p:sp>
         <p:nvSpPr>
-          <p:cNvPr id="109" name="Line 3"/>
+          <p:cNvPr id="110" name="Line 3"/>
           <p:cNvSpPr/>
           <p:nvPr/>
         </p:nvSpPr>
@@ -6184,6 +6212,128 @@
           <a:xfrm flipV="1">
             <a:off x="1974960" y="3194640"/>
             <a:ext cx="438480" cy="218880"/>
+          </a:xfrm>
+          <a:prstGeom prst="line">
+            <a:avLst/>
+          </a:prstGeom>
+          <a:ln cap="rnd">
+            <a:solidFill>
+              <a:srgbClr val="000000"/>
+            </a:solidFill>
+            <a:custDash>
+              <a:ds d="1225000000" sp="1225000000"/>
+            </a:custDash>
+            <a:tailEnd len="med" type="triangle" w="med"/>
+          </a:ln>
+        </p:spPr>
+      </p:sp>
+      <p:sp>
+        <p:nvSpPr>
+          <p:cNvPr id="111" name="CustomShape 4"/>
+          <p:cNvSpPr/>
+          <p:nvPr/>
+        </p:nvSpPr>
+        <p:spPr>
+          <a:xfrm>
+            <a:off x="1047600" y="3163320"/>
+            <a:ext cx="963360" cy="676080"/>
+          </a:xfrm>
+          <a:prstGeom prst="rect">
+            <a:avLst/>
+          </a:prstGeom>
+          <a:noFill/>
+          <a:ln>
+            <a:noFill/>
+          </a:ln>
+        </p:spPr>
+        <p:txBody>
+          <a:bodyPr lIns="90000" rIns="90000" tIns="45000" bIns="45000"/>
+          <a:p>
+            <a:r>
+              <a:rPr lang="en-US">
+                <a:solidFill>
+                  <a:srgbClr val="3465a4"/>
+                </a:solidFill>
+                <a:latin typeface="Arial"/>
+              </a:rPr>
+              <a:t>release</a:t>
+            </a:r>
+            <a:endParaRPr/>
+          </a:p>
+          <a:p>
+            <a:r>
+              <a:rPr lang="en-US">
+                <a:solidFill>
+                  <a:srgbClr val="3465a4"/>
+                </a:solidFill>
+                <a:latin typeface="Arial"/>
+              </a:rPr>
+              <a:t>time</a:t>
+            </a:r>
+            <a:endParaRPr/>
+          </a:p>
+        </p:txBody>
+      </p:sp>
+      <p:sp>
+        <p:nvSpPr>
+          <p:cNvPr id="112" name="Line 5"/>
+          <p:cNvSpPr/>
+          <p:nvPr/>
+        </p:nvSpPr>
+        <p:spPr>
+          <a:xfrm flipV="1">
+            <a:off x="5394960" y="3358080"/>
+            <a:ext cx="0" cy="421200"/>
+          </a:xfrm>
+          <a:prstGeom prst="line">
+            <a:avLst/>
+          </a:prstGeom>
+          <a:ln cap="rnd">
+            <a:solidFill>
+              <a:srgbClr val="000000"/>
+            </a:solidFill>
+            <a:custDash>
+              <a:ds d="1225000000" sp="1225000000"/>
+            </a:custDash>
+            <a:tailEnd len="med" type="triangle" w="med"/>
+          </a:ln>
+        </p:spPr>
+      </p:sp>
+      <p:sp>
+        <p:nvSpPr>
+          <p:cNvPr id="113" name="Line 6"/>
+          <p:cNvSpPr/>
+          <p:nvPr/>
+        </p:nvSpPr>
+        <p:spPr>
+          <a:xfrm flipH="1" flipV="1">
+            <a:off x="6458760" y="3180960"/>
+            <a:ext cx="526680" cy="177120"/>
+          </a:xfrm>
+          <a:prstGeom prst="line">
+            <a:avLst/>
+          </a:prstGeom>
+          <a:ln cap="rnd">
+            <a:solidFill>
+              <a:srgbClr val="000000"/>
+            </a:solidFill>
+            <a:custDash>
+              <a:ds d="1225000000" sp="1225000000"/>
+            </a:custDash>
+            <a:tailEnd len="med" type="triangle" w="med"/>
+          </a:ln>
+        </p:spPr>
+      </p:sp>
+      <p:sp>
+        <p:nvSpPr>
+          <p:cNvPr id="114" name="Line 7"/>
+          <p:cNvSpPr/>
+          <p:nvPr/>
+        </p:nvSpPr>
+        <p:spPr>
+          <a:xfrm flipV="1">
+            <a:off x="4297680" y="2518560"/>
+            <a:ext cx="0" cy="707760"/>
           </a:xfrm>
           <a:prstGeom prst="line">
             <a:avLst/>
@@ -6194,6 +6344,7 @@
             </a:solidFill>
             <a:custDash>
               <a:ds d="35000" sp="35000"/>
+              <a:ds d="35000" sp="35000"/>
             </a:custDash>
             <a:tailEnd len="med" type="triangle" w="med"/>
           </a:ln>
@@ -6201,14 +6352,14 @@
       </p:sp>
       <p:sp>
         <p:nvSpPr>
-          <p:cNvPr id="110" name="CustomShape 4"/>
+          <p:cNvPr id="115" name="CustomShape 8"/>
           <p:cNvSpPr/>
           <p:nvPr/>
         </p:nvSpPr>
         <p:spPr>
           <a:xfrm>
-            <a:off x="1047600" y="3163320"/>
-            <a:ext cx="963720" cy="676440"/>
+            <a:off x="3567600" y="3235680"/>
+            <a:ext cx="1460880" cy="604080"/>
           </a:xfrm>
           <a:prstGeom prst="rect">
             <a:avLst/>
@@ -6228,7 +6379,7 @@
                 </a:solidFill>
                 <a:latin typeface="Arial"/>
               </a:rPr>
-              <a:t>release</a:t>
+              <a:t>computation</a:t>
             </a:r>
             <a:endParaRPr/>
           </a:p>
@@ -6248,90 +6399,14 @@
       </p:sp>
       <p:sp>
         <p:nvSpPr>
-          <p:cNvPr id="111" name="Line 5"/>
+          <p:cNvPr id="116" name="CustomShape 9"/>
           <p:cNvSpPr/>
           <p:nvPr/>
         </p:nvSpPr>
         <p:spPr>
-          <a:xfrm flipV="1">
-            <a:off x="5394960" y="3358080"/>
-            <a:ext cx="0" cy="421200"/>
-          </a:xfrm>
-          <a:prstGeom prst="line">
-            <a:avLst/>
-          </a:prstGeom>
-          <a:ln cap="rnd">
-            <a:solidFill>
-              <a:srgbClr val="000000"/>
-            </a:solidFill>
-            <a:custDash>
-              <a:ds d="35000" sp="35000"/>
-            </a:custDash>
-            <a:tailEnd len="med" type="triangle" w="med"/>
-          </a:ln>
-        </p:spPr>
-      </p:sp>
-      <p:sp>
-        <p:nvSpPr>
-          <p:cNvPr id="112" name="Line 6"/>
-          <p:cNvSpPr/>
-          <p:nvPr/>
-        </p:nvSpPr>
-        <p:spPr>
-          <a:xfrm flipH="1" flipV="1">
-            <a:off x="6458760" y="3180960"/>
-            <a:ext cx="526680" cy="177120"/>
-          </a:xfrm>
-          <a:prstGeom prst="line">
-            <a:avLst/>
-          </a:prstGeom>
-          <a:ln cap="rnd">
-            <a:solidFill>
-              <a:srgbClr val="000000"/>
-            </a:solidFill>
-            <a:custDash>
-              <a:ds d="35000" sp="35000"/>
-            </a:custDash>
-            <a:tailEnd len="med" type="triangle" w="med"/>
-          </a:ln>
-        </p:spPr>
-      </p:sp>
-      <p:sp>
-        <p:nvSpPr>
-          <p:cNvPr id="113" name="Line 7"/>
-          <p:cNvSpPr/>
-          <p:nvPr/>
-        </p:nvSpPr>
-        <p:spPr>
-          <a:xfrm flipV="1">
-            <a:off x="4297680" y="2518560"/>
-            <a:ext cx="0" cy="707760"/>
-          </a:xfrm>
-          <a:prstGeom prst="line">
-            <a:avLst/>
-          </a:prstGeom>
-          <a:ln cap="rnd">
-            <a:solidFill>
-              <a:srgbClr val="000000"/>
-            </a:solidFill>
-            <a:custDash>
-              <a:ds d="2072810688000" sp="1225000000"/>
-              <a:ds d="2072810688000" sp="1225000000"/>
-            </a:custDash>
-            <a:tailEnd len="med" type="triangle" w="med"/>
-          </a:ln>
-        </p:spPr>
-      </p:sp>
-      <p:sp>
-        <p:nvSpPr>
-          <p:cNvPr id="114" name="CustomShape 8"/>
-          <p:cNvSpPr/>
-          <p:nvPr/>
-        </p:nvSpPr>
-        <p:spPr>
-          <a:xfrm>
-            <a:off x="3567600" y="3235680"/>
-            <a:ext cx="1461240" cy="604440"/>
+          <a:xfrm>
+            <a:off x="4899600" y="3775680"/>
+            <a:ext cx="1043280" cy="612720"/>
           </a:xfrm>
           <a:prstGeom prst="rect">
             <a:avLst/>
@@ -6351,7 +6426,7 @@
                 </a:solidFill>
                 <a:latin typeface="Arial"/>
               </a:rPr>
-              <a:t>computation</a:t>
+              <a:t>finishing</a:t>
             </a:r>
             <a:endParaRPr/>
           </a:p>
@@ -6371,14 +6446,14 @@
       </p:sp>
       <p:sp>
         <p:nvSpPr>
-          <p:cNvPr id="115" name="CustomShape 9"/>
+          <p:cNvPr id="117" name="CustomShape 10"/>
           <p:cNvSpPr/>
           <p:nvPr/>
         </p:nvSpPr>
         <p:spPr>
           <a:xfrm>
-            <a:off x="4899600" y="3775680"/>
-            <a:ext cx="1043640" cy="613080"/>
+            <a:off x="1047600" y="3163680"/>
+            <a:ext cx="963360" cy="676080"/>
           </a:xfrm>
           <a:prstGeom prst="rect">
             <a:avLst/>
@@ -6398,7 +6473,7 @@
                 </a:solidFill>
                 <a:latin typeface="Arial"/>
               </a:rPr>
-              <a:t>finishing</a:t>
+              <a:t>release</a:t>
             </a:r>
             <a:endParaRPr/>
           </a:p>
@@ -6418,14 +6493,14 @@
       </p:sp>
       <p:sp>
         <p:nvSpPr>
-          <p:cNvPr id="116" name="CustomShape 10"/>
+          <p:cNvPr id="118" name="CustomShape 11"/>
           <p:cNvSpPr/>
           <p:nvPr/>
         </p:nvSpPr>
         <p:spPr>
           <a:xfrm>
-            <a:off x="1047600" y="3163680"/>
-            <a:ext cx="963720" cy="676440"/>
+            <a:off x="6985440" y="3108960"/>
+            <a:ext cx="1152000" cy="639360"/>
           </a:xfrm>
           <a:prstGeom prst="rect">
             <a:avLst/>
@@ -6445,7 +6520,7 @@
                 </a:solidFill>
                 <a:latin typeface="Arial"/>
               </a:rPr>
-              <a:t>release</a:t>
+              <a:t>relative</a:t>
             </a:r>
             <a:endParaRPr/>
           </a:p>
@@ -6457,69 +6532,22 @@
                 </a:solidFill>
                 <a:latin typeface="Arial"/>
               </a:rPr>
-              <a:t>time</a:t>
-            </a:r>
-            <a:endParaRPr/>
-          </a:p>
-        </p:txBody>
-      </p:sp>
-      <p:sp>
-        <p:nvSpPr>
-          <p:cNvPr id="117" name="CustomShape 11"/>
+              <a:t>deadline</a:t>
+            </a:r>
+            <a:endParaRPr/>
+          </a:p>
+        </p:txBody>
+      </p:sp>
+      <p:sp>
+        <p:nvSpPr>
+          <p:cNvPr id="119" name="CustomShape 12"/>
           <p:cNvSpPr/>
           <p:nvPr/>
         </p:nvSpPr>
         <p:spPr>
           <a:xfrm>
-            <a:off x="6985440" y="3108960"/>
-            <a:ext cx="1152360" cy="639720"/>
-          </a:xfrm>
-          <a:prstGeom prst="rect">
-            <a:avLst/>
-          </a:prstGeom>
-          <a:noFill/>
-          <a:ln>
-            <a:noFill/>
-          </a:ln>
-        </p:spPr>
-        <p:txBody>
-          <a:bodyPr lIns="90000" rIns="90000" tIns="45000" bIns="45000"/>
-          <a:p>
-            <a:r>
-              <a:rPr lang="en-US">
-                <a:solidFill>
-                  <a:srgbClr val="3465a4"/>
-                </a:solidFill>
-                <a:latin typeface="Arial"/>
-              </a:rPr>
-              <a:t>relative</a:t>
-            </a:r>
-            <a:endParaRPr/>
-          </a:p>
-          <a:p>
-            <a:r>
-              <a:rPr lang="en-US">
-                <a:solidFill>
-                  <a:srgbClr val="3465a4"/>
-                </a:solidFill>
-                <a:latin typeface="Arial"/>
-              </a:rPr>
-              <a:t>deadline</a:t>
-            </a:r>
-            <a:endParaRPr/>
-          </a:p>
-        </p:txBody>
-      </p:sp>
-      <p:sp>
-        <p:nvSpPr>
-          <p:cNvPr id="118" name="CustomShape 12"/>
-          <p:cNvSpPr/>
-          <p:nvPr/>
-        </p:nvSpPr>
-        <p:spPr>
-          <a:xfrm>
             <a:off x="777240" y="5180760"/>
-            <a:ext cx="7589160" cy="624240"/>
+            <a:ext cx="7588800" cy="623880"/>
           </a:xfrm>
           <a:prstGeom prst="rect">
             <a:avLst/>
@@ -6609,14 +6637,14 @@
       </p:grpSpPr>
       <p:sp>
         <p:nvSpPr>
-          <p:cNvPr id="119" name="CustomShape 1"/>
+          <p:cNvPr id="120" name="CustomShape 1"/>
           <p:cNvSpPr/>
           <p:nvPr/>
         </p:nvSpPr>
         <p:spPr>
           <a:xfrm>
             <a:off x="457200" y="164520"/>
-            <a:ext cx="8225640" cy="634680"/>
+            <a:ext cx="8225280" cy="634320"/>
           </a:xfrm>
           <a:prstGeom prst="rect">
             <a:avLst/>
@@ -6649,14 +6677,14 @@
       </p:sp>
       <p:sp>
         <p:nvSpPr>
-          <p:cNvPr id="120" name="CustomShape 2"/>
+          <p:cNvPr id="121" name="CustomShape 2"/>
           <p:cNvSpPr/>
           <p:nvPr/>
         </p:nvSpPr>
         <p:spPr>
           <a:xfrm>
             <a:off x="6553080" y="6356520"/>
-            <a:ext cx="2129760" cy="361080"/>
+            <a:ext cx="2129400" cy="360720"/>
           </a:xfrm>
           <a:prstGeom prst="rect">
             <a:avLst/>
@@ -6690,22 +6718,22 @@
                 <a:latin typeface="Arial"/>
                 <a:ea typeface="ＭＳ Ｐゴシック"/>
               </a:rPr>
-              <a:t>7</a:t>
-            </a:r>
-            <a:endParaRPr/>
-          </a:p>
-        </p:txBody>
-      </p:sp>
-      <p:sp>
-        <p:nvSpPr>
-          <p:cNvPr id="121" name="CustomShape 3"/>
+              <a:t>4</a:t>
+            </a:r>
+            <a:endParaRPr/>
+          </a:p>
+        </p:txBody>
+      </p:sp>
+      <p:sp>
+        <p:nvSpPr>
+          <p:cNvPr id="122" name="CustomShape 3"/>
           <p:cNvSpPr/>
           <p:nvPr/>
         </p:nvSpPr>
         <p:spPr>
           <a:xfrm>
             <a:off x="320760" y="1616400"/>
-            <a:ext cx="8500680" cy="2108520"/>
+            <a:ext cx="8500320" cy="2108160"/>
           </a:xfrm>
           <a:prstGeom prst="rect">
             <a:avLst/>
@@ -6730,7 +6758,7 @@
                 </a:solidFill>
                 <a:latin typeface="Calibri"/>
               </a:rPr>
-              <a:t>This protocol assigns to each task a reservation (Q, T), where:</a:t>
+              <a:t>This model assigns to each task a reservation (Q, T), where:</a:t>
             </a:r>
             <a:endParaRPr/>
           </a:p>
@@ -6803,14 +6831,14 @@
       </p:sp>
       <p:sp>
         <p:nvSpPr>
-          <p:cNvPr id="122" name="CustomShape 4"/>
+          <p:cNvPr id="123" name="CustomShape 4"/>
           <p:cNvSpPr/>
           <p:nvPr/>
         </p:nvSpPr>
         <p:spPr>
           <a:xfrm>
             <a:off x="316080" y="4439880"/>
-            <a:ext cx="8500680" cy="1587600"/>
+            <a:ext cx="8500320" cy="1587240"/>
           </a:xfrm>
           <a:prstGeom prst="rect">
             <a:avLst/>
@@ -6835,7 +6863,7 @@
                 </a:solidFill>
                 <a:latin typeface="Calibri"/>
               </a:rPr>
-              <a:t>A task can execute for Q time in every interval of length T (</a:t>
+              <a:t>A task can execute for Q time units in every interval of length T (</a:t>
             </a:r>
             <a:r>
               <a:rPr lang="en-US" sz="3200">
@@ -6861,14 +6889,14 @@
       </p:sp>
       <p:sp>
         <p:nvSpPr>
-          <p:cNvPr id="123" name="CustomShape 5"/>
+          <p:cNvPr id="124" name="CustomShape 5"/>
           <p:cNvSpPr/>
           <p:nvPr/>
         </p:nvSpPr>
         <p:spPr>
           <a:xfrm>
             <a:off x="4389120" y="3765600"/>
-            <a:ext cx="365040" cy="639360"/>
+            <a:ext cx="364680" cy="639000"/>
           </a:xfrm>
           <a:prstGeom prst="downArrow">
             <a:avLst>
@@ -6937,14 +6965,14 @@
       </p:grpSpPr>
       <p:sp>
         <p:nvSpPr>
-          <p:cNvPr id="124" name="CustomShape 1"/>
+          <p:cNvPr id="125" name="CustomShape 1"/>
           <p:cNvSpPr/>
           <p:nvPr/>
         </p:nvSpPr>
         <p:spPr>
           <a:xfrm>
             <a:off x="457200" y="164520"/>
-            <a:ext cx="8225640" cy="634680"/>
+            <a:ext cx="8225280" cy="634320"/>
           </a:xfrm>
           <a:prstGeom prst="rect">
             <a:avLst/>
@@ -6977,14 +7005,14 @@
       </p:sp>
       <p:sp>
         <p:nvSpPr>
-          <p:cNvPr id="125" name="CustomShape 2"/>
+          <p:cNvPr id="126" name="CustomShape 2"/>
           <p:cNvSpPr/>
           <p:nvPr/>
         </p:nvSpPr>
         <p:spPr>
           <a:xfrm>
             <a:off x="6553080" y="6356520"/>
-            <a:ext cx="2129760" cy="361080"/>
+            <a:ext cx="2129400" cy="360720"/>
           </a:xfrm>
           <a:prstGeom prst="rect">
             <a:avLst/>
@@ -7018,22 +7046,22 @@
                 <a:latin typeface="Arial"/>
                 <a:ea typeface="ＭＳ Ｐゴシック"/>
               </a:rPr>
-              <a:t>8</a:t>
-            </a:r>
-            <a:endParaRPr/>
-          </a:p>
-        </p:txBody>
-      </p:sp>
-      <p:sp>
-        <p:nvSpPr>
-          <p:cNvPr id="126" name="CustomShape 3"/>
+              <a:t>5</a:t>
+            </a:r>
+            <a:endParaRPr/>
+          </a:p>
+        </p:txBody>
+      </p:sp>
+      <p:sp>
+        <p:nvSpPr>
+          <p:cNvPr id="127" name="CustomShape 3"/>
           <p:cNvSpPr/>
           <p:nvPr/>
         </p:nvSpPr>
         <p:spPr>
           <a:xfrm>
             <a:off x="320400" y="1384560"/>
-            <a:ext cx="8503200" cy="1172520"/>
+            <a:ext cx="8502840" cy="1172160"/>
           </a:xfrm>
           <a:prstGeom prst="rect">
             <a:avLst/>
@@ -7066,7 +7094,7 @@
       </p:sp>
       <p:pic>
         <p:nvPicPr>
-          <p:cNvPr id="127" name="" descr=""/>
+          <p:cNvPr id="128" name="" descr=""/>
           <p:cNvPicPr/>
           <p:nvPr/>
         </p:nvPicPr>
@@ -7079,7 +7107,7 @@
         <p:spPr>
           <a:xfrm>
             <a:off x="2555640" y="2621880"/>
-            <a:ext cx="4029480" cy="2393280"/>
+            <a:ext cx="4029120" cy="2392920"/>
           </a:xfrm>
           <a:prstGeom prst="rect">
             <a:avLst/>
@@ -7091,14 +7119,14 @@
       </p:pic>
       <p:sp>
         <p:nvSpPr>
-          <p:cNvPr id="128" name="CustomShape 4"/>
+          <p:cNvPr id="129" name="CustomShape 4"/>
           <p:cNvSpPr/>
           <p:nvPr/>
         </p:nvSpPr>
         <p:spPr>
           <a:xfrm>
             <a:off x="3255840" y="2712960"/>
-            <a:ext cx="1002600" cy="747720"/>
+            <a:ext cx="1002240" cy="747360"/>
           </a:xfrm>
           <a:prstGeom prst="rect">
             <a:avLst/>
@@ -7114,14 +7142,14 @@
       </p:sp>
       <p:sp>
         <p:nvSpPr>
-          <p:cNvPr id="129" name="CustomShape 5"/>
+          <p:cNvPr id="130" name="CustomShape 5"/>
           <p:cNvSpPr/>
           <p:nvPr/>
         </p:nvSpPr>
         <p:spPr>
           <a:xfrm>
             <a:off x="690120" y="5195880"/>
-            <a:ext cx="3379680" cy="653040"/>
+            <a:ext cx="3379320" cy="652680"/>
           </a:xfrm>
           <a:prstGeom prst="rect">
             <a:avLst/>
@@ -7154,14 +7182,14 @@
       </p:sp>
       <p:sp>
         <p:nvSpPr>
-          <p:cNvPr id="130" name="CustomShape 6"/>
+          <p:cNvPr id="131" name="CustomShape 6"/>
           <p:cNvSpPr/>
           <p:nvPr/>
         </p:nvSpPr>
         <p:spPr>
           <a:xfrm>
             <a:off x="4812840" y="5195160"/>
-            <a:ext cx="3963960" cy="653040"/>
+            <a:ext cx="3963600" cy="652680"/>
           </a:xfrm>
           <a:prstGeom prst="rect">
             <a:avLst/>
@@ -7194,7 +7222,7 @@
       </p:sp>
       <p:sp>
         <p:nvSpPr>
-          <p:cNvPr id="131" name="Line 7"/>
+          <p:cNvPr id="132" name="Line 7"/>
           <p:cNvSpPr/>
           <p:nvPr/>
         </p:nvSpPr>
@@ -7217,14 +7245,14 @@
       </p:sp>
       <p:sp>
         <p:nvSpPr>
-          <p:cNvPr id="132" name="CustomShape 8"/>
+          <p:cNvPr id="133" name="CustomShape 8"/>
           <p:cNvSpPr/>
           <p:nvPr/>
         </p:nvSpPr>
         <p:spPr>
           <a:xfrm>
             <a:off x="3945600" y="5580720"/>
-            <a:ext cx="638280" cy="363960"/>
+            <a:ext cx="637920" cy="363600"/>
           </a:xfrm>
           <a:prstGeom prst="rightArrow">
             <a:avLst>
@@ -7293,14 +7321,14 @@
       </p:grpSpPr>
       <p:sp>
         <p:nvSpPr>
-          <p:cNvPr id="133" name="CustomShape 1"/>
+          <p:cNvPr id="134" name="CustomShape 1"/>
           <p:cNvSpPr/>
           <p:nvPr/>
         </p:nvSpPr>
         <p:spPr>
           <a:xfrm>
             <a:off x="457200" y="164520"/>
-            <a:ext cx="8225640" cy="634680"/>
+            <a:ext cx="8225280" cy="634320"/>
           </a:xfrm>
           <a:prstGeom prst="rect">
             <a:avLst/>
@@ -7333,14 +7361,14 @@
       </p:sp>
       <p:sp>
         <p:nvSpPr>
-          <p:cNvPr id="134" name="CustomShape 2"/>
+          <p:cNvPr id="135" name="CustomShape 2"/>
           <p:cNvSpPr/>
           <p:nvPr/>
         </p:nvSpPr>
         <p:spPr>
           <a:xfrm>
             <a:off x="6553080" y="6356520"/>
-            <a:ext cx="2129760" cy="361080"/>
+            <a:ext cx="2129400" cy="360720"/>
           </a:xfrm>
           <a:prstGeom prst="rect">
             <a:avLst/>
@@ -7374,22 +7402,22 @@
                 <a:latin typeface="Arial"/>
                 <a:ea typeface="ＭＳ Ｐゴシック"/>
               </a:rPr>
-              <a:t>3</a:t>
-            </a:r>
-            <a:endParaRPr/>
-          </a:p>
-        </p:txBody>
-      </p:sp>
-      <p:sp>
-        <p:nvSpPr>
-          <p:cNvPr id="135" name="CustomShape 3"/>
+              <a:t>6</a:t>
+            </a:r>
+            <a:endParaRPr/>
+          </a:p>
+        </p:txBody>
+      </p:sp>
+      <p:sp>
+        <p:nvSpPr>
+          <p:cNvPr id="136" name="CustomShape 3"/>
           <p:cNvSpPr/>
           <p:nvPr/>
         </p:nvSpPr>
         <p:spPr>
           <a:xfrm>
             <a:off x="457560" y="1737360"/>
-            <a:ext cx="8228880" cy="4569120"/>
+            <a:ext cx="8228520" cy="4568760"/>
           </a:xfrm>
           <a:prstGeom prst="rect">
             <a:avLst/>
@@ -7414,7 +7442,25 @@
                 </a:solidFill>
                 <a:latin typeface="Calibri"/>
               </a:rPr>
-              <a:t>PROSIT is written in order to provide a modular structure:</a:t>
+              <a:t>PROSIT is developed in C++ and has a </a:t>
+            </a:r>
+            <a:r>
+              <a:rPr lang="en-US" sz="3200">
+                <a:solidFill>
+                  <a:srgbClr val="ff6600"/>
+                </a:solidFill>
+                <a:latin typeface="Calibri"/>
+              </a:rPr>
+              <a:t>modular</a:t>
+            </a:r>
+            <a:r>
+              <a:rPr lang="en-US" sz="3200">
+                <a:solidFill>
+                  <a:srgbClr val="3465a4"/>
+                </a:solidFill>
+                <a:latin typeface="Calibri"/>
+              </a:rPr>
+              <a:t> structure. It is composed of the following modules:</a:t>
             </a:r>
             <a:endParaRPr/>
           </a:p>
@@ -7452,7 +7498,7 @@
                 </a:solidFill>
                 <a:latin typeface="Calibri"/>
               </a:rPr>
-              <a:t>Distributions handler</a:t>
+              <a:t>Probability distribution handler</a:t>
             </a:r>
             <a:endParaRPr/>
           </a:p>
@@ -7566,14 +7612,14 @@
       </p:grpSpPr>
       <p:sp>
         <p:nvSpPr>
-          <p:cNvPr id="136" name="CustomShape 1"/>
+          <p:cNvPr id="137" name="CustomShape 1"/>
           <p:cNvSpPr/>
           <p:nvPr/>
         </p:nvSpPr>
         <p:spPr>
           <a:xfrm>
             <a:off x="457200" y="164520"/>
-            <a:ext cx="8225640" cy="634680"/>
+            <a:ext cx="8225280" cy="634320"/>
           </a:xfrm>
           <a:prstGeom prst="rect">
             <a:avLst/>
@@ -7606,14 +7652,14 @@
       </p:sp>
       <p:sp>
         <p:nvSpPr>
-          <p:cNvPr id="137" name="CustomShape 2"/>
+          <p:cNvPr id="138" name="CustomShape 2"/>
           <p:cNvSpPr/>
           <p:nvPr/>
         </p:nvSpPr>
         <p:spPr>
           <a:xfrm>
             <a:off x="6553080" y="6356520"/>
-            <a:ext cx="2129760" cy="361080"/>
+            <a:ext cx="2129400" cy="360720"/>
           </a:xfrm>
           <a:prstGeom prst="rect">
             <a:avLst/>
@@ -7647,22 +7693,22 @@
                 <a:latin typeface="Arial"/>
                 <a:ea typeface="ＭＳ Ｐゴシック"/>
               </a:rPr>
-              <a:t>4</a:t>
-            </a:r>
-            <a:endParaRPr/>
-          </a:p>
-        </p:txBody>
-      </p:sp>
-      <p:sp>
-        <p:nvSpPr>
-          <p:cNvPr id="138" name="CustomShape 3"/>
+              <a:t>7</a:t>
+            </a:r>
+            <a:endParaRPr/>
+          </a:p>
+        </p:txBody>
+      </p:sp>
+      <p:sp>
+        <p:nvSpPr>
+          <p:cNvPr id="139" name="CustomShape 3"/>
           <p:cNvSpPr/>
           <p:nvPr/>
         </p:nvSpPr>
         <p:spPr>
           <a:xfrm>
             <a:off x="457560" y="1420560"/>
-            <a:ext cx="8225640" cy="2458080"/>
+            <a:ext cx="8225280" cy="2457720"/>
           </a:xfrm>
           <a:prstGeom prst="rect">
             <a:avLst/>
@@ -7769,7 +7815,7 @@
       </p:sp>
       <p:pic>
         <p:nvPicPr>
-          <p:cNvPr id="139" name="" descr=""/>
+          <p:cNvPr id="140" name="" descr=""/>
           <p:cNvPicPr/>
           <p:nvPr/>
         </p:nvPicPr>
@@ -7782,7 +7828,7 @@
         <p:spPr>
           <a:xfrm>
             <a:off x="2073600" y="4144320"/>
-            <a:ext cx="4993200" cy="1848240"/>
+            <a:ext cx="4992840" cy="1847880"/>
           </a:xfrm>
           <a:prstGeom prst="rect">
             <a:avLst/>
@@ -7843,14 +7889,14 @@
       </p:grpSpPr>
       <p:sp>
         <p:nvSpPr>
-          <p:cNvPr id="140" name="CustomShape 1"/>
+          <p:cNvPr id="141" name="CustomShape 1"/>
           <p:cNvSpPr/>
           <p:nvPr/>
         </p:nvSpPr>
         <p:spPr>
           <a:xfrm>
             <a:off x="457200" y="164520"/>
-            <a:ext cx="8225640" cy="634680"/>
+            <a:ext cx="8225280" cy="634320"/>
           </a:xfrm>
           <a:prstGeom prst="rect">
             <a:avLst/>
@@ -7883,14 +7929,14 @@
       </p:sp>
       <p:sp>
         <p:nvSpPr>
-          <p:cNvPr id="141" name="CustomShape 2"/>
+          <p:cNvPr id="142" name="CustomShape 2"/>
           <p:cNvSpPr/>
           <p:nvPr/>
         </p:nvSpPr>
         <p:spPr>
           <a:xfrm>
             <a:off x="6553080" y="6356520"/>
-            <a:ext cx="2129760" cy="361080"/>
+            <a:ext cx="2129400" cy="360720"/>
           </a:xfrm>
           <a:prstGeom prst="rect">
             <a:avLst/>
@@ -7924,22 +7970,22 @@
                 <a:latin typeface="Arial"/>
                 <a:ea typeface="ＭＳ Ｐゴシック"/>
               </a:rPr>
-              <a:t>5</a:t>
-            </a:r>
-            <a:endParaRPr/>
-          </a:p>
-        </p:txBody>
-      </p:sp>
-      <p:sp>
-        <p:nvSpPr>
-          <p:cNvPr id="142" name="CustomShape 3"/>
+              <a:t>8</a:t>
+            </a:r>
+            <a:endParaRPr/>
+          </a:p>
+        </p:txBody>
+      </p:sp>
+      <p:sp>
+        <p:nvSpPr>
+          <p:cNvPr id="143" name="CustomShape 3"/>
           <p:cNvSpPr/>
           <p:nvPr/>
         </p:nvSpPr>
         <p:spPr>
           <a:xfrm>
             <a:off x="421560" y="1384560"/>
-            <a:ext cx="8264520" cy="4921920"/>
+            <a:ext cx="8264160" cy="4921560"/>
           </a:xfrm>
           <a:prstGeom prst="rect">
             <a:avLst/>
@@ -8040,15 +8086,6 @@
               </a:rPr>
               <a:t>computes probability from the transition matrix</a:t>
             </a:r>
-            <a:r>
-              <a:rPr i="1" lang="en-US" sz="3200">
-                <a:solidFill>
-                  <a:srgbClr val="3465a4"/>
-                </a:solidFill>
-                <a:latin typeface="Calibri"/>
-              </a:rPr>
-              <a:t> </a:t>
-            </a:r>
             <a:endParaRPr/>
           </a:p>
           <a:p>
@@ -8093,7 +8130,7 @@
                 </a:solidFill>
                 <a:latin typeface="Calibri"/>
               </a:rPr>
-              <a:t>checks whether the algorithm's output is reasonable</a:t>
+              <a:t>checks if the algorithm's output is reasonable</a:t>
             </a:r>
             <a:endParaRPr/>
           </a:p>
@@ -8139,7 +8176,7 @@
                 </a:solidFill>
                 <a:latin typeface="Calibri"/>
               </a:rPr>
-              <a:t>stores the results in a map, using the deadline as key value</a:t>
+              <a:t>stores the results in a map, using the deadline as key</a:t>
             </a:r>
             <a:endParaRPr/>
           </a:p>

</xml_diff>

<commit_message>
fixed matrix and charts in slides
</commit_message>
<xml_diff>
--- a/slides/slides.pptx
+++ b/slides/slides.pptx
@@ -199,7 +199,7 @@
           <a:bodyPr lIns="0" rIns="0" tIns="0" bIns="0" anchor="b"/>
           <a:p>
             <a:pPr algn="r"/>
-            <a:fld id="{2FB1A4D0-0007-498F-BB98-F477913D2F91}" type="slidenum">
+            <a:fld id="{CE9EE159-9223-4C51-BDEE-2504709B80D0}" type="slidenum">
               <a:rPr lang="en-US" sz="1400">
                 <a:latin typeface="Times New Roman"/>
               </a:rPr>
@@ -234,7 +234,7 @@
       </p:grpSpPr>
       <p:sp>
         <p:nvSpPr>
-          <p:cNvPr id="161" name="PlaceHolder 1"/>
+          <p:cNvPr id="177" name="PlaceHolder 1"/>
           <p:cNvSpPr>
             <a:spLocks noGrp="1"/>
           </p:cNvSpPr>
@@ -245,7 +245,7 @@
         <p:spPr>
           <a:xfrm>
             <a:off x="946080" y="4861080"/>
-            <a:ext cx="5201640" cy="4598280"/>
+            <a:ext cx="5201280" cy="4597920"/>
           </a:xfrm>
           <a:prstGeom prst="rect">
             <a:avLst/>
@@ -260,14 +260,14 @@
       </p:sp>
       <p:sp>
         <p:nvSpPr>
-          <p:cNvPr id="162" name="CustomShape 2"/>
+          <p:cNvPr id="178" name="CustomShape 2"/>
           <p:cNvSpPr/>
           <p:nvPr/>
         </p:nvSpPr>
         <p:spPr>
           <a:xfrm>
             <a:off x="4024440" y="9725040"/>
-            <a:ext cx="3069720" cy="504360"/>
+            <a:ext cx="3069360" cy="504000"/>
           </a:xfrm>
           <a:prstGeom prst="rect">
             <a:avLst/>
@@ -285,7 +285,7 @@
                 <a:spcPct val="100000"/>
               </a:lnSpc>
             </a:pPr>
-            <a:fld id="{4B605604-E6CE-42E9-848D-0D8DFF18BBAB}" type="slidenum">
+            <a:fld id="{0ECF7194-0DEE-4E44-A95D-2690C456179A}" type="slidenum">
               <a:rPr lang="en-US" sz="1200">
                 <a:solidFill>
                   <a:srgbClr val="000000"/>
@@ -323,7 +323,7 @@
       </p:grpSpPr>
       <p:sp>
         <p:nvSpPr>
-          <p:cNvPr id="177" name="PlaceHolder 1"/>
+          <p:cNvPr id="193" name="PlaceHolder 1"/>
           <p:cNvSpPr>
             <a:spLocks noGrp="1"/>
           </p:cNvSpPr>
@@ -334,7 +334,7 @@
         <p:spPr>
           <a:xfrm>
             <a:off x="946080" y="4861080"/>
-            <a:ext cx="5202360" cy="4599000"/>
+            <a:ext cx="5202000" cy="4598640"/>
           </a:xfrm>
           <a:prstGeom prst="rect">
             <a:avLst/>
@@ -349,14 +349,14 @@
       </p:sp>
       <p:sp>
         <p:nvSpPr>
-          <p:cNvPr id="178" name="CustomShape 2"/>
+          <p:cNvPr id="194" name="CustomShape 2"/>
           <p:cNvSpPr/>
           <p:nvPr/>
         </p:nvSpPr>
         <p:spPr>
           <a:xfrm>
             <a:off x="4024440" y="9725040"/>
-            <a:ext cx="3070440" cy="505080"/>
+            <a:ext cx="3070080" cy="504720"/>
           </a:xfrm>
           <a:prstGeom prst="rect">
             <a:avLst/>
@@ -374,7 +374,7 @@
                 <a:spcPct val="100000"/>
               </a:lnSpc>
             </a:pPr>
-            <a:fld id="{9633F788-F18D-451A-95FE-339D537C2560}" type="slidenum">
+            <a:fld id="{AB12BDEC-3F30-46BD-AC98-5D37E2429309}" type="slidenum">
               <a:rPr lang="en-US" sz="1200">
                 <a:solidFill>
                   <a:srgbClr val="000000"/>
@@ -412,7 +412,7 @@
       </p:grpSpPr>
       <p:sp>
         <p:nvSpPr>
-          <p:cNvPr id="179" name="PlaceHolder 1"/>
+          <p:cNvPr id="195" name="PlaceHolder 1"/>
           <p:cNvSpPr>
             <a:spLocks noGrp="1"/>
           </p:cNvSpPr>
@@ -423,7 +423,7 @@
         <p:spPr>
           <a:xfrm>
             <a:off x="946080" y="4861080"/>
-            <a:ext cx="5202360" cy="4599000"/>
+            <a:ext cx="5202000" cy="4598640"/>
           </a:xfrm>
           <a:prstGeom prst="rect">
             <a:avLst/>
@@ -438,14 +438,14 @@
       </p:sp>
       <p:sp>
         <p:nvSpPr>
-          <p:cNvPr id="180" name="CustomShape 2"/>
+          <p:cNvPr id="196" name="CustomShape 2"/>
           <p:cNvSpPr/>
           <p:nvPr/>
         </p:nvSpPr>
         <p:spPr>
           <a:xfrm>
             <a:off x="4024440" y="9725040"/>
-            <a:ext cx="3070440" cy="505080"/>
+            <a:ext cx="3070080" cy="504720"/>
           </a:xfrm>
           <a:prstGeom prst="rect">
             <a:avLst/>
@@ -463,7 +463,7 @@
                 <a:spcPct val="100000"/>
               </a:lnSpc>
             </a:pPr>
-            <a:fld id="{AD4D237F-3876-4664-9730-2774622A01BC}" type="slidenum">
+            <a:fld id="{01179D78-1EC6-4D19-B7BF-5D9A95B66B91}" type="slidenum">
               <a:rPr lang="en-US" sz="1200">
                 <a:solidFill>
                   <a:srgbClr val="000000"/>
@@ -501,7 +501,7 @@
       </p:grpSpPr>
       <p:sp>
         <p:nvSpPr>
-          <p:cNvPr id="181" name="PlaceHolder 1"/>
+          <p:cNvPr id="197" name="PlaceHolder 1"/>
           <p:cNvSpPr>
             <a:spLocks noGrp="1"/>
           </p:cNvSpPr>
@@ -512,7 +512,7 @@
         <p:spPr>
           <a:xfrm>
             <a:off x="946080" y="4861080"/>
-            <a:ext cx="5202360" cy="4599000"/>
+            <a:ext cx="5202000" cy="4598640"/>
           </a:xfrm>
           <a:prstGeom prst="rect">
             <a:avLst/>
@@ -527,14 +527,14 @@
       </p:sp>
       <p:sp>
         <p:nvSpPr>
-          <p:cNvPr id="182" name="CustomShape 2"/>
+          <p:cNvPr id="198" name="CustomShape 2"/>
           <p:cNvSpPr/>
           <p:nvPr/>
         </p:nvSpPr>
         <p:spPr>
           <a:xfrm>
             <a:off x="4024440" y="9725040"/>
-            <a:ext cx="3070440" cy="505080"/>
+            <a:ext cx="3070080" cy="504720"/>
           </a:xfrm>
           <a:prstGeom prst="rect">
             <a:avLst/>
@@ -552,7 +552,7 @@
                 <a:spcPct val="100000"/>
               </a:lnSpc>
             </a:pPr>
-            <a:fld id="{174AF95F-A8D9-4917-8E37-16A181E5EC6B}" type="slidenum">
+            <a:fld id="{618B93BA-9565-4FD4-A1D2-D66EAFAB3505}" type="slidenum">
               <a:rPr lang="en-US" sz="1200">
                 <a:solidFill>
                   <a:srgbClr val="000000"/>
@@ -590,7 +590,7 @@
       </p:grpSpPr>
       <p:sp>
         <p:nvSpPr>
-          <p:cNvPr id="183" name="PlaceHolder 1"/>
+          <p:cNvPr id="199" name="PlaceHolder 1"/>
           <p:cNvSpPr>
             <a:spLocks noGrp="1"/>
           </p:cNvSpPr>
@@ -601,7 +601,7 @@
         <p:spPr>
           <a:xfrm>
             <a:off x="946080" y="4861080"/>
-            <a:ext cx="5202360" cy="4599000"/>
+            <a:ext cx="5202000" cy="4598640"/>
           </a:xfrm>
           <a:prstGeom prst="rect">
             <a:avLst/>
@@ -616,14 +616,14 @@
       </p:sp>
       <p:sp>
         <p:nvSpPr>
-          <p:cNvPr id="184" name="CustomShape 2"/>
+          <p:cNvPr id="200" name="CustomShape 2"/>
           <p:cNvSpPr/>
           <p:nvPr/>
         </p:nvSpPr>
         <p:spPr>
           <a:xfrm>
             <a:off x="4024440" y="9725040"/>
-            <a:ext cx="3070440" cy="505080"/>
+            <a:ext cx="3070080" cy="504720"/>
           </a:xfrm>
           <a:prstGeom prst="rect">
             <a:avLst/>
@@ -641,7 +641,7 @@
                 <a:spcPct val="100000"/>
               </a:lnSpc>
             </a:pPr>
-            <a:fld id="{0DE85C24-5CF5-43A2-BEA7-CDBAB4F1E6B3}" type="slidenum">
+            <a:fld id="{CA706F9F-D78F-46D3-BCC9-DB237CC5E9EF}" type="slidenum">
               <a:rPr lang="en-US" sz="1200">
                 <a:solidFill>
                   <a:srgbClr val="000000"/>
@@ -679,7 +679,7 @@
       </p:grpSpPr>
       <p:sp>
         <p:nvSpPr>
-          <p:cNvPr id="185" name="PlaceHolder 1"/>
+          <p:cNvPr id="201" name="PlaceHolder 1"/>
           <p:cNvSpPr>
             <a:spLocks noGrp="1"/>
           </p:cNvSpPr>
@@ -690,7 +690,7 @@
         <p:spPr>
           <a:xfrm>
             <a:off x="946080" y="4861080"/>
-            <a:ext cx="5202360" cy="4599000"/>
+            <a:ext cx="5202000" cy="4598640"/>
           </a:xfrm>
           <a:prstGeom prst="rect">
             <a:avLst/>
@@ -705,14 +705,14 @@
       </p:sp>
       <p:sp>
         <p:nvSpPr>
-          <p:cNvPr id="186" name="CustomShape 2"/>
+          <p:cNvPr id="202" name="CustomShape 2"/>
           <p:cNvSpPr/>
           <p:nvPr/>
         </p:nvSpPr>
         <p:spPr>
           <a:xfrm>
             <a:off x="4024440" y="9725040"/>
-            <a:ext cx="3070440" cy="505080"/>
+            <a:ext cx="3070080" cy="504720"/>
           </a:xfrm>
           <a:prstGeom prst="rect">
             <a:avLst/>
@@ -730,7 +730,7 @@
                 <a:spcPct val="100000"/>
               </a:lnSpc>
             </a:pPr>
-            <a:fld id="{2FBFB496-2961-4AFB-BABD-774152339FB2}" type="slidenum">
+            <a:fld id="{012BD613-51CD-44F9-B53A-8ACC1C91540E}" type="slidenum">
               <a:rPr lang="en-US" sz="1200">
                 <a:solidFill>
                   <a:srgbClr val="000000"/>
@@ -768,7 +768,7 @@
       </p:grpSpPr>
       <p:sp>
         <p:nvSpPr>
-          <p:cNvPr id="163" name="PlaceHolder 1"/>
+          <p:cNvPr id="179" name="PlaceHolder 1"/>
           <p:cNvSpPr>
             <a:spLocks noGrp="1"/>
           </p:cNvSpPr>
@@ -779,7 +779,7 @@
         <p:spPr>
           <a:xfrm>
             <a:off x="946080" y="4861080"/>
-            <a:ext cx="5202360" cy="4599000"/>
+            <a:ext cx="5202000" cy="4598640"/>
           </a:xfrm>
           <a:prstGeom prst="rect">
             <a:avLst/>
@@ -794,14 +794,14 @@
       </p:sp>
       <p:sp>
         <p:nvSpPr>
-          <p:cNvPr id="164" name="CustomShape 2"/>
+          <p:cNvPr id="180" name="CustomShape 2"/>
           <p:cNvSpPr/>
           <p:nvPr/>
         </p:nvSpPr>
         <p:spPr>
           <a:xfrm>
             <a:off x="4024440" y="9725040"/>
-            <a:ext cx="3070440" cy="505080"/>
+            <a:ext cx="3070080" cy="504720"/>
           </a:xfrm>
           <a:prstGeom prst="rect">
             <a:avLst/>
@@ -819,7 +819,7 @@
                 <a:spcPct val="100000"/>
               </a:lnSpc>
             </a:pPr>
-            <a:fld id="{70337A6F-F226-4BF8-A160-14645EC47528}" type="slidenum">
+            <a:fld id="{54E2180C-6F72-4EED-824C-2F7AA6C962A1}" type="slidenum">
               <a:rPr lang="en-US" sz="1200">
                 <a:solidFill>
                   <a:srgbClr val="000000"/>
@@ -857,7 +857,7 @@
       </p:grpSpPr>
       <p:sp>
         <p:nvSpPr>
-          <p:cNvPr id="165" name="PlaceHolder 1"/>
+          <p:cNvPr id="181" name="PlaceHolder 1"/>
           <p:cNvSpPr>
             <a:spLocks noGrp="1"/>
           </p:cNvSpPr>
@@ -868,7 +868,7 @@
         <p:spPr>
           <a:xfrm>
             <a:off x="946080" y="4861080"/>
-            <a:ext cx="5202360" cy="4599000"/>
+            <a:ext cx="5202000" cy="4598640"/>
           </a:xfrm>
           <a:prstGeom prst="rect">
             <a:avLst/>
@@ -883,14 +883,14 @@
       </p:sp>
       <p:sp>
         <p:nvSpPr>
-          <p:cNvPr id="166" name="CustomShape 2"/>
+          <p:cNvPr id="182" name="CustomShape 2"/>
           <p:cNvSpPr/>
           <p:nvPr/>
         </p:nvSpPr>
         <p:spPr>
           <a:xfrm>
             <a:off x="4024440" y="9725040"/>
-            <a:ext cx="3070440" cy="505080"/>
+            <a:ext cx="3070080" cy="504720"/>
           </a:xfrm>
           <a:prstGeom prst="rect">
             <a:avLst/>
@@ -908,7 +908,7 @@
                 <a:spcPct val="100000"/>
               </a:lnSpc>
             </a:pPr>
-            <a:fld id="{0FBD9452-8EB8-4B48-B4BE-C080733D21C0}" type="slidenum">
+            <a:fld id="{A831BAE3-37D8-45C4-8A84-4F6CEDD13A89}" type="slidenum">
               <a:rPr lang="en-US" sz="1200">
                 <a:solidFill>
                   <a:srgbClr val="000000"/>
@@ -946,7 +946,7 @@
       </p:grpSpPr>
       <p:sp>
         <p:nvSpPr>
-          <p:cNvPr id="167" name="PlaceHolder 1"/>
+          <p:cNvPr id="183" name="PlaceHolder 1"/>
           <p:cNvSpPr>
             <a:spLocks noGrp="1"/>
           </p:cNvSpPr>
@@ -957,7 +957,7 @@
         <p:spPr>
           <a:xfrm>
             <a:off x="946080" y="4861080"/>
-            <a:ext cx="5202360" cy="4599000"/>
+            <a:ext cx="5202000" cy="4598640"/>
           </a:xfrm>
           <a:prstGeom prst="rect">
             <a:avLst/>
@@ -972,14 +972,14 @@
       </p:sp>
       <p:sp>
         <p:nvSpPr>
-          <p:cNvPr id="168" name="CustomShape 2"/>
+          <p:cNvPr id="184" name="CustomShape 2"/>
           <p:cNvSpPr/>
           <p:nvPr/>
         </p:nvSpPr>
         <p:spPr>
           <a:xfrm>
             <a:off x="4024440" y="9725040"/>
-            <a:ext cx="3070440" cy="505080"/>
+            <a:ext cx="3070080" cy="504720"/>
           </a:xfrm>
           <a:prstGeom prst="rect">
             <a:avLst/>
@@ -997,7 +997,7 @@
                 <a:spcPct val="100000"/>
               </a:lnSpc>
             </a:pPr>
-            <a:fld id="{CE048F95-8211-4686-BF73-2F9B28E436D2}" type="slidenum">
+            <a:fld id="{A6B80E3E-533E-413A-92DA-2B214725FA4A}" type="slidenum">
               <a:rPr lang="en-US" sz="1200">
                 <a:solidFill>
                   <a:srgbClr val="000000"/>
@@ -1035,7 +1035,7 @@
       </p:grpSpPr>
       <p:sp>
         <p:nvSpPr>
-          <p:cNvPr id="169" name="PlaceHolder 1"/>
+          <p:cNvPr id="185" name="PlaceHolder 1"/>
           <p:cNvSpPr>
             <a:spLocks noGrp="1"/>
           </p:cNvSpPr>
@@ -1046,7 +1046,7 @@
         <p:spPr>
           <a:xfrm>
             <a:off x="946080" y="4861080"/>
-            <a:ext cx="5202360" cy="4599000"/>
+            <a:ext cx="5202000" cy="4598640"/>
           </a:xfrm>
           <a:prstGeom prst="rect">
             <a:avLst/>
@@ -1061,14 +1061,14 @@
       </p:sp>
       <p:sp>
         <p:nvSpPr>
-          <p:cNvPr id="170" name="CustomShape 2"/>
+          <p:cNvPr id="186" name="CustomShape 2"/>
           <p:cNvSpPr/>
           <p:nvPr/>
         </p:nvSpPr>
         <p:spPr>
           <a:xfrm>
             <a:off x="4024440" y="9725040"/>
-            <a:ext cx="3070440" cy="505080"/>
+            <a:ext cx="3070080" cy="504720"/>
           </a:xfrm>
           <a:prstGeom prst="rect">
             <a:avLst/>
@@ -1086,7 +1086,7 @@
                 <a:spcPct val="100000"/>
               </a:lnSpc>
             </a:pPr>
-            <a:fld id="{319C2955-E10F-4404-B53A-62B3FED1E6EB}" type="slidenum">
+            <a:fld id="{7C9E73B3-59A7-4B1D-8164-3C12FD7A277B}" type="slidenum">
               <a:rPr lang="en-US" sz="1200">
                 <a:solidFill>
                   <a:srgbClr val="000000"/>
@@ -1124,7 +1124,7 @@
       </p:grpSpPr>
       <p:sp>
         <p:nvSpPr>
-          <p:cNvPr id="171" name="PlaceHolder 1"/>
+          <p:cNvPr id="187" name="PlaceHolder 1"/>
           <p:cNvSpPr>
             <a:spLocks noGrp="1"/>
           </p:cNvSpPr>
@@ -1135,7 +1135,7 @@
         <p:spPr>
           <a:xfrm>
             <a:off x="946080" y="4861080"/>
-            <a:ext cx="5202360" cy="4599000"/>
+            <a:ext cx="5202000" cy="4598640"/>
           </a:xfrm>
           <a:prstGeom prst="rect">
             <a:avLst/>
@@ -1150,14 +1150,14 @@
       </p:sp>
       <p:sp>
         <p:nvSpPr>
-          <p:cNvPr id="172" name="CustomShape 2"/>
+          <p:cNvPr id="188" name="CustomShape 2"/>
           <p:cNvSpPr/>
           <p:nvPr/>
         </p:nvSpPr>
         <p:spPr>
           <a:xfrm>
             <a:off x="4024440" y="9725040"/>
-            <a:ext cx="3070440" cy="505080"/>
+            <a:ext cx="3070080" cy="504720"/>
           </a:xfrm>
           <a:prstGeom prst="rect">
             <a:avLst/>
@@ -1175,7 +1175,7 @@
                 <a:spcPct val="100000"/>
               </a:lnSpc>
             </a:pPr>
-            <a:fld id="{C5638B7E-54EC-4BF2-BC17-8B0D1AF31467}" type="slidenum">
+            <a:fld id="{FB84E98C-B9DE-4D08-89A1-92AC7E071E12}" type="slidenum">
               <a:rPr lang="en-US" sz="1200">
                 <a:solidFill>
                   <a:srgbClr val="000000"/>
@@ -1213,7 +1213,7 @@
       </p:grpSpPr>
       <p:sp>
         <p:nvSpPr>
-          <p:cNvPr id="173" name="PlaceHolder 1"/>
+          <p:cNvPr id="189" name="PlaceHolder 1"/>
           <p:cNvSpPr>
             <a:spLocks noGrp="1"/>
           </p:cNvSpPr>
@@ -1224,7 +1224,7 @@
         <p:spPr>
           <a:xfrm>
             <a:off x="946080" y="4861080"/>
-            <a:ext cx="5202360" cy="4599000"/>
+            <a:ext cx="5202000" cy="4598640"/>
           </a:xfrm>
           <a:prstGeom prst="rect">
             <a:avLst/>
@@ -1239,14 +1239,14 @@
       </p:sp>
       <p:sp>
         <p:nvSpPr>
-          <p:cNvPr id="174" name="CustomShape 2"/>
+          <p:cNvPr id="190" name="CustomShape 2"/>
           <p:cNvSpPr/>
           <p:nvPr/>
         </p:nvSpPr>
         <p:spPr>
           <a:xfrm>
             <a:off x="4024440" y="9725040"/>
-            <a:ext cx="3070440" cy="505080"/>
+            <a:ext cx="3070080" cy="504720"/>
           </a:xfrm>
           <a:prstGeom prst="rect">
             <a:avLst/>
@@ -1264,7 +1264,7 @@
                 <a:spcPct val="100000"/>
               </a:lnSpc>
             </a:pPr>
-            <a:fld id="{316ADA55-100C-40EB-BC95-AB984538610A}" type="slidenum">
+            <a:fld id="{3A3EB71F-6A6A-4181-810A-DB35D62A441D}" type="slidenum">
               <a:rPr lang="en-US" sz="1200">
                 <a:solidFill>
                   <a:srgbClr val="000000"/>
@@ -1302,7 +1302,7 @@
       </p:grpSpPr>
       <p:sp>
         <p:nvSpPr>
-          <p:cNvPr id="175" name="PlaceHolder 1"/>
+          <p:cNvPr id="191" name="PlaceHolder 1"/>
           <p:cNvSpPr>
             <a:spLocks noGrp="1"/>
           </p:cNvSpPr>
@@ -1313,7 +1313,7 @@
         <p:spPr>
           <a:xfrm>
             <a:off x="946080" y="4861080"/>
-            <a:ext cx="5202360" cy="4599000"/>
+            <a:ext cx="5202000" cy="4598640"/>
           </a:xfrm>
           <a:prstGeom prst="rect">
             <a:avLst/>
@@ -1328,14 +1328,14 @@
       </p:sp>
       <p:sp>
         <p:nvSpPr>
-          <p:cNvPr id="176" name="CustomShape 2"/>
+          <p:cNvPr id="192" name="CustomShape 2"/>
           <p:cNvSpPr/>
           <p:nvPr/>
         </p:nvSpPr>
         <p:spPr>
           <a:xfrm>
             <a:off x="4024440" y="9725040"/>
-            <a:ext cx="3070440" cy="505080"/>
+            <a:ext cx="3070080" cy="504720"/>
           </a:xfrm>
           <a:prstGeom prst="rect">
             <a:avLst/>
@@ -1353,7 +1353,7 @@
                 <a:spcPct val="100000"/>
               </a:lnSpc>
             </a:pPr>
-            <a:fld id="{58AA4146-7BF9-42C3-ABAC-2FBC5E3BB185}" type="slidenum">
+            <a:fld id="{27746743-1F9B-4CAC-A529-4A6B6DAC297B}" type="slidenum">
               <a:rPr lang="en-US" sz="1200">
                 <a:solidFill>
                   <a:srgbClr val="000000"/>
@@ -3721,7 +3721,7 @@
         <p:spPr>
           <a:xfrm>
             <a:off x="0" y="932760"/>
-            <a:ext cx="9138600" cy="109800"/>
+            <a:ext cx="9138240" cy="109440"/>
           </a:xfrm>
           <a:prstGeom prst="rect">
             <a:avLst/>
@@ -3743,7 +3743,7 @@
         <p:spPr>
           <a:xfrm>
             <a:off x="7707960" y="6564960"/>
-            <a:ext cx="909000" cy="909000"/>
+            <a:ext cx="908640" cy="908640"/>
           </a:xfrm>
           <a:prstGeom prst="rect">
             <a:avLst/>
@@ -3769,7 +3769,7 @@
         <p:spPr>
           <a:xfrm>
             <a:off x="0" y="0"/>
-            <a:ext cx="9147960" cy="1382040"/>
+            <a:ext cx="9147600" cy="1381680"/>
           </a:xfrm>
           <a:prstGeom prst="rect">
             <a:avLst/>
@@ -3790,7 +3790,7 @@
         </p:nvPicPr>
         <p:blipFill>
           <a:blip r:embed="rId3"/>
-          <a:srcRect l="0" t="0" r="49898" b="45076"/>
+          <a:srcRect l="0" t="0" r="49894" b="45065"/>
           <a:stretch>
             <a:fillRect/>
           </a:stretch>
@@ -3798,7 +3798,7 @@
         <p:spPr>
           <a:xfrm>
             <a:off x="6619320" y="1393560"/>
-            <a:ext cx="2517120" cy="954720"/>
+            <a:ext cx="2516760" cy="954360"/>
           </a:xfrm>
           <a:prstGeom prst="rect">
             <a:avLst/>
@@ -3816,7 +3816,7 @@
         </p:nvPicPr>
         <p:blipFill>
           <a:blip r:embed="rId4"/>
-          <a:srcRect l="0" t="0" r="2218" b="13294"/>
+          <a:srcRect l="0" t="0" r="2206" b="13249"/>
           <a:stretch>
             <a:fillRect/>
           </a:stretch>
@@ -3824,7 +3824,7 @@
         <p:spPr>
           <a:xfrm>
             <a:off x="0" y="1393560"/>
-            <a:ext cx="3395160" cy="878040"/>
+            <a:ext cx="3394800" cy="877680"/>
           </a:xfrm>
           <a:prstGeom prst="rect">
             <a:avLst/>
@@ -4041,7 +4041,7 @@
         <p:spPr>
           <a:xfrm>
             <a:off x="0" y="932760"/>
-            <a:ext cx="9139320" cy="110520"/>
+            <a:ext cx="9138960" cy="110160"/>
           </a:xfrm>
           <a:prstGeom prst="rect">
             <a:avLst/>
@@ -4063,7 +4063,7 @@
         <p:spPr>
           <a:xfrm>
             <a:off x="7707960" y="6564960"/>
-            <a:ext cx="909720" cy="909720"/>
+            <a:ext cx="909360" cy="909360"/>
           </a:xfrm>
           <a:prstGeom prst="rect">
             <a:avLst/>
@@ -4274,7 +4274,7 @@
         <p:spPr>
           <a:xfrm>
             <a:off x="720" y="2305440"/>
-            <a:ext cx="9138600" cy="1736280"/>
+            <a:ext cx="9138240" cy="1735920"/>
           </a:xfrm>
           <a:prstGeom prst="rect">
             <a:avLst/>
@@ -4331,7 +4331,7 @@
         <p:spPr>
           <a:xfrm>
             <a:off x="1189440" y="4264560"/>
-            <a:ext cx="6761160" cy="543600"/>
+            <a:ext cx="6760800" cy="543240"/>
           </a:xfrm>
           <a:prstGeom prst="rect">
             <a:avLst/>
@@ -4371,7 +4371,7 @@
         <p:spPr>
           <a:xfrm>
             <a:off x="10207080" y="2718720"/>
-            <a:ext cx="179280" cy="456120"/>
+            <a:ext cx="178920" cy="455760"/>
           </a:xfrm>
           <a:prstGeom prst="rect">
             <a:avLst/>
@@ -4391,7 +4391,7 @@
         <p:spPr>
           <a:xfrm>
             <a:off x="1855800" y="5852160"/>
-            <a:ext cx="6395400" cy="441360"/>
+            <a:ext cx="6395040" cy="441000"/>
           </a:xfrm>
           <a:prstGeom prst="rect">
             <a:avLst/>
@@ -4440,7 +4440,7 @@
         <p:spPr>
           <a:xfrm>
             <a:off x="1330920" y="2082960"/>
-            <a:ext cx="909000" cy="909000"/>
+            <a:ext cx="908640" cy="908640"/>
           </a:xfrm>
           <a:prstGeom prst="rect">
             <a:avLst/>
@@ -4460,7 +4460,7 @@
         <p:spPr>
           <a:xfrm>
             <a:off x="1855800" y="5486400"/>
-            <a:ext cx="6395400" cy="441360"/>
+            <a:ext cx="6395040" cy="441000"/>
           </a:xfrm>
           <a:prstGeom prst="rect">
             <a:avLst/>
@@ -4509,7 +4509,7 @@
         <p:spPr>
           <a:xfrm>
             <a:off x="6035040" y="1828800"/>
-            <a:ext cx="2921400" cy="1001160"/>
+            <a:ext cx="2921040" cy="1000800"/>
           </a:xfrm>
           <a:prstGeom prst="rect">
             <a:avLst/>
@@ -4529,7 +4529,7 @@
         <p:spPr>
           <a:xfrm>
             <a:off x="6309360" y="2194560"/>
-            <a:ext cx="1458360" cy="361080"/>
+            <a:ext cx="1458000" cy="360720"/>
           </a:xfrm>
           <a:prstGeom prst="rect">
             <a:avLst/>
@@ -4549,7 +4549,7 @@
         <p:spPr>
           <a:xfrm>
             <a:off x="1371600" y="3657600"/>
-            <a:ext cx="2921400" cy="1092600"/>
+            <a:ext cx="2921040" cy="1092240"/>
           </a:xfrm>
           <a:prstGeom prst="rect">
             <a:avLst/>
@@ -4569,7 +4569,7 @@
         <p:spPr>
           <a:xfrm>
             <a:off x="6547680" y="1463040"/>
-            <a:ext cx="2555640" cy="909720"/>
+            <a:ext cx="2555280" cy="909360"/>
           </a:xfrm>
           <a:prstGeom prst="rect">
             <a:avLst/>
@@ -4591,7 +4591,7 @@
         <p:spPr>
           <a:xfrm>
             <a:off x="3360600" y="4705200"/>
-            <a:ext cx="2422800" cy="433080"/>
+            <a:ext cx="2422440" cy="432720"/>
           </a:xfrm>
           <a:prstGeom prst="rect">
             <a:avLst/>
@@ -4665,14 +4665,14 @@
       </p:grpSpPr>
       <p:sp>
         <p:nvSpPr>
-          <p:cNvPr id="146" name="CustomShape 1"/>
+          <p:cNvPr id="161" name="CustomShape 1"/>
           <p:cNvSpPr/>
           <p:nvPr/>
         </p:nvSpPr>
         <p:spPr>
           <a:xfrm>
             <a:off x="457200" y="164520"/>
-            <a:ext cx="8224920" cy="633960"/>
+            <a:ext cx="8224560" cy="633600"/>
           </a:xfrm>
           <a:prstGeom prst="rect">
             <a:avLst/>
@@ -4705,14 +4705,14 @@
       </p:sp>
       <p:sp>
         <p:nvSpPr>
-          <p:cNvPr id="147" name="CustomShape 2"/>
+          <p:cNvPr id="162" name="CustomShape 2"/>
           <p:cNvSpPr/>
           <p:nvPr/>
         </p:nvSpPr>
         <p:spPr>
           <a:xfrm>
             <a:off x="6553080" y="6356520"/>
-            <a:ext cx="2129040" cy="360360"/>
+            <a:ext cx="2128680" cy="360000"/>
           </a:xfrm>
           <a:prstGeom prst="rect">
             <a:avLst/>
@@ -4754,14 +4754,14 @@
       </p:sp>
       <p:sp>
         <p:nvSpPr>
-          <p:cNvPr id="148" name="CustomShape 3"/>
+          <p:cNvPr id="163" name="CustomShape 3"/>
           <p:cNvSpPr/>
           <p:nvPr/>
         </p:nvSpPr>
         <p:spPr>
           <a:xfrm>
             <a:off x="421560" y="1384560"/>
-            <a:ext cx="8263800" cy="4921200"/>
+            <a:ext cx="8263440" cy="627120"/>
           </a:xfrm>
           <a:prstGeom prst="rect">
             <a:avLst/>
@@ -4796,33 +4796,6 @@
                 <a:spcPct val="100000"/>
               </a:lnSpc>
             </a:pPr>
-            <a:r>
-              <a:rPr lang="en-US" sz="3200">
-                <a:solidFill>
-                  <a:srgbClr val="ff6600"/>
-                </a:solidFill>
-                <a:latin typeface="Calibri"/>
-              </a:rPr>
-              <a:t>pre_process</a:t>
-            </a:r>
-            <a:r>
-              <a:rPr lang="en-US" sz="3200">
-                <a:solidFill>
-                  <a:srgbClr val="3465a4"/>
-                </a:solidFill>
-                <a:latin typeface="Calibri"/>
-              </a:rPr>
-              <a:t> </a:t>
-            </a:r>
-            <a:r>
-              <a:rPr lang="en-US" sz="2500">
-                <a:solidFill>
-                  <a:srgbClr val="3465a4"/>
-                </a:solidFill>
-                <a:latin typeface="Calibri"/>
-              </a:rPr>
-              <a:t>creates the transition matrix for the QBDP</a:t>
-            </a:r>
             <a:endParaRPr/>
           </a:p>
           <a:p>
@@ -4831,107 +4804,35 @@
                 <a:spcPct val="100000"/>
               </a:lnSpc>
             </a:pPr>
-            <a:r>
-              <a:rPr lang="en-US" sz="3200">
-                <a:solidFill>
-                  <a:srgbClr val="ff6600"/>
-                </a:solidFill>
-                <a:latin typeface="Calibri"/>
-              </a:rPr>
-              <a:t>compute_pi</a:t>
-            </a:r>
-            <a:r>
-              <a:rPr lang="en-US" sz="3200">
-                <a:solidFill>
-                  <a:srgbClr val="3465a4"/>
-                </a:solidFill>
-                <a:latin typeface="Calibri"/>
-              </a:rPr>
-              <a:t> </a:t>
-            </a:r>
-            <a:r>
-              <a:rPr lang="en-US" sz="2500">
-                <a:solidFill>
-                  <a:srgbClr val="3465a4"/>
-                </a:solidFill>
-                <a:latin typeface="Calibri"/>
-              </a:rPr>
-              <a:t>computes probability from the transition matrix</a:t>
-            </a:r>
-            <a:endParaRPr/>
-          </a:p>
-          <a:p>
-            <a:pPr algn="just">
-              <a:lnSpc>
-                <a:spcPct val="100000"/>
-              </a:lnSpc>
-            </a:pPr>
-            <a:r>
-              <a:rPr lang="en-US" sz="3200">
-                <a:solidFill>
-                  <a:srgbClr val="ff6600"/>
-                </a:solidFill>
-                <a:latin typeface="Calibri"/>
-              </a:rPr>
-              <a:t>post_process</a:t>
-            </a:r>
-            <a:r>
-              <a:rPr i="1" lang="en-US" sz="3200">
-                <a:solidFill>
-                  <a:srgbClr val="3465a4"/>
-                </a:solidFill>
-                <a:latin typeface="Calibri"/>
-              </a:rPr>
-              <a:t> </a:t>
-            </a:r>
-            <a:r>
-              <a:rPr lang="en-US" sz="2500">
-                <a:solidFill>
-                  <a:srgbClr val="3465a4"/>
-                </a:solidFill>
-                <a:latin typeface="Calibri"/>
-              </a:rPr>
-              <a:t>checks if the algorithm's output is reasonable</a:t>
-            </a:r>
-            <a:endParaRPr/>
-          </a:p>
-          <a:p>
-            <a:pPr algn="just">
-              <a:lnSpc>
-                <a:spcPct val="100000"/>
-              </a:lnSpc>
-            </a:pPr>
-            <a:r>
-              <a:rPr lang="en-US" sz="3200">
-                <a:solidFill>
-                  <a:srgbClr val="ff6600"/>
-                </a:solidFill>
-                <a:latin typeface="Calibri"/>
-              </a:rPr>
-              <a:t>fill_in_probability_map</a:t>
-            </a:r>
-            <a:r>
-              <a:rPr i="1" lang="en-US" sz="3200">
-                <a:solidFill>
-                  <a:srgbClr val="3465a4"/>
-                </a:solidFill>
-                <a:latin typeface="Calibri"/>
-              </a:rPr>
-              <a:t> </a:t>
-            </a:r>
-            <a:r>
-              <a:rPr lang="en-US" sz="2500">
-                <a:solidFill>
-                  <a:srgbClr val="3465a4"/>
-                </a:solidFill>
-                <a:latin typeface="Calibri"/>
-              </a:rPr>
-              <a:t>stores the results in a map, using the deadline as key</a:t>
-            </a:r>
-            <a:endParaRPr/>
-          </a:p>
-        </p:txBody>
-      </p:sp>
+            <a:endParaRPr/>
+          </a:p>
+        </p:txBody>
+      </p:sp>
+      <p:pic>
+        <p:nvPicPr>
+          <p:cNvPr id="164" name="" descr=""/>
+          <p:cNvPicPr/>
+          <p:nvPr/>
+        </p:nvPicPr>
+        <p:blipFill>
+          <a:blip r:embed="rId1"/>
+          <a:stretch>
+            <a:fillRect/>
+          </a:stretch>
+        </p:blipFill>
+        <p:spPr>
+          <a:xfrm>
+            <a:off x="2219760" y="2216880"/>
+            <a:ext cx="4704840" cy="3893040"/>
+          </a:xfrm>
+          <a:prstGeom prst="rect">
+            <a:avLst/>
+          </a:prstGeom>
+          <a:ln>
+            <a:noFill/>
+          </a:ln>
+        </p:spPr>
+      </p:pic>
     </p:spTree>
   </p:cSld>
   <p:timing>
@@ -4983,14 +4884,14 @@
       </p:grpSpPr>
       <p:sp>
         <p:nvSpPr>
-          <p:cNvPr id="149" name="CustomShape 1"/>
+          <p:cNvPr id="165" name="CustomShape 1"/>
           <p:cNvSpPr/>
           <p:nvPr/>
         </p:nvSpPr>
         <p:spPr>
           <a:xfrm>
             <a:off x="457200" y="164520"/>
-            <a:ext cx="8224920" cy="633960"/>
+            <a:ext cx="8224560" cy="633600"/>
           </a:xfrm>
           <a:prstGeom prst="rect">
             <a:avLst/>
@@ -5023,14 +4924,14 @@
       </p:sp>
       <p:sp>
         <p:nvSpPr>
-          <p:cNvPr id="150" name="CustomShape 2"/>
+          <p:cNvPr id="166" name="CustomShape 2"/>
           <p:cNvSpPr/>
           <p:nvPr/>
         </p:nvSpPr>
         <p:spPr>
           <a:xfrm>
             <a:off x="6553080" y="6356520"/>
-            <a:ext cx="2129040" cy="360360"/>
+            <a:ext cx="2128680" cy="360000"/>
           </a:xfrm>
           <a:prstGeom prst="rect">
             <a:avLst/>
@@ -5072,14 +4973,14 @@
       </p:sp>
       <p:sp>
         <p:nvSpPr>
-          <p:cNvPr id="151" name="CustomShape 3"/>
+          <p:cNvPr id="167" name="CustomShape 3"/>
           <p:cNvSpPr/>
           <p:nvPr/>
         </p:nvSpPr>
         <p:spPr>
           <a:xfrm>
-            <a:off x="1943280" y="1852560"/>
-            <a:ext cx="5257440" cy="2844000"/>
+            <a:off x="1943280" y="1420560"/>
+            <a:ext cx="5257080" cy="2843640"/>
           </a:xfrm>
           <a:prstGeom prst="rect">
             <a:avLst/>
@@ -5106,6 +5007,14 @@
               </a:rPr>
               <a:t>Optimisation</a:t>
             </a:r>
+            <a:endParaRPr/>
+          </a:p>
+          <a:p>
+            <a:pPr algn="ctr">
+              <a:lnSpc>
+                <a:spcPct val="100000"/>
+              </a:lnSpc>
+            </a:pPr>
             <a:endParaRPr/>
           </a:p>
           <a:p>
@@ -5280,14 +5189,14 @@
       </p:grpSpPr>
       <p:sp>
         <p:nvSpPr>
-          <p:cNvPr id="152" name="CustomShape 1"/>
+          <p:cNvPr id="168" name="CustomShape 1"/>
           <p:cNvSpPr/>
           <p:nvPr/>
         </p:nvSpPr>
         <p:spPr>
           <a:xfrm>
             <a:off x="457200" y="164520"/>
-            <a:ext cx="8224920" cy="633960"/>
+            <a:ext cx="8224560" cy="633600"/>
           </a:xfrm>
           <a:prstGeom prst="rect">
             <a:avLst/>
@@ -5320,14 +5229,14 @@
       </p:sp>
       <p:sp>
         <p:nvSpPr>
-          <p:cNvPr id="153" name="CustomShape 2"/>
+          <p:cNvPr id="169" name="CustomShape 2"/>
           <p:cNvSpPr/>
           <p:nvPr/>
         </p:nvSpPr>
         <p:spPr>
           <a:xfrm>
             <a:off x="6553080" y="6356520"/>
-            <a:ext cx="2129040" cy="360360"/>
+            <a:ext cx="2128680" cy="360000"/>
           </a:xfrm>
           <a:prstGeom prst="rect">
             <a:avLst/>
@@ -5369,7 +5278,7 @@
       </p:sp>
       <p:pic>
         <p:nvPicPr>
-          <p:cNvPr id="154" name="" descr=""/>
+          <p:cNvPr id="170" name="" descr=""/>
           <p:cNvPicPr/>
           <p:nvPr/>
         </p:nvPicPr>
@@ -5382,7 +5291,7 @@
         <p:spPr>
           <a:xfrm>
             <a:off x="892080" y="1047960"/>
-            <a:ext cx="7420680" cy="5591880"/>
+            <a:ext cx="7420320" cy="5591520"/>
           </a:xfrm>
           <a:prstGeom prst="rect">
             <a:avLst/>
@@ -5443,14 +5352,14 @@
       </p:grpSpPr>
       <p:sp>
         <p:nvSpPr>
-          <p:cNvPr id="155" name="CustomShape 1"/>
+          <p:cNvPr id="171" name="CustomShape 1"/>
           <p:cNvSpPr/>
           <p:nvPr/>
         </p:nvSpPr>
         <p:spPr>
           <a:xfrm>
             <a:off x="875160" y="3151800"/>
-            <a:ext cx="7390080" cy="713160"/>
+            <a:ext cx="7389720" cy="712800"/>
           </a:xfrm>
           <a:prstGeom prst="rect">
             <a:avLst/>
@@ -5527,14 +5436,14 @@
       </p:grpSpPr>
       <p:sp>
         <p:nvSpPr>
-          <p:cNvPr id="156" name="CustomShape 1"/>
+          <p:cNvPr id="172" name="CustomShape 1"/>
           <p:cNvSpPr/>
           <p:nvPr/>
         </p:nvSpPr>
         <p:spPr>
           <a:xfrm>
             <a:off x="457200" y="164520"/>
-            <a:ext cx="8224920" cy="633960"/>
+            <a:ext cx="8224560" cy="633600"/>
           </a:xfrm>
           <a:prstGeom prst="rect">
             <a:avLst/>
@@ -5567,14 +5476,14 @@
       </p:sp>
       <p:sp>
         <p:nvSpPr>
-          <p:cNvPr id="157" name="CustomShape 2"/>
+          <p:cNvPr id="173" name="CustomShape 2"/>
           <p:cNvSpPr/>
           <p:nvPr/>
         </p:nvSpPr>
         <p:spPr>
           <a:xfrm>
             <a:off x="594360" y="1873440"/>
-            <a:ext cx="7955280" cy="1005840"/>
+            <a:ext cx="7954920" cy="1005480"/>
           </a:xfrm>
           <a:prstGeom prst="rect">
             <a:avLst/>
@@ -5693,14 +5602,14 @@
       </p:grpSpPr>
       <p:sp>
         <p:nvSpPr>
-          <p:cNvPr id="158" name="CustomShape 1"/>
+          <p:cNvPr id="174" name="CustomShape 1"/>
           <p:cNvSpPr/>
           <p:nvPr/>
         </p:nvSpPr>
         <p:spPr>
           <a:xfrm>
             <a:off x="457200" y="164520"/>
-            <a:ext cx="8224920" cy="633960"/>
+            <a:ext cx="8224560" cy="633600"/>
           </a:xfrm>
           <a:prstGeom prst="rect">
             <a:avLst/>
@@ -5733,14 +5642,14 @@
       </p:sp>
       <p:sp>
         <p:nvSpPr>
-          <p:cNvPr id="159" name="CustomShape 2"/>
+          <p:cNvPr id="175" name="CustomShape 2"/>
           <p:cNvSpPr/>
           <p:nvPr/>
         </p:nvSpPr>
         <p:spPr>
           <a:xfrm>
             <a:off x="6553080" y="6356520"/>
-            <a:ext cx="2129040" cy="360360"/>
+            <a:ext cx="2128680" cy="360000"/>
           </a:xfrm>
           <a:prstGeom prst="rect">
             <a:avLst/>
@@ -5772,7 +5681,7 @@
       </p:sp>
       <p:pic>
         <p:nvPicPr>
-          <p:cNvPr id="160" name="" descr=""/>
+          <p:cNvPr id="176" name="" descr=""/>
           <p:cNvPicPr/>
           <p:nvPr/>
         </p:nvPicPr>
@@ -5785,7 +5694,7 @@
         <p:spPr>
           <a:xfrm>
             <a:off x="75960" y="1958040"/>
-            <a:ext cx="8989920" cy="3375360"/>
+            <a:ext cx="8989560" cy="3375000"/>
           </a:xfrm>
           <a:prstGeom prst="rect">
             <a:avLst/>
@@ -5853,7 +5762,7 @@
         <p:spPr>
           <a:xfrm>
             <a:off x="457200" y="164520"/>
-            <a:ext cx="8224920" cy="633960"/>
+            <a:ext cx="8224560" cy="633600"/>
           </a:xfrm>
           <a:prstGeom prst="rect">
             <a:avLst/>
@@ -5893,7 +5802,7 @@
         <p:spPr>
           <a:xfrm>
             <a:off x="457200" y="1744200"/>
-            <a:ext cx="8224920" cy="4521240"/>
+            <a:ext cx="8224560" cy="4520880"/>
           </a:xfrm>
           <a:prstGeom prst="rect">
             <a:avLst/>
@@ -6030,7 +5939,7 @@
         <p:spPr>
           <a:xfrm>
             <a:off x="6553080" y="6356520"/>
-            <a:ext cx="2129040" cy="360360"/>
+            <a:ext cx="2128680" cy="360000"/>
           </a:xfrm>
           <a:prstGeom prst="rect">
             <a:avLst/>
@@ -6128,7 +6037,7 @@
         <p:spPr>
           <a:xfrm>
             <a:off x="457200" y="164520"/>
-            <a:ext cx="8224920" cy="633960"/>
+            <a:ext cx="8224560" cy="633600"/>
           </a:xfrm>
           <a:prstGeom prst="rect">
             <a:avLst/>
@@ -6168,7 +6077,7 @@
         <p:spPr>
           <a:xfrm>
             <a:off x="6553080" y="6356520"/>
-            <a:ext cx="2129040" cy="360360"/>
+            <a:ext cx="2128680" cy="360000"/>
           </a:xfrm>
           <a:prstGeom prst="rect">
             <a:avLst/>
@@ -6223,7 +6132,7 @@
         <p:spPr>
           <a:xfrm>
             <a:off x="2615760" y="2698560"/>
-            <a:ext cx="1860480" cy="2556000"/>
+            <a:ext cx="1860120" cy="2555640"/>
           </a:xfrm>
           <a:prstGeom prst="rect">
             <a:avLst/>
@@ -6242,7 +6151,7 @@
         <p:spPr>
           <a:xfrm>
             <a:off x="640080" y="5815440"/>
-            <a:ext cx="3653280" cy="442800"/>
+            <a:ext cx="3652920" cy="442440"/>
           </a:xfrm>
           <a:prstGeom prst="rect">
             <a:avLst/>
@@ -6283,7 +6192,7 @@
         <p:spPr>
           <a:xfrm>
             <a:off x="5120640" y="2643120"/>
-            <a:ext cx="3779280" cy="1275840"/>
+            <a:ext cx="3778920" cy="1275480"/>
           </a:xfrm>
           <a:prstGeom prst="rect">
             <a:avLst/>
@@ -6308,7 +6217,7 @@
         <p:spPr>
           <a:xfrm>
             <a:off x="6126480" y="3959280"/>
-            <a:ext cx="1787400" cy="1733040"/>
+            <a:ext cx="1787040" cy="1732680"/>
           </a:xfrm>
           <a:prstGeom prst="rect">
             <a:avLst/>
@@ -6327,7 +6236,7 @@
         <p:spPr>
           <a:xfrm>
             <a:off x="5056560" y="5804280"/>
-            <a:ext cx="3861360" cy="442800"/>
+            <a:ext cx="3861000" cy="442440"/>
           </a:xfrm>
           <a:prstGeom prst="rect">
             <a:avLst/>
@@ -6362,7 +6271,7 @@
         <p:spPr>
           <a:xfrm>
             <a:off x="274320" y="1230480"/>
-            <a:ext cx="8686800" cy="1038960"/>
+            <a:ext cx="8686440" cy="1038600"/>
           </a:xfrm>
           <a:prstGeom prst="rect">
             <a:avLst/>
@@ -6387,7 +6296,7 @@
                 </a:solidFill>
                 <a:latin typeface="Calibri"/>
               </a:rPr>
-              <a:t>Hard   vs   soft </a:t>
+              <a:t>Hard vs. soft </a:t>
             </a:r>
             <a:endParaRPr/>
           </a:p>
@@ -6441,7 +6350,7 @@
         <p:spPr>
           <a:xfrm>
             <a:off x="365760" y="3072240"/>
-            <a:ext cx="2190240" cy="1733040"/>
+            <a:ext cx="2189880" cy="1732680"/>
           </a:xfrm>
           <a:prstGeom prst="rect">
             <a:avLst/>
@@ -6509,7 +6418,7 @@
         <p:spPr>
           <a:xfrm>
             <a:off x="457200" y="164520"/>
-            <a:ext cx="8224920" cy="633960"/>
+            <a:ext cx="8224560" cy="633600"/>
           </a:xfrm>
           <a:prstGeom prst="rect">
             <a:avLst/>
@@ -6549,7 +6458,7 @@
         <p:spPr>
           <a:xfrm>
             <a:off x="6553080" y="6356520"/>
-            <a:ext cx="2129040" cy="360360"/>
+            <a:ext cx="2128680" cy="360000"/>
           </a:xfrm>
           <a:prstGeom prst="rect">
             <a:avLst/>
@@ -6604,7 +6513,7 @@
         <p:spPr>
           <a:xfrm>
             <a:off x="2070720" y="1712160"/>
-            <a:ext cx="5000400" cy="1643400"/>
+            <a:ext cx="5000040" cy="1643040"/>
           </a:xfrm>
           <a:prstGeom prst="rect">
             <a:avLst/>
@@ -6633,7 +6542,7 @@
               <a:srgbClr val="000000"/>
             </a:solidFill>
             <a:custDash>
-              <a:ds d="-74672960000" sp="-74672960000"/>
+              <a:ds d="35000" sp="35000"/>
             </a:custDash>
             <a:tailEnd len="med" type="triangle" w="med"/>
           </a:ln>
@@ -6648,7 +6557,7 @@
         <p:spPr>
           <a:xfrm>
             <a:off x="1047600" y="3163320"/>
-            <a:ext cx="963000" cy="675720"/>
+            <a:ext cx="962640" cy="675360"/>
           </a:xfrm>
           <a:prstGeom prst="rect">
             <a:avLst/>
@@ -6705,7 +6614,7 @@
               <a:srgbClr val="000000"/>
             </a:solidFill>
             <a:custDash>
-              <a:ds d="-74672960000" sp="-74672960000"/>
+              <a:ds d="35000" sp="35000"/>
             </a:custDash>
             <a:tailEnd len="med" type="triangle" w="med"/>
           </a:ln>
@@ -6730,7 +6639,7 @@
               <a:srgbClr val="000000"/>
             </a:solidFill>
             <a:custDash>
-              <a:ds d="-74672960000" sp="-74672960000"/>
+              <a:ds d="35000" sp="35000"/>
             </a:custDash>
             <a:tailEnd len="med" type="triangle" w="med"/>
           </a:ln>
@@ -6755,8 +6664,8 @@
               <a:srgbClr val="000000"/>
             </a:solidFill>
             <a:custDash>
-              <a:ds d="1225000000" sp="1225000000"/>
-              <a:ds d="1225000000" sp="1225000000"/>
+              <a:ds d="2072810688000" sp="35000"/>
+              <a:ds d="2072810688000" sp="35000"/>
             </a:custDash>
             <a:tailEnd len="med" type="triangle" w="med"/>
           </a:ln>
@@ -6771,7 +6680,7 @@
         <p:spPr>
           <a:xfrm>
             <a:off x="3567600" y="3235680"/>
-            <a:ext cx="1460520" cy="603720"/>
+            <a:ext cx="1460160" cy="603360"/>
           </a:xfrm>
           <a:prstGeom prst="rect">
             <a:avLst/>
@@ -6818,7 +6727,7 @@
         <p:spPr>
           <a:xfrm>
             <a:off x="4899600" y="3775680"/>
-            <a:ext cx="1042920" cy="612360"/>
+            <a:ext cx="1042560" cy="612000"/>
           </a:xfrm>
           <a:prstGeom prst="rect">
             <a:avLst/>
@@ -6865,7 +6774,7 @@
         <p:spPr>
           <a:xfrm>
             <a:off x="1047600" y="3163680"/>
-            <a:ext cx="963000" cy="675720"/>
+            <a:ext cx="962640" cy="675360"/>
           </a:xfrm>
           <a:prstGeom prst="rect">
             <a:avLst/>
@@ -6912,7 +6821,7 @@
         <p:spPr>
           <a:xfrm>
             <a:off x="6985440" y="3108960"/>
-            <a:ext cx="1151640" cy="639000"/>
+            <a:ext cx="1151280" cy="638640"/>
           </a:xfrm>
           <a:prstGeom prst="rect">
             <a:avLst/>
@@ -6959,7 +6868,7 @@
         <p:spPr>
           <a:xfrm>
             <a:off x="777240" y="5180760"/>
-            <a:ext cx="7588440" cy="623520"/>
+            <a:ext cx="7588080" cy="623160"/>
           </a:xfrm>
           <a:prstGeom prst="rect">
             <a:avLst/>
@@ -7056,7 +6965,7 @@
         <p:spPr>
           <a:xfrm>
             <a:off x="457200" y="164520"/>
-            <a:ext cx="8224920" cy="633960"/>
+            <a:ext cx="8224560" cy="633600"/>
           </a:xfrm>
           <a:prstGeom prst="rect">
             <a:avLst/>
@@ -7075,7 +6984,7 @@
               </a:lnSpc>
             </a:pPr>
             <a:r>
-              <a:rPr lang="en-US" sz="3830">
+              <a:rPr lang="en-US" sz="3800">
                 <a:solidFill>
                   <a:srgbClr val="4f81bd"/>
                 </a:solidFill>
@@ -7096,7 +7005,7 @@
         <p:spPr>
           <a:xfrm>
             <a:off x="6553080" y="6356520"/>
-            <a:ext cx="2129040" cy="360360"/>
+            <a:ext cx="2128680" cy="360000"/>
           </a:xfrm>
           <a:prstGeom prst="rect">
             <a:avLst/>
@@ -7145,7 +7054,7 @@
         <p:spPr>
           <a:xfrm>
             <a:off x="1349280" y="1832400"/>
-            <a:ext cx="6445800" cy="3504240"/>
+            <a:ext cx="6445440" cy="3503880"/>
           </a:xfrm>
           <a:prstGeom prst="rect">
             <a:avLst/>
@@ -7158,7 +7067,7 @@
         <p:txBody>
           <a:bodyPr lIns="90000" rIns="90000" tIns="45000" bIns="45000"/>
           <a:p>
-            <a:pPr algn="just">
+            <a:pPr>
               <a:lnSpc>
                 <a:spcPct val="100000"/>
               </a:lnSpc>
@@ -7175,40 +7084,31 @@
             <a:endParaRPr/>
           </a:p>
           <a:p>
-            <a:pPr algn="just">
-              <a:lnSpc>
-                <a:spcPct val="100000"/>
-              </a:lnSpc>
-            </a:pPr>
-            <a:endParaRPr/>
-          </a:p>
-          <a:p>
-            <a:pPr algn="ctr">
-              <a:lnSpc>
-                <a:spcPct val="100000"/>
-              </a:lnSpc>
-            </a:pPr>
-            <a:r>
-              <a:rPr lang="en-US" sz="3200">
-                <a:solidFill>
-                  <a:srgbClr val="3465a4"/>
-                </a:solidFill>
-                <a:latin typeface="Calibri"/>
-              </a:rPr>
-              <a:t>task := (Q, T)</a:t>
-            </a:r>
-            <a:endParaRPr/>
-          </a:p>
-          <a:p>
-            <a:pPr algn="just">
-              <a:lnSpc>
-                <a:spcPct val="100000"/>
-              </a:lnSpc>
-            </a:pPr>
-            <a:endParaRPr/>
-          </a:p>
-          <a:p>
-            <a:pPr algn="just">
+            <a:pPr>
+              <a:lnSpc>
+                <a:spcPct val="100000"/>
+              </a:lnSpc>
+            </a:pPr>
+            <a:endParaRPr/>
+          </a:p>
+          <a:p>
+            <a:pPr>
+              <a:lnSpc>
+                <a:spcPct val="100000"/>
+              </a:lnSpc>
+            </a:pPr>
+            <a:endParaRPr/>
+          </a:p>
+          <a:p>
+            <a:pPr>
+              <a:lnSpc>
+                <a:spcPct val="100000"/>
+              </a:lnSpc>
+            </a:pPr>
+            <a:endParaRPr/>
+          </a:p>
+          <a:p>
+            <a:pPr>
               <a:lnSpc>
                 <a:spcPct val="100000"/>
               </a:lnSpc>
@@ -7239,7 +7139,16 @@
                 </a:solidFill>
                 <a:latin typeface="Calibri"/>
               </a:rPr>
-              <a:t>Q is the </a:t>
+              <a:t>     </a:t>
+            </a:r>
+            <a:r>
+              <a:rPr lang="en-US" sz="3200">
+                <a:solidFill>
+                  <a:srgbClr val="3465a4"/>
+                </a:solidFill>
+                <a:latin typeface="Calibri"/>
+              </a:rPr>
+              <a:t>is the </a:t>
             </a:r>
             <a:r>
               <a:rPr lang="en-US" sz="3200">
@@ -7276,7 +7185,16 @@
                 </a:solidFill>
                 <a:latin typeface="Calibri"/>
               </a:rPr>
-              <a:t>T is the </a:t>
+              <a:t>     </a:t>
+            </a:r>
+            <a:r>
+              <a:rPr lang="en-US" sz="3200">
+                <a:solidFill>
+                  <a:srgbClr val="3465a4"/>
+                </a:solidFill>
+                <a:latin typeface="Calibri"/>
+              </a:rPr>
+              <a:t>is the </a:t>
             </a:r>
             <a:r>
               <a:rPr lang="en-US" sz="3200">
@@ -7300,7 +7218,7 @@
         <p:spPr>
           <a:xfrm>
             <a:off x="316080" y="4439880"/>
-            <a:ext cx="8499960" cy="1586880"/>
+            <a:ext cx="8499600" cy="1586520"/>
           </a:xfrm>
           <a:prstGeom prst="rect">
             <a:avLst/>
@@ -7311,6 +7229,81 @@
           </a:ln>
         </p:spPr>
       </p:sp>
+      <p:pic>
+        <p:nvPicPr>
+          <p:cNvPr id="124" name="" descr=""/>
+          <p:cNvPicPr/>
+          <p:nvPr/>
+        </p:nvPicPr>
+        <p:blipFill>
+          <a:blip r:embed="rId1"/>
+          <a:stretch>
+            <a:fillRect/>
+          </a:stretch>
+        </p:blipFill>
+        <p:spPr>
+          <a:xfrm>
+            <a:off x="2882520" y="2735280"/>
+            <a:ext cx="3378960" cy="830880"/>
+          </a:xfrm>
+          <a:prstGeom prst="rect">
+            <a:avLst/>
+          </a:prstGeom>
+          <a:ln>
+            <a:noFill/>
+          </a:ln>
+        </p:spPr>
+      </p:pic>
+      <p:pic>
+        <p:nvPicPr>
+          <p:cNvPr id="125" name="" descr=""/>
+          <p:cNvPicPr/>
+          <p:nvPr/>
+        </p:nvPicPr>
+        <p:blipFill>
+          <a:blip r:embed="rId2"/>
+          <a:stretch>
+            <a:fillRect/>
+          </a:stretch>
+        </p:blipFill>
+        <p:spPr>
+          <a:xfrm>
+            <a:off x="1681920" y="4354200"/>
+            <a:ext cx="568080" cy="492120"/>
+          </a:xfrm>
+          <a:prstGeom prst="rect">
+            <a:avLst/>
+          </a:prstGeom>
+          <a:ln>
+            <a:noFill/>
+          </a:ln>
+        </p:spPr>
+      </p:pic>
+      <p:pic>
+        <p:nvPicPr>
+          <p:cNvPr id="126" name="" descr=""/>
+          <p:cNvPicPr/>
+          <p:nvPr/>
+        </p:nvPicPr>
+        <p:blipFill>
+          <a:blip r:embed="rId3"/>
+          <a:stretch>
+            <a:fillRect/>
+          </a:stretch>
+        </p:blipFill>
+        <p:spPr>
+          <a:xfrm>
+            <a:off x="1681920" y="4826880"/>
+            <a:ext cx="548640" cy="509400"/>
+          </a:xfrm>
+          <a:prstGeom prst="rect">
+            <a:avLst/>
+          </a:prstGeom>
+          <a:ln>
+            <a:noFill/>
+          </a:ln>
+        </p:spPr>
+      </p:pic>
     </p:spTree>
   </p:cSld>
   <p:timing>
@@ -7362,14 +7355,14 @@
       </p:grpSpPr>
       <p:sp>
         <p:nvSpPr>
-          <p:cNvPr id="124" name="CustomShape 1"/>
+          <p:cNvPr id="127" name="CustomShape 1"/>
           <p:cNvSpPr/>
           <p:nvPr/>
         </p:nvSpPr>
         <p:spPr>
           <a:xfrm>
             <a:off x="457200" y="164520"/>
-            <a:ext cx="8224920" cy="633960"/>
+            <a:ext cx="8224560" cy="633600"/>
           </a:xfrm>
           <a:prstGeom prst="rect">
             <a:avLst/>
@@ -7388,7 +7381,7 @@
               </a:lnSpc>
             </a:pPr>
             <a:r>
-              <a:rPr lang="en-US" sz="3830">
+              <a:rPr lang="en-US" sz="3800">
                 <a:solidFill>
                   <a:srgbClr val="4f81bd"/>
                 </a:solidFill>
@@ -7402,14 +7395,14 @@
       </p:sp>
       <p:sp>
         <p:nvSpPr>
-          <p:cNvPr id="125" name="CustomShape 2"/>
+          <p:cNvPr id="128" name="CustomShape 2"/>
           <p:cNvSpPr/>
           <p:nvPr/>
         </p:nvSpPr>
         <p:spPr>
           <a:xfrm>
             <a:off x="6553080" y="6356520"/>
-            <a:ext cx="2129040" cy="360360"/>
+            <a:ext cx="2128680" cy="360000"/>
           </a:xfrm>
           <a:prstGeom prst="rect">
             <a:avLst/>
@@ -7451,14 +7444,14 @@
       </p:sp>
       <p:sp>
         <p:nvSpPr>
-          <p:cNvPr id="126" name="CustomShape 3"/>
+          <p:cNvPr id="129" name="CustomShape 3"/>
           <p:cNvSpPr/>
           <p:nvPr/>
         </p:nvSpPr>
         <p:spPr>
           <a:xfrm>
             <a:off x="1349280" y="1472400"/>
-            <a:ext cx="6445800" cy="636480"/>
+            <a:ext cx="6445440" cy="636120"/>
           </a:xfrm>
           <a:prstGeom prst="rect">
             <a:avLst/>
@@ -7483,8 +7476,16 @@
                 </a:solidFill>
                 <a:latin typeface="Calibri"/>
               </a:rPr>
-              <a:t>task := (Q, T)</a:t>
-            </a:r>
+              <a:t>Bandwidth</a:t>
+            </a:r>
+            <a:endParaRPr/>
+          </a:p>
+          <a:p>
+            <a:pPr>
+              <a:lnSpc>
+                <a:spcPct val="100000"/>
+              </a:lnSpc>
+            </a:pPr>
             <a:endParaRPr/>
           </a:p>
           <a:p>
@@ -7507,14 +7508,14 @@
       </p:sp>
       <p:sp>
         <p:nvSpPr>
-          <p:cNvPr id="127" name="CustomShape 4"/>
+          <p:cNvPr id="130" name="CustomShape 4"/>
           <p:cNvSpPr/>
           <p:nvPr/>
         </p:nvSpPr>
         <p:spPr>
           <a:xfrm>
             <a:off x="316080" y="4439880"/>
-            <a:ext cx="8499960" cy="1586880"/>
+            <a:ext cx="8499600" cy="1586520"/>
           </a:xfrm>
           <a:prstGeom prst="rect">
             <a:avLst/>
@@ -7527,67 +7528,94 @@
       </p:sp>
       <p:sp>
         <p:nvSpPr>
-          <p:cNvPr id="128" name="TextShape 5"/>
-          <p:cNvSpPr txBox="1"/>
-          <p:nvPr/>
-        </p:nvSpPr>
-        <p:spPr>
-          <a:xfrm>
-            <a:off x="2574720" y="2954160"/>
-            <a:ext cx="3994560" cy="564480"/>
-          </a:xfrm>
-          <a:prstGeom prst="rect">
-            <a:avLst/>
-          </a:prstGeom>
+          <p:cNvPr id="131" name="CustomShape 5"/>
+          <p:cNvSpPr/>
+          <p:nvPr/>
+        </p:nvSpPr>
+        <p:spPr>
+          <a:xfrm>
+            <a:off x="2606400" y="3868560"/>
+            <a:ext cx="3931560" cy="564120"/>
+          </a:xfrm>
+          <a:prstGeom prst="rect">
+            <a:avLst/>
+          </a:prstGeom>
+          <a:noFill/>
+          <a:ln>
+            <a:noFill/>
+          </a:ln>
         </p:spPr>
         <p:txBody>
           <a:bodyPr lIns="90000" rIns="90000" tIns="45000" bIns="45000"/>
           <a:p>
+            <a:pPr algn="ctr">
+              <a:lnSpc>
+                <a:spcPct val="100000"/>
+              </a:lnSpc>
+            </a:pPr>
             <a:r>
               <a:rPr lang="en-US" sz="3200">
                 <a:solidFill>
-                  <a:srgbClr val="3465a4"/>
+                  <a:srgbClr val="ff6600"/>
                 </a:solidFill>
                 <a:latin typeface="Calibri"/>
               </a:rPr>
-              <a:t>Bandwidth = Q / T</a:t>
-            </a:r>
-            <a:endParaRPr/>
-          </a:p>
-        </p:txBody>
-      </p:sp>
-      <p:sp>
-        <p:nvSpPr>
-          <p:cNvPr id="129" name="TextShape 6"/>
-          <p:cNvSpPr txBox="1"/>
-          <p:nvPr/>
-        </p:nvSpPr>
-        <p:spPr>
-          <a:xfrm>
-            <a:off x="2606040" y="4480560"/>
-            <a:ext cx="3931920" cy="564480"/>
-          </a:xfrm>
-          <a:prstGeom prst="rect">
-            <a:avLst/>
-          </a:prstGeom>
-        </p:spPr>
-        <p:txBody>
-          <a:bodyPr lIns="90000" rIns="90000" tIns="45000" bIns="45000"/>
-          <a:p>
-            <a:pPr algn="ctr"/>
-            <a:r>
-              <a:rPr lang="en-US" sz="3200">
-                <a:solidFill>
-                  <a:srgbClr val="ff6600"/>
-                </a:solidFill>
-                <a:latin typeface="Calibri"/>
-              </a:rPr>
               <a:t>Temporal isolation</a:t>
             </a:r>
             <a:endParaRPr/>
           </a:p>
         </p:txBody>
       </p:sp>
+      <p:pic>
+        <p:nvPicPr>
+          <p:cNvPr id="132" name="" descr=""/>
+          <p:cNvPicPr/>
+          <p:nvPr/>
+        </p:nvPicPr>
+        <p:blipFill>
+          <a:blip r:embed="rId1"/>
+          <a:stretch>
+            <a:fillRect/>
+          </a:stretch>
+        </p:blipFill>
+        <p:spPr>
+          <a:xfrm>
+            <a:off x="1471680" y="4388040"/>
+            <a:ext cx="6201000" cy="1495080"/>
+          </a:xfrm>
+          <a:prstGeom prst="rect">
+            <a:avLst/>
+          </a:prstGeom>
+          <a:ln>
+            <a:noFill/>
+          </a:ln>
+        </p:spPr>
+      </p:pic>
+      <p:pic>
+        <p:nvPicPr>
+          <p:cNvPr id="133" name="" descr=""/>
+          <p:cNvPicPr/>
+          <p:nvPr/>
+        </p:nvPicPr>
+        <p:blipFill>
+          <a:blip r:embed="rId2"/>
+          <a:stretch>
+            <a:fillRect/>
+          </a:stretch>
+        </p:blipFill>
+        <p:spPr>
+          <a:xfrm>
+            <a:off x="3499560" y="1953360"/>
+            <a:ext cx="2145240" cy="1100160"/>
+          </a:xfrm>
+          <a:prstGeom prst="rect">
+            <a:avLst/>
+          </a:prstGeom>
+          <a:ln>
+            <a:noFill/>
+          </a:ln>
+        </p:spPr>
+      </p:pic>
     </p:spTree>
   </p:cSld>
   <p:timing>
@@ -7639,14 +7667,14 @@
       </p:grpSpPr>
       <p:sp>
         <p:nvSpPr>
-          <p:cNvPr id="130" name="CustomShape 1"/>
+          <p:cNvPr id="134" name="CustomShape 1"/>
           <p:cNvSpPr/>
           <p:nvPr/>
         </p:nvSpPr>
         <p:spPr>
           <a:xfrm>
             <a:off x="457200" y="164520"/>
-            <a:ext cx="8224920" cy="633960"/>
+            <a:ext cx="8224560" cy="633600"/>
           </a:xfrm>
           <a:prstGeom prst="rect">
             <a:avLst/>
@@ -7679,14 +7707,14 @@
       </p:sp>
       <p:sp>
         <p:nvSpPr>
-          <p:cNvPr id="131" name="CustomShape 2"/>
+          <p:cNvPr id="135" name="CustomShape 2"/>
           <p:cNvSpPr/>
           <p:nvPr/>
         </p:nvSpPr>
         <p:spPr>
           <a:xfrm>
             <a:off x="6553080" y="6356520"/>
-            <a:ext cx="2129040" cy="360360"/>
+            <a:ext cx="2128680" cy="360000"/>
           </a:xfrm>
           <a:prstGeom prst="rect">
             <a:avLst/>
@@ -7728,14 +7756,14 @@
       </p:sp>
       <p:sp>
         <p:nvSpPr>
-          <p:cNvPr id="132" name="CustomShape 3"/>
+          <p:cNvPr id="136" name="CustomShape 3"/>
           <p:cNvSpPr/>
           <p:nvPr/>
         </p:nvSpPr>
         <p:spPr>
           <a:xfrm>
             <a:off x="320400" y="1384560"/>
-            <a:ext cx="8502480" cy="1171800"/>
+            <a:ext cx="8502120" cy="1171440"/>
           </a:xfrm>
           <a:prstGeom prst="rect">
             <a:avLst/>
@@ -7765,10 +7793,117 @@
             <a:endParaRPr/>
           </a:p>
         </p:txBody>
+      </p:sp>
+      <p:sp>
+        <p:nvSpPr>
+          <p:cNvPr id="137" name="CustomShape 4"/>
+          <p:cNvSpPr/>
+          <p:nvPr/>
+        </p:nvSpPr>
+        <p:spPr>
+          <a:xfrm>
+            <a:off x="690120" y="5051880"/>
+            <a:ext cx="3378600" cy="651960"/>
+          </a:xfrm>
+          <a:prstGeom prst="rect">
+            <a:avLst/>
+          </a:prstGeom>
+          <a:noFill/>
+          <a:ln>
+            <a:noFill/>
+          </a:ln>
+        </p:spPr>
+        <p:txBody>
+          <a:bodyPr lIns="90000" rIns="90000" tIns="45000" bIns="45000"/>
+          <a:p>
+            <a:pPr algn="ctr">
+              <a:lnSpc>
+                <a:spcPct val="100000"/>
+              </a:lnSpc>
+            </a:pPr>
+            <a:r>
+              <a:rPr lang="en-US" sz="3200">
+                <a:solidFill>
+                  <a:srgbClr val="3465a4"/>
+                </a:solidFill>
+                <a:latin typeface="Calibri"/>
+              </a:rPr>
+              <a:t>Inner block structure </a:t>
+            </a:r>
+            <a:endParaRPr/>
+          </a:p>
+        </p:txBody>
+      </p:sp>
+      <p:sp>
+        <p:nvSpPr>
+          <p:cNvPr id="138" name="CustomShape 5"/>
+          <p:cNvSpPr/>
+          <p:nvPr/>
+        </p:nvSpPr>
+        <p:spPr>
+          <a:xfrm>
+            <a:off x="4812840" y="5051160"/>
+            <a:ext cx="3962880" cy="651960"/>
+          </a:xfrm>
+          <a:prstGeom prst="rect">
+            <a:avLst/>
+          </a:prstGeom>
+          <a:noFill/>
+          <a:ln>
+            <a:noFill/>
+          </a:ln>
+        </p:spPr>
+        <p:txBody>
+          <a:bodyPr lIns="90000" rIns="90000" tIns="45000" bIns="45000"/>
+          <a:p>
+            <a:pPr algn="ctr">
+              <a:lnSpc>
+                <a:spcPct val="100000"/>
+              </a:lnSpc>
+            </a:pPr>
+            <a:r>
+              <a:rPr lang="en-US" sz="3200">
+                <a:solidFill>
+                  <a:srgbClr val="3465a4"/>
+                </a:solidFill>
+                <a:latin typeface="Calibri"/>
+              </a:rPr>
+              <a:t>Quasi-Birth-Death process</a:t>
+            </a:r>
+            <a:endParaRPr/>
+          </a:p>
+        </p:txBody>
+      </p:sp>
+      <p:sp>
+        <p:nvSpPr>
+          <p:cNvPr id="139" name="CustomShape 6"/>
+          <p:cNvSpPr/>
+          <p:nvPr/>
+        </p:nvSpPr>
+        <p:spPr>
+          <a:xfrm>
+            <a:off x="3945600" y="5436720"/>
+            <a:ext cx="637200" cy="362880"/>
+          </a:xfrm>
+          <a:prstGeom prst="rightArrow">
+            <a:avLst>
+              <a:gd name="adj1" fmla="val 16200"/>
+              <a:gd name="adj2" fmla="val 5400"/>
+            </a:avLst>
+          </a:prstGeom>
+          <a:solidFill>
+            <a:srgbClr val="729fcf"/>
+          </a:solidFill>
+          <a:ln>
+            <a:solidFill>
+              <a:srgbClr val="3465a4"/>
+            </a:solidFill>
+          </a:ln>
+        </p:spPr>
       </p:sp>
       <p:pic>
         <p:nvPicPr>
-          <p:cNvPr id="133" name="" descr=""/>
+          <p:cNvPr id="140" name="" descr=""/>
           <p:cNvPicPr/>
           <p:nvPr/>
         </p:nvPicPr>
@@ -7780,8 +7915,8 @@
         </p:blipFill>
         <p:spPr>
           <a:xfrm>
-            <a:off x="2555640" y="2333880"/>
-            <a:ext cx="4028760" cy="2392560"/>
+            <a:off x="2284560" y="2103120"/>
+            <a:ext cx="4574880" cy="2851200"/>
           </a:xfrm>
           <a:prstGeom prst="rect">
             <a:avLst/>
@@ -7793,19 +7928,18 @@
       </p:pic>
       <p:sp>
         <p:nvSpPr>
-          <p:cNvPr id="134" name="CustomShape 4"/>
+          <p:cNvPr id="141" name="Line 7"/>
           <p:cNvSpPr/>
           <p:nvPr/>
         </p:nvSpPr>
         <p:spPr>
           <a:xfrm>
-            <a:off x="3255840" y="2424960"/>
-            <a:ext cx="1001880" cy="747000"/>
-          </a:xfrm>
-          <a:prstGeom prst="rect">
-            <a:avLst/>
-          </a:prstGeom>
-          <a:noFill/>
+            <a:off x="4206240" y="2191680"/>
+            <a:ext cx="0" cy="1005840"/>
+          </a:xfrm>
+          <a:prstGeom prst="line">
+            <a:avLst/>
+          </a:prstGeom>
           <a:ln w="29160">
             <a:solidFill>
               <a:srgbClr val="ff3333"/>
@@ -7816,131 +7950,266 @@
       </p:sp>
       <p:sp>
         <p:nvSpPr>
-          <p:cNvPr id="135" name="CustomShape 5"/>
+          <p:cNvPr id="142" name="Line 8"/>
           <p:cNvSpPr/>
           <p:nvPr/>
         </p:nvSpPr>
         <p:spPr>
-          <a:xfrm>
-            <a:off x="690120" y="5051880"/>
-            <a:ext cx="3378960" cy="652320"/>
-          </a:xfrm>
-          <a:prstGeom prst="rect">
-            <a:avLst/>
-          </a:prstGeom>
-          <a:noFill/>
-          <a:ln>
-            <a:noFill/>
-          </a:ln>
-        </p:spPr>
-        <p:txBody>
-          <a:bodyPr lIns="90000" rIns="90000" tIns="45000" bIns="45000"/>
-          <a:p>
-            <a:pPr algn="ctr">
-              <a:lnSpc>
-                <a:spcPct val="100000"/>
-              </a:lnSpc>
-            </a:pPr>
-            <a:r>
-              <a:rPr lang="en-US" sz="3200">
-                <a:solidFill>
-                  <a:srgbClr val="3465a4"/>
-                </a:solidFill>
-                <a:latin typeface="Calibri"/>
-              </a:rPr>
-              <a:t>Inner block structure </a:t>
-            </a:r>
-            <a:endParaRPr/>
-          </a:p>
-        </p:txBody>
-      </p:sp>
-      <p:sp>
-        <p:nvSpPr>
-          <p:cNvPr id="136" name="CustomShape 6"/>
+          <a:xfrm flipV="1">
+            <a:off x="3095280" y="3197520"/>
+            <a:ext cx="1110960" cy="2880"/>
+          </a:xfrm>
+          <a:prstGeom prst="line">
+            <a:avLst/>
+          </a:prstGeom>
+          <a:ln w="29160">
+            <a:solidFill>
+              <a:srgbClr val="ff3333"/>
+            </a:solidFill>
+            <a:round/>
+          </a:ln>
+        </p:spPr>
+      </p:sp>
+      <p:sp>
+        <p:nvSpPr>
+          <p:cNvPr id="143" name="Line 9"/>
           <p:cNvSpPr/>
           <p:nvPr/>
         </p:nvSpPr>
         <p:spPr>
           <a:xfrm>
-            <a:off x="4812840" y="5051160"/>
-            <a:ext cx="3963240" cy="652320"/>
-          </a:xfrm>
-          <a:prstGeom prst="rect">
-            <a:avLst/>
-          </a:prstGeom>
-          <a:noFill/>
-          <a:ln>
-            <a:noFill/>
-          </a:ln>
-        </p:spPr>
-        <p:txBody>
-          <a:bodyPr lIns="90000" rIns="90000" tIns="45000" bIns="45000"/>
-          <a:p>
-            <a:pPr algn="ctr">
-              <a:lnSpc>
-                <a:spcPct val="100000"/>
-              </a:lnSpc>
-            </a:pPr>
-            <a:r>
-              <a:rPr lang="en-US" sz="3200">
-                <a:solidFill>
-                  <a:srgbClr val="3465a4"/>
-                </a:solidFill>
-                <a:latin typeface="Calibri"/>
-              </a:rPr>
-              <a:t>Quasi-Birth-Death process</a:t>
-            </a:r>
-            <a:endParaRPr/>
-          </a:p>
-        </p:txBody>
-      </p:sp>
-      <p:sp>
-        <p:nvSpPr>
-          <p:cNvPr id="137" name="Line 7"/>
+            <a:off x="3092400" y="2740320"/>
+            <a:ext cx="2880" cy="460080"/>
+          </a:xfrm>
+          <a:prstGeom prst="line">
+            <a:avLst/>
+          </a:prstGeom>
+          <a:ln w="29160">
+            <a:solidFill>
+              <a:srgbClr val="ff3333"/>
+            </a:solidFill>
+            <a:round/>
+          </a:ln>
+        </p:spPr>
+      </p:sp>
+      <p:sp>
+        <p:nvSpPr>
+          <p:cNvPr id="144" name="Line 10"/>
           <p:cNvSpPr/>
           <p:nvPr/>
         </p:nvSpPr>
         <p:spPr>
           <a:xfrm>
-            <a:off x="4261320" y="3175560"/>
-            <a:ext cx="310680" cy="266040"/>
+            <a:off x="3092400" y="2740320"/>
+            <a:ext cx="640080" cy="0"/>
           </a:xfrm>
           <a:prstGeom prst="line">
             <a:avLst/>
           </a:prstGeom>
-          <a:ln w="19080">
+          <a:ln w="29160">
+            <a:solidFill>
+              <a:srgbClr val="ff3333"/>
+            </a:solidFill>
+            <a:round/>
+          </a:ln>
+        </p:spPr>
+      </p:sp>
+      <p:sp>
+        <p:nvSpPr>
+          <p:cNvPr id="145" name="Line 11"/>
+          <p:cNvSpPr/>
+          <p:nvPr/>
+        </p:nvSpPr>
+        <p:spPr>
+          <a:xfrm>
+            <a:off x="3732480" y="2191680"/>
+            <a:ext cx="0" cy="548640"/>
+          </a:xfrm>
+          <a:prstGeom prst="line">
+            <a:avLst/>
+          </a:prstGeom>
+          <a:ln w="29160">
+            <a:solidFill>
+              <a:srgbClr val="ff3333"/>
+            </a:solidFill>
+            <a:round/>
+          </a:ln>
+        </p:spPr>
+      </p:sp>
+      <p:sp>
+        <p:nvSpPr>
+          <p:cNvPr id="146" name="Line 12"/>
+          <p:cNvSpPr/>
+          <p:nvPr/>
+        </p:nvSpPr>
+        <p:spPr>
+          <a:xfrm>
+            <a:off x="3732480" y="2205360"/>
+            <a:ext cx="473760" cy="0"/>
+          </a:xfrm>
+          <a:prstGeom prst="line">
+            <a:avLst/>
+          </a:prstGeom>
+          <a:ln w="29160">
+            <a:solidFill>
+              <a:srgbClr val="ff3333"/>
+            </a:solidFill>
+            <a:round/>
+          </a:ln>
+        </p:spPr>
+      </p:sp>
+      <p:sp>
+        <p:nvSpPr>
+          <p:cNvPr id="147" name="Line 13"/>
+          <p:cNvSpPr/>
+          <p:nvPr/>
+        </p:nvSpPr>
+        <p:spPr>
+          <a:xfrm>
+            <a:off x="5486400" y="3291840"/>
+            <a:ext cx="0" cy="1005840"/>
+          </a:xfrm>
+          <a:prstGeom prst="line">
+            <a:avLst/>
+          </a:prstGeom>
+          <a:ln w="29160">
+            <a:solidFill>
+              <a:srgbClr val="ff3333"/>
+            </a:solidFill>
+            <a:round/>
+          </a:ln>
+        </p:spPr>
+      </p:sp>
+      <p:sp>
+        <p:nvSpPr>
+          <p:cNvPr id="148" name="Line 14"/>
+          <p:cNvSpPr/>
+          <p:nvPr/>
+        </p:nvSpPr>
+        <p:spPr>
+          <a:xfrm flipV="1">
+            <a:off x="4375440" y="4297680"/>
+            <a:ext cx="1110960" cy="2880"/>
+          </a:xfrm>
+          <a:prstGeom prst="line">
+            <a:avLst/>
+          </a:prstGeom>
+          <a:ln w="29160">
+            <a:solidFill>
+              <a:srgbClr val="ff3333"/>
+            </a:solidFill>
+            <a:round/>
+          </a:ln>
+        </p:spPr>
+      </p:sp>
+      <p:sp>
+        <p:nvSpPr>
+          <p:cNvPr id="149" name="Line 15"/>
+          <p:cNvSpPr/>
+          <p:nvPr/>
+        </p:nvSpPr>
+        <p:spPr>
+          <a:xfrm>
+            <a:off x="4372560" y="3840480"/>
+            <a:ext cx="2880" cy="460080"/>
+          </a:xfrm>
+          <a:prstGeom prst="line">
+            <a:avLst/>
+          </a:prstGeom>
+          <a:ln w="29160">
+            <a:solidFill>
+              <a:srgbClr val="ff3333"/>
+            </a:solidFill>
+            <a:round/>
+          </a:ln>
+        </p:spPr>
+      </p:sp>
+      <p:sp>
+        <p:nvSpPr>
+          <p:cNvPr id="150" name="Line 16"/>
+          <p:cNvSpPr/>
+          <p:nvPr/>
+        </p:nvSpPr>
+        <p:spPr>
+          <a:xfrm>
+            <a:off x="4372560" y="3840480"/>
+            <a:ext cx="640080" cy="0"/>
+          </a:xfrm>
+          <a:prstGeom prst="line">
+            <a:avLst/>
+          </a:prstGeom>
+          <a:ln w="29160">
+            <a:solidFill>
+              <a:srgbClr val="ff3333"/>
+            </a:solidFill>
+            <a:round/>
+          </a:ln>
+        </p:spPr>
+      </p:sp>
+      <p:sp>
+        <p:nvSpPr>
+          <p:cNvPr id="151" name="Line 17"/>
+          <p:cNvSpPr/>
+          <p:nvPr/>
+        </p:nvSpPr>
+        <p:spPr>
+          <a:xfrm>
+            <a:off x="5012640" y="3291840"/>
+            <a:ext cx="0" cy="548640"/>
+          </a:xfrm>
+          <a:prstGeom prst="line">
+            <a:avLst/>
+          </a:prstGeom>
+          <a:ln w="29160">
+            <a:solidFill>
+              <a:srgbClr val="ff3333"/>
+            </a:solidFill>
+            <a:round/>
+          </a:ln>
+        </p:spPr>
+      </p:sp>
+      <p:sp>
+        <p:nvSpPr>
+          <p:cNvPr id="152" name="Line 18"/>
+          <p:cNvSpPr/>
+          <p:nvPr/>
+        </p:nvSpPr>
+        <p:spPr>
+          <a:xfrm>
+            <a:off x="5012640" y="3305520"/>
+            <a:ext cx="473760" cy="0"/>
+          </a:xfrm>
+          <a:prstGeom prst="line">
+            <a:avLst/>
+          </a:prstGeom>
+          <a:ln w="29160">
+            <a:solidFill>
+              <a:srgbClr val="ff3333"/>
+            </a:solidFill>
+            <a:round/>
+          </a:ln>
+        </p:spPr>
+      </p:sp>
+      <p:sp>
+        <p:nvSpPr>
+          <p:cNvPr id="153" name="Line 19"/>
+          <p:cNvSpPr/>
+          <p:nvPr/>
+        </p:nvSpPr>
+        <p:spPr>
+          <a:xfrm>
+            <a:off x="4206240" y="3200400"/>
+            <a:ext cx="548640" cy="457200"/>
+          </a:xfrm>
+          <a:prstGeom prst="line">
+            <a:avLst/>
+          </a:prstGeom>
+          <a:ln w="29160">
             <a:solidFill>
               <a:srgbClr val="ff3333"/>
             </a:solidFill>
             <a:round/>
             <a:tailEnd len="med" type="triangle" w="med"/>
-          </a:ln>
-        </p:spPr>
-      </p:sp>
-      <p:sp>
-        <p:nvSpPr>
-          <p:cNvPr id="138" name="CustomShape 8"/>
-          <p:cNvSpPr/>
-          <p:nvPr/>
-        </p:nvSpPr>
-        <p:spPr>
-          <a:xfrm>
-            <a:off x="3945600" y="5436720"/>
-            <a:ext cx="637560" cy="363240"/>
-          </a:xfrm>
-          <a:prstGeom prst="rightArrow">
-            <a:avLst>
-              <a:gd name="adj1" fmla="val 16200"/>
-              <a:gd name="adj2" fmla="val 5400"/>
-            </a:avLst>
-          </a:prstGeom>
-          <a:solidFill>
-            <a:srgbClr val="729fcf"/>
-          </a:solidFill>
-          <a:ln>
-            <a:solidFill>
-              <a:srgbClr val="3465a4"/>
-            </a:solidFill>
           </a:ln>
         </p:spPr>
       </p:sp>
@@ -7995,14 +8264,14 @@
       </p:grpSpPr>
       <p:sp>
         <p:nvSpPr>
-          <p:cNvPr id="139" name="CustomShape 1"/>
+          <p:cNvPr id="154" name="CustomShape 1"/>
           <p:cNvSpPr/>
           <p:nvPr/>
         </p:nvSpPr>
         <p:spPr>
           <a:xfrm>
             <a:off x="457200" y="164520"/>
-            <a:ext cx="8224920" cy="633960"/>
+            <a:ext cx="8224560" cy="633600"/>
           </a:xfrm>
           <a:prstGeom prst="rect">
             <a:avLst/>
@@ -8035,14 +8304,14 @@
       </p:sp>
       <p:sp>
         <p:nvSpPr>
-          <p:cNvPr id="140" name="CustomShape 2"/>
+          <p:cNvPr id="155" name="CustomShape 2"/>
           <p:cNvSpPr/>
           <p:nvPr/>
         </p:nvSpPr>
         <p:spPr>
           <a:xfrm>
             <a:off x="6553080" y="6356520"/>
-            <a:ext cx="2129040" cy="360360"/>
+            <a:ext cx="2128680" cy="360000"/>
           </a:xfrm>
           <a:prstGeom prst="rect">
             <a:avLst/>
@@ -8084,14 +8353,14 @@
       </p:sp>
       <p:sp>
         <p:nvSpPr>
-          <p:cNvPr id="141" name="CustomShape 3"/>
+          <p:cNvPr id="156" name="CustomShape 3"/>
           <p:cNvSpPr/>
           <p:nvPr/>
         </p:nvSpPr>
         <p:spPr>
           <a:xfrm>
-            <a:off x="1189080" y="1557360"/>
-            <a:ext cx="6766200" cy="4568400"/>
+            <a:off x="1189080" y="1449360"/>
+            <a:ext cx="6765840" cy="4568040"/>
           </a:xfrm>
           <a:prstGeom prst="rect">
             <a:avLst/>
@@ -8268,14 +8537,14 @@
       </p:grpSpPr>
       <p:sp>
         <p:nvSpPr>
-          <p:cNvPr id="142" name="CustomShape 1"/>
+          <p:cNvPr id="157" name="CustomShape 1"/>
           <p:cNvSpPr/>
           <p:nvPr/>
         </p:nvSpPr>
         <p:spPr>
           <a:xfrm>
             <a:off x="457200" y="164520"/>
-            <a:ext cx="8224920" cy="633960"/>
+            <a:ext cx="8224560" cy="633600"/>
           </a:xfrm>
           <a:prstGeom prst="rect">
             <a:avLst/>
@@ -8308,14 +8577,14 @@
       </p:sp>
       <p:sp>
         <p:nvSpPr>
-          <p:cNvPr id="143" name="CustomShape 2"/>
+          <p:cNvPr id="158" name="CustomShape 2"/>
           <p:cNvSpPr/>
           <p:nvPr/>
         </p:nvSpPr>
         <p:spPr>
           <a:xfrm>
             <a:off x="6553080" y="6356520"/>
-            <a:ext cx="2129040" cy="360360"/>
+            <a:ext cx="2128680" cy="360000"/>
           </a:xfrm>
           <a:prstGeom prst="rect">
             <a:avLst/>
@@ -8357,14 +8626,14 @@
       </p:sp>
       <p:sp>
         <p:nvSpPr>
-          <p:cNvPr id="144" name="CustomShape 3"/>
+          <p:cNvPr id="159" name="CustomShape 3"/>
           <p:cNvSpPr/>
           <p:nvPr/>
         </p:nvSpPr>
         <p:spPr>
           <a:xfrm>
             <a:off x="640080" y="1420560"/>
-            <a:ext cx="7863840" cy="2457360"/>
+            <a:ext cx="7863480" cy="2457000"/>
           </a:xfrm>
           <a:prstGeom prst="rect">
             <a:avLst/>
@@ -8426,16 +8695,7 @@
                 </a:solidFill>
                 <a:latin typeface="Calibri"/>
               </a:rPr>
-              <a:t>(</a:t>
-            </a:r>
-            <a:r>
-              <a:rPr lang="en-US" sz="2500">
-                <a:solidFill>
-                  <a:srgbClr val="3465a4"/>
-                </a:solidFill>
-                <a:latin typeface="Calibri"/>
-              </a:rPr>
-              <a:t>QoS)</a:t>
+              <a:t>(QoS)</a:t>
             </a:r>
             <a:r>
               <a:rPr lang="en-US" sz="3200">
@@ -8516,7 +8776,7 @@
       </p:sp>
       <p:pic>
         <p:nvPicPr>
-          <p:cNvPr id="145" name="" descr=""/>
+          <p:cNvPr id="160" name="" descr=""/>
           <p:cNvPicPr/>
           <p:nvPr/>
         </p:nvPicPr>
@@ -8529,7 +8789,7 @@
         <p:spPr>
           <a:xfrm>
             <a:off x="1951200" y="3568320"/>
-            <a:ext cx="5241600" cy="2192400"/>
+            <a:ext cx="5241240" cy="2192040"/>
           </a:xfrm>
           <a:prstGeom prst="rect">
             <a:avLst/>

</xml_diff>

<commit_message>
fixed arrows in slides
</commit_message>
<xml_diff>
--- a/slides/slides.pptx
+++ b/slides/slides.pptx
@@ -199,7 +199,7 @@
           <a:bodyPr lIns="0" rIns="0" tIns="0" bIns="0" anchor="b"/>
           <a:p>
             <a:pPr algn="r"/>
-            <a:fld id="{4CE73FC8-0128-4B74-BB23-6C10F2FFCF96}" type="slidenum">
+            <a:fld id="{F7CFF689-9D39-488C-ADF3-52D51BE2CAB6}" type="slidenum">
               <a:rPr lang="en-US" sz="1400">
                 <a:latin typeface="Times New Roman"/>
               </a:rPr>
@@ -245,7 +245,7 @@
         <p:spPr>
           <a:xfrm>
             <a:off x="946080" y="4861080"/>
-            <a:ext cx="5200920" cy="4597560"/>
+            <a:ext cx="5200560" cy="4597200"/>
           </a:xfrm>
           <a:prstGeom prst="rect">
             <a:avLst/>
@@ -267,7 +267,7 @@
         <p:spPr>
           <a:xfrm>
             <a:off x="4024440" y="9725040"/>
-            <a:ext cx="3069000" cy="503640"/>
+            <a:ext cx="3068640" cy="503280"/>
           </a:xfrm>
           <a:prstGeom prst="rect">
             <a:avLst/>
@@ -285,7 +285,7 @@
                 <a:spcPct val="100000"/>
               </a:lnSpc>
             </a:pPr>
-            <a:fld id="{521FFE04-0231-4434-8F6C-FF72AA5886E7}" type="slidenum">
+            <a:fld id="{E4A73A9E-97C6-4786-A13F-38F8BB7B76DA}" type="slidenum">
               <a:rPr lang="en-US" sz="1200">
                 <a:solidFill>
                   <a:srgbClr val="000000"/>
@@ -334,7 +334,7 @@
         <p:spPr>
           <a:xfrm>
             <a:off x="946080" y="4861080"/>
-            <a:ext cx="5201640" cy="4598280"/>
+            <a:ext cx="5201280" cy="4597920"/>
           </a:xfrm>
           <a:prstGeom prst="rect">
             <a:avLst/>
@@ -356,7 +356,7 @@
         <p:spPr>
           <a:xfrm>
             <a:off x="4024440" y="9725040"/>
-            <a:ext cx="3069720" cy="504360"/>
+            <a:ext cx="3069360" cy="504000"/>
           </a:xfrm>
           <a:prstGeom prst="rect">
             <a:avLst/>
@@ -374,7 +374,7 @@
                 <a:spcPct val="100000"/>
               </a:lnSpc>
             </a:pPr>
-            <a:fld id="{A4A3172B-BCDD-4C2F-A8B1-F5DBA525FD95}" type="slidenum">
+            <a:fld id="{EAA6899B-7352-42FD-A77E-D50133565DED}" type="slidenum">
               <a:rPr lang="en-US" sz="1200">
                 <a:solidFill>
                   <a:srgbClr val="000000"/>
@@ -423,7 +423,7 @@
         <p:spPr>
           <a:xfrm>
             <a:off x="946080" y="4861080"/>
-            <a:ext cx="5201640" cy="4598280"/>
+            <a:ext cx="5201280" cy="4597920"/>
           </a:xfrm>
           <a:prstGeom prst="rect">
             <a:avLst/>
@@ -445,7 +445,7 @@
         <p:spPr>
           <a:xfrm>
             <a:off x="4024440" y="9725040"/>
-            <a:ext cx="3069720" cy="504360"/>
+            <a:ext cx="3069360" cy="504000"/>
           </a:xfrm>
           <a:prstGeom prst="rect">
             <a:avLst/>
@@ -463,7 +463,7 @@
                 <a:spcPct val="100000"/>
               </a:lnSpc>
             </a:pPr>
-            <a:fld id="{FE8A5BE0-F977-49CE-AAE9-2131A4476DA7}" type="slidenum">
+            <a:fld id="{6ADC3DDE-D787-4FC5-A9E5-00AA99F1EA49}" type="slidenum">
               <a:rPr lang="en-US" sz="1200">
                 <a:solidFill>
                   <a:srgbClr val="000000"/>
@@ -512,7 +512,7 @@
         <p:spPr>
           <a:xfrm>
             <a:off x="946080" y="4861080"/>
-            <a:ext cx="5201640" cy="4598280"/>
+            <a:ext cx="5201280" cy="4597920"/>
           </a:xfrm>
           <a:prstGeom prst="rect">
             <a:avLst/>
@@ -534,7 +534,7 @@
         <p:spPr>
           <a:xfrm>
             <a:off x="4024440" y="9725040"/>
-            <a:ext cx="3069720" cy="504360"/>
+            <a:ext cx="3069360" cy="504000"/>
           </a:xfrm>
           <a:prstGeom prst="rect">
             <a:avLst/>
@@ -552,7 +552,7 @@
                 <a:spcPct val="100000"/>
               </a:lnSpc>
             </a:pPr>
-            <a:fld id="{FA847BE1-CF38-4C2F-98E0-FB2D7CAF49AC}" type="slidenum">
+            <a:fld id="{0E54D6EF-FF9F-4638-9FD7-D110F25D2B7E}" type="slidenum">
               <a:rPr lang="en-US" sz="1200">
                 <a:solidFill>
                   <a:srgbClr val="000000"/>
@@ -601,7 +601,7 @@
         <p:spPr>
           <a:xfrm>
             <a:off x="946080" y="4861080"/>
-            <a:ext cx="5201640" cy="4598280"/>
+            <a:ext cx="5201280" cy="4597920"/>
           </a:xfrm>
           <a:prstGeom prst="rect">
             <a:avLst/>
@@ -623,7 +623,7 @@
         <p:spPr>
           <a:xfrm>
             <a:off x="4024440" y="9725040"/>
-            <a:ext cx="3069720" cy="504360"/>
+            <a:ext cx="3069360" cy="504000"/>
           </a:xfrm>
           <a:prstGeom prst="rect">
             <a:avLst/>
@@ -641,7 +641,7 @@
                 <a:spcPct val="100000"/>
               </a:lnSpc>
             </a:pPr>
-            <a:fld id="{9A66D177-DAED-4563-8B06-B4BECFC871C0}" type="slidenum">
+            <a:fld id="{3C549A47-0541-4171-B46E-74CCFADE63D5}" type="slidenum">
               <a:rPr lang="en-US" sz="1200">
                 <a:solidFill>
                   <a:srgbClr val="000000"/>
@@ -690,7 +690,7 @@
         <p:spPr>
           <a:xfrm>
             <a:off x="946080" y="4861080"/>
-            <a:ext cx="5201640" cy="4598280"/>
+            <a:ext cx="5201280" cy="4597920"/>
           </a:xfrm>
           <a:prstGeom prst="rect">
             <a:avLst/>
@@ -712,7 +712,7 @@
         <p:spPr>
           <a:xfrm>
             <a:off x="4024440" y="9725040"/>
-            <a:ext cx="3069720" cy="504360"/>
+            <a:ext cx="3069360" cy="504000"/>
           </a:xfrm>
           <a:prstGeom prst="rect">
             <a:avLst/>
@@ -730,7 +730,7 @@
                 <a:spcPct val="100000"/>
               </a:lnSpc>
             </a:pPr>
-            <a:fld id="{6FCFE88E-90A7-44F6-88F0-8C7C3BEC54F0}" type="slidenum">
+            <a:fld id="{0E705D1D-B3DB-43FF-BE21-C18ABC69CA80}" type="slidenum">
               <a:rPr lang="en-US" sz="1200">
                 <a:solidFill>
                   <a:srgbClr val="000000"/>
@@ -779,7 +779,7 @@
         <p:spPr>
           <a:xfrm>
             <a:off x="946080" y="4861080"/>
-            <a:ext cx="5201640" cy="4598280"/>
+            <a:ext cx="5201280" cy="4597920"/>
           </a:xfrm>
           <a:prstGeom prst="rect">
             <a:avLst/>
@@ -801,7 +801,7 @@
         <p:spPr>
           <a:xfrm>
             <a:off x="4024440" y="9725040"/>
-            <a:ext cx="3069720" cy="504360"/>
+            <a:ext cx="3069360" cy="504000"/>
           </a:xfrm>
           <a:prstGeom prst="rect">
             <a:avLst/>
@@ -819,7 +819,7 @@
                 <a:spcPct val="100000"/>
               </a:lnSpc>
             </a:pPr>
-            <a:fld id="{FBBAD349-45A0-43C9-A77E-1DB1DB78FFE9}" type="slidenum">
+            <a:fld id="{BE57CBDC-FE1B-497B-855B-C55235F25EC3}" type="slidenum">
               <a:rPr lang="en-US" sz="1200">
                 <a:solidFill>
                   <a:srgbClr val="000000"/>
@@ -868,7 +868,7 @@
         <p:spPr>
           <a:xfrm>
             <a:off x="946080" y="4861080"/>
-            <a:ext cx="5201640" cy="4598280"/>
+            <a:ext cx="5201280" cy="4597920"/>
           </a:xfrm>
           <a:prstGeom prst="rect">
             <a:avLst/>
@@ -890,7 +890,7 @@
         <p:spPr>
           <a:xfrm>
             <a:off x="4024440" y="9725040"/>
-            <a:ext cx="3069720" cy="504360"/>
+            <a:ext cx="3069360" cy="504000"/>
           </a:xfrm>
           <a:prstGeom prst="rect">
             <a:avLst/>
@@ -908,7 +908,7 @@
                 <a:spcPct val="100000"/>
               </a:lnSpc>
             </a:pPr>
-            <a:fld id="{B448A20E-F478-41D4-AC19-177FA6DBCDBF}" type="slidenum">
+            <a:fld id="{96E54A91-CBD9-43E2-A90A-69CCB8126999}" type="slidenum">
               <a:rPr lang="en-US" sz="1200">
                 <a:solidFill>
                   <a:srgbClr val="000000"/>
@@ -957,7 +957,7 @@
         <p:spPr>
           <a:xfrm>
             <a:off x="946080" y="4861080"/>
-            <a:ext cx="5201640" cy="4598280"/>
+            <a:ext cx="5201280" cy="4597920"/>
           </a:xfrm>
           <a:prstGeom prst="rect">
             <a:avLst/>
@@ -979,7 +979,7 @@
         <p:spPr>
           <a:xfrm>
             <a:off x="4024440" y="9725040"/>
-            <a:ext cx="3069720" cy="504360"/>
+            <a:ext cx="3069360" cy="504000"/>
           </a:xfrm>
           <a:prstGeom prst="rect">
             <a:avLst/>
@@ -997,7 +997,7 @@
                 <a:spcPct val="100000"/>
               </a:lnSpc>
             </a:pPr>
-            <a:fld id="{171EC181-B5EB-48EA-A410-8A0822EEC1BA}" type="slidenum">
+            <a:fld id="{1C3916A3-C7A9-4DCA-B985-84C160F44178}" type="slidenum">
               <a:rPr lang="en-US" sz="1200">
                 <a:solidFill>
                   <a:srgbClr val="000000"/>
@@ -1046,7 +1046,7 @@
         <p:spPr>
           <a:xfrm>
             <a:off x="946080" y="4861080"/>
-            <a:ext cx="5201640" cy="4598280"/>
+            <a:ext cx="5201280" cy="4597920"/>
           </a:xfrm>
           <a:prstGeom prst="rect">
             <a:avLst/>
@@ -1068,7 +1068,7 @@
         <p:spPr>
           <a:xfrm>
             <a:off x="4024440" y="9725040"/>
-            <a:ext cx="3069720" cy="504360"/>
+            <a:ext cx="3069360" cy="504000"/>
           </a:xfrm>
           <a:prstGeom prst="rect">
             <a:avLst/>
@@ -1086,7 +1086,7 @@
                 <a:spcPct val="100000"/>
               </a:lnSpc>
             </a:pPr>
-            <a:fld id="{A11236F3-D1C8-4420-AC0A-348AB279D2A7}" type="slidenum">
+            <a:fld id="{E9071414-D93D-4702-8495-C0EE9CFC27C8}" type="slidenum">
               <a:rPr lang="en-US" sz="1200">
                 <a:solidFill>
                   <a:srgbClr val="000000"/>
@@ -1135,7 +1135,7 @@
         <p:spPr>
           <a:xfrm>
             <a:off x="946080" y="4861080"/>
-            <a:ext cx="5201640" cy="4598280"/>
+            <a:ext cx="5201280" cy="4597920"/>
           </a:xfrm>
           <a:prstGeom prst="rect">
             <a:avLst/>
@@ -1157,7 +1157,7 @@
         <p:spPr>
           <a:xfrm>
             <a:off x="4024440" y="9725040"/>
-            <a:ext cx="3069720" cy="504360"/>
+            <a:ext cx="3069360" cy="504000"/>
           </a:xfrm>
           <a:prstGeom prst="rect">
             <a:avLst/>
@@ -1175,7 +1175,7 @@
                 <a:spcPct val="100000"/>
               </a:lnSpc>
             </a:pPr>
-            <a:fld id="{783701DA-8EAF-4462-93E9-BD2A4557A976}" type="slidenum">
+            <a:fld id="{9A60ED01-EC27-42C4-98DA-D42A256A10B9}" type="slidenum">
               <a:rPr lang="en-US" sz="1200">
                 <a:solidFill>
                   <a:srgbClr val="000000"/>
@@ -1224,7 +1224,7 @@
         <p:spPr>
           <a:xfrm>
             <a:off x="946080" y="4861080"/>
-            <a:ext cx="5201640" cy="4598280"/>
+            <a:ext cx="5201280" cy="4597920"/>
           </a:xfrm>
           <a:prstGeom prst="rect">
             <a:avLst/>
@@ -1246,7 +1246,7 @@
         <p:spPr>
           <a:xfrm>
             <a:off x="4024440" y="9725040"/>
-            <a:ext cx="3069720" cy="504360"/>
+            <a:ext cx="3069360" cy="504000"/>
           </a:xfrm>
           <a:prstGeom prst="rect">
             <a:avLst/>
@@ -1264,7 +1264,7 @@
                 <a:spcPct val="100000"/>
               </a:lnSpc>
             </a:pPr>
-            <a:fld id="{E662080C-6052-4735-B7C3-C3F98F936EAA}" type="slidenum">
+            <a:fld id="{3FE5FA3F-9380-4EBE-876B-37DFC741886C}" type="slidenum">
               <a:rPr lang="en-US" sz="1200">
                 <a:solidFill>
                   <a:srgbClr val="000000"/>
@@ -1313,7 +1313,7 @@
         <p:spPr>
           <a:xfrm>
             <a:off x="946080" y="4861080"/>
-            <a:ext cx="5201640" cy="4598280"/>
+            <a:ext cx="5201280" cy="4597920"/>
           </a:xfrm>
           <a:prstGeom prst="rect">
             <a:avLst/>
@@ -1335,7 +1335,7 @@
         <p:spPr>
           <a:xfrm>
             <a:off x="4024440" y="9725040"/>
-            <a:ext cx="3069720" cy="504360"/>
+            <a:ext cx="3069360" cy="504000"/>
           </a:xfrm>
           <a:prstGeom prst="rect">
             <a:avLst/>
@@ -1353,7 +1353,7 @@
                 <a:spcPct val="100000"/>
               </a:lnSpc>
             </a:pPr>
-            <a:fld id="{A53C579B-AF88-4DDC-A306-C32AE4843E7E}" type="slidenum">
+            <a:fld id="{6616274E-2056-442B-931E-FBF61C658C4D}" type="slidenum">
               <a:rPr lang="en-US" sz="1200">
                 <a:solidFill>
                   <a:srgbClr val="000000"/>
@@ -3721,7 +3721,7 @@
         <p:spPr>
           <a:xfrm>
             <a:off x="0" y="932760"/>
-            <a:ext cx="9137880" cy="109080"/>
+            <a:ext cx="9137520" cy="108720"/>
           </a:xfrm>
           <a:prstGeom prst="rect">
             <a:avLst/>
@@ -3743,7 +3743,7 @@
         <p:spPr>
           <a:xfrm>
             <a:off x="7707960" y="6564960"/>
-            <a:ext cx="908280" cy="908280"/>
+            <a:ext cx="907920" cy="907920"/>
           </a:xfrm>
           <a:prstGeom prst="rect">
             <a:avLst/>
@@ -3769,7 +3769,7 @@
         <p:spPr>
           <a:xfrm>
             <a:off x="0" y="0"/>
-            <a:ext cx="9147240" cy="1381320"/>
+            <a:ext cx="9146880" cy="1380960"/>
           </a:xfrm>
           <a:prstGeom prst="rect">
             <a:avLst/>
@@ -3790,7 +3790,7 @@
         </p:nvPicPr>
         <p:blipFill>
           <a:blip r:embed="rId3"/>
-          <a:srcRect l="0" t="0" r="49890" b="45053"/>
+          <a:srcRect l="0" t="0" r="49886" b="45042"/>
           <a:stretch>
             <a:fillRect/>
           </a:stretch>
@@ -3798,7 +3798,7 @@
         <p:spPr>
           <a:xfrm>
             <a:off x="6619320" y="1393560"/>
-            <a:ext cx="2516400" cy="954000"/>
+            <a:ext cx="2516040" cy="953640"/>
           </a:xfrm>
           <a:prstGeom prst="rect">
             <a:avLst/>
@@ -3816,7 +3816,7 @@
         </p:nvPicPr>
         <p:blipFill>
           <a:blip r:embed="rId4"/>
-          <a:srcRect l="0" t="0" r="2194" b="13205"/>
+          <a:srcRect l="0" t="0" r="2182" b="13160"/>
           <a:stretch>
             <a:fillRect/>
           </a:stretch>
@@ -3824,7 +3824,7 @@
         <p:spPr>
           <a:xfrm>
             <a:off x="0" y="1393560"/>
-            <a:ext cx="3394440" cy="877320"/>
+            <a:ext cx="3394080" cy="876960"/>
           </a:xfrm>
           <a:prstGeom prst="rect">
             <a:avLst/>
@@ -4041,7 +4041,7 @@
         <p:spPr>
           <a:xfrm>
             <a:off x="0" y="932760"/>
-            <a:ext cx="9138600" cy="109800"/>
+            <a:ext cx="9138240" cy="109440"/>
           </a:xfrm>
           <a:prstGeom prst="rect">
             <a:avLst/>
@@ -4063,7 +4063,7 @@
         <p:spPr>
           <a:xfrm>
             <a:off x="7707960" y="6564960"/>
-            <a:ext cx="909000" cy="909000"/>
+            <a:ext cx="908640" cy="908640"/>
           </a:xfrm>
           <a:prstGeom prst="rect">
             <a:avLst/>
@@ -4274,7 +4274,7 @@
         <p:spPr>
           <a:xfrm>
             <a:off x="720" y="2305440"/>
-            <a:ext cx="9137880" cy="1735560"/>
+            <a:ext cx="9137520" cy="1735200"/>
           </a:xfrm>
           <a:prstGeom prst="rect">
             <a:avLst/>
@@ -4331,7 +4331,7 @@
         <p:spPr>
           <a:xfrm>
             <a:off x="1189440" y="4264560"/>
-            <a:ext cx="6760440" cy="542880"/>
+            <a:ext cx="6760080" cy="542520"/>
           </a:xfrm>
           <a:prstGeom prst="rect">
             <a:avLst/>
@@ -4371,7 +4371,7 @@
         <p:spPr>
           <a:xfrm>
             <a:off x="10207080" y="2718720"/>
-            <a:ext cx="178560" cy="455400"/>
+            <a:ext cx="178200" cy="455040"/>
           </a:xfrm>
           <a:prstGeom prst="rect">
             <a:avLst/>
@@ -4391,7 +4391,7 @@
         <p:spPr>
           <a:xfrm>
             <a:off x="1931040" y="5852160"/>
-            <a:ext cx="5212080" cy="440640"/>
+            <a:ext cx="5211720" cy="440280"/>
           </a:xfrm>
           <a:prstGeom prst="rect">
             <a:avLst/>
@@ -4440,7 +4440,7 @@
         <p:spPr>
           <a:xfrm>
             <a:off x="1330920" y="2082960"/>
-            <a:ext cx="908280" cy="908280"/>
+            <a:ext cx="907920" cy="907920"/>
           </a:xfrm>
           <a:prstGeom prst="rect">
             <a:avLst/>
@@ -4460,7 +4460,7 @@
         <p:spPr>
           <a:xfrm>
             <a:off x="1931040" y="5486400"/>
-            <a:ext cx="5212080" cy="440640"/>
+            <a:ext cx="5211720" cy="440280"/>
           </a:xfrm>
           <a:prstGeom prst="rect">
             <a:avLst/>
@@ -4509,7 +4509,7 @@
         <p:spPr>
           <a:xfrm>
             <a:off x="6035040" y="1828800"/>
-            <a:ext cx="2920680" cy="1000440"/>
+            <a:ext cx="2920320" cy="1000080"/>
           </a:xfrm>
           <a:prstGeom prst="rect">
             <a:avLst/>
@@ -4529,7 +4529,7 @@
         <p:spPr>
           <a:xfrm>
             <a:off x="6309360" y="2194560"/>
-            <a:ext cx="1457640" cy="360360"/>
+            <a:ext cx="1457280" cy="360000"/>
           </a:xfrm>
           <a:prstGeom prst="rect">
             <a:avLst/>
@@ -4549,7 +4549,7 @@
         <p:spPr>
           <a:xfrm>
             <a:off x="1371600" y="3657600"/>
-            <a:ext cx="2920680" cy="1091880"/>
+            <a:ext cx="2920320" cy="1091520"/>
           </a:xfrm>
           <a:prstGeom prst="rect">
             <a:avLst/>
@@ -4569,7 +4569,7 @@
         <p:spPr>
           <a:xfrm>
             <a:off x="6547680" y="1463040"/>
-            <a:ext cx="2554920" cy="909000"/>
+            <a:ext cx="2554560" cy="908640"/>
           </a:xfrm>
           <a:prstGeom prst="rect">
             <a:avLst/>
@@ -4591,7 +4591,7 @@
         <p:spPr>
           <a:xfrm>
             <a:off x="3358440" y="4705200"/>
-            <a:ext cx="2422080" cy="432360"/>
+            <a:ext cx="2421720" cy="432000"/>
           </a:xfrm>
           <a:prstGeom prst="rect">
             <a:avLst/>
@@ -4677,7 +4677,7 @@
         <p:spPr>
           <a:xfrm>
             <a:off x="457200" y="164520"/>
-            <a:ext cx="8224200" cy="633240"/>
+            <a:ext cx="8223840" cy="632880"/>
           </a:xfrm>
           <a:prstGeom prst="rect">
             <a:avLst/>
@@ -4717,7 +4717,7 @@
         <p:spPr>
           <a:xfrm>
             <a:off x="6553080" y="6356520"/>
-            <a:ext cx="2128320" cy="359640"/>
+            <a:ext cx="2127960" cy="359280"/>
           </a:xfrm>
           <a:prstGeom prst="rect">
             <a:avLst/>
@@ -4766,7 +4766,7 @@
         <p:spPr>
           <a:xfrm>
             <a:off x="421560" y="1384560"/>
-            <a:ext cx="8263080" cy="626760"/>
+            <a:ext cx="8262720" cy="626400"/>
           </a:xfrm>
           <a:prstGeom prst="rect">
             <a:avLst/>
@@ -4828,7 +4828,7 @@
         <p:spPr>
           <a:xfrm>
             <a:off x="2219760" y="2216880"/>
-            <a:ext cx="4704480" cy="3892680"/>
+            <a:ext cx="4704120" cy="3892320"/>
           </a:xfrm>
           <a:prstGeom prst="rect">
             <a:avLst/>
@@ -4896,7 +4896,7 @@
         <p:spPr>
           <a:xfrm>
             <a:off x="457200" y="164520"/>
-            <a:ext cx="8224200" cy="633240"/>
+            <a:ext cx="8223840" cy="632880"/>
           </a:xfrm>
           <a:prstGeom prst="rect">
             <a:avLst/>
@@ -4936,7 +4936,7 @@
         <p:spPr>
           <a:xfrm>
             <a:off x="6553080" y="6356520"/>
-            <a:ext cx="2128320" cy="359640"/>
+            <a:ext cx="2127960" cy="359280"/>
           </a:xfrm>
           <a:prstGeom prst="rect">
             <a:avLst/>
@@ -4985,7 +4985,7 @@
         <p:spPr>
           <a:xfrm>
             <a:off x="1188720" y="1418040"/>
-            <a:ext cx="6766560" cy="4572000"/>
+            <a:ext cx="6766200" cy="4571640"/>
           </a:xfrm>
           <a:prstGeom prst="rect">
             <a:avLst/>
@@ -5095,9 +5095,6 @@
               <a:lnSpc>
                 <a:spcPct val="100000"/>
               </a:lnSpc>
-              <a:buSzPct val="45000"/>
-              <a:buFont typeface="StarSymbol"/>
-              <a:buChar char=""/>
             </a:pPr>
             <a:endParaRPr/>
           </a:p>
@@ -5201,7 +5198,7 @@
         <p:spPr>
           <a:xfrm>
             <a:off x="457200" y="164520"/>
-            <a:ext cx="8224200" cy="633240"/>
+            <a:ext cx="8223840" cy="632880"/>
           </a:xfrm>
           <a:prstGeom prst="rect">
             <a:avLst/>
@@ -5241,7 +5238,7 @@
         <p:spPr>
           <a:xfrm>
             <a:off x="6553080" y="6356520"/>
-            <a:ext cx="2128320" cy="359640"/>
+            <a:ext cx="2127960" cy="359280"/>
           </a:xfrm>
           <a:prstGeom prst="rect">
             <a:avLst/>
@@ -5296,7 +5293,7 @@
         <p:spPr>
           <a:xfrm>
             <a:off x="892080" y="1047960"/>
-            <a:ext cx="7419960" cy="5591160"/>
+            <a:ext cx="7419600" cy="5590800"/>
           </a:xfrm>
           <a:prstGeom prst="rect">
             <a:avLst/>
@@ -5364,7 +5361,7 @@
         <p:spPr>
           <a:xfrm>
             <a:off x="875160" y="3151800"/>
-            <a:ext cx="7389360" cy="712440"/>
+            <a:ext cx="7389000" cy="712080"/>
           </a:xfrm>
           <a:prstGeom prst="rect">
             <a:avLst/>
@@ -5448,7 +5445,7 @@
         <p:spPr>
           <a:xfrm>
             <a:off x="457200" y="164520"/>
-            <a:ext cx="8224200" cy="633240"/>
+            <a:ext cx="8223840" cy="632880"/>
           </a:xfrm>
           <a:prstGeom prst="rect">
             <a:avLst/>
@@ -5488,7 +5485,7 @@
         <p:spPr>
           <a:xfrm>
             <a:off x="594360" y="1873440"/>
-            <a:ext cx="7954560" cy="1005120"/>
+            <a:ext cx="7954200" cy="1004760"/>
           </a:xfrm>
           <a:prstGeom prst="rect">
             <a:avLst/>
@@ -5614,7 +5611,7 @@
         <p:spPr>
           <a:xfrm>
             <a:off x="457200" y="164520"/>
-            <a:ext cx="8224200" cy="633240"/>
+            <a:ext cx="8223840" cy="632880"/>
           </a:xfrm>
           <a:prstGeom prst="rect">
             <a:avLst/>
@@ -5654,7 +5651,7 @@
         <p:spPr>
           <a:xfrm>
             <a:off x="6553080" y="6356520"/>
-            <a:ext cx="2128320" cy="359640"/>
+            <a:ext cx="2127960" cy="359280"/>
           </a:xfrm>
           <a:prstGeom prst="rect">
             <a:avLst/>
@@ -5699,7 +5696,7 @@
         <p:spPr>
           <a:xfrm>
             <a:off x="75960" y="1958040"/>
-            <a:ext cx="8989200" cy="3374640"/>
+            <a:ext cx="8988840" cy="3374280"/>
           </a:xfrm>
           <a:prstGeom prst="rect">
             <a:avLst/>
@@ -5767,7 +5764,7 @@
         <p:spPr>
           <a:xfrm>
             <a:off x="457200" y="164520"/>
-            <a:ext cx="8224200" cy="633240"/>
+            <a:ext cx="8223840" cy="632880"/>
           </a:xfrm>
           <a:prstGeom prst="rect">
             <a:avLst/>
@@ -5807,7 +5804,7 @@
         <p:spPr>
           <a:xfrm>
             <a:off x="457200" y="1744200"/>
-            <a:ext cx="8224200" cy="4520520"/>
+            <a:ext cx="8223840" cy="4520160"/>
           </a:xfrm>
           <a:prstGeom prst="rect">
             <a:avLst/>
@@ -5944,7 +5941,7 @@
         <p:spPr>
           <a:xfrm>
             <a:off x="6553080" y="6356520"/>
-            <a:ext cx="2128320" cy="359640"/>
+            <a:ext cx="2127960" cy="359280"/>
           </a:xfrm>
           <a:prstGeom prst="rect">
             <a:avLst/>
@@ -6042,7 +6039,7 @@
         <p:spPr>
           <a:xfrm>
             <a:off x="457200" y="164520"/>
-            <a:ext cx="8224200" cy="633240"/>
+            <a:ext cx="8223840" cy="632880"/>
           </a:xfrm>
           <a:prstGeom prst="rect">
             <a:avLst/>
@@ -6082,7 +6079,7 @@
         <p:spPr>
           <a:xfrm>
             <a:off x="6553080" y="6356520"/>
-            <a:ext cx="2128320" cy="359640"/>
+            <a:ext cx="2127960" cy="359280"/>
           </a:xfrm>
           <a:prstGeom prst="rect">
             <a:avLst/>
@@ -6137,7 +6134,7 @@
         <p:spPr>
           <a:xfrm>
             <a:off x="2615760" y="2698560"/>
-            <a:ext cx="1859760" cy="2555280"/>
+            <a:ext cx="1859400" cy="2554920"/>
           </a:xfrm>
           <a:prstGeom prst="rect">
             <a:avLst/>
@@ -6156,7 +6153,7 @@
         <p:spPr>
           <a:xfrm>
             <a:off x="640080" y="5815440"/>
-            <a:ext cx="3652560" cy="442080"/>
+            <a:ext cx="3652200" cy="441720"/>
           </a:xfrm>
           <a:prstGeom prst="rect">
             <a:avLst/>
@@ -6197,7 +6194,7 @@
         <p:spPr>
           <a:xfrm>
             <a:off x="5120640" y="2643120"/>
-            <a:ext cx="3778560" cy="1275120"/>
+            <a:ext cx="3778200" cy="1274760"/>
           </a:xfrm>
           <a:prstGeom prst="rect">
             <a:avLst/>
@@ -6222,7 +6219,7 @@
         <p:spPr>
           <a:xfrm>
             <a:off x="6126480" y="3959280"/>
-            <a:ext cx="1786680" cy="1732320"/>
+            <a:ext cx="1786320" cy="1731960"/>
           </a:xfrm>
           <a:prstGeom prst="rect">
             <a:avLst/>
@@ -6241,7 +6238,7 @@
         <p:spPr>
           <a:xfrm>
             <a:off x="5056560" y="5804280"/>
-            <a:ext cx="3860640" cy="442080"/>
+            <a:ext cx="3860280" cy="441720"/>
           </a:xfrm>
           <a:prstGeom prst="rect">
             <a:avLst/>
@@ -6276,7 +6273,7 @@
         <p:spPr>
           <a:xfrm>
             <a:off x="274320" y="1230480"/>
-            <a:ext cx="8686080" cy="1038240"/>
+            <a:ext cx="8685720" cy="1037880"/>
           </a:xfrm>
           <a:prstGeom prst="rect">
             <a:avLst/>
@@ -6355,7 +6352,7 @@
         <p:spPr>
           <a:xfrm>
             <a:off x="365760" y="3072240"/>
-            <a:ext cx="2189520" cy="1732320"/>
+            <a:ext cx="2189160" cy="1731960"/>
           </a:xfrm>
           <a:prstGeom prst="rect">
             <a:avLst/>
@@ -6423,7 +6420,7 @@
         <p:spPr>
           <a:xfrm>
             <a:off x="457200" y="164520"/>
-            <a:ext cx="8224200" cy="633240"/>
+            <a:ext cx="8223840" cy="632880"/>
           </a:xfrm>
           <a:prstGeom prst="rect">
             <a:avLst/>
@@ -6463,7 +6460,7 @@
         <p:spPr>
           <a:xfrm>
             <a:off x="6553080" y="6356520"/>
-            <a:ext cx="2128320" cy="359640"/>
+            <a:ext cx="2127960" cy="359280"/>
           </a:xfrm>
           <a:prstGeom prst="rect">
             <a:avLst/>
@@ -6518,7 +6515,7 @@
         <p:spPr>
           <a:xfrm>
             <a:off x="2070720" y="1712160"/>
-            <a:ext cx="4999680" cy="1642680"/>
+            <a:ext cx="4999320" cy="1642320"/>
           </a:xfrm>
           <a:prstGeom prst="rect">
             <a:avLst/>
@@ -6542,12 +6539,12 @@
           <a:prstGeom prst="line">
             <a:avLst/>
           </a:prstGeom>
-          <a:ln cap="rnd">
+          <a:ln>
             <a:solidFill>
               <a:srgbClr val="000000"/>
             </a:solidFill>
             <a:custDash>
-              <a:ds d="1225000000" sp="1225000000"/>
+              <a:ds d="197000" sp="197000"/>
             </a:custDash>
             <a:tailEnd len="med" type="triangle" w="med"/>
           </a:ln>
@@ -6562,7 +6559,7 @@
         <p:spPr>
           <a:xfrm>
             <a:off x="1047600" y="3163320"/>
-            <a:ext cx="962280" cy="675000"/>
+            <a:ext cx="961920" cy="674640"/>
           </a:xfrm>
           <a:prstGeom prst="rect">
             <a:avLst/>
@@ -6614,12 +6611,12 @@
           <a:prstGeom prst="line">
             <a:avLst/>
           </a:prstGeom>
-          <a:ln cap="rnd">
+          <a:ln>
             <a:solidFill>
               <a:srgbClr val="000000"/>
             </a:solidFill>
             <a:custDash>
-              <a:ds d="1225000000" sp="1225000000"/>
+              <a:ds d="197000" sp="197000"/>
             </a:custDash>
             <a:tailEnd len="med" type="triangle" w="med"/>
           </a:ln>
@@ -6639,12 +6636,12 @@
           <a:prstGeom prst="line">
             <a:avLst/>
           </a:prstGeom>
-          <a:ln cap="rnd">
+          <a:ln>
             <a:solidFill>
               <a:srgbClr val="000000"/>
             </a:solidFill>
             <a:custDash>
-              <a:ds d="1225000000" sp="1225000000"/>
+              <a:ds d="197000" sp="197000"/>
             </a:custDash>
             <a:tailEnd len="med" type="triangle" w="med"/>
           </a:ln>
@@ -6659,7 +6656,7 @@
         <p:spPr>
           <a:xfrm>
             <a:off x="3567600" y="3235680"/>
-            <a:ext cx="1459800" cy="603000"/>
+            <a:ext cx="1459440" cy="602640"/>
           </a:xfrm>
           <a:prstGeom prst="rect">
             <a:avLst/>
@@ -6706,7 +6703,7 @@
         <p:spPr>
           <a:xfrm>
             <a:off x="4899600" y="3775680"/>
-            <a:ext cx="1042200" cy="611640"/>
+            <a:ext cx="1041840" cy="611280"/>
           </a:xfrm>
           <a:prstGeom prst="rect">
             <a:avLst/>
@@ -6753,7 +6750,7 @@
         <p:spPr>
           <a:xfrm>
             <a:off x="1047600" y="3163680"/>
-            <a:ext cx="962280" cy="675000"/>
+            <a:ext cx="961920" cy="674640"/>
           </a:xfrm>
           <a:prstGeom prst="rect">
             <a:avLst/>
@@ -6800,7 +6797,7 @@
         <p:spPr>
           <a:xfrm>
             <a:off x="6985440" y="3108960"/>
-            <a:ext cx="1150920" cy="638280"/>
+            <a:ext cx="1150560" cy="637920"/>
           </a:xfrm>
           <a:prstGeom prst="rect">
             <a:avLst/>
@@ -6847,7 +6844,7 @@
         <p:spPr>
           <a:xfrm>
             <a:off x="777240" y="5180760"/>
-            <a:ext cx="7587720" cy="622800"/>
+            <a:ext cx="7587360" cy="622440"/>
           </a:xfrm>
           <a:prstGeom prst="rect">
             <a:avLst/>
@@ -6900,12 +6897,12 @@
           <a:prstGeom prst="line">
             <a:avLst/>
           </a:prstGeom>
-          <a:ln cap="rnd">
+          <a:ln>
             <a:solidFill>
               <a:srgbClr val="000000"/>
             </a:solidFill>
             <a:custDash>
-              <a:ds d="1225000000" sp="1225000000"/>
+              <a:ds d="197000" sp="197000"/>
             </a:custDash>
             <a:tailEnd len="med" type="triangle" w="med"/>
           </a:ln>
@@ -6969,7 +6966,7 @@
         <p:spPr>
           <a:xfrm>
             <a:off x="457200" y="164520"/>
-            <a:ext cx="8224200" cy="633240"/>
+            <a:ext cx="8223840" cy="632880"/>
           </a:xfrm>
           <a:prstGeom prst="rect">
             <a:avLst/>
@@ -7009,7 +7006,7 @@
         <p:spPr>
           <a:xfrm>
             <a:off x="6553080" y="6356520"/>
-            <a:ext cx="2128320" cy="359640"/>
+            <a:ext cx="2127960" cy="359280"/>
           </a:xfrm>
           <a:prstGeom prst="rect">
             <a:avLst/>
@@ -7058,7 +7055,7 @@
         <p:spPr>
           <a:xfrm>
             <a:off x="1349280" y="1832400"/>
-            <a:ext cx="6445080" cy="3503520"/>
+            <a:ext cx="6444720" cy="3503160"/>
           </a:xfrm>
           <a:prstGeom prst="rect">
             <a:avLst/>
@@ -7222,7 +7219,7 @@
         <p:spPr>
           <a:xfrm>
             <a:off x="316080" y="4439880"/>
-            <a:ext cx="8499240" cy="1586160"/>
+            <a:ext cx="8498880" cy="1585800"/>
           </a:xfrm>
           <a:prstGeom prst="rect">
             <a:avLst/>
@@ -7248,7 +7245,7 @@
         <p:spPr>
           <a:xfrm>
             <a:off x="2882520" y="2735280"/>
-            <a:ext cx="3378600" cy="830520"/>
+            <a:ext cx="3378240" cy="830160"/>
           </a:xfrm>
           <a:prstGeom prst="rect">
             <a:avLst/>
@@ -7273,7 +7270,7 @@
         <p:spPr>
           <a:xfrm>
             <a:off x="1681920" y="4354200"/>
-            <a:ext cx="567720" cy="491760"/>
+            <a:ext cx="567360" cy="491400"/>
           </a:xfrm>
           <a:prstGeom prst="rect">
             <a:avLst/>
@@ -7298,7 +7295,7 @@
         <p:spPr>
           <a:xfrm>
             <a:off x="1681920" y="4826880"/>
-            <a:ext cx="548280" cy="509040"/>
+            <a:ext cx="547920" cy="508680"/>
           </a:xfrm>
           <a:prstGeom prst="rect">
             <a:avLst/>
@@ -7366,7 +7363,7 @@
         <p:spPr>
           <a:xfrm>
             <a:off x="457200" y="164520"/>
-            <a:ext cx="8224200" cy="633240"/>
+            <a:ext cx="8223840" cy="632880"/>
           </a:xfrm>
           <a:prstGeom prst="rect">
             <a:avLst/>
@@ -7406,7 +7403,7 @@
         <p:spPr>
           <a:xfrm>
             <a:off x="6553080" y="6356520"/>
-            <a:ext cx="2128320" cy="359640"/>
+            <a:ext cx="2127960" cy="359280"/>
           </a:xfrm>
           <a:prstGeom prst="rect">
             <a:avLst/>
@@ -7455,7 +7452,7 @@
         <p:spPr>
           <a:xfrm>
             <a:off x="1349280" y="1472400"/>
-            <a:ext cx="6445080" cy="635760"/>
+            <a:ext cx="6444720" cy="635400"/>
           </a:xfrm>
           <a:prstGeom prst="rect">
             <a:avLst/>
@@ -7519,7 +7516,7 @@
         <p:spPr>
           <a:xfrm>
             <a:off x="316080" y="4439880"/>
-            <a:ext cx="8499240" cy="1586160"/>
+            <a:ext cx="8498880" cy="1585800"/>
           </a:xfrm>
           <a:prstGeom prst="rect">
             <a:avLst/>
@@ -7539,7 +7536,7 @@
         <p:spPr>
           <a:xfrm>
             <a:off x="2606400" y="3868560"/>
-            <a:ext cx="3931200" cy="563760"/>
+            <a:ext cx="3930840" cy="563400"/>
           </a:xfrm>
           <a:prstGeom prst="rect">
             <a:avLst/>
@@ -7585,7 +7582,7 @@
         <p:spPr>
           <a:xfrm>
             <a:off x="1471680" y="4424040"/>
-            <a:ext cx="6200640" cy="1494720"/>
+            <a:ext cx="6200280" cy="1494360"/>
           </a:xfrm>
           <a:prstGeom prst="rect">
             <a:avLst/>
@@ -7610,7 +7607,7 @@
         <p:spPr>
           <a:xfrm>
             <a:off x="3499560" y="2061360"/>
-            <a:ext cx="2144880" cy="1099800"/>
+            <a:ext cx="2144520" cy="1099440"/>
           </a:xfrm>
           <a:prstGeom prst="rect">
             <a:avLst/>
@@ -7678,7 +7675,7 @@
         <p:spPr>
           <a:xfrm>
             <a:off x="457200" y="164520"/>
-            <a:ext cx="8224200" cy="633240"/>
+            <a:ext cx="8223840" cy="632880"/>
           </a:xfrm>
           <a:prstGeom prst="rect">
             <a:avLst/>
@@ -7718,7 +7715,7 @@
         <p:spPr>
           <a:xfrm>
             <a:off x="6553080" y="6356520"/>
-            <a:ext cx="2128320" cy="359640"/>
+            <a:ext cx="2127960" cy="359280"/>
           </a:xfrm>
           <a:prstGeom prst="rect">
             <a:avLst/>
@@ -7767,7 +7764,7 @@
         <p:spPr>
           <a:xfrm>
             <a:off x="320400" y="1384560"/>
-            <a:ext cx="8501760" cy="1171080"/>
+            <a:ext cx="8501400" cy="1170720"/>
           </a:xfrm>
           <a:prstGeom prst="rect">
             <a:avLst/>
@@ -7807,7 +7804,7 @@
         <p:spPr>
           <a:xfrm>
             <a:off x="690120" y="5051880"/>
-            <a:ext cx="3378240" cy="651600"/>
+            <a:ext cx="3377880" cy="651240"/>
           </a:xfrm>
           <a:prstGeom prst="rect">
             <a:avLst/>
@@ -7847,7 +7844,7 @@
         <p:spPr>
           <a:xfrm>
             <a:off x="4812840" y="5051160"/>
-            <a:ext cx="3962520" cy="651600"/>
+            <a:ext cx="3962160" cy="651240"/>
           </a:xfrm>
           <a:prstGeom prst="rect">
             <a:avLst/>
@@ -7893,7 +7890,7 @@
         <p:spPr>
           <a:xfrm>
             <a:off x="2284560" y="2103120"/>
-            <a:ext cx="4574520" cy="2850840"/>
+            <a:ext cx="4574160" cy="2850480"/>
           </a:xfrm>
           <a:prstGeom prst="rect">
             <a:avLst/>
@@ -8294,7 +8291,7 @@
         <p:spPr>
           <a:xfrm>
             <a:off x="457200" y="164520"/>
-            <a:ext cx="8224200" cy="633240"/>
+            <a:ext cx="8223840" cy="632880"/>
           </a:xfrm>
           <a:prstGeom prst="rect">
             <a:avLst/>
@@ -8334,7 +8331,7 @@
         <p:spPr>
           <a:xfrm>
             <a:off x="6553080" y="6356520"/>
-            <a:ext cx="2128320" cy="359640"/>
+            <a:ext cx="2127960" cy="359280"/>
           </a:xfrm>
           <a:prstGeom prst="rect">
             <a:avLst/>
@@ -8383,7 +8380,7 @@
         <p:spPr>
           <a:xfrm>
             <a:off x="1189080" y="1449360"/>
-            <a:ext cx="6765480" cy="4567680"/>
+            <a:ext cx="6765120" cy="4567320"/>
           </a:xfrm>
           <a:prstGeom prst="rect">
             <a:avLst/>
@@ -8567,7 +8564,7 @@
         <p:spPr>
           <a:xfrm>
             <a:off x="457200" y="164520"/>
-            <a:ext cx="8224200" cy="633240"/>
+            <a:ext cx="8223840" cy="632880"/>
           </a:xfrm>
           <a:prstGeom prst="rect">
             <a:avLst/>
@@ -8607,7 +8604,7 @@
         <p:spPr>
           <a:xfrm>
             <a:off x="6553080" y="6356520"/>
-            <a:ext cx="2128320" cy="359640"/>
+            <a:ext cx="2127960" cy="359280"/>
           </a:xfrm>
           <a:prstGeom prst="rect">
             <a:avLst/>
@@ -8656,7 +8653,7 @@
         <p:spPr>
           <a:xfrm>
             <a:off x="640080" y="1420560"/>
-            <a:ext cx="7863120" cy="2456640"/>
+            <a:ext cx="7862760" cy="2456280"/>
           </a:xfrm>
           <a:prstGeom prst="rect">
             <a:avLst/>
@@ -8812,7 +8809,7 @@
         <p:spPr>
           <a:xfrm>
             <a:off x="1951200" y="3568320"/>
-            <a:ext cx="5240880" cy="2191680"/>
+            <a:ext cx="5240520" cy="2191320"/>
           </a:xfrm>
           <a:prstGeom prst="rect">
             <a:avLst/>

</xml_diff>

<commit_message>
fixed img in slides
</commit_message>
<xml_diff>
--- a/slides/slides.pptx
+++ b/slides/slides.pptx
@@ -198,7 +198,7 @@
           <a:bodyPr lIns="0" rIns="0" tIns="0" bIns="0" anchor="b"/>
           <a:p>
             <a:pPr algn="r"/>
-            <a:fld id="{52222F6F-F23F-48EC-9690-70A5491D15A5}" type="slidenum">
+            <a:fld id="{8B272B46-490B-4782-A011-56C07E35FBD3}" type="slidenum">
               <a:rPr lang="en-US" sz="1400">
                 <a:latin typeface="Times New Roman"/>
               </a:rPr>
@@ -233,7 +233,7 @@
       </p:grpSpPr>
       <p:sp>
         <p:nvSpPr>
-          <p:cNvPr id="175" name="PlaceHolder 1"/>
+          <p:cNvPr id="183" name="PlaceHolder 1"/>
           <p:cNvSpPr>
             <a:spLocks noGrp="1"/>
           </p:cNvSpPr>
@@ -244,7 +244,7 @@
         <p:spPr>
           <a:xfrm>
             <a:off x="946080" y="4861080"/>
-            <a:ext cx="5200200" cy="4596840"/>
+            <a:ext cx="5199840" cy="4596480"/>
           </a:xfrm>
           <a:prstGeom prst="rect">
             <a:avLst/>
@@ -259,14 +259,14 @@
       </p:sp>
       <p:sp>
         <p:nvSpPr>
-          <p:cNvPr id="176" name="CustomShape 2"/>
+          <p:cNvPr id="184" name="CustomShape 2"/>
           <p:cNvSpPr/>
           <p:nvPr/>
         </p:nvSpPr>
         <p:spPr>
           <a:xfrm>
             <a:off x="4024440" y="9725040"/>
-            <a:ext cx="3068280" cy="502920"/>
+            <a:ext cx="3067920" cy="502560"/>
           </a:xfrm>
           <a:prstGeom prst="rect">
             <a:avLst/>
@@ -284,7 +284,7 @@
                 <a:spcPct val="100000"/>
               </a:lnSpc>
             </a:pPr>
-            <a:fld id="{8E61B601-5A1E-4BD4-B6AE-06299C6421F4}" type="slidenum">
+            <a:fld id="{28F9D7F1-1FE6-4EA1-986F-B6E210B3B634}" type="slidenum">
               <a:rPr lang="en-US" sz="1200">
                 <a:solidFill>
                   <a:srgbClr val="000000"/>
@@ -322,7 +322,7 @@
       </p:grpSpPr>
       <p:sp>
         <p:nvSpPr>
-          <p:cNvPr id="191" name="PlaceHolder 1"/>
+          <p:cNvPr id="199" name="PlaceHolder 1"/>
           <p:cNvSpPr>
             <a:spLocks noGrp="1"/>
           </p:cNvSpPr>
@@ -333,7 +333,7 @@
         <p:spPr>
           <a:xfrm>
             <a:off x="946080" y="4861080"/>
-            <a:ext cx="5200920" cy="4597560"/>
+            <a:ext cx="5200560" cy="4597200"/>
           </a:xfrm>
           <a:prstGeom prst="rect">
             <a:avLst/>
@@ -348,14 +348,14 @@
       </p:sp>
       <p:sp>
         <p:nvSpPr>
-          <p:cNvPr id="192" name="CustomShape 2"/>
+          <p:cNvPr id="200" name="CustomShape 2"/>
           <p:cNvSpPr/>
           <p:nvPr/>
         </p:nvSpPr>
         <p:spPr>
           <a:xfrm>
             <a:off x="4024440" y="9725040"/>
-            <a:ext cx="3069000" cy="503640"/>
+            <a:ext cx="3068640" cy="503280"/>
           </a:xfrm>
           <a:prstGeom prst="rect">
             <a:avLst/>
@@ -373,7 +373,7 @@
                 <a:spcPct val="100000"/>
               </a:lnSpc>
             </a:pPr>
-            <a:fld id="{C7B00C16-3B3B-4C8F-B061-5EE182004B02}" type="slidenum">
+            <a:fld id="{627140F8-1D1F-4D7F-8DB0-6AFE1BBCD017}" type="slidenum">
               <a:rPr lang="en-US" sz="1200">
                 <a:solidFill>
                   <a:srgbClr val="000000"/>
@@ -411,7 +411,7 @@
       </p:grpSpPr>
       <p:sp>
         <p:nvSpPr>
-          <p:cNvPr id="193" name="PlaceHolder 1"/>
+          <p:cNvPr id="201" name="PlaceHolder 1"/>
           <p:cNvSpPr>
             <a:spLocks noGrp="1"/>
           </p:cNvSpPr>
@@ -422,7 +422,7 @@
         <p:spPr>
           <a:xfrm>
             <a:off x="946080" y="4861080"/>
-            <a:ext cx="5200920" cy="4597560"/>
+            <a:ext cx="5200560" cy="4597200"/>
           </a:xfrm>
           <a:prstGeom prst="rect">
             <a:avLst/>
@@ -437,14 +437,14 @@
       </p:sp>
       <p:sp>
         <p:nvSpPr>
-          <p:cNvPr id="194" name="CustomShape 2"/>
+          <p:cNvPr id="202" name="CustomShape 2"/>
           <p:cNvSpPr/>
           <p:nvPr/>
         </p:nvSpPr>
         <p:spPr>
           <a:xfrm>
             <a:off x="4024440" y="9725040"/>
-            <a:ext cx="3069000" cy="503640"/>
+            <a:ext cx="3068640" cy="503280"/>
           </a:xfrm>
           <a:prstGeom prst="rect">
             <a:avLst/>
@@ -462,7 +462,7 @@
                 <a:spcPct val="100000"/>
               </a:lnSpc>
             </a:pPr>
-            <a:fld id="{9E821149-54C0-4B6B-A6D7-8371988D6039}" type="slidenum">
+            <a:fld id="{E7B842C7-83F6-4845-9551-DAB764D63ED4}" type="slidenum">
               <a:rPr lang="en-US" sz="1200">
                 <a:solidFill>
                   <a:srgbClr val="000000"/>
@@ -500,7 +500,7 @@
       </p:grpSpPr>
       <p:sp>
         <p:nvSpPr>
-          <p:cNvPr id="195" name="PlaceHolder 1"/>
+          <p:cNvPr id="203" name="PlaceHolder 1"/>
           <p:cNvSpPr>
             <a:spLocks noGrp="1"/>
           </p:cNvSpPr>
@@ -511,7 +511,7 @@
         <p:spPr>
           <a:xfrm>
             <a:off x="946080" y="4861080"/>
-            <a:ext cx="5200920" cy="4597560"/>
+            <a:ext cx="5200560" cy="4597200"/>
           </a:xfrm>
           <a:prstGeom prst="rect">
             <a:avLst/>
@@ -526,14 +526,14 @@
       </p:sp>
       <p:sp>
         <p:nvSpPr>
-          <p:cNvPr id="196" name="CustomShape 2"/>
+          <p:cNvPr id="204" name="CustomShape 2"/>
           <p:cNvSpPr/>
           <p:nvPr/>
         </p:nvSpPr>
         <p:spPr>
           <a:xfrm>
             <a:off x="4024440" y="9725040"/>
-            <a:ext cx="3069000" cy="503640"/>
+            <a:ext cx="3068640" cy="503280"/>
           </a:xfrm>
           <a:prstGeom prst="rect">
             <a:avLst/>
@@ -551,7 +551,7 @@
                 <a:spcPct val="100000"/>
               </a:lnSpc>
             </a:pPr>
-            <a:fld id="{B6F51B08-645C-49D3-B63D-B92426755B6D}" type="slidenum">
+            <a:fld id="{75919AAC-D0D4-4231-A2FF-57AE319C25CB}" type="slidenum">
               <a:rPr lang="en-US" sz="1200">
                 <a:solidFill>
                   <a:srgbClr val="000000"/>
@@ -589,7 +589,7 @@
       </p:grpSpPr>
       <p:sp>
         <p:nvSpPr>
-          <p:cNvPr id="197" name="PlaceHolder 1"/>
+          <p:cNvPr id="205" name="PlaceHolder 1"/>
           <p:cNvSpPr>
             <a:spLocks noGrp="1"/>
           </p:cNvSpPr>
@@ -600,7 +600,7 @@
         <p:spPr>
           <a:xfrm>
             <a:off x="946080" y="4861080"/>
-            <a:ext cx="5200920" cy="4597560"/>
+            <a:ext cx="5200560" cy="4597200"/>
           </a:xfrm>
           <a:prstGeom prst="rect">
             <a:avLst/>
@@ -615,14 +615,14 @@
       </p:sp>
       <p:sp>
         <p:nvSpPr>
-          <p:cNvPr id="198" name="CustomShape 2"/>
+          <p:cNvPr id="206" name="CustomShape 2"/>
           <p:cNvSpPr/>
           <p:nvPr/>
         </p:nvSpPr>
         <p:spPr>
           <a:xfrm>
             <a:off x="4024440" y="9725040"/>
-            <a:ext cx="3069000" cy="503640"/>
+            <a:ext cx="3068640" cy="503280"/>
           </a:xfrm>
           <a:prstGeom prst="rect">
             <a:avLst/>
@@ -640,7 +640,7 @@
                 <a:spcPct val="100000"/>
               </a:lnSpc>
             </a:pPr>
-            <a:fld id="{BE1DF631-DFFB-4024-BF15-F433271668F2}" type="slidenum">
+            <a:fld id="{89AA5F9C-A2C4-412F-9BAB-E07A0BFBE863}" type="slidenum">
               <a:rPr lang="en-US" sz="1200">
                 <a:solidFill>
                   <a:srgbClr val="000000"/>
@@ -678,7 +678,7 @@
       </p:grpSpPr>
       <p:sp>
         <p:nvSpPr>
-          <p:cNvPr id="177" name="PlaceHolder 1"/>
+          <p:cNvPr id="185" name="PlaceHolder 1"/>
           <p:cNvSpPr>
             <a:spLocks noGrp="1"/>
           </p:cNvSpPr>
@@ -689,7 +689,7 @@
         <p:spPr>
           <a:xfrm>
             <a:off x="946080" y="4861080"/>
-            <a:ext cx="5200920" cy="4597560"/>
+            <a:ext cx="5200560" cy="4597200"/>
           </a:xfrm>
           <a:prstGeom prst="rect">
             <a:avLst/>
@@ -704,14 +704,14 @@
       </p:sp>
       <p:sp>
         <p:nvSpPr>
-          <p:cNvPr id="178" name="CustomShape 2"/>
+          <p:cNvPr id="186" name="CustomShape 2"/>
           <p:cNvSpPr/>
           <p:nvPr/>
         </p:nvSpPr>
         <p:spPr>
           <a:xfrm>
             <a:off x="4024440" y="9725040"/>
-            <a:ext cx="3069000" cy="503640"/>
+            <a:ext cx="3068640" cy="503280"/>
           </a:xfrm>
           <a:prstGeom prst="rect">
             <a:avLst/>
@@ -729,7 +729,7 @@
                 <a:spcPct val="100000"/>
               </a:lnSpc>
             </a:pPr>
-            <a:fld id="{A52A8191-6545-4484-AEDA-A0BE979629A0}" type="slidenum">
+            <a:fld id="{629774A9-637A-4971-A2E7-983A838EF882}" type="slidenum">
               <a:rPr lang="en-US" sz="1200">
                 <a:solidFill>
                   <a:srgbClr val="000000"/>
@@ -767,7 +767,7 @@
       </p:grpSpPr>
       <p:sp>
         <p:nvSpPr>
-          <p:cNvPr id="179" name="PlaceHolder 1"/>
+          <p:cNvPr id="187" name="PlaceHolder 1"/>
           <p:cNvSpPr>
             <a:spLocks noGrp="1"/>
           </p:cNvSpPr>
@@ -778,7 +778,7 @@
         <p:spPr>
           <a:xfrm>
             <a:off x="946080" y="4861080"/>
-            <a:ext cx="5200920" cy="4597560"/>
+            <a:ext cx="5200560" cy="4597200"/>
           </a:xfrm>
           <a:prstGeom prst="rect">
             <a:avLst/>
@@ -793,14 +793,14 @@
       </p:sp>
       <p:sp>
         <p:nvSpPr>
-          <p:cNvPr id="180" name="CustomShape 2"/>
+          <p:cNvPr id="188" name="CustomShape 2"/>
           <p:cNvSpPr/>
           <p:nvPr/>
         </p:nvSpPr>
         <p:spPr>
           <a:xfrm>
             <a:off x="4024440" y="9725040"/>
-            <a:ext cx="3069000" cy="503640"/>
+            <a:ext cx="3068640" cy="503280"/>
           </a:xfrm>
           <a:prstGeom prst="rect">
             <a:avLst/>
@@ -818,7 +818,7 @@
                 <a:spcPct val="100000"/>
               </a:lnSpc>
             </a:pPr>
-            <a:fld id="{3597241F-0499-4014-BD56-8BC76A31D328}" type="slidenum">
+            <a:fld id="{11D794BF-FC6C-4A2B-A6F5-B77B87B017D2}" type="slidenum">
               <a:rPr lang="en-US" sz="1200">
                 <a:solidFill>
                   <a:srgbClr val="000000"/>
@@ -856,7 +856,7 @@
       </p:grpSpPr>
       <p:sp>
         <p:nvSpPr>
-          <p:cNvPr id="181" name="PlaceHolder 1"/>
+          <p:cNvPr id="189" name="PlaceHolder 1"/>
           <p:cNvSpPr>
             <a:spLocks noGrp="1"/>
           </p:cNvSpPr>
@@ -867,7 +867,7 @@
         <p:spPr>
           <a:xfrm>
             <a:off x="946080" y="4861080"/>
-            <a:ext cx="5200920" cy="4597560"/>
+            <a:ext cx="5200560" cy="4597200"/>
           </a:xfrm>
           <a:prstGeom prst="rect">
             <a:avLst/>
@@ -882,14 +882,14 @@
       </p:sp>
       <p:sp>
         <p:nvSpPr>
-          <p:cNvPr id="182" name="CustomShape 2"/>
+          <p:cNvPr id="190" name="CustomShape 2"/>
           <p:cNvSpPr/>
           <p:nvPr/>
         </p:nvSpPr>
         <p:spPr>
           <a:xfrm>
             <a:off x="4024440" y="9725040"/>
-            <a:ext cx="3069000" cy="503640"/>
+            <a:ext cx="3068640" cy="503280"/>
           </a:xfrm>
           <a:prstGeom prst="rect">
             <a:avLst/>
@@ -907,7 +907,7 @@
                 <a:spcPct val="100000"/>
               </a:lnSpc>
             </a:pPr>
-            <a:fld id="{65944C21-F277-4AE5-8F3C-A5E0A8BECD27}" type="slidenum">
+            <a:fld id="{2224D8D8-AD20-4844-B2ED-CD36C829906B}" type="slidenum">
               <a:rPr lang="en-US" sz="1200">
                 <a:solidFill>
                   <a:srgbClr val="000000"/>
@@ -945,7 +945,7 @@
       </p:grpSpPr>
       <p:sp>
         <p:nvSpPr>
-          <p:cNvPr id="183" name="PlaceHolder 1"/>
+          <p:cNvPr id="191" name="PlaceHolder 1"/>
           <p:cNvSpPr>
             <a:spLocks noGrp="1"/>
           </p:cNvSpPr>
@@ -956,7 +956,7 @@
         <p:spPr>
           <a:xfrm>
             <a:off x="946080" y="4861080"/>
-            <a:ext cx="5200920" cy="4597560"/>
+            <a:ext cx="5200560" cy="4597200"/>
           </a:xfrm>
           <a:prstGeom prst="rect">
             <a:avLst/>
@@ -971,14 +971,14 @@
       </p:sp>
       <p:sp>
         <p:nvSpPr>
-          <p:cNvPr id="184" name="CustomShape 2"/>
+          <p:cNvPr id="192" name="CustomShape 2"/>
           <p:cNvSpPr/>
           <p:nvPr/>
         </p:nvSpPr>
         <p:spPr>
           <a:xfrm>
             <a:off x="4024440" y="9725040"/>
-            <a:ext cx="3069000" cy="503640"/>
+            <a:ext cx="3068640" cy="503280"/>
           </a:xfrm>
           <a:prstGeom prst="rect">
             <a:avLst/>
@@ -996,7 +996,7 @@
                 <a:spcPct val="100000"/>
               </a:lnSpc>
             </a:pPr>
-            <a:fld id="{E89647DE-F979-463A-8EE1-42190CE0D9B4}" type="slidenum">
+            <a:fld id="{9D587B76-8853-4DFB-9263-F1DF2406EB51}" type="slidenum">
               <a:rPr lang="en-US" sz="1200">
                 <a:solidFill>
                   <a:srgbClr val="000000"/>
@@ -1034,7 +1034,7 @@
       </p:grpSpPr>
       <p:sp>
         <p:nvSpPr>
-          <p:cNvPr id="185" name="PlaceHolder 1"/>
+          <p:cNvPr id="193" name="PlaceHolder 1"/>
           <p:cNvSpPr>
             <a:spLocks noGrp="1"/>
           </p:cNvSpPr>
@@ -1045,7 +1045,7 @@
         <p:spPr>
           <a:xfrm>
             <a:off x="946080" y="4861080"/>
-            <a:ext cx="5200920" cy="4597560"/>
+            <a:ext cx="5200560" cy="4597200"/>
           </a:xfrm>
           <a:prstGeom prst="rect">
             <a:avLst/>
@@ -1060,14 +1060,14 @@
       </p:sp>
       <p:sp>
         <p:nvSpPr>
-          <p:cNvPr id="186" name="CustomShape 2"/>
+          <p:cNvPr id="194" name="CustomShape 2"/>
           <p:cNvSpPr/>
           <p:nvPr/>
         </p:nvSpPr>
         <p:spPr>
           <a:xfrm>
             <a:off x="4024440" y="9725040"/>
-            <a:ext cx="3069000" cy="503640"/>
+            <a:ext cx="3068640" cy="503280"/>
           </a:xfrm>
           <a:prstGeom prst="rect">
             <a:avLst/>
@@ -1085,7 +1085,7 @@
                 <a:spcPct val="100000"/>
               </a:lnSpc>
             </a:pPr>
-            <a:fld id="{329A4BEB-6B90-417A-B113-C38BA17D01E0}" type="slidenum">
+            <a:fld id="{A2F863D6-1FC4-4C06-A200-1C4A25C05BFE}" type="slidenum">
               <a:rPr lang="en-US" sz="1200">
                 <a:solidFill>
                   <a:srgbClr val="000000"/>
@@ -1123,7 +1123,7 @@
       </p:grpSpPr>
       <p:sp>
         <p:nvSpPr>
-          <p:cNvPr id="187" name="PlaceHolder 1"/>
+          <p:cNvPr id="195" name="PlaceHolder 1"/>
           <p:cNvSpPr>
             <a:spLocks noGrp="1"/>
           </p:cNvSpPr>
@@ -1134,7 +1134,7 @@
         <p:spPr>
           <a:xfrm>
             <a:off x="946080" y="4861080"/>
-            <a:ext cx="5200920" cy="4597560"/>
+            <a:ext cx="5200560" cy="4597200"/>
           </a:xfrm>
           <a:prstGeom prst="rect">
             <a:avLst/>
@@ -1149,14 +1149,14 @@
       </p:sp>
       <p:sp>
         <p:nvSpPr>
-          <p:cNvPr id="188" name="CustomShape 2"/>
+          <p:cNvPr id="196" name="CustomShape 2"/>
           <p:cNvSpPr/>
           <p:nvPr/>
         </p:nvSpPr>
         <p:spPr>
           <a:xfrm>
             <a:off x="4024440" y="9725040"/>
-            <a:ext cx="3069000" cy="503640"/>
+            <a:ext cx="3068640" cy="503280"/>
           </a:xfrm>
           <a:prstGeom prst="rect">
             <a:avLst/>
@@ -1174,7 +1174,7 @@
                 <a:spcPct val="100000"/>
               </a:lnSpc>
             </a:pPr>
-            <a:fld id="{33A66086-C543-454D-955E-AD61814AD060}" type="slidenum">
+            <a:fld id="{6CAB7C66-C078-4D1D-B999-C7E1EEE212E7}" type="slidenum">
               <a:rPr lang="en-US" sz="1200">
                 <a:solidFill>
                   <a:srgbClr val="000000"/>
@@ -1212,7 +1212,7 @@
       </p:grpSpPr>
       <p:sp>
         <p:nvSpPr>
-          <p:cNvPr id="189" name="PlaceHolder 1"/>
+          <p:cNvPr id="197" name="PlaceHolder 1"/>
           <p:cNvSpPr>
             <a:spLocks noGrp="1"/>
           </p:cNvSpPr>
@@ -1223,7 +1223,7 @@
         <p:spPr>
           <a:xfrm>
             <a:off x="946080" y="4861080"/>
-            <a:ext cx="5200920" cy="4597560"/>
+            <a:ext cx="5200560" cy="4597200"/>
           </a:xfrm>
           <a:prstGeom prst="rect">
             <a:avLst/>
@@ -1238,14 +1238,14 @@
       </p:sp>
       <p:sp>
         <p:nvSpPr>
-          <p:cNvPr id="190" name="CustomShape 2"/>
+          <p:cNvPr id="198" name="CustomShape 2"/>
           <p:cNvSpPr/>
           <p:nvPr/>
         </p:nvSpPr>
         <p:spPr>
           <a:xfrm>
             <a:off x="4024440" y="9725040"/>
-            <a:ext cx="3069000" cy="503640"/>
+            <a:ext cx="3068640" cy="503280"/>
           </a:xfrm>
           <a:prstGeom prst="rect">
             <a:avLst/>
@@ -1263,7 +1263,7 @@
                 <a:spcPct val="100000"/>
               </a:lnSpc>
             </a:pPr>
-            <a:fld id="{4E6279D6-0C0A-4507-86C9-3D1DDE1F897A}" type="slidenum">
+            <a:fld id="{CC4A3D2C-51E7-4A38-BA52-F2E80560B46C}" type="slidenum">
               <a:rPr lang="en-US" sz="1200">
                 <a:solidFill>
                   <a:srgbClr val="000000"/>
@@ -3631,7 +3631,7 @@
         <p:spPr>
           <a:xfrm>
             <a:off x="0" y="932760"/>
-            <a:ext cx="9137160" cy="108360"/>
+            <a:ext cx="9136800" cy="108000"/>
           </a:xfrm>
           <a:prstGeom prst="rect">
             <a:avLst/>
@@ -3653,7 +3653,7 @@
         <p:spPr>
           <a:xfrm>
             <a:off x="7707960" y="6564960"/>
-            <a:ext cx="907560" cy="907560"/>
+            <a:ext cx="907200" cy="907200"/>
           </a:xfrm>
           <a:prstGeom prst="rect">
             <a:avLst/>
@@ -3679,7 +3679,7 @@
         <p:spPr>
           <a:xfrm>
             <a:off x="0" y="0"/>
-            <a:ext cx="9146520" cy="1380600"/>
+            <a:ext cx="9146160" cy="1380240"/>
           </a:xfrm>
           <a:prstGeom prst="rect">
             <a:avLst/>
@@ -3700,7 +3700,7 @@
         </p:nvPicPr>
         <p:blipFill>
           <a:blip r:embed="rId3"/>
-          <a:srcRect l="0" t="0" r="49882" b="45030"/>
+          <a:srcRect l="0" t="0" r="49878" b="45019"/>
           <a:stretch>
             <a:fillRect/>
           </a:stretch>
@@ -3708,7 +3708,7 @@
         <p:spPr>
           <a:xfrm>
             <a:off x="6619320" y="1393560"/>
-            <a:ext cx="2515680" cy="953280"/>
+            <a:ext cx="2515320" cy="952920"/>
           </a:xfrm>
           <a:prstGeom prst="rect">
             <a:avLst/>
@@ -3726,7 +3726,7 @@
         </p:nvPicPr>
         <p:blipFill>
           <a:blip r:embed="rId4"/>
-          <a:srcRect l="0" t="0" r="2170" b="13115"/>
+          <a:srcRect l="0" t="0" r="2158" b="13070"/>
           <a:stretch>
             <a:fillRect/>
           </a:stretch>
@@ -3734,7 +3734,7 @@
         <p:spPr>
           <a:xfrm>
             <a:off x="0" y="1393560"/>
-            <a:ext cx="3393720" cy="876600"/>
+            <a:ext cx="3393360" cy="876240"/>
           </a:xfrm>
           <a:prstGeom prst="rect">
             <a:avLst/>
@@ -3951,7 +3951,7 @@
         <p:spPr>
           <a:xfrm>
             <a:off x="0" y="932760"/>
-            <a:ext cx="9137880" cy="109080"/>
+            <a:ext cx="9137520" cy="108720"/>
           </a:xfrm>
           <a:prstGeom prst="rect">
             <a:avLst/>
@@ -3973,7 +3973,7 @@
         <p:spPr>
           <a:xfrm>
             <a:off x="7707960" y="6564960"/>
-            <a:ext cx="908280" cy="908280"/>
+            <a:ext cx="907920" cy="907920"/>
           </a:xfrm>
           <a:prstGeom prst="rect">
             <a:avLst/>
@@ -4184,7 +4184,7 @@
         <p:spPr>
           <a:xfrm>
             <a:off x="720" y="2305440"/>
-            <a:ext cx="9137160" cy="1734840"/>
+            <a:ext cx="9136800" cy="1734480"/>
           </a:xfrm>
           <a:prstGeom prst="rect">
             <a:avLst/>
@@ -4241,7 +4241,7 @@
         <p:spPr>
           <a:xfrm>
             <a:off x="1189440" y="4264560"/>
-            <a:ext cx="6759720" cy="542160"/>
+            <a:ext cx="6759360" cy="541800"/>
           </a:xfrm>
           <a:prstGeom prst="rect">
             <a:avLst/>
@@ -4281,7 +4281,7 @@
         <p:spPr>
           <a:xfrm>
             <a:off x="10207080" y="2718720"/>
-            <a:ext cx="177840" cy="454680"/>
+            <a:ext cx="177480" cy="454320"/>
           </a:xfrm>
           <a:prstGeom prst="rect">
             <a:avLst/>
@@ -4301,7 +4301,7 @@
         <p:spPr>
           <a:xfrm>
             <a:off x="1931040" y="5852160"/>
-            <a:ext cx="5211360" cy="439920"/>
+            <a:ext cx="5211000" cy="439560"/>
           </a:xfrm>
           <a:prstGeom prst="rect">
             <a:avLst/>
@@ -4350,7 +4350,7 @@
         <p:spPr>
           <a:xfrm>
             <a:off x="1330920" y="2082960"/>
-            <a:ext cx="907560" cy="907560"/>
+            <a:ext cx="907200" cy="907200"/>
           </a:xfrm>
           <a:prstGeom prst="rect">
             <a:avLst/>
@@ -4370,7 +4370,7 @@
         <p:spPr>
           <a:xfrm>
             <a:off x="1931040" y="5486400"/>
-            <a:ext cx="5211360" cy="439920"/>
+            <a:ext cx="5211000" cy="439560"/>
           </a:xfrm>
           <a:prstGeom prst="rect">
             <a:avLst/>
@@ -4419,7 +4419,7 @@
         <p:spPr>
           <a:xfrm>
             <a:off x="6035040" y="1828800"/>
-            <a:ext cx="2919960" cy="999720"/>
+            <a:ext cx="2919600" cy="999360"/>
           </a:xfrm>
           <a:prstGeom prst="rect">
             <a:avLst/>
@@ -4439,7 +4439,7 @@
         <p:spPr>
           <a:xfrm>
             <a:off x="6309360" y="2194560"/>
-            <a:ext cx="1456920" cy="359640"/>
+            <a:ext cx="1456560" cy="359280"/>
           </a:xfrm>
           <a:prstGeom prst="rect">
             <a:avLst/>
@@ -4459,7 +4459,7 @@
         <p:spPr>
           <a:xfrm>
             <a:off x="1371600" y="3657600"/>
-            <a:ext cx="2919960" cy="1091160"/>
+            <a:ext cx="2919600" cy="1090800"/>
           </a:xfrm>
           <a:prstGeom prst="rect">
             <a:avLst/>
@@ -4479,7 +4479,7 @@
         <p:spPr>
           <a:xfrm>
             <a:off x="6547680" y="1463040"/>
-            <a:ext cx="2554200" cy="908280"/>
+            <a:ext cx="2553840" cy="907920"/>
           </a:xfrm>
           <a:prstGeom prst="rect">
             <a:avLst/>
@@ -4501,7 +4501,7 @@
         <p:spPr>
           <a:xfrm>
             <a:off x="3358440" y="4705200"/>
-            <a:ext cx="2421360" cy="431640"/>
+            <a:ext cx="2421000" cy="431280"/>
           </a:xfrm>
           <a:prstGeom prst="rect">
             <a:avLst/>
@@ -4580,14 +4580,14 @@
       </p:grpSpPr>
       <p:sp>
         <p:nvSpPr>
-          <p:cNvPr id="163" name="CustomShape 1"/>
+          <p:cNvPr id="171" name="CustomShape 1"/>
           <p:cNvSpPr/>
           <p:nvPr/>
         </p:nvSpPr>
         <p:spPr>
           <a:xfrm>
             <a:off x="457200" y="164520"/>
-            <a:ext cx="8223480" cy="632520"/>
+            <a:ext cx="8223120" cy="632160"/>
           </a:xfrm>
           <a:prstGeom prst="rect">
             <a:avLst/>
@@ -4620,14 +4620,14 @@
       </p:sp>
       <p:sp>
         <p:nvSpPr>
-          <p:cNvPr id="164" name="CustomShape 2"/>
+          <p:cNvPr id="172" name="CustomShape 2"/>
           <p:cNvSpPr/>
           <p:nvPr/>
         </p:nvSpPr>
         <p:spPr>
           <a:xfrm>
             <a:off x="6553080" y="6356520"/>
-            <a:ext cx="2127600" cy="358920"/>
+            <a:ext cx="2127240" cy="358560"/>
           </a:xfrm>
           <a:prstGeom prst="rect">
             <a:avLst/>
@@ -4669,14 +4669,14 @@
       </p:sp>
       <p:sp>
         <p:nvSpPr>
-          <p:cNvPr id="165" name="CustomShape 3"/>
+          <p:cNvPr id="173" name="CustomShape 3"/>
           <p:cNvSpPr/>
           <p:nvPr/>
         </p:nvSpPr>
         <p:spPr>
           <a:xfrm>
             <a:off x="1188720" y="1418040"/>
-            <a:ext cx="6765840" cy="4571280"/>
+            <a:ext cx="6765480" cy="4570920"/>
           </a:xfrm>
           <a:prstGeom prst="rect">
             <a:avLst/>
@@ -4882,14 +4882,14 @@
       </p:grpSpPr>
       <p:sp>
         <p:nvSpPr>
-          <p:cNvPr id="166" name="CustomShape 1"/>
+          <p:cNvPr id="174" name="CustomShape 1"/>
           <p:cNvSpPr/>
           <p:nvPr/>
         </p:nvSpPr>
         <p:spPr>
           <a:xfrm>
             <a:off x="457200" y="164520"/>
-            <a:ext cx="8223480" cy="632520"/>
+            <a:ext cx="8223120" cy="632160"/>
           </a:xfrm>
           <a:prstGeom prst="rect">
             <a:avLst/>
@@ -4922,14 +4922,14 @@
       </p:sp>
       <p:sp>
         <p:nvSpPr>
-          <p:cNvPr id="167" name="CustomShape 2"/>
+          <p:cNvPr id="175" name="CustomShape 2"/>
           <p:cNvSpPr/>
           <p:nvPr/>
         </p:nvSpPr>
         <p:spPr>
           <a:xfrm>
             <a:off x="6553080" y="6356520"/>
-            <a:ext cx="2127600" cy="358920"/>
+            <a:ext cx="2127240" cy="358560"/>
           </a:xfrm>
           <a:prstGeom prst="rect">
             <a:avLst/>
@@ -4971,7 +4971,7 @@
       </p:sp>
       <p:pic>
         <p:nvPicPr>
-          <p:cNvPr id="168" name="" descr=""/>
+          <p:cNvPr id="176" name="" descr=""/>
           <p:cNvPicPr/>
           <p:nvPr/>
         </p:nvPicPr>
@@ -4984,7 +4984,7 @@
         <p:spPr>
           <a:xfrm>
             <a:off x="892080" y="1047960"/>
-            <a:ext cx="7419240" cy="5590440"/>
+            <a:ext cx="7418880" cy="5590080"/>
           </a:xfrm>
           <a:prstGeom prst="rect">
             <a:avLst/>
@@ -5045,14 +5045,14 @@
       </p:grpSpPr>
       <p:sp>
         <p:nvSpPr>
-          <p:cNvPr id="169" name="CustomShape 1"/>
+          <p:cNvPr id="177" name="CustomShape 1"/>
           <p:cNvSpPr/>
           <p:nvPr/>
         </p:nvSpPr>
         <p:spPr>
           <a:xfrm>
             <a:off x="875160" y="3151800"/>
-            <a:ext cx="7388640" cy="711720"/>
+            <a:ext cx="7388280" cy="711360"/>
           </a:xfrm>
           <a:prstGeom prst="rect">
             <a:avLst/>
@@ -5129,14 +5129,14 @@
       </p:grpSpPr>
       <p:sp>
         <p:nvSpPr>
-          <p:cNvPr id="170" name="CustomShape 1"/>
+          <p:cNvPr id="178" name="CustomShape 1"/>
           <p:cNvSpPr/>
           <p:nvPr/>
         </p:nvSpPr>
         <p:spPr>
           <a:xfrm>
             <a:off x="457200" y="164520"/>
-            <a:ext cx="8223480" cy="632520"/>
+            <a:ext cx="8223120" cy="632160"/>
           </a:xfrm>
           <a:prstGeom prst="rect">
             <a:avLst/>
@@ -5169,14 +5169,14 @@
       </p:sp>
       <p:sp>
         <p:nvSpPr>
-          <p:cNvPr id="171" name="CustomShape 2"/>
+          <p:cNvPr id="179" name="CustomShape 2"/>
           <p:cNvSpPr/>
           <p:nvPr/>
         </p:nvSpPr>
         <p:spPr>
           <a:xfrm>
             <a:off x="6553080" y="6356520"/>
-            <a:ext cx="2127600" cy="358920"/>
+            <a:ext cx="2127240" cy="358560"/>
           </a:xfrm>
           <a:prstGeom prst="rect">
             <a:avLst/>
@@ -5208,7 +5208,7 @@
       </p:sp>
       <p:pic>
         <p:nvPicPr>
-          <p:cNvPr id="172" name="" descr=""/>
+          <p:cNvPr id="180" name="" descr=""/>
           <p:cNvPicPr/>
           <p:nvPr/>
         </p:nvPicPr>
@@ -5221,7 +5221,7 @@
         <p:spPr>
           <a:xfrm>
             <a:off x="75960" y="1958040"/>
-            <a:ext cx="8988480" cy="3373920"/>
+            <a:ext cx="8988120" cy="3373560"/>
           </a:xfrm>
           <a:prstGeom prst="rect">
             <a:avLst/>
@@ -5282,14 +5282,14 @@
       </p:grpSpPr>
       <p:sp>
         <p:nvSpPr>
-          <p:cNvPr id="173" name="CustomShape 1"/>
+          <p:cNvPr id="181" name="CustomShape 1"/>
           <p:cNvSpPr/>
           <p:nvPr/>
         </p:nvSpPr>
         <p:spPr>
           <a:xfrm>
             <a:off x="457200" y="164520"/>
-            <a:ext cx="8223480" cy="632520"/>
+            <a:ext cx="8223120" cy="632160"/>
           </a:xfrm>
           <a:prstGeom prst="rect">
             <a:avLst/>
@@ -5322,14 +5322,14 @@
       </p:sp>
       <p:sp>
         <p:nvSpPr>
-          <p:cNvPr id="174" name="CustomShape 2"/>
+          <p:cNvPr id="182" name="CustomShape 2"/>
           <p:cNvSpPr/>
           <p:nvPr/>
         </p:nvSpPr>
         <p:spPr>
           <a:xfrm>
             <a:off x="594360" y="1873440"/>
-            <a:ext cx="7953840" cy="1004400"/>
+            <a:ext cx="7953480" cy="1004040"/>
           </a:xfrm>
           <a:prstGeom prst="rect">
             <a:avLst/>
@@ -5455,7 +5455,7 @@
         <p:spPr>
           <a:xfrm>
             <a:off x="457200" y="164520"/>
-            <a:ext cx="8223480" cy="632520"/>
+            <a:ext cx="8223120" cy="632160"/>
           </a:xfrm>
           <a:prstGeom prst="rect">
             <a:avLst/>
@@ -5495,7 +5495,7 @@
         <p:spPr>
           <a:xfrm>
             <a:off x="6553080" y="6356520"/>
-            <a:ext cx="2127600" cy="358920"/>
+            <a:ext cx="2127240" cy="358560"/>
           </a:xfrm>
           <a:prstGeom prst="rect">
             <a:avLst/>
@@ -5550,7 +5550,7 @@
         <p:spPr>
           <a:xfrm>
             <a:off x="2615760" y="2698560"/>
-            <a:ext cx="1859040" cy="2554560"/>
+            <a:ext cx="1858680" cy="2554200"/>
           </a:xfrm>
           <a:prstGeom prst="rect">
             <a:avLst/>
@@ -5569,7 +5569,7 @@
         <p:spPr>
           <a:xfrm>
             <a:off x="640080" y="5815440"/>
-            <a:ext cx="3651840" cy="441360"/>
+            <a:ext cx="3651480" cy="441000"/>
           </a:xfrm>
           <a:prstGeom prst="rect">
             <a:avLst/>
@@ -5610,7 +5610,7 @@
         <p:spPr>
           <a:xfrm>
             <a:off x="5120640" y="2643120"/>
-            <a:ext cx="3777840" cy="1274400"/>
+            <a:ext cx="3777480" cy="1274040"/>
           </a:xfrm>
           <a:prstGeom prst="rect">
             <a:avLst/>
@@ -5635,7 +5635,7 @@
         <p:spPr>
           <a:xfrm>
             <a:off x="6126480" y="3959280"/>
-            <a:ext cx="1785960" cy="1731600"/>
+            <a:ext cx="1785600" cy="1731240"/>
           </a:xfrm>
           <a:prstGeom prst="rect">
             <a:avLst/>
@@ -5654,7 +5654,7 @@
         <p:spPr>
           <a:xfrm>
             <a:off x="5056560" y="5804280"/>
-            <a:ext cx="3859920" cy="441360"/>
+            <a:ext cx="3859560" cy="441000"/>
           </a:xfrm>
           <a:prstGeom prst="rect">
             <a:avLst/>
@@ -5689,7 +5689,7 @@
         <p:spPr>
           <a:xfrm>
             <a:off x="274320" y="1230480"/>
-            <a:ext cx="8685360" cy="1037520"/>
+            <a:ext cx="8685000" cy="1037160"/>
           </a:xfrm>
           <a:prstGeom prst="rect">
             <a:avLst/>
@@ -5768,7 +5768,7 @@
         <p:spPr>
           <a:xfrm>
             <a:off x="365760" y="3072240"/>
-            <a:ext cx="2188800" cy="1731600"/>
+            <a:ext cx="2188440" cy="1731240"/>
           </a:xfrm>
           <a:prstGeom prst="rect">
             <a:avLst/>
@@ -5836,7 +5836,7 @@
         <p:spPr>
           <a:xfrm>
             <a:off x="457200" y="164520"/>
-            <a:ext cx="8223480" cy="632520"/>
+            <a:ext cx="8223120" cy="632160"/>
           </a:xfrm>
           <a:prstGeom prst="rect">
             <a:avLst/>
@@ -5876,7 +5876,7 @@
         <p:spPr>
           <a:xfrm>
             <a:off x="6553080" y="6356520"/>
-            <a:ext cx="2127600" cy="358920"/>
+            <a:ext cx="2127240" cy="358560"/>
           </a:xfrm>
           <a:prstGeom prst="rect">
             <a:avLst/>
@@ -5916,9 +5916,317 @@
           </a:p>
         </p:txBody>
       </p:sp>
+      <p:sp>
+        <p:nvSpPr>
+          <p:cNvPr id="106" name="CustomShape 3"/>
+          <p:cNvSpPr/>
+          <p:nvPr/>
+        </p:nvSpPr>
+        <p:spPr>
+          <a:xfrm>
+            <a:off x="1839600" y="3739320"/>
+            <a:ext cx="961200" cy="673920"/>
+          </a:xfrm>
+          <a:prstGeom prst="rect">
+            <a:avLst/>
+          </a:prstGeom>
+          <a:noFill/>
+          <a:ln>
+            <a:noFill/>
+          </a:ln>
+        </p:spPr>
+        <p:txBody>
+          <a:bodyPr lIns="90000" rIns="90000" tIns="45000" bIns="45000"/>
+          <a:p>
+            <a:r>
+              <a:rPr lang="en-US">
+                <a:solidFill>
+                  <a:srgbClr val="3465a4"/>
+                </a:solidFill>
+                <a:latin typeface="Arial"/>
+              </a:rPr>
+              <a:t>release</a:t>
+            </a:r>
+            <a:endParaRPr/>
+          </a:p>
+          <a:p>
+            <a:r>
+              <a:rPr lang="en-US">
+                <a:solidFill>
+                  <a:srgbClr val="3465a4"/>
+                </a:solidFill>
+                <a:latin typeface="Arial"/>
+              </a:rPr>
+              <a:t>time</a:t>
+            </a:r>
+            <a:endParaRPr/>
+          </a:p>
+        </p:txBody>
+      </p:sp>
+      <p:sp>
+        <p:nvSpPr>
+          <p:cNvPr id="107" name="Line 4"/>
+          <p:cNvSpPr/>
+          <p:nvPr/>
+        </p:nvSpPr>
+        <p:spPr>
+          <a:xfrm flipV="1">
+            <a:off x="2651760" y="3988800"/>
+            <a:ext cx="560160" cy="126000"/>
+          </a:xfrm>
+          <a:prstGeom prst="line">
+            <a:avLst/>
+          </a:prstGeom>
+          <a:ln>
+            <a:solidFill>
+              <a:srgbClr val="000000"/>
+            </a:solidFill>
+            <a:custDash>
+              <a:ds d="197000" sp="197000"/>
+            </a:custDash>
+            <a:tailEnd len="med" type="triangle" w="med"/>
+          </a:ln>
+        </p:spPr>
+      </p:sp>
+      <p:sp>
+        <p:nvSpPr>
+          <p:cNvPr id="108" name="CustomShape 5"/>
+          <p:cNvSpPr/>
+          <p:nvPr/>
+        </p:nvSpPr>
+        <p:spPr>
+          <a:xfrm>
+            <a:off x="3243600" y="4315680"/>
+            <a:ext cx="1458720" cy="601920"/>
+          </a:xfrm>
+          <a:prstGeom prst="rect">
+            <a:avLst/>
+          </a:prstGeom>
+          <a:noFill/>
+          <a:ln>
+            <a:noFill/>
+          </a:ln>
+        </p:spPr>
+        <p:txBody>
+          <a:bodyPr lIns="90000" rIns="90000" tIns="45000" bIns="45000"/>
+          <a:p>
+            <a:r>
+              <a:rPr lang="en-US">
+                <a:solidFill>
+                  <a:srgbClr val="3465a4"/>
+                </a:solidFill>
+                <a:latin typeface="Arial"/>
+              </a:rPr>
+              <a:t>computation</a:t>
+            </a:r>
+            <a:endParaRPr/>
+          </a:p>
+          <a:p>
+            <a:r>
+              <a:rPr lang="en-US">
+                <a:solidFill>
+                  <a:srgbClr val="3465a4"/>
+                </a:solidFill>
+                <a:latin typeface="Arial"/>
+              </a:rPr>
+              <a:t>time</a:t>
+            </a:r>
+            <a:endParaRPr/>
+          </a:p>
+        </p:txBody>
+      </p:sp>
+      <p:sp>
+        <p:nvSpPr>
+          <p:cNvPr id="109" name="CustomShape 6"/>
+          <p:cNvSpPr/>
+          <p:nvPr/>
+        </p:nvSpPr>
+        <p:spPr>
+          <a:xfrm>
+            <a:off x="4719600" y="2335680"/>
+            <a:ext cx="1041120" cy="610560"/>
+          </a:xfrm>
+          <a:prstGeom prst="rect">
+            <a:avLst/>
+          </a:prstGeom>
+          <a:noFill/>
+          <a:ln>
+            <a:noFill/>
+          </a:ln>
+        </p:spPr>
+        <p:txBody>
+          <a:bodyPr lIns="90000" rIns="90000" tIns="45000" bIns="45000"/>
+          <a:p>
+            <a:r>
+              <a:rPr lang="en-US">
+                <a:solidFill>
+                  <a:srgbClr val="3465a4"/>
+                </a:solidFill>
+                <a:latin typeface="Arial"/>
+              </a:rPr>
+              <a:t>finishing</a:t>
+            </a:r>
+            <a:endParaRPr/>
+          </a:p>
+          <a:p>
+            <a:r>
+              <a:rPr lang="en-US">
+                <a:solidFill>
+                  <a:srgbClr val="3465a4"/>
+                </a:solidFill>
+                <a:latin typeface="Arial"/>
+              </a:rPr>
+              <a:t>time</a:t>
+            </a:r>
+            <a:endParaRPr/>
+          </a:p>
+        </p:txBody>
+      </p:sp>
+      <p:sp>
+        <p:nvSpPr>
+          <p:cNvPr id="110" name="CustomShape 7"/>
+          <p:cNvSpPr/>
+          <p:nvPr/>
+        </p:nvSpPr>
+        <p:spPr>
+          <a:xfrm>
+            <a:off x="1839600" y="3739680"/>
+            <a:ext cx="961200" cy="673920"/>
+          </a:xfrm>
+          <a:prstGeom prst="rect">
+            <a:avLst/>
+          </a:prstGeom>
+          <a:noFill/>
+          <a:ln>
+            <a:noFill/>
+          </a:ln>
+        </p:spPr>
+        <p:txBody>
+          <a:bodyPr lIns="90000" rIns="90000" tIns="45000" bIns="45000"/>
+          <a:p>
+            <a:r>
+              <a:rPr lang="en-US">
+                <a:solidFill>
+                  <a:srgbClr val="3465a4"/>
+                </a:solidFill>
+                <a:latin typeface="Arial"/>
+              </a:rPr>
+              <a:t>release</a:t>
+            </a:r>
+            <a:endParaRPr/>
+          </a:p>
+          <a:p>
+            <a:r>
+              <a:rPr lang="en-US">
+                <a:solidFill>
+                  <a:srgbClr val="3465a4"/>
+                </a:solidFill>
+                <a:latin typeface="Arial"/>
+              </a:rPr>
+              <a:t>time</a:t>
+            </a:r>
+            <a:endParaRPr/>
+          </a:p>
+        </p:txBody>
+      </p:sp>
+      <p:sp>
+        <p:nvSpPr>
+          <p:cNvPr id="111" name="CustomShape 8"/>
+          <p:cNvSpPr/>
+          <p:nvPr/>
+        </p:nvSpPr>
+        <p:spPr>
+          <a:xfrm>
+            <a:off x="5077440" y="3648960"/>
+            <a:ext cx="1149840" cy="637200"/>
+          </a:xfrm>
+          <a:prstGeom prst="rect">
+            <a:avLst/>
+          </a:prstGeom>
+          <a:noFill/>
+          <a:ln>
+            <a:noFill/>
+          </a:ln>
+        </p:spPr>
+        <p:txBody>
+          <a:bodyPr lIns="90000" rIns="90000" tIns="45000" bIns="45000"/>
+          <a:p>
+            <a:r>
+              <a:rPr lang="en-US">
+                <a:solidFill>
+                  <a:srgbClr val="3465a4"/>
+                </a:solidFill>
+                <a:latin typeface="Arial"/>
+              </a:rPr>
+              <a:t>relative</a:t>
+            </a:r>
+            <a:endParaRPr/>
+          </a:p>
+          <a:p>
+            <a:r>
+              <a:rPr lang="en-US">
+                <a:solidFill>
+                  <a:srgbClr val="3465a4"/>
+                </a:solidFill>
+                <a:latin typeface="Arial"/>
+              </a:rPr>
+              <a:t>deadline</a:t>
+            </a:r>
+            <a:endParaRPr/>
+          </a:p>
+        </p:txBody>
+      </p:sp>
+      <p:sp>
+        <p:nvSpPr>
+          <p:cNvPr id="112" name="CustomShape 9"/>
+          <p:cNvSpPr/>
+          <p:nvPr/>
+        </p:nvSpPr>
+        <p:spPr>
+          <a:xfrm>
+            <a:off x="777240" y="5252760"/>
+            <a:ext cx="7586640" cy="621720"/>
+          </a:xfrm>
+          <a:prstGeom prst="rect">
+            <a:avLst/>
+          </a:prstGeom>
+          <a:noFill/>
+          <a:ln>
+            <a:noFill/>
+          </a:ln>
+        </p:spPr>
+        <p:txBody>
+          <a:bodyPr lIns="90000" rIns="90000" tIns="45000" bIns="45000"/>
+          <a:p>
+            <a:pPr algn="ctr">
+              <a:lnSpc>
+                <a:spcPct val="100000"/>
+              </a:lnSpc>
+            </a:pPr>
+            <a:r>
+              <a:rPr lang="en-US" sz="3200">
+                <a:solidFill>
+                  <a:srgbClr val="3465a4"/>
+                </a:solidFill>
+                <a:latin typeface="Calibri"/>
+              </a:rPr>
+              <a:t>Probabilistic vs. deterministic deadline</a:t>
+            </a:r>
+            <a:endParaRPr/>
+          </a:p>
+          <a:p>
+            <a:pPr>
+              <a:lnSpc>
+                <a:spcPct val="100000"/>
+              </a:lnSpc>
+            </a:pPr>
+            <a:endParaRPr/>
+          </a:p>
+        </p:txBody>
+      </p:sp>
       <p:pic>
         <p:nvPicPr>
-          <p:cNvPr id="106" name="" descr=""/>
+          <p:cNvPr id="113" name="" descr=""/>
           <p:cNvPicPr/>
           <p:nvPr/>
         </p:nvPicPr>
@@ -5930,8 +6238,8 @@
         </p:blipFill>
         <p:spPr>
           <a:xfrm>
-            <a:off x="2070720" y="1712160"/>
-            <a:ext cx="4998960" cy="1641960"/>
+            <a:off x="400320" y="1285920"/>
+            <a:ext cx="8343360" cy="2926080"/>
           </a:xfrm>
           <a:prstGeom prst="rect">
             <a:avLst/>
@@ -5943,24 +6251,24 @@
       </p:pic>
       <p:sp>
         <p:nvSpPr>
-          <p:cNvPr id="107" name="Line 3"/>
+          <p:cNvPr id="114" name="Line 10"/>
           <p:cNvSpPr/>
           <p:nvPr/>
         </p:nvSpPr>
         <p:spPr>
           <a:xfrm flipV="1">
-            <a:off x="1974960" y="3194640"/>
-            <a:ext cx="438480" cy="218880"/>
+            <a:off x="3922200" y="3438720"/>
+            <a:ext cx="0" cy="950400"/>
           </a:xfrm>
           <a:prstGeom prst="line">
             <a:avLst/>
           </a:prstGeom>
-          <a:ln cap="rnd">
+          <a:ln>
             <a:solidFill>
               <a:srgbClr val="000000"/>
             </a:solidFill>
             <a:custDash>
-              <a:ds d="6895000000" sp="6895000000"/>
+              <a:ds d="197000" sp="197000"/>
             </a:custDash>
             <a:tailEnd len="med" type="triangle" w="med"/>
           </a:ln>
@@ -5968,71 +6276,24 @@
       </p:sp>
       <p:sp>
         <p:nvSpPr>
-          <p:cNvPr id="108" name="CustomShape 4"/>
+          <p:cNvPr id="115" name="Line 11"/>
           <p:cNvSpPr/>
           <p:nvPr/>
         </p:nvSpPr>
         <p:spPr>
-          <a:xfrm>
-            <a:off x="1047600" y="3163320"/>
-            <a:ext cx="961560" cy="674280"/>
-          </a:xfrm>
-          <a:prstGeom prst="rect">
-            <a:avLst/>
-          </a:prstGeom>
-          <a:noFill/>
-          <a:ln>
-            <a:noFill/>
-          </a:ln>
-        </p:spPr>
-        <p:txBody>
-          <a:bodyPr lIns="90000" rIns="90000" tIns="45000" bIns="45000"/>
-          <a:p>
-            <a:r>
-              <a:rPr lang="en-US">
-                <a:solidFill>
-                  <a:srgbClr val="3465a4"/>
-                </a:solidFill>
-                <a:latin typeface="Arial"/>
-              </a:rPr>
-              <a:t>release</a:t>
-            </a:r>
-            <a:endParaRPr/>
-          </a:p>
-          <a:p>
-            <a:r>
-              <a:rPr lang="en-US">
-                <a:solidFill>
-                  <a:srgbClr val="3465a4"/>
-                </a:solidFill>
-                <a:latin typeface="Arial"/>
-              </a:rPr>
-              <a:t>time</a:t>
-            </a:r>
-            <a:endParaRPr/>
-          </a:p>
-        </p:txBody>
-      </p:sp>
-      <p:sp>
-        <p:nvSpPr>
-          <p:cNvPr id="109" name="Line 5"/>
-          <p:cNvSpPr/>
-          <p:nvPr/>
-        </p:nvSpPr>
-        <p:spPr>
-          <a:xfrm flipV="1">
-            <a:off x="5394960" y="3358080"/>
-            <a:ext cx="0" cy="421200"/>
+          <a:xfrm flipH="1">
+            <a:off x="4480560" y="2651760"/>
+            <a:ext cx="274320" cy="274320"/>
           </a:xfrm>
           <a:prstGeom prst="line">
             <a:avLst/>
           </a:prstGeom>
-          <a:ln cap="rnd">
+          <a:ln>
             <a:solidFill>
               <a:srgbClr val="000000"/>
             </a:solidFill>
             <a:custDash>
-              <a:ds d="6895000000" sp="6895000000"/>
+              <a:ds d="197000" sp="197000"/>
             </a:custDash>
             <a:tailEnd len="med" type="triangle" w="med"/>
           </a:ln>
@@ -6040,285 +6301,24 @@
       </p:sp>
       <p:sp>
         <p:nvSpPr>
-          <p:cNvPr id="110" name="Line 6"/>
+          <p:cNvPr id="116" name="Line 12"/>
           <p:cNvSpPr/>
           <p:nvPr/>
         </p:nvSpPr>
         <p:spPr>
-          <a:xfrm flipH="1" flipV="1">
-            <a:off x="6458760" y="3180960"/>
-            <a:ext cx="526680" cy="177120"/>
+          <a:xfrm flipH="1">
+            <a:off x="4663440" y="3931920"/>
+            <a:ext cx="457200" cy="0"/>
           </a:xfrm>
           <a:prstGeom prst="line">
             <a:avLst/>
           </a:prstGeom>
-          <a:ln cap="rnd">
+          <a:ln>
             <a:solidFill>
               <a:srgbClr val="000000"/>
             </a:solidFill>
             <a:custDash>
-              <a:ds d="6895000000" sp="6895000000"/>
-            </a:custDash>
-            <a:tailEnd len="med" type="triangle" w="med"/>
-          </a:ln>
-        </p:spPr>
-      </p:sp>
-      <p:sp>
-        <p:nvSpPr>
-          <p:cNvPr id="111" name="CustomShape 7"/>
-          <p:cNvSpPr/>
-          <p:nvPr/>
-        </p:nvSpPr>
-        <p:spPr>
-          <a:xfrm>
-            <a:off x="3567600" y="3235680"/>
-            <a:ext cx="1459080" cy="602280"/>
-          </a:xfrm>
-          <a:prstGeom prst="rect">
-            <a:avLst/>
-          </a:prstGeom>
-          <a:noFill/>
-          <a:ln>
-            <a:noFill/>
-          </a:ln>
-        </p:spPr>
-        <p:txBody>
-          <a:bodyPr lIns="90000" rIns="90000" tIns="45000" bIns="45000"/>
-          <a:p>
-            <a:r>
-              <a:rPr lang="en-US">
-                <a:solidFill>
-                  <a:srgbClr val="3465a4"/>
-                </a:solidFill>
-                <a:latin typeface="Arial"/>
-              </a:rPr>
-              <a:t>computation</a:t>
-            </a:r>
-            <a:endParaRPr/>
-          </a:p>
-          <a:p>
-            <a:r>
-              <a:rPr lang="en-US">
-                <a:solidFill>
-                  <a:srgbClr val="3465a4"/>
-                </a:solidFill>
-                <a:latin typeface="Arial"/>
-              </a:rPr>
-              <a:t>time</a:t>
-            </a:r>
-            <a:endParaRPr/>
-          </a:p>
-        </p:txBody>
-      </p:sp>
-      <p:sp>
-        <p:nvSpPr>
-          <p:cNvPr id="112" name="CustomShape 8"/>
-          <p:cNvSpPr/>
-          <p:nvPr/>
-        </p:nvSpPr>
-        <p:spPr>
-          <a:xfrm>
-            <a:off x="4899600" y="3775680"/>
-            <a:ext cx="1041480" cy="610920"/>
-          </a:xfrm>
-          <a:prstGeom prst="rect">
-            <a:avLst/>
-          </a:prstGeom>
-          <a:noFill/>
-          <a:ln>
-            <a:noFill/>
-          </a:ln>
-        </p:spPr>
-        <p:txBody>
-          <a:bodyPr lIns="90000" rIns="90000" tIns="45000" bIns="45000"/>
-          <a:p>
-            <a:r>
-              <a:rPr lang="en-US">
-                <a:solidFill>
-                  <a:srgbClr val="3465a4"/>
-                </a:solidFill>
-                <a:latin typeface="Arial"/>
-              </a:rPr>
-              <a:t>finishing</a:t>
-            </a:r>
-            <a:endParaRPr/>
-          </a:p>
-          <a:p>
-            <a:r>
-              <a:rPr lang="en-US">
-                <a:solidFill>
-                  <a:srgbClr val="3465a4"/>
-                </a:solidFill>
-                <a:latin typeface="Arial"/>
-              </a:rPr>
-              <a:t>time</a:t>
-            </a:r>
-            <a:endParaRPr/>
-          </a:p>
-        </p:txBody>
-      </p:sp>
-      <p:sp>
-        <p:nvSpPr>
-          <p:cNvPr id="113" name="CustomShape 9"/>
-          <p:cNvSpPr/>
-          <p:nvPr/>
-        </p:nvSpPr>
-        <p:spPr>
-          <a:xfrm>
-            <a:off x="1047600" y="3163680"/>
-            <a:ext cx="961560" cy="674280"/>
-          </a:xfrm>
-          <a:prstGeom prst="rect">
-            <a:avLst/>
-          </a:prstGeom>
-          <a:noFill/>
-          <a:ln>
-            <a:noFill/>
-          </a:ln>
-        </p:spPr>
-        <p:txBody>
-          <a:bodyPr lIns="90000" rIns="90000" tIns="45000" bIns="45000"/>
-          <a:p>
-            <a:r>
-              <a:rPr lang="en-US">
-                <a:solidFill>
-                  <a:srgbClr val="3465a4"/>
-                </a:solidFill>
-                <a:latin typeface="Arial"/>
-              </a:rPr>
-              <a:t>release</a:t>
-            </a:r>
-            <a:endParaRPr/>
-          </a:p>
-          <a:p>
-            <a:r>
-              <a:rPr lang="en-US">
-                <a:solidFill>
-                  <a:srgbClr val="3465a4"/>
-                </a:solidFill>
-                <a:latin typeface="Arial"/>
-              </a:rPr>
-              <a:t>time</a:t>
-            </a:r>
-            <a:endParaRPr/>
-          </a:p>
-        </p:txBody>
-      </p:sp>
-      <p:sp>
-        <p:nvSpPr>
-          <p:cNvPr id="114" name="CustomShape 10"/>
-          <p:cNvSpPr/>
-          <p:nvPr/>
-        </p:nvSpPr>
-        <p:spPr>
-          <a:xfrm>
-            <a:off x="6985440" y="3108960"/>
-            <a:ext cx="1150200" cy="637560"/>
-          </a:xfrm>
-          <a:prstGeom prst="rect">
-            <a:avLst/>
-          </a:prstGeom>
-          <a:noFill/>
-          <a:ln>
-            <a:noFill/>
-          </a:ln>
-        </p:spPr>
-        <p:txBody>
-          <a:bodyPr lIns="90000" rIns="90000" tIns="45000" bIns="45000"/>
-          <a:p>
-            <a:r>
-              <a:rPr lang="en-US">
-                <a:solidFill>
-                  <a:srgbClr val="3465a4"/>
-                </a:solidFill>
-                <a:latin typeface="Arial"/>
-              </a:rPr>
-              <a:t>relative</a:t>
-            </a:r>
-            <a:endParaRPr/>
-          </a:p>
-          <a:p>
-            <a:r>
-              <a:rPr lang="en-US">
-                <a:solidFill>
-                  <a:srgbClr val="3465a4"/>
-                </a:solidFill>
-                <a:latin typeface="Arial"/>
-              </a:rPr>
-              <a:t>deadline</a:t>
-            </a:r>
-            <a:endParaRPr/>
-          </a:p>
-        </p:txBody>
-      </p:sp>
-      <p:sp>
-        <p:nvSpPr>
-          <p:cNvPr id="115" name="CustomShape 11"/>
-          <p:cNvSpPr/>
-          <p:nvPr/>
-        </p:nvSpPr>
-        <p:spPr>
-          <a:xfrm>
-            <a:off x="777240" y="5180760"/>
-            <a:ext cx="7587000" cy="622080"/>
-          </a:xfrm>
-          <a:prstGeom prst="rect">
-            <a:avLst/>
-          </a:prstGeom>
-          <a:noFill/>
-          <a:ln>
-            <a:noFill/>
-          </a:ln>
-        </p:spPr>
-        <p:txBody>
-          <a:bodyPr lIns="90000" rIns="90000" tIns="45000" bIns="45000"/>
-          <a:p>
-            <a:pPr algn="ctr">
-              <a:lnSpc>
-                <a:spcPct val="100000"/>
-              </a:lnSpc>
-            </a:pPr>
-            <a:r>
-              <a:rPr lang="en-US" sz="3200">
-                <a:solidFill>
-                  <a:srgbClr val="3465a4"/>
-                </a:solidFill>
-                <a:latin typeface="Calibri"/>
-              </a:rPr>
-              <a:t>Probabilistic vs. deterministic deadline</a:t>
-            </a:r>
-            <a:endParaRPr/>
-          </a:p>
-          <a:p>
-            <a:pPr>
-              <a:lnSpc>
-                <a:spcPct val="100000"/>
-              </a:lnSpc>
-            </a:pPr>
-            <a:endParaRPr/>
-          </a:p>
-        </p:txBody>
-      </p:sp>
-      <p:sp>
-        <p:nvSpPr>
-          <p:cNvPr id="116" name="Line 12"/>
-          <p:cNvSpPr/>
-          <p:nvPr/>
-        </p:nvSpPr>
-        <p:spPr>
-          <a:xfrm flipV="1">
-            <a:off x="4294800" y="2543760"/>
-            <a:ext cx="0" cy="748080"/>
-          </a:xfrm>
-          <a:prstGeom prst="line">
-            <a:avLst/>
-          </a:prstGeom>
-          <a:ln cap="rnd">
-            <a:solidFill>
-              <a:srgbClr val="000000"/>
-            </a:solidFill>
-            <a:custDash>
-              <a:ds d="6895000000" sp="6895000000"/>
+              <a:ds d="197000" sp="197000"/>
             </a:custDash>
             <a:tailEnd len="med" type="triangle" w="med"/>
           </a:ln>
@@ -6382,7 +6382,7 @@
         <p:spPr>
           <a:xfrm>
             <a:off x="457200" y="164520"/>
-            <a:ext cx="8223480" cy="632520"/>
+            <a:ext cx="8223120" cy="632160"/>
           </a:xfrm>
           <a:prstGeom prst="rect">
             <a:avLst/>
@@ -6422,7 +6422,7 @@
         <p:spPr>
           <a:xfrm>
             <a:off x="6553080" y="6356520"/>
-            <a:ext cx="2127600" cy="358920"/>
+            <a:ext cx="2127240" cy="358560"/>
           </a:xfrm>
           <a:prstGeom prst="rect">
             <a:avLst/>
@@ -6471,7 +6471,7 @@
         <p:spPr>
           <a:xfrm>
             <a:off x="1349280" y="1832400"/>
-            <a:ext cx="6444360" cy="3502800"/>
+            <a:ext cx="6444000" cy="3502440"/>
           </a:xfrm>
           <a:prstGeom prst="rect">
             <a:avLst/>
@@ -6635,7 +6635,7 @@
         <p:spPr>
           <a:xfrm>
             <a:off x="316080" y="4439880"/>
-            <a:ext cx="8498520" cy="1585440"/>
+            <a:ext cx="8498160" cy="1585080"/>
           </a:xfrm>
           <a:prstGeom prst="rect">
             <a:avLst/>
@@ -6661,7 +6661,7 @@
         <p:spPr>
           <a:xfrm>
             <a:off x="2882520" y="2735280"/>
-            <a:ext cx="3377880" cy="829800"/>
+            <a:ext cx="3377520" cy="829440"/>
           </a:xfrm>
           <a:prstGeom prst="rect">
             <a:avLst/>
@@ -6686,7 +6686,7 @@
         <p:spPr>
           <a:xfrm>
             <a:off x="1681920" y="4354200"/>
-            <a:ext cx="567000" cy="491040"/>
+            <a:ext cx="566640" cy="490680"/>
           </a:xfrm>
           <a:prstGeom prst="rect">
             <a:avLst/>
@@ -6711,7 +6711,7 @@
         <p:spPr>
           <a:xfrm>
             <a:off x="1681920" y="4826880"/>
-            <a:ext cx="547560" cy="508320"/>
+            <a:ext cx="547200" cy="507960"/>
           </a:xfrm>
           <a:prstGeom prst="rect">
             <a:avLst/>
@@ -6779,7 +6779,7 @@
         <p:spPr>
           <a:xfrm>
             <a:off x="457200" y="164520"/>
-            <a:ext cx="8223480" cy="632520"/>
+            <a:ext cx="8223120" cy="632160"/>
           </a:xfrm>
           <a:prstGeom prst="rect">
             <a:avLst/>
@@ -6819,7 +6819,7 @@
         <p:spPr>
           <a:xfrm>
             <a:off x="6553080" y="6356520"/>
-            <a:ext cx="2127600" cy="358920"/>
+            <a:ext cx="2127240" cy="358560"/>
           </a:xfrm>
           <a:prstGeom prst="rect">
             <a:avLst/>
@@ -6867,8 +6867,8 @@
         </p:nvSpPr>
         <p:spPr>
           <a:xfrm>
-            <a:off x="1349280" y="1472400"/>
-            <a:ext cx="6444360" cy="635040"/>
+            <a:off x="1349280" y="1184400"/>
+            <a:ext cx="6444000" cy="634680"/>
           </a:xfrm>
           <a:prstGeom prst="rect">
             <a:avLst/>
@@ -6932,7 +6932,7 @@
         <p:spPr>
           <a:xfrm>
             <a:off x="316080" y="4439880"/>
-            <a:ext cx="8498520" cy="1585440"/>
+            <a:ext cx="8498160" cy="1585080"/>
           </a:xfrm>
           <a:prstGeom prst="rect">
             <a:avLst/>
@@ -6951,8 +6951,8 @@
         </p:nvSpPr>
         <p:spPr>
           <a:xfrm>
-            <a:off x="2606400" y="3868560"/>
-            <a:ext cx="3930480" cy="563040"/>
+            <a:off x="2607120" y="2572560"/>
+            <a:ext cx="3930120" cy="562680"/>
           </a:xfrm>
           <a:prstGeom prst="rect">
             <a:avLst/>
@@ -6997,8 +6997,8 @@
         </p:blipFill>
         <p:spPr>
           <a:xfrm>
-            <a:off x="1471680" y="4424040"/>
-            <a:ext cx="6199920" cy="1494000"/>
+            <a:off x="2016000" y="3120480"/>
+            <a:ext cx="5112000" cy="1196640"/>
           </a:xfrm>
           <a:prstGeom prst="rect">
             <a:avLst/>
@@ -7022,8 +7022,8 @@
         </p:blipFill>
         <p:spPr>
           <a:xfrm>
-            <a:off x="3499560" y="2061360"/>
-            <a:ext cx="2144160" cy="1099080"/>
+            <a:off x="3670200" y="1684800"/>
+            <a:ext cx="1803960" cy="971280"/>
           </a:xfrm>
           <a:prstGeom prst="rect">
             <a:avLst/>
@@ -7033,6 +7033,173 @@
           </a:ln>
         </p:spPr>
       </p:pic>
+      <p:sp>
+        <p:nvSpPr>
+          <p:cNvPr id="131" name="CustomShape 6"/>
+          <p:cNvSpPr/>
+          <p:nvPr/>
+        </p:nvSpPr>
+        <p:spPr>
+          <a:xfrm>
+            <a:off x="1352160" y="4406760"/>
+            <a:ext cx="6444000" cy="634680"/>
+          </a:xfrm>
+          <a:prstGeom prst="rect">
+            <a:avLst/>
+          </a:prstGeom>
+          <a:noFill/>
+          <a:ln>
+            <a:noFill/>
+          </a:ln>
+        </p:spPr>
+        <p:txBody>
+          <a:bodyPr lIns="90000" rIns="90000" tIns="45000" bIns="45000"/>
+          <a:p>
+            <a:pPr algn="ctr">
+              <a:lnSpc>
+                <a:spcPct val="100000"/>
+              </a:lnSpc>
+            </a:pPr>
+            <a:endParaRPr/>
+          </a:p>
+          <a:p>
+            <a:pPr>
+              <a:lnSpc>
+                <a:spcPct val="100000"/>
+              </a:lnSpc>
+            </a:pPr>
+            <a:endParaRPr/>
+          </a:p>
+          <a:p>
+            <a:pPr algn="just">
+              <a:lnSpc>
+                <a:spcPct val="100000"/>
+              </a:lnSpc>
+            </a:pPr>
+            <a:endParaRPr/>
+          </a:p>
+          <a:p>
+            <a:pPr>
+              <a:lnSpc>
+                <a:spcPct val="100000"/>
+              </a:lnSpc>
+            </a:pPr>
+            <a:endParaRPr/>
+          </a:p>
+        </p:txBody>
+      </p:sp>
+      <p:sp>
+        <p:nvSpPr>
+          <p:cNvPr id="132" name="Line 7"/>
+          <p:cNvSpPr/>
+          <p:nvPr/>
+        </p:nvSpPr>
+        <p:spPr>
+          <a:xfrm>
+            <a:off x="4590720" y="4223520"/>
+            <a:ext cx="0" cy="731520"/>
+          </a:xfrm>
+          <a:prstGeom prst="line">
+            <a:avLst/>
+          </a:prstGeom>
+          <a:ln w="57240">
+            <a:solidFill>
+              <a:srgbClr val="3465a4"/>
+            </a:solidFill>
+            <a:round/>
+            <a:tailEnd len="med" type="triangle" w="med"/>
+          </a:ln>
+        </p:spPr>
+      </p:sp>
+      <p:pic>
+        <p:nvPicPr>
+          <p:cNvPr id="133" name="Picture 5" descr=""/>
+          <p:cNvPicPr/>
+          <p:nvPr/>
+        </p:nvPicPr>
+        <p:blipFill>
+          <a:blip r:embed="rId3"/>
+          <a:stretch>
+            <a:fillRect/>
+          </a:stretch>
+        </p:blipFill>
+        <p:spPr>
+          <a:xfrm>
+            <a:off x="1554480" y="5578560"/>
+            <a:ext cx="6039360" cy="730800"/>
+          </a:xfrm>
+          <a:prstGeom prst="rect">
+            <a:avLst/>
+          </a:prstGeom>
+          <a:ln>
+            <a:noFill/>
+          </a:ln>
+        </p:spPr>
+      </p:pic>
+      <p:sp>
+        <p:nvSpPr>
+          <p:cNvPr id="134" name="CustomShape 8"/>
+          <p:cNvSpPr/>
+          <p:nvPr/>
+        </p:nvSpPr>
+        <p:spPr>
+          <a:xfrm>
+            <a:off x="1352160" y="4982760"/>
+            <a:ext cx="6444000" cy="634680"/>
+          </a:xfrm>
+          <a:prstGeom prst="rect">
+            <a:avLst/>
+          </a:prstGeom>
+          <a:noFill/>
+          <a:ln>
+            <a:noFill/>
+          </a:ln>
+        </p:spPr>
+        <p:txBody>
+          <a:bodyPr lIns="90000" rIns="90000" tIns="45000" bIns="45000"/>
+          <a:p>
+            <a:pPr algn="ctr">
+              <a:lnSpc>
+                <a:spcPct val="100000"/>
+              </a:lnSpc>
+            </a:pPr>
+            <a:r>
+              <a:rPr lang="en-US" sz="3200">
+                <a:solidFill>
+                  <a:srgbClr val="3465a4"/>
+                </a:solidFill>
+                <a:latin typeface="Calibri"/>
+              </a:rPr>
+              <a:t>Model</a:t>
+            </a:r>
+            <a:endParaRPr/>
+          </a:p>
+          <a:p>
+            <a:pPr>
+              <a:lnSpc>
+                <a:spcPct val="100000"/>
+              </a:lnSpc>
+            </a:pPr>
+            <a:endParaRPr/>
+          </a:p>
+          <a:p>
+            <a:pPr algn="just">
+              <a:lnSpc>
+                <a:spcPct val="100000"/>
+              </a:lnSpc>
+            </a:pPr>
+            <a:endParaRPr/>
+          </a:p>
+          <a:p>
+            <a:pPr>
+              <a:lnSpc>
+                <a:spcPct val="100000"/>
+              </a:lnSpc>
+            </a:pPr>
+            <a:endParaRPr/>
+          </a:p>
+        </p:txBody>
+      </p:sp>
     </p:spTree>
   </p:cSld>
   <p:timing>
@@ -7084,14 +7251,14 @@
       </p:grpSpPr>
       <p:sp>
         <p:nvSpPr>
-          <p:cNvPr id="131" name="CustomShape 1"/>
+          <p:cNvPr id="135" name="CustomShape 1"/>
           <p:cNvSpPr/>
           <p:nvPr/>
         </p:nvSpPr>
         <p:spPr>
           <a:xfrm>
             <a:off x="457200" y="164520"/>
-            <a:ext cx="8223480" cy="632520"/>
+            <a:ext cx="8223120" cy="632160"/>
           </a:xfrm>
           <a:prstGeom prst="rect">
             <a:avLst/>
@@ -7124,14 +7291,14 @@
       </p:sp>
       <p:sp>
         <p:nvSpPr>
-          <p:cNvPr id="132" name="CustomShape 2"/>
+          <p:cNvPr id="136" name="CustomShape 2"/>
           <p:cNvSpPr/>
           <p:nvPr/>
         </p:nvSpPr>
         <p:spPr>
           <a:xfrm>
             <a:off x="6553080" y="6356520"/>
-            <a:ext cx="2127600" cy="358920"/>
+            <a:ext cx="2127240" cy="358560"/>
           </a:xfrm>
           <a:prstGeom prst="rect">
             <a:avLst/>
@@ -7173,14 +7340,14 @@
       </p:sp>
       <p:sp>
         <p:nvSpPr>
-          <p:cNvPr id="133" name="CustomShape 3"/>
+          <p:cNvPr id="137" name="CustomShape 3"/>
           <p:cNvSpPr/>
           <p:nvPr/>
         </p:nvSpPr>
         <p:spPr>
           <a:xfrm>
             <a:off x="320400" y="1384560"/>
-            <a:ext cx="8501040" cy="1170360"/>
+            <a:ext cx="8500680" cy="1170000"/>
           </a:xfrm>
           <a:prstGeom prst="rect">
             <a:avLst/>
@@ -7213,14 +7380,14 @@
       </p:sp>
       <p:sp>
         <p:nvSpPr>
-          <p:cNvPr id="134" name="CustomShape 4"/>
+          <p:cNvPr id="138" name="CustomShape 4"/>
           <p:cNvSpPr/>
           <p:nvPr/>
         </p:nvSpPr>
         <p:spPr>
           <a:xfrm>
-            <a:off x="690120" y="5051880"/>
-            <a:ext cx="3377520" cy="650880"/>
+            <a:off x="690120" y="5123880"/>
+            <a:ext cx="3377160" cy="650520"/>
           </a:xfrm>
           <a:prstGeom prst="rect">
             <a:avLst/>
@@ -7253,14 +7420,14 @@
       </p:sp>
       <p:sp>
         <p:nvSpPr>
-          <p:cNvPr id="135" name="CustomShape 5"/>
+          <p:cNvPr id="139" name="CustomShape 5"/>
           <p:cNvSpPr/>
           <p:nvPr/>
         </p:nvSpPr>
         <p:spPr>
           <a:xfrm>
-            <a:off x="4812840" y="5051160"/>
-            <a:ext cx="3961800" cy="650880"/>
+            <a:off x="4812840" y="5123160"/>
+            <a:ext cx="3961440" cy="650520"/>
           </a:xfrm>
           <a:prstGeom prst="rect">
             <a:avLst/>
@@ -7293,7 +7460,7 @@
       </p:sp>
       <p:pic>
         <p:nvPicPr>
-          <p:cNvPr id="136" name="" descr=""/>
+          <p:cNvPr id="140" name="" descr=""/>
           <p:cNvPicPr/>
           <p:nvPr/>
         </p:nvPicPr>
@@ -7305,8 +7472,8 @@
         </p:blipFill>
         <p:spPr>
           <a:xfrm>
-            <a:off x="2284560" y="2103120"/>
-            <a:ext cx="4573800" cy="2850120"/>
+            <a:off x="2284560" y="2139120"/>
+            <a:ext cx="4573440" cy="2849760"/>
           </a:xfrm>
           <a:prstGeom prst="rect">
             <a:avLst/>
@@ -7318,13 +7485,13 @@
       </p:pic>
       <p:sp>
         <p:nvSpPr>
-          <p:cNvPr id="137" name="Line 6"/>
+          <p:cNvPr id="141" name="Line 6"/>
           <p:cNvSpPr/>
           <p:nvPr/>
         </p:nvSpPr>
         <p:spPr>
           <a:xfrm>
-            <a:off x="4206240" y="2191680"/>
+            <a:off x="4206240" y="2227680"/>
             <a:ext cx="0" cy="1008720"/>
           </a:xfrm>
           <a:prstGeom prst="line">
@@ -7340,13 +7507,13 @@
       </p:sp>
       <p:sp>
         <p:nvSpPr>
-          <p:cNvPr id="138" name="Line 7"/>
+          <p:cNvPr id="142" name="Line 7"/>
           <p:cNvSpPr/>
           <p:nvPr/>
         </p:nvSpPr>
         <p:spPr>
           <a:xfrm flipV="1">
-            <a:off x="3095280" y="3197520"/>
+            <a:off x="3095280" y="3233520"/>
             <a:ext cx="1110960" cy="2880"/>
           </a:xfrm>
           <a:prstGeom prst="line">
@@ -7362,13 +7529,13 @@
       </p:sp>
       <p:sp>
         <p:nvSpPr>
-          <p:cNvPr id="139" name="Line 8"/>
+          <p:cNvPr id="143" name="Line 8"/>
           <p:cNvSpPr/>
           <p:nvPr/>
         </p:nvSpPr>
         <p:spPr>
           <a:xfrm>
-            <a:off x="3092400" y="2740320"/>
+            <a:off x="3092400" y="2776320"/>
             <a:ext cx="2880" cy="460080"/>
           </a:xfrm>
           <a:prstGeom prst="line">
@@ -7384,13 +7551,13 @@
       </p:sp>
       <p:sp>
         <p:nvSpPr>
-          <p:cNvPr id="140" name="Line 9"/>
+          <p:cNvPr id="144" name="Line 9"/>
           <p:cNvSpPr/>
           <p:nvPr/>
         </p:nvSpPr>
         <p:spPr>
           <a:xfrm>
-            <a:off x="3092400" y="2740320"/>
+            <a:off x="3092400" y="2776320"/>
             <a:ext cx="656640" cy="2880"/>
           </a:xfrm>
           <a:prstGeom prst="line">
@@ -7406,13 +7573,13 @@
       </p:sp>
       <p:sp>
         <p:nvSpPr>
-          <p:cNvPr id="141" name="Line 10"/>
+          <p:cNvPr id="145" name="Line 10"/>
           <p:cNvSpPr/>
           <p:nvPr/>
         </p:nvSpPr>
         <p:spPr>
           <a:xfrm>
-            <a:off x="3732480" y="2191680"/>
+            <a:off x="3732480" y="2227680"/>
             <a:ext cx="0" cy="548640"/>
           </a:xfrm>
           <a:prstGeom prst="line">
@@ -7428,13 +7595,13 @@
       </p:sp>
       <p:sp>
         <p:nvSpPr>
-          <p:cNvPr id="142" name="Line 11"/>
+          <p:cNvPr id="146" name="Line 11"/>
           <p:cNvSpPr/>
           <p:nvPr/>
         </p:nvSpPr>
         <p:spPr>
           <a:xfrm>
-            <a:off x="3732480" y="2205360"/>
+            <a:off x="3732480" y="2241360"/>
             <a:ext cx="473760" cy="0"/>
           </a:xfrm>
           <a:prstGeom prst="line">
@@ -7450,13 +7617,13 @@
       </p:sp>
       <p:sp>
         <p:nvSpPr>
-          <p:cNvPr id="143" name="Line 12"/>
+          <p:cNvPr id="147" name="Line 12"/>
           <p:cNvSpPr/>
           <p:nvPr/>
         </p:nvSpPr>
         <p:spPr>
           <a:xfrm>
-            <a:off x="5486400" y="3291840"/>
+            <a:off x="5486400" y="3327840"/>
             <a:ext cx="0" cy="1005840"/>
           </a:xfrm>
           <a:prstGeom prst="line">
@@ -7472,13 +7639,13 @@
       </p:sp>
       <p:sp>
         <p:nvSpPr>
-          <p:cNvPr id="144" name="Line 13"/>
+          <p:cNvPr id="148" name="Line 13"/>
           <p:cNvSpPr/>
           <p:nvPr/>
         </p:nvSpPr>
         <p:spPr>
           <a:xfrm flipV="1">
-            <a:off x="4375440" y="4297680"/>
+            <a:off x="4375440" y="4333680"/>
             <a:ext cx="1110960" cy="2880"/>
           </a:xfrm>
           <a:prstGeom prst="line">
@@ -7494,13 +7661,13 @@
       </p:sp>
       <p:sp>
         <p:nvSpPr>
-          <p:cNvPr id="145" name="Line 14"/>
+          <p:cNvPr id="149" name="Line 14"/>
           <p:cNvSpPr/>
           <p:nvPr/>
         </p:nvSpPr>
         <p:spPr>
           <a:xfrm>
-            <a:off x="4372560" y="3840480"/>
+            <a:off x="4372560" y="3876480"/>
             <a:ext cx="2880" cy="460080"/>
           </a:xfrm>
           <a:prstGeom prst="line">
@@ -7516,13 +7683,13 @@
       </p:sp>
       <p:sp>
         <p:nvSpPr>
-          <p:cNvPr id="146" name="Line 15"/>
+          <p:cNvPr id="150" name="Line 15"/>
           <p:cNvSpPr/>
           <p:nvPr/>
         </p:nvSpPr>
         <p:spPr>
           <a:xfrm>
-            <a:off x="4372560" y="3840480"/>
+            <a:off x="4372560" y="3876480"/>
             <a:ext cx="640080" cy="0"/>
           </a:xfrm>
           <a:prstGeom prst="line">
@@ -7538,13 +7705,13 @@
       </p:sp>
       <p:sp>
         <p:nvSpPr>
-          <p:cNvPr id="147" name="Line 16"/>
+          <p:cNvPr id="151" name="Line 16"/>
           <p:cNvSpPr/>
           <p:nvPr/>
         </p:nvSpPr>
         <p:spPr>
           <a:xfrm>
-            <a:off x="5012640" y="3291840"/>
+            <a:off x="5012640" y="3327840"/>
             <a:ext cx="0" cy="548640"/>
           </a:xfrm>
           <a:prstGeom prst="line">
@@ -7560,13 +7727,13 @@
       </p:sp>
       <p:sp>
         <p:nvSpPr>
-          <p:cNvPr id="148" name="Line 17"/>
+          <p:cNvPr id="152" name="Line 17"/>
           <p:cNvSpPr/>
           <p:nvPr/>
         </p:nvSpPr>
         <p:spPr>
           <a:xfrm>
-            <a:off x="5012640" y="3305520"/>
+            <a:off x="5012640" y="3341520"/>
             <a:ext cx="473760" cy="0"/>
           </a:xfrm>
           <a:prstGeom prst="line">
@@ -7582,13 +7749,13 @@
       </p:sp>
       <p:sp>
         <p:nvSpPr>
-          <p:cNvPr id="149" name="Line 18"/>
+          <p:cNvPr id="153" name="Line 18"/>
           <p:cNvSpPr/>
           <p:nvPr/>
         </p:nvSpPr>
         <p:spPr>
           <a:xfrm>
-            <a:off x="3953160" y="3201480"/>
+            <a:off x="3953160" y="3237480"/>
             <a:ext cx="550800" cy="455040"/>
           </a:xfrm>
           <a:prstGeom prst="line">
@@ -7605,13 +7772,13 @@
       </p:sp>
       <p:sp>
         <p:nvSpPr>
-          <p:cNvPr id="150" name="Line 19"/>
+          <p:cNvPr id="154" name="Line 19"/>
           <p:cNvSpPr/>
           <p:nvPr/>
         </p:nvSpPr>
         <p:spPr>
           <a:xfrm>
-            <a:off x="4206240" y="2906280"/>
+            <a:off x="4206240" y="2942280"/>
             <a:ext cx="550800" cy="455040"/>
           </a:xfrm>
           <a:prstGeom prst="line">
@@ -7628,13 +7795,13 @@
       </p:sp>
       <p:sp>
         <p:nvSpPr>
-          <p:cNvPr id="151" name="Line 20"/>
+          <p:cNvPr id="155" name="Line 20"/>
           <p:cNvSpPr/>
           <p:nvPr/>
         </p:nvSpPr>
         <p:spPr>
           <a:xfrm>
-            <a:off x="3915360" y="5669280"/>
+            <a:off x="3915360" y="5741280"/>
             <a:ext cx="731520" cy="0"/>
           </a:xfrm>
           <a:prstGeom prst="line">
@@ -7700,14 +7867,14 @@
       </p:grpSpPr>
       <p:sp>
         <p:nvSpPr>
-          <p:cNvPr id="152" name="CustomShape 1"/>
+          <p:cNvPr id="156" name="CustomShape 1"/>
           <p:cNvSpPr/>
           <p:nvPr/>
         </p:nvSpPr>
         <p:spPr>
           <a:xfrm>
             <a:off x="457200" y="164520"/>
-            <a:ext cx="8223480" cy="632520"/>
+            <a:ext cx="8223120" cy="632160"/>
           </a:xfrm>
           <a:prstGeom prst="rect">
             <a:avLst/>
@@ -7740,14 +7907,14 @@
       </p:sp>
       <p:sp>
         <p:nvSpPr>
-          <p:cNvPr id="153" name="CustomShape 2"/>
+          <p:cNvPr id="157" name="CustomShape 2"/>
           <p:cNvSpPr/>
           <p:nvPr/>
         </p:nvSpPr>
         <p:spPr>
           <a:xfrm>
             <a:off x="6553080" y="6356520"/>
-            <a:ext cx="2127600" cy="358920"/>
+            <a:ext cx="2127240" cy="358560"/>
           </a:xfrm>
           <a:prstGeom prst="rect">
             <a:avLst/>
@@ -7789,14 +7956,14 @@
       </p:sp>
       <p:sp>
         <p:nvSpPr>
-          <p:cNvPr id="154" name="CustomShape 3"/>
+          <p:cNvPr id="158" name="CustomShape 3"/>
           <p:cNvSpPr/>
           <p:nvPr/>
         </p:nvSpPr>
         <p:spPr>
           <a:xfrm>
-            <a:off x="1189080" y="1449360"/>
-            <a:ext cx="6764760" cy="4566960"/>
+            <a:off x="640080" y="1420560"/>
+            <a:ext cx="7862040" cy="2455560"/>
           </a:xfrm>
           <a:prstGeom prst="rect">
             <a:avLst/>
@@ -7821,7 +7988,7 @@
                 </a:solidFill>
                 <a:latin typeface="Calibri"/>
               </a:rPr>
-              <a:t>Modules</a:t>
+              <a:t>Challenges</a:t>
             </a:r>
             <a:endParaRPr/>
           </a:p>
@@ -7836,11 +8003,47 @@
             <a:r>
               <a:rPr lang="en-US" sz="3200">
                 <a:solidFill>
+                  <a:srgbClr val="ff6600"/>
+                </a:solidFill>
+                <a:latin typeface="Calibri"/>
+              </a:rPr>
+              <a:t>Synthesis</a:t>
+            </a:r>
+            <a:r>
+              <a:rPr lang="en-US" sz="3200">
+                <a:solidFill>
                   <a:srgbClr val="3465a4"/>
                 </a:solidFill>
                 <a:latin typeface="Calibri"/>
               </a:rPr>
-              <a:t>XML parser</a:t>
+              <a:t>: </a:t>
+            </a:r>
+            <a:r>
+              <a:rPr lang="en-US" sz="2500">
+                <a:solidFill>
+                  <a:srgbClr val="3465a4"/>
+                </a:solidFill>
+                <a:latin typeface="Calibri"/>
+              </a:rPr>
+              <a:t>(QoS)</a:t>
+            </a:r>
+            <a:r>
+              <a:rPr lang="en-US" sz="3200">
+                <a:solidFill>
+                  <a:srgbClr val="3465a4"/>
+                </a:solidFill>
+                <a:latin typeface="Calibri"/>
+              </a:rPr>
+              <a:t> → </a:t>
+            </a:r>
+            <a:r>
+              <a:rPr lang="en-US" sz="2500">
+                <a:solidFill>
+                  <a:srgbClr val="3465a4"/>
+                </a:solidFill>
+                <a:latin typeface="Calibri"/>
+              </a:rPr>
+              <a:t>Scheduling parameters</a:t>
             </a:r>
             <a:endParaRPr/>
           </a:p>
@@ -7855,22 +8058,30 @@
             <a:r>
               <a:rPr lang="en-US" sz="3200">
                 <a:solidFill>
+                  <a:srgbClr val="ff6600"/>
+                </a:solidFill>
+                <a:latin typeface="Calibri"/>
+              </a:rPr>
+              <a:t>Analysis</a:t>
+            </a:r>
+            <a:r>
+              <a:rPr lang="en-US" sz="3200">
+                <a:solidFill>
                   <a:srgbClr val="3465a4"/>
                 </a:solidFill>
                 <a:latin typeface="Calibri"/>
               </a:rPr>
-              <a:t>Probability distribution handler</a:t>
-            </a:r>
-            <a:endParaRPr/>
-          </a:p>
-          <a:p>
-            <a:pPr>
-              <a:lnSpc>
-                <a:spcPct val="100000"/>
-              </a:lnSpc>
-              <a:buFont typeface="Arial"/>
-              <a:buChar char="•"/>
-            </a:pPr>
+              <a:t>: </a:t>
+            </a:r>
+            <a:r>
+              <a:rPr lang="en-US" sz="2500">
+                <a:solidFill>
+                  <a:srgbClr val="3465a4"/>
+                </a:solidFill>
+                <a:latin typeface="Calibri"/>
+              </a:rPr>
+              <a:t>(Scheduling parameters) </a:t>
+            </a:r>
             <a:r>
               <a:rPr lang="en-US" sz="3200">
                 <a:solidFill>
@@ -7878,50 +8089,46 @@
                 </a:solidFill>
                 <a:latin typeface="Calibri"/>
               </a:rPr>
-              <a:t>Task descriptor</a:t>
-            </a:r>
-            <a:endParaRPr/>
-          </a:p>
-          <a:p>
-            <a:pPr>
-              <a:lnSpc>
-                <a:spcPct val="100000"/>
-              </a:lnSpc>
-              <a:buFont typeface="Arial"/>
-              <a:buChar char="•"/>
-            </a:pPr>
-            <a:r>
-              <a:rPr lang="en-US" sz="3200">
+              <a:t>→</a:t>
+            </a:r>
+            <a:r>
+              <a:rPr lang="en-US" sz="2500">
                 <a:solidFill>
                   <a:srgbClr val="3465a4"/>
                 </a:solidFill>
                 <a:latin typeface="Calibri"/>
               </a:rPr>
-              <a:t>Probability solver</a:t>
-            </a:r>
-            <a:endParaRPr/>
-          </a:p>
-          <a:p>
-            <a:pPr>
-              <a:lnSpc>
-                <a:spcPct val="100000"/>
-              </a:lnSpc>
-              <a:buFont typeface="Arial"/>
-              <a:buChar char="•"/>
-            </a:pPr>
-            <a:r>
-              <a:rPr lang="en-US" sz="3200">
-                <a:solidFill>
-                  <a:srgbClr val="3465a4"/>
-                </a:solidFill>
-                <a:latin typeface="Calibri"/>
-              </a:rPr>
-              <a:t>QoS evaluation</a:t>
-            </a:r>
-            <a:endParaRPr/>
-          </a:p>
-        </p:txBody>
-      </p:sp>
+              <a:t> QoS</a:t>
+            </a:r>
+            <a:endParaRPr/>
+          </a:p>
+        </p:txBody>
+      </p:sp>
+      <p:pic>
+        <p:nvPicPr>
+          <p:cNvPr id="159" name="" descr=""/>
+          <p:cNvPicPr/>
+          <p:nvPr/>
+        </p:nvPicPr>
+        <p:blipFill>
+          <a:blip r:embed="rId1"/>
+          <a:stretch>
+            <a:fillRect/>
+          </a:stretch>
+        </p:blipFill>
+        <p:spPr>
+          <a:xfrm>
+            <a:off x="1951200" y="3568320"/>
+            <a:ext cx="5239800" cy="2190600"/>
+          </a:xfrm>
+          <a:prstGeom prst="rect">
+            <a:avLst/>
+          </a:prstGeom>
+          <a:ln>
+            <a:noFill/>
+          </a:ln>
+        </p:spPr>
+      </p:pic>
     </p:spTree>
   </p:cSld>
   <p:timing>
@@ -7973,14 +8180,14 @@
       </p:grpSpPr>
       <p:sp>
         <p:nvSpPr>
-          <p:cNvPr id="155" name="CustomShape 1"/>
+          <p:cNvPr id="160" name="CustomShape 1"/>
           <p:cNvSpPr/>
           <p:nvPr/>
         </p:nvSpPr>
         <p:spPr>
           <a:xfrm>
             <a:off x="457200" y="164520"/>
-            <a:ext cx="8223480" cy="632520"/>
+            <a:ext cx="8223120" cy="632160"/>
           </a:xfrm>
           <a:prstGeom prst="rect">
             <a:avLst/>
@@ -8013,14 +8220,14 @@
       </p:sp>
       <p:sp>
         <p:nvSpPr>
-          <p:cNvPr id="156" name="CustomShape 2"/>
+          <p:cNvPr id="161" name="CustomShape 2"/>
           <p:cNvSpPr/>
           <p:nvPr/>
         </p:nvSpPr>
         <p:spPr>
           <a:xfrm>
             <a:off x="6553080" y="6356520"/>
-            <a:ext cx="2127600" cy="358920"/>
+            <a:ext cx="2127240" cy="358560"/>
           </a:xfrm>
           <a:prstGeom prst="rect">
             <a:avLst/>
@@ -8062,14 +8269,14 @@
       </p:sp>
       <p:sp>
         <p:nvSpPr>
-          <p:cNvPr id="157" name="CustomShape 3"/>
+          <p:cNvPr id="162" name="CustomShape 3"/>
           <p:cNvSpPr/>
           <p:nvPr/>
         </p:nvSpPr>
         <p:spPr>
           <a:xfrm>
-            <a:off x="640080" y="1420560"/>
-            <a:ext cx="7862400" cy="2455920"/>
+            <a:off x="1189080" y="1449360"/>
+            <a:ext cx="6764400" cy="4566600"/>
           </a:xfrm>
           <a:prstGeom prst="rect">
             <a:avLst/>
@@ -8094,7 +8301,7 @@
                 </a:solidFill>
                 <a:latin typeface="Calibri"/>
               </a:rPr>
-              <a:t>Challenges</a:t>
+              <a:t>Modules</a:t>
             </a:r>
             <a:endParaRPr/>
           </a:p>
@@ -8109,47 +8316,11 @@
             <a:r>
               <a:rPr lang="en-US" sz="3200">
                 <a:solidFill>
-                  <a:srgbClr val="ff6600"/>
+                  <a:srgbClr val="3465a4"/>
                 </a:solidFill>
                 <a:latin typeface="Calibri"/>
               </a:rPr>
-              <a:t>Synthesis</a:t>
-            </a:r>
-            <a:r>
-              <a:rPr lang="en-US" sz="3200">
-                <a:solidFill>
-                  <a:srgbClr val="3465a4"/>
-                </a:solidFill>
-                <a:latin typeface="Calibri"/>
-              </a:rPr>
-              <a:t>: </a:t>
-            </a:r>
-            <a:r>
-              <a:rPr lang="en-US" sz="2500">
-                <a:solidFill>
-                  <a:srgbClr val="3465a4"/>
-                </a:solidFill>
-                <a:latin typeface="Calibri"/>
-              </a:rPr>
-              <a:t>(QoS)</a:t>
-            </a:r>
-            <a:r>
-              <a:rPr lang="en-US" sz="3200">
-                <a:solidFill>
-                  <a:srgbClr val="3465a4"/>
-                </a:solidFill>
-                <a:latin typeface="Calibri"/>
-              </a:rPr>
-              <a:t> → </a:t>
-            </a:r>
-            <a:r>
-              <a:rPr lang="en-US" sz="2500">
-                <a:solidFill>
-                  <a:srgbClr val="3465a4"/>
-                </a:solidFill>
-                <a:latin typeface="Calibri"/>
-              </a:rPr>
-              <a:t>Scheduling parameters</a:t>
+              <a:t>XML parser</a:t>
             </a:r>
             <a:endParaRPr/>
           </a:p>
@@ -8164,12 +8335,22 @@
             <a:r>
               <a:rPr lang="en-US" sz="3200">
                 <a:solidFill>
-                  <a:srgbClr val="ff6600"/>
+                  <a:srgbClr val="3465a4"/>
                 </a:solidFill>
                 <a:latin typeface="Calibri"/>
               </a:rPr>
-              <a:t>Analysis</a:t>
-            </a:r>
+              <a:t>Probability distribution handler</a:t>
+            </a:r>
+            <a:endParaRPr/>
+          </a:p>
+          <a:p>
+            <a:pPr>
+              <a:lnSpc>
+                <a:spcPct val="100000"/>
+              </a:lnSpc>
+              <a:buFont typeface="Arial"/>
+              <a:buChar char="•"/>
+            </a:pPr>
             <a:r>
               <a:rPr lang="en-US" sz="3200">
                 <a:solidFill>
@@ -8177,17 +8358,37 @@
                 </a:solidFill>
                 <a:latin typeface="Calibri"/>
               </a:rPr>
-              <a:t>: </a:t>
-            </a:r>
-            <a:r>
-              <a:rPr lang="en-US" sz="2500">
+              <a:t>Task descriptor</a:t>
+            </a:r>
+            <a:endParaRPr/>
+          </a:p>
+          <a:p>
+            <a:pPr>
+              <a:lnSpc>
+                <a:spcPct val="100000"/>
+              </a:lnSpc>
+              <a:buFont typeface="Arial"/>
+              <a:buChar char="•"/>
+            </a:pPr>
+            <a:r>
+              <a:rPr lang="en-US" sz="3200">
                 <a:solidFill>
                   <a:srgbClr val="3465a4"/>
                 </a:solidFill>
                 <a:latin typeface="Calibri"/>
               </a:rPr>
-              <a:t>(Scheduling parameters) </a:t>
-            </a:r>
+              <a:t>Probability solver</a:t>
+            </a:r>
+            <a:endParaRPr/>
+          </a:p>
+          <a:p>
+            <a:pPr>
+              <a:lnSpc>
+                <a:spcPct val="100000"/>
+              </a:lnSpc>
+              <a:buFont typeface="Arial"/>
+              <a:buChar char="•"/>
+            </a:pPr>
             <a:r>
               <a:rPr lang="en-US" sz="3200">
                 <a:solidFill>
@@ -8195,46 +8396,12 @@
                 </a:solidFill>
                 <a:latin typeface="Calibri"/>
               </a:rPr>
-              <a:t>→</a:t>
-            </a:r>
-            <a:r>
-              <a:rPr lang="en-US" sz="2500">
-                <a:solidFill>
-                  <a:srgbClr val="3465a4"/>
-                </a:solidFill>
-                <a:latin typeface="Calibri"/>
-              </a:rPr>
-              <a:t> QoS</a:t>
-            </a:r>
-            <a:endParaRPr/>
-          </a:p>
-        </p:txBody>
-      </p:sp>
-      <p:pic>
-        <p:nvPicPr>
-          <p:cNvPr id="158" name="" descr=""/>
-          <p:cNvPicPr/>
-          <p:nvPr/>
-        </p:nvPicPr>
-        <p:blipFill>
-          <a:blip r:embed="rId1"/>
-          <a:stretch>
-            <a:fillRect/>
-          </a:stretch>
-        </p:blipFill>
-        <p:spPr>
-          <a:xfrm>
-            <a:off x="1951200" y="3568320"/>
-            <a:ext cx="5240160" cy="2190960"/>
-          </a:xfrm>
-          <a:prstGeom prst="rect">
-            <a:avLst/>
-          </a:prstGeom>
-          <a:ln>
-            <a:noFill/>
-          </a:ln>
-        </p:spPr>
-      </p:pic>
+              <a:t>QoS evaluation</a:t>
+            </a:r>
+            <a:endParaRPr/>
+          </a:p>
+        </p:txBody>
+      </p:sp>
     </p:spTree>
   </p:cSld>
   <p:timing>
@@ -8286,14 +8453,14 @@
       </p:grpSpPr>
       <p:sp>
         <p:nvSpPr>
-          <p:cNvPr id="159" name="CustomShape 1"/>
+          <p:cNvPr id="163" name="CustomShape 1"/>
           <p:cNvSpPr/>
           <p:nvPr/>
         </p:nvSpPr>
         <p:spPr>
           <a:xfrm>
             <a:off x="457200" y="164520"/>
-            <a:ext cx="8223480" cy="632520"/>
+            <a:ext cx="8223120" cy="632160"/>
           </a:xfrm>
           <a:prstGeom prst="rect">
             <a:avLst/>
@@ -8326,14 +8493,14 @@
       </p:sp>
       <p:sp>
         <p:nvSpPr>
-          <p:cNvPr id="160" name="CustomShape 2"/>
+          <p:cNvPr id="164" name="CustomShape 2"/>
           <p:cNvSpPr/>
           <p:nvPr/>
         </p:nvSpPr>
         <p:spPr>
           <a:xfrm>
             <a:off x="6553080" y="6356520"/>
-            <a:ext cx="2127600" cy="358920"/>
+            <a:ext cx="2127240" cy="358560"/>
           </a:xfrm>
           <a:prstGeom prst="rect">
             <a:avLst/>
@@ -8375,14 +8542,14 @@
       </p:sp>
       <p:sp>
         <p:nvSpPr>
-          <p:cNvPr id="161" name="CustomShape 3"/>
+          <p:cNvPr id="165" name="CustomShape 3"/>
           <p:cNvSpPr/>
           <p:nvPr/>
         </p:nvSpPr>
         <p:spPr>
           <a:xfrm>
-            <a:off x="421560" y="1384560"/>
-            <a:ext cx="8262360" cy="626040"/>
+            <a:off x="441000" y="1384560"/>
+            <a:ext cx="8262000" cy="625680"/>
           </a:xfrm>
           <a:prstGeom prst="rect">
             <a:avLst/>
@@ -8431,7 +8598,7 @@
       </p:sp>
       <p:pic>
         <p:nvPicPr>
-          <p:cNvPr id="162" name="" descr=""/>
+          <p:cNvPr id="166" name="" descr=""/>
           <p:cNvPicPr/>
           <p:nvPr/>
         </p:nvPicPr>
@@ -8443,8 +8610,8 @@
         </p:blipFill>
         <p:spPr>
           <a:xfrm>
-            <a:off x="2219760" y="2216880"/>
-            <a:ext cx="4703760" cy="3891960"/>
+            <a:off x="2615760" y="2144880"/>
+            <a:ext cx="4703400" cy="3891600"/>
           </a:xfrm>
           <a:prstGeom prst="rect">
             <a:avLst/>
@@ -8454,6 +8621,178 @@
           </a:ln>
         </p:spPr>
       </p:pic>
+      <p:sp>
+        <p:nvSpPr>
+          <p:cNvPr id="167" name="TextShape 4"/>
+          <p:cNvSpPr txBox="1"/>
+          <p:nvPr/>
+        </p:nvSpPr>
+        <p:spPr>
+          <a:xfrm>
+            <a:off x="936720" y="3826800"/>
+            <a:ext cx="1541520" cy="305280"/>
+          </a:xfrm>
+          <a:prstGeom prst="rect">
+            <a:avLst/>
+          </a:prstGeom>
+        </p:spPr>
+        <p:txBody>
+          <a:bodyPr lIns="90000" rIns="90000" tIns="45000" bIns="45000"/>
+          <a:p>
+            <a:r>
+              <a:rPr b="1" lang="en-US" sz="1500">
+                <a:solidFill>
+                  <a:srgbClr val="3465a4"/>
+                </a:solidFill>
+                <a:latin typeface="Arial"/>
+              </a:rPr>
+              <a:t>Matrix creation</a:t>
+            </a:r>
+            <a:endParaRPr/>
+          </a:p>
+        </p:txBody>
+      </p:sp>
+      <p:sp>
+        <p:nvSpPr>
+          <p:cNvPr id="168" name="TextShape 5"/>
+          <p:cNvSpPr txBox="1"/>
+          <p:nvPr/>
+        </p:nvSpPr>
+        <p:spPr>
+          <a:xfrm>
+            <a:off x="238320" y="4957200"/>
+            <a:ext cx="2377440" cy="1201680"/>
+          </a:xfrm>
+          <a:prstGeom prst="rect">
+            <a:avLst/>
+          </a:prstGeom>
+        </p:spPr>
+        <p:txBody>
+          <a:bodyPr lIns="90000" rIns="90000" tIns="45000" bIns="45000"/>
+          <a:p>
+            <a:r>
+              <a:rPr b="1" lang="en-US" sz="1500">
+                <a:solidFill>
+                  <a:srgbClr val="3465a4"/>
+                </a:solidFill>
+                <a:latin typeface="Arial"/>
+              </a:rPr>
+              <a:t>Algorithms:</a:t>
+            </a:r>
+            <a:endParaRPr/>
+          </a:p>
+          <a:p>
+            <a:r>
+              <a:rPr b="1" lang="en-US" sz="1500">
+                <a:solidFill>
+                  <a:srgbClr val="3465a4"/>
+                </a:solidFill>
+                <a:latin typeface="Arial"/>
+              </a:rPr>
+              <a:t>* Cyclic reduction</a:t>
+            </a:r>
+            <a:endParaRPr/>
+          </a:p>
+          <a:p>
+            <a:r>
+              <a:rPr b="1" lang="en-US" sz="1500">
+                <a:solidFill>
+                  <a:srgbClr val="3465a4"/>
+                </a:solidFill>
+                <a:latin typeface="Arial"/>
+              </a:rPr>
+              <a:t>* Logarithmic reduction</a:t>
+            </a:r>
+            <a:endParaRPr/>
+          </a:p>
+          <a:p>
+            <a:r>
+              <a:rPr b="1" lang="en-US" sz="1500">
+                <a:solidFill>
+                  <a:srgbClr val="3465a4"/>
+                </a:solidFill>
+                <a:latin typeface="Arial"/>
+              </a:rPr>
+              <a:t>* Companion</a:t>
+            </a:r>
+            <a:endParaRPr/>
+          </a:p>
+          <a:p>
+            <a:r>
+              <a:rPr b="1" lang="en-US" sz="1500">
+                <a:solidFill>
+                  <a:srgbClr val="3465a4"/>
+                </a:solidFill>
+                <a:latin typeface="Arial"/>
+              </a:rPr>
+              <a:t>* Analytical</a:t>
+            </a:r>
+            <a:endParaRPr/>
+          </a:p>
+        </p:txBody>
+      </p:sp>
+      <p:sp>
+        <p:nvSpPr>
+          <p:cNvPr id="169" name="TextShape 6"/>
+          <p:cNvSpPr txBox="1"/>
+          <p:nvPr/>
+        </p:nvSpPr>
+        <p:spPr>
+          <a:xfrm>
+            <a:off x="7354080" y="3804480"/>
+            <a:ext cx="1434960" cy="305280"/>
+          </a:xfrm>
+          <a:prstGeom prst="rect">
+            <a:avLst/>
+          </a:prstGeom>
+        </p:spPr>
+        <p:txBody>
+          <a:bodyPr lIns="90000" rIns="90000" tIns="45000" bIns="45000"/>
+          <a:p>
+            <a:r>
+              <a:rPr b="1" lang="en-US" sz="1500">
+                <a:solidFill>
+                  <a:srgbClr val="3465a4"/>
+                </a:solidFill>
+                <a:latin typeface="Arial"/>
+              </a:rPr>
+              <a:t>Check results</a:t>
+            </a:r>
+            <a:endParaRPr/>
+          </a:p>
+        </p:txBody>
+      </p:sp>
+      <p:sp>
+        <p:nvSpPr>
+          <p:cNvPr id="170" name="TextShape 7"/>
+          <p:cNvSpPr txBox="1"/>
+          <p:nvPr/>
+        </p:nvSpPr>
+        <p:spPr>
+          <a:xfrm>
+            <a:off x="7370640" y="5400720"/>
+            <a:ext cx="1349640" cy="305280"/>
+          </a:xfrm>
+          <a:prstGeom prst="rect">
+            <a:avLst/>
+          </a:prstGeom>
+        </p:spPr>
+        <p:txBody>
+          <a:bodyPr lIns="90000" rIns="90000" tIns="45000" bIns="45000"/>
+          <a:p>
+            <a:r>
+              <a:rPr b="1" lang="en-US" sz="1500">
+                <a:solidFill>
+                  <a:srgbClr val="3465a4"/>
+                </a:solidFill>
+                <a:latin typeface="Arial"/>
+              </a:rPr>
+              <a:t>Store results</a:t>
+            </a:r>
+            <a:endParaRPr/>
+          </a:p>
+        </p:txBody>
+      </p:sp>
     </p:spTree>
   </p:cSld>
   <p:timing>

</xml_diff>

<commit_message>
addes new backup slide
</commit_message>
<xml_diff>
--- a/slides/slides.pptx
+++ b/slides/slides.pptx
@@ -23,6 +23,7 @@
     <p:sldId id="267" r:id="rId16"/>
     <p:sldId id="268" r:id="rId17"/>
     <p:sldId id="269" r:id="rId18"/>
+    <p:sldId id="270" r:id="rId19"/>
   </p:sldIdLst>
   <p:sldSz cx="9144000" cy="6858000"/>
   <p:notesSz cx="7099300" cy="10234612"/>
@@ -198,7 +199,7 @@
           <a:bodyPr lIns="0" rIns="0" tIns="0" bIns="0" anchor="b"/>
           <a:p>
             <a:pPr algn="r"/>
-            <a:fld id="{8B272B46-490B-4782-A011-56C07E35FBD3}" type="slidenum">
+            <a:fld id="{DD09BF8F-C9FC-42F3-9DAE-B9F9629B6CD8}" type="slidenum">
               <a:rPr lang="en-US" sz="1400">
                 <a:latin typeface="Times New Roman"/>
               </a:rPr>
@@ -233,7 +234,7 @@
       </p:grpSpPr>
       <p:sp>
         <p:nvSpPr>
-          <p:cNvPr id="183" name="PlaceHolder 1"/>
+          <p:cNvPr id="188" name="PlaceHolder 1"/>
           <p:cNvSpPr>
             <a:spLocks noGrp="1"/>
           </p:cNvSpPr>
@@ -259,7 +260,7 @@
       </p:sp>
       <p:sp>
         <p:nvSpPr>
-          <p:cNvPr id="184" name="CustomShape 2"/>
+          <p:cNvPr id="189" name="CustomShape 2"/>
           <p:cNvSpPr/>
           <p:nvPr/>
         </p:nvSpPr>
@@ -284,7 +285,7 @@
                 <a:spcPct val="100000"/>
               </a:lnSpc>
             </a:pPr>
-            <a:fld id="{28F9D7F1-1FE6-4EA1-986F-B6E210B3B634}" type="slidenum">
+            <a:fld id="{19562125-C4CB-431E-B41C-031FF6AFEEF0}" type="slidenum">
               <a:rPr lang="en-US" sz="1200">
                 <a:solidFill>
                   <a:srgbClr val="000000"/>
@@ -322,7 +323,7 @@
       </p:grpSpPr>
       <p:sp>
         <p:nvSpPr>
-          <p:cNvPr id="199" name="PlaceHolder 1"/>
+          <p:cNvPr id="204" name="PlaceHolder 1"/>
           <p:cNvSpPr>
             <a:spLocks noGrp="1"/>
           </p:cNvSpPr>
@@ -348,7 +349,7 @@
       </p:sp>
       <p:sp>
         <p:nvSpPr>
-          <p:cNvPr id="200" name="CustomShape 2"/>
+          <p:cNvPr id="205" name="CustomShape 2"/>
           <p:cNvSpPr/>
           <p:nvPr/>
         </p:nvSpPr>
@@ -373,7 +374,7 @@
                 <a:spcPct val="100000"/>
               </a:lnSpc>
             </a:pPr>
-            <a:fld id="{627140F8-1D1F-4D7F-8DB0-6AFE1BBCD017}" type="slidenum">
+            <a:fld id="{97099FCE-3BC5-408E-8481-A99BE6C35DA2}" type="slidenum">
               <a:rPr lang="en-US" sz="1200">
                 <a:solidFill>
                   <a:srgbClr val="000000"/>
@@ -411,7 +412,7 @@
       </p:grpSpPr>
       <p:sp>
         <p:nvSpPr>
-          <p:cNvPr id="201" name="PlaceHolder 1"/>
+          <p:cNvPr id="206" name="PlaceHolder 1"/>
           <p:cNvSpPr>
             <a:spLocks noGrp="1"/>
           </p:cNvSpPr>
@@ -437,7 +438,7 @@
       </p:sp>
       <p:sp>
         <p:nvSpPr>
-          <p:cNvPr id="202" name="CustomShape 2"/>
+          <p:cNvPr id="207" name="CustomShape 2"/>
           <p:cNvSpPr/>
           <p:nvPr/>
         </p:nvSpPr>
@@ -462,7 +463,7 @@
                 <a:spcPct val="100000"/>
               </a:lnSpc>
             </a:pPr>
-            <a:fld id="{E7B842C7-83F6-4845-9551-DAB764D63ED4}" type="slidenum">
+            <a:fld id="{69260FAD-9665-4601-B05D-68D88F1F05A1}" type="slidenum">
               <a:rPr lang="en-US" sz="1200">
                 <a:solidFill>
                   <a:srgbClr val="000000"/>
@@ -500,7 +501,7 @@
       </p:grpSpPr>
       <p:sp>
         <p:nvSpPr>
-          <p:cNvPr id="203" name="PlaceHolder 1"/>
+          <p:cNvPr id="208" name="PlaceHolder 1"/>
           <p:cNvSpPr>
             <a:spLocks noGrp="1"/>
           </p:cNvSpPr>
@@ -526,7 +527,7 @@
       </p:sp>
       <p:sp>
         <p:nvSpPr>
-          <p:cNvPr id="204" name="CustomShape 2"/>
+          <p:cNvPr id="209" name="CustomShape 2"/>
           <p:cNvSpPr/>
           <p:nvPr/>
         </p:nvSpPr>
@@ -551,7 +552,7 @@
                 <a:spcPct val="100000"/>
               </a:lnSpc>
             </a:pPr>
-            <a:fld id="{75919AAC-D0D4-4231-A2FF-57AE319C25CB}" type="slidenum">
+            <a:fld id="{3A4170BB-4E8D-4296-A563-FFA38C9B94DC}" type="slidenum">
               <a:rPr lang="en-US" sz="1200">
                 <a:solidFill>
                   <a:srgbClr val="000000"/>
@@ -589,7 +590,7 @@
       </p:grpSpPr>
       <p:sp>
         <p:nvSpPr>
-          <p:cNvPr id="205" name="PlaceHolder 1"/>
+          <p:cNvPr id="210" name="PlaceHolder 1"/>
           <p:cNvSpPr>
             <a:spLocks noGrp="1"/>
           </p:cNvSpPr>
@@ -615,7 +616,7 @@
       </p:sp>
       <p:sp>
         <p:nvSpPr>
-          <p:cNvPr id="206" name="CustomShape 2"/>
+          <p:cNvPr id="211" name="CustomShape 2"/>
           <p:cNvSpPr/>
           <p:nvPr/>
         </p:nvSpPr>
@@ -640,7 +641,96 @@
                 <a:spcPct val="100000"/>
               </a:lnSpc>
             </a:pPr>
-            <a:fld id="{89AA5F9C-A2C4-412F-9BAB-E07A0BFBE863}" type="slidenum">
+            <a:fld id="{40893F51-2DAD-42E9-B40C-ABCE8713DCCA}" type="slidenum">
+              <a:rPr lang="en-US" sz="1200">
+                <a:solidFill>
+                  <a:srgbClr val="000000"/>
+                </a:solidFill>
+                <a:latin typeface="Times New Roman"/>
+                <a:ea typeface="ＭＳ Ｐゴシック"/>
+              </a:rPr>
+              <a:t>&lt;number&gt;</a:t>
+            </a:fld>
+            <a:endParaRPr/>
+          </a:p>
+        </p:txBody>
+      </p:sp>
+    </p:spTree>
+  </p:cSld>
+</p:notes>
+</file>
+
+<file path=ppt/notesSlides/notesSlide15.xml><?xml version="1.0" encoding="utf-8"?>
+<p:notes xmlns:a="http://schemas.openxmlformats.org/drawingml/2006/main" xmlns:p="http://schemas.openxmlformats.org/presentationml/2006/main" xmlns:r="http://schemas.openxmlformats.org/officeDocument/2006/relationships">
+  <p:cSld>
+    <p:spTree>
+      <p:nvGrpSpPr>
+        <p:cNvPr id="1" name=""/>
+        <p:cNvGrpSpPr/>
+        <p:nvPr/>
+      </p:nvGrpSpPr>
+      <p:grpSpPr>
+        <a:xfrm>
+          <a:off x="0" y="0"/>
+          <a:ext cx="0" cy="0"/>
+          <a:chOff x="0" y="0"/>
+          <a:chExt cx="0" cy="0"/>
+        </a:xfrm>
+      </p:grpSpPr>
+      <p:sp>
+        <p:nvSpPr>
+          <p:cNvPr id="212" name="PlaceHolder 1"/>
+          <p:cNvSpPr>
+            <a:spLocks noGrp="1"/>
+          </p:cNvSpPr>
+          <p:nvPr>
+            <p:ph type="body"/>
+          </p:nvPr>
+        </p:nvSpPr>
+        <p:spPr>
+          <a:xfrm>
+            <a:off x="946080" y="4861080"/>
+            <a:ext cx="5200560" cy="4597200"/>
+          </a:xfrm>
+          <a:prstGeom prst="rect">
+            <a:avLst/>
+          </a:prstGeom>
+        </p:spPr>
+        <p:txBody>
+          <a:bodyPr lIns="95040" rIns="95040" tIns="47520" bIns="47520"/>
+          <a:p>
+            <a:endParaRPr/>
+          </a:p>
+        </p:txBody>
+      </p:sp>
+      <p:sp>
+        <p:nvSpPr>
+          <p:cNvPr id="213" name="CustomShape 2"/>
+          <p:cNvSpPr/>
+          <p:nvPr/>
+        </p:nvSpPr>
+        <p:spPr>
+          <a:xfrm>
+            <a:off x="4024440" y="9725040"/>
+            <a:ext cx="3068640" cy="503280"/>
+          </a:xfrm>
+          <a:prstGeom prst="rect">
+            <a:avLst/>
+          </a:prstGeom>
+          <a:noFill/>
+          <a:ln>
+            <a:noFill/>
+          </a:ln>
+        </p:spPr>
+        <p:txBody>
+          <a:bodyPr lIns="95040" rIns="95040" tIns="47520" bIns="47520" anchor="b"/>
+          <a:p>
+            <a:pPr>
+              <a:lnSpc>
+                <a:spcPct val="100000"/>
+              </a:lnSpc>
+            </a:pPr>
+            <a:fld id="{5D4E9099-5FE1-4ECE-98B8-6E7F9ECC55F0}" type="slidenum">
               <a:rPr lang="en-US" sz="1200">
                 <a:solidFill>
                   <a:srgbClr val="000000"/>
@@ -678,7 +768,7 @@
       </p:grpSpPr>
       <p:sp>
         <p:nvSpPr>
-          <p:cNvPr id="185" name="PlaceHolder 1"/>
+          <p:cNvPr id="190" name="PlaceHolder 1"/>
           <p:cNvSpPr>
             <a:spLocks noGrp="1"/>
           </p:cNvSpPr>
@@ -704,7 +794,7 @@
       </p:sp>
       <p:sp>
         <p:nvSpPr>
-          <p:cNvPr id="186" name="CustomShape 2"/>
+          <p:cNvPr id="191" name="CustomShape 2"/>
           <p:cNvSpPr/>
           <p:nvPr/>
         </p:nvSpPr>
@@ -729,7 +819,7 @@
                 <a:spcPct val="100000"/>
               </a:lnSpc>
             </a:pPr>
-            <a:fld id="{629774A9-637A-4971-A2E7-983A838EF882}" type="slidenum">
+            <a:fld id="{7A406D60-EF9A-42DC-A7BC-E0B01BC52656}" type="slidenum">
               <a:rPr lang="en-US" sz="1200">
                 <a:solidFill>
                   <a:srgbClr val="000000"/>
@@ -767,7 +857,7 @@
       </p:grpSpPr>
       <p:sp>
         <p:nvSpPr>
-          <p:cNvPr id="187" name="PlaceHolder 1"/>
+          <p:cNvPr id="192" name="PlaceHolder 1"/>
           <p:cNvSpPr>
             <a:spLocks noGrp="1"/>
           </p:cNvSpPr>
@@ -793,7 +883,7 @@
       </p:sp>
       <p:sp>
         <p:nvSpPr>
-          <p:cNvPr id="188" name="CustomShape 2"/>
+          <p:cNvPr id="193" name="CustomShape 2"/>
           <p:cNvSpPr/>
           <p:nvPr/>
         </p:nvSpPr>
@@ -818,7 +908,7 @@
                 <a:spcPct val="100000"/>
               </a:lnSpc>
             </a:pPr>
-            <a:fld id="{11D794BF-FC6C-4A2B-A6F5-B77B87B017D2}" type="slidenum">
+            <a:fld id="{39FFC631-0AE1-4115-B4F8-02DA853F065B}" type="slidenum">
               <a:rPr lang="en-US" sz="1200">
                 <a:solidFill>
                   <a:srgbClr val="000000"/>
@@ -856,7 +946,7 @@
       </p:grpSpPr>
       <p:sp>
         <p:nvSpPr>
-          <p:cNvPr id="189" name="PlaceHolder 1"/>
+          <p:cNvPr id="194" name="PlaceHolder 1"/>
           <p:cNvSpPr>
             <a:spLocks noGrp="1"/>
           </p:cNvSpPr>
@@ -882,7 +972,7 @@
       </p:sp>
       <p:sp>
         <p:nvSpPr>
-          <p:cNvPr id="190" name="CustomShape 2"/>
+          <p:cNvPr id="195" name="CustomShape 2"/>
           <p:cNvSpPr/>
           <p:nvPr/>
         </p:nvSpPr>
@@ -907,7 +997,7 @@
                 <a:spcPct val="100000"/>
               </a:lnSpc>
             </a:pPr>
-            <a:fld id="{2224D8D8-AD20-4844-B2ED-CD36C829906B}" type="slidenum">
+            <a:fld id="{BE5FF0D9-51B2-4EEF-AF42-5336DE3CA367}" type="slidenum">
               <a:rPr lang="en-US" sz="1200">
                 <a:solidFill>
                   <a:srgbClr val="000000"/>
@@ -945,7 +1035,7 @@
       </p:grpSpPr>
       <p:sp>
         <p:nvSpPr>
-          <p:cNvPr id="191" name="PlaceHolder 1"/>
+          <p:cNvPr id="196" name="PlaceHolder 1"/>
           <p:cNvSpPr>
             <a:spLocks noGrp="1"/>
           </p:cNvSpPr>
@@ -971,7 +1061,7 @@
       </p:sp>
       <p:sp>
         <p:nvSpPr>
-          <p:cNvPr id="192" name="CustomShape 2"/>
+          <p:cNvPr id="197" name="CustomShape 2"/>
           <p:cNvSpPr/>
           <p:nvPr/>
         </p:nvSpPr>
@@ -996,7 +1086,7 @@
                 <a:spcPct val="100000"/>
               </a:lnSpc>
             </a:pPr>
-            <a:fld id="{9D587B76-8853-4DFB-9263-F1DF2406EB51}" type="slidenum">
+            <a:fld id="{412B0311-65E5-4F90-8843-767F59E2C4AC}" type="slidenum">
               <a:rPr lang="en-US" sz="1200">
                 <a:solidFill>
                   <a:srgbClr val="000000"/>
@@ -1034,7 +1124,7 @@
       </p:grpSpPr>
       <p:sp>
         <p:nvSpPr>
-          <p:cNvPr id="193" name="PlaceHolder 1"/>
+          <p:cNvPr id="198" name="PlaceHolder 1"/>
           <p:cNvSpPr>
             <a:spLocks noGrp="1"/>
           </p:cNvSpPr>
@@ -1060,7 +1150,7 @@
       </p:sp>
       <p:sp>
         <p:nvSpPr>
-          <p:cNvPr id="194" name="CustomShape 2"/>
+          <p:cNvPr id="199" name="CustomShape 2"/>
           <p:cNvSpPr/>
           <p:nvPr/>
         </p:nvSpPr>
@@ -1085,7 +1175,7 @@
                 <a:spcPct val="100000"/>
               </a:lnSpc>
             </a:pPr>
-            <a:fld id="{A2F863D6-1FC4-4C06-A200-1C4A25C05BFE}" type="slidenum">
+            <a:fld id="{5384E71E-24FB-4E76-91A9-1B0C4FC99122}" type="slidenum">
               <a:rPr lang="en-US" sz="1200">
                 <a:solidFill>
                   <a:srgbClr val="000000"/>
@@ -1123,7 +1213,7 @@
       </p:grpSpPr>
       <p:sp>
         <p:nvSpPr>
-          <p:cNvPr id="195" name="PlaceHolder 1"/>
+          <p:cNvPr id="200" name="PlaceHolder 1"/>
           <p:cNvSpPr>
             <a:spLocks noGrp="1"/>
           </p:cNvSpPr>
@@ -1149,7 +1239,7 @@
       </p:sp>
       <p:sp>
         <p:nvSpPr>
-          <p:cNvPr id="196" name="CustomShape 2"/>
+          <p:cNvPr id="201" name="CustomShape 2"/>
           <p:cNvSpPr/>
           <p:nvPr/>
         </p:nvSpPr>
@@ -1174,7 +1264,7 @@
                 <a:spcPct val="100000"/>
               </a:lnSpc>
             </a:pPr>
-            <a:fld id="{6CAB7C66-C078-4D1D-B999-C7E1EEE212E7}" type="slidenum">
+            <a:fld id="{AA32ED9E-854A-48DB-B69E-1F29E8960B3C}" type="slidenum">
               <a:rPr lang="en-US" sz="1200">
                 <a:solidFill>
                   <a:srgbClr val="000000"/>
@@ -1212,7 +1302,7 @@
       </p:grpSpPr>
       <p:sp>
         <p:nvSpPr>
-          <p:cNvPr id="197" name="PlaceHolder 1"/>
+          <p:cNvPr id="202" name="PlaceHolder 1"/>
           <p:cNvSpPr>
             <a:spLocks noGrp="1"/>
           </p:cNvSpPr>
@@ -1238,7 +1328,7 @@
       </p:sp>
       <p:sp>
         <p:nvSpPr>
-          <p:cNvPr id="198" name="CustomShape 2"/>
+          <p:cNvPr id="203" name="CustomShape 2"/>
           <p:cNvSpPr/>
           <p:nvPr/>
         </p:nvSpPr>
@@ -1263,7 +1353,7 @@
                 <a:spcPct val="100000"/>
               </a:lnSpc>
             </a:pPr>
-            <a:fld id="{CC4A3D2C-51E7-4A38-BA52-F2E80560B46C}" type="slidenum">
+            <a:fld id="{E541F759-3BF0-42A1-B020-2AF27F2134B9}" type="slidenum">
               <a:rPr lang="en-US" sz="1200">
                 <a:solidFill>
                   <a:srgbClr val="000000"/>
@@ -5429,6 +5519,199 @@
 </p:sld>
 </file>
 
+<file path=ppt/slides/slide15.xml><?xml version="1.0" encoding="utf-8"?>
+<p:sld xmlns:a="http://schemas.openxmlformats.org/drawingml/2006/main" xmlns:p="http://schemas.openxmlformats.org/presentationml/2006/main" xmlns:r="http://schemas.openxmlformats.org/officeDocument/2006/relationships">
+  <p:cSld>
+    <p:spTree>
+      <p:nvGrpSpPr>
+        <p:cNvPr id="1" name=""/>
+        <p:cNvGrpSpPr/>
+        <p:nvPr/>
+      </p:nvGrpSpPr>
+      <p:grpSpPr>
+        <a:xfrm>
+          <a:off x="0" y="0"/>
+          <a:ext cx="0" cy="0"/>
+          <a:chOff x="0" y="0"/>
+          <a:chExt cx="0" cy="0"/>
+        </a:xfrm>
+      </p:grpSpPr>
+      <p:sp>
+        <p:nvSpPr>
+          <p:cNvPr id="183" name="CustomShape 1"/>
+          <p:cNvSpPr/>
+          <p:nvPr/>
+        </p:nvSpPr>
+        <p:spPr>
+          <a:xfrm>
+            <a:off x="457200" y="164520"/>
+            <a:ext cx="8223120" cy="632160"/>
+          </a:xfrm>
+          <a:prstGeom prst="rect">
+            <a:avLst/>
+          </a:prstGeom>
+          <a:noFill/>
+          <a:ln>
+            <a:noFill/>
+          </a:ln>
+        </p:spPr>
+        <p:txBody>
+          <a:bodyPr lIns="90000" rIns="90000" tIns="45000" bIns="45000" anchor="ctr"/>
+          <a:p>
+            <a:pPr algn="ctr">
+              <a:lnSpc>
+                <a:spcPct val="100000"/>
+              </a:lnSpc>
+            </a:pPr>
+            <a:r>
+              <a:rPr lang="en-US" sz="4400">
+                <a:solidFill>
+                  <a:srgbClr val="4f81bd"/>
+                </a:solidFill>
+                <a:latin typeface="Calibri"/>
+              </a:rPr>
+              <a:t>Example</a:t>
+            </a:r>
+            <a:endParaRPr/>
+          </a:p>
+        </p:txBody>
+      </p:sp>
+      <p:pic>
+        <p:nvPicPr>
+          <p:cNvPr id="184" name="" descr=""/>
+          <p:cNvPicPr/>
+          <p:nvPr/>
+        </p:nvPicPr>
+        <p:blipFill>
+          <a:blip r:embed="rId1"/>
+          <a:stretch>
+            <a:fillRect/>
+          </a:stretch>
+        </p:blipFill>
+        <p:spPr>
+          <a:xfrm>
+            <a:off x="86040" y="1132200"/>
+            <a:ext cx="4413960" cy="3678120"/>
+          </a:xfrm>
+          <a:prstGeom prst="rect">
+            <a:avLst/>
+          </a:prstGeom>
+          <a:ln>
+            <a:noFill/>
+          </a:ln>
+        </p:spPr>
+      </p:pic>
+      <p:sp>
+        <p:nvSpPr>
+          <p:cNvPr id="185" name="Line 2"/>
+          <p:cNvSpPr/>
+          <p:nvPr/>
+        </p:nvSpPr>
+        <p:spPr>
+          <a:xfrm>
+            <a:off x="2934720" y="3057120"/>
+            <a:ext cx="1158480" cy="988560"/>
+          </a:xfrm>
+          <a:prstGeom prst="line">
+            <a:avLst/>
+          </a:prstGeom>
+          <a:ln w="57240">
+            <a:solidFill>
+              <a:srgbClr val="3465a4"/>
+            </a:solidFill>
+            <a:round/>
+            <a:tailEnd len="med" type="triangle" w="med"/>
+          </a:ln>
+        </p:spPr>
+      </p:sp>
+      <p:sp>
+        <p:nvSpPr>
+          <p:cNvPr id="186" name="TextShape 3"/>
+          <p:cNvSpPr txBox="1"/>
+          <p:nvPr/>
+        </p:nvSpPr>
+        <p:spPr>
+          <a:xfrm>
+            <a:off x="3420000" y="3108960"/>
+            <a:ext cx="2286000" cy="305280"/>
+          </a:xfrm>
+          <a:prstGeom prst="rect">
+            <a:avLst/>
+          </a:prstGeom>
+        </p:spPr>
+        <p:txBody>
+          <a:bodyPr lIns="90000" rIns="90000" tIns="45000" bIns="45000"/>
+          <a:p>
+            <a:r>
+              <a:rPr b="1" lang="en-US" sz="1500">
+                <a:solidFill>
+                  <a:srgbClr val="3465a4"/>
+                </a:solidFill>
+                <a:latin typeface="Arial"/>
+              </a:rPr>
+              <a:t>Computation</a:t>
+            </a:r>
+            <a:endParaRPr/>
+          </a:p>
+        </p:txBody>
+      </p:sp>
+      <p:pic>
+        <p:nvPicPr>
+          <p:cNvPr id="187" name="" descr=""/>
+          <p:cNvPicPr/>
+          <p:nvPr/>
+        </p:nvPicPr>
+        <p:blipFill>
+          <a:blip r:embed="rId2"/>
+          <a:stretch>
+            <a:fillRect/>
+          </a:stretch>
+        </p:blipFill>
+        <p:spPr>
+          <a:xfrm>
+            <a:off x="2743200" y="4261680"/>
+            <a:ext cx="6346800" cy="2359440"/>
+          </a:xfrm>
+          <a:prstGeom prst="rect">
+            <a:avLst/>
+          </a:prstGeom>
+          <a:ln>
+            <a:noFill/>
+          </a:ln>
+        </p:spPr>
+      </p:pic>
+    </p:spTree>
+  </p:cSld>
+  <p:timing>
+    <p:tnLst>
+      <p:par>
+        <p:cTn id="29" dur="indefinite" restart="never" nodeType="tmRoot">
+          <p:childTnLst>
+            <p:seq>
+              <p:cTn id="30" nodeType="mainSeq"/>
+              <p:prevCondLst>
+                <p:cond delay="0" evt="onPrev">
+                  <p:tgtEl>
+                    <p:sldTgt/>
+                  </p:tgtEl>
+                </p:cond>
+              </p:prevCondLst>
+              <p:nextCondLst>
+                <p:cond delay="0" evt="onNext">
+                  <p:tgtEl>
+                    <p:sldTgt/>
+                  </p:tgtEl>
+                </p:cond>
+              </p:nextCondLst>
+            </p:seq>
+          </p:childTnLst>
+        </p:cTn>
+      </p:par>
+    </p:tnLst>
+  </p:timing>
+</p:sld>
+</file>
+
 <file path=ppt/slides/slide2.xml><?xml version="1.0" encoding="utf-8"?>
 <p:sld xmlns:a="http://schemas.openxmlformats.org/drawingml/2006/main" xmlns:p="http://schemas.openxmlformats.org/presentationml/2006/main" xmlns:r="http://schemas.openxmlformats.org/officeDocument/2006/relationships">
   <p:cSld>
@@ -5924,7 +6207,7 @@
         </p:nvSpPr>
         <p:spPr>
           <a:xfrm>
-            <a:off x="1839600" y="3739320"/>
+            <a:off x="1839600" y="3775320"/>
             <a:ext cx="961200" cy="673920"/>
           </a:xfrm>
           <a:prstGeom prst="rect">
@@ -5971,8 +6254,8 @@
         </p:nvSpPr>
         <p:spPr>
           <a:xfrm flipV="1">
-            <a:off x="2651760" y="3988800"/>
-            <a:ext cx="560160" cy="126000"/>
+            <a:off x="2651760" y="4024800"/>
+            <a:ext cx="512640" cy="126000"/>
           </a:xfrm>
           <a:prstGeom prst="line">
             <a:avLst/>
@@ -5996,7 +6279,7 @@
         </p:nvSpPr>
         <p:spPr>
           <a:xfrm>
-            <a:off x="3243600" y="4315680"/>
+            <a:off x="3243600" y="4351680"/>
             <a:ext cx="1458720" cy="601920"/>
           </a:xfrm>
           <a:prstGeom prst="rect">
@@ -6043,7 +6326,7 @@
         </p:nvSpPr>
         <p:spPr>
           <a:xfrm>
-            <a:off x="4719600" y="2335680"/>
+            <a:off x="4719600" y="2371680"/>
             <a:ext cx="1041120" cy="610560"/>
           </a:xfrm>
           <a:prstGeom prst="rect">
@@ -6090,7 +6373,7 @@
         </p:nvSpPr>
         <p:spPr>
           <a:xfrm>
-            <a:off x="1839600" y="3739680"/>
+            <a:off x="1839600" y="3775680"/>
             <a:ext cx="961200" cy="673920"/>
           </a:xfrm>
           <a:prstGeom prst="rect">
@@ -6137,7 +6420,7 @@
         </p:nvSpPr>
         <p:spPr>
           <a:xfrm>
-            <a:off x="5077440" y="3648960"/>
+            <a:off x="5077440" y="3684960"/>
             <a:ext cx="1149840" cy="637200"/>
           </a:xfrm>
           <a:prstGeom prst="rect">
@@ -6238,7 +6521,7 @@
         </p:blipFill>
         <p:spPr>
           <a:xfrm>
-            <a:off x="400320" y="1285920"/>
+            <a:off x="400320" y="1321920"/>
             <a:ext cx="8343360" cy="2926080"/>
           </a:xfrm>
           <a:prstGeom prst="rect">
@@ -6257,7 +6540,7 @@
         </p:nvSpPr>
         <p:spPr>
           <a:xfrm flipV="1">
-            <a:off x="3922200" y="3438720"/>
+            <a:off x="3922200" y="3474720"/>
             <a:ext cx="0" cy="950400"/>
           </a:xfrm>
           <a:prstGeom prst="line">
@@ -6282,7 +6565,7 @@
         </p:nvSpPr>
         <p:spPr>
           <a:xfrm flipH="1">
-            <a:off x="4480560" y="2651760"/>
+            <a:off x="4480560" y="2687760"/>
             <a:ext cx="274320" cy="274320"/>
           </a:xfrm>
           <a:prstGeom prst="line">
@@ -6307,7 +6590,7 @@
         </p:nvSpPr>
         <p:spPr>
           <a:xfrm flipH="1">
-            <a:off x="4663440" y="3931920"/>
+            <a:off x="4663440" y="3967920"/>
             <a:ext cx="457200" cy="0"/>
           </a:xfrm>
           <a:prstGeom prst="line">
@@ -8660,7 +8943,7 @@
         </p:nvSpPr>
         <p:spPr>
           <a:xfrm>
-            <a:off x="238320" y="4957200"/>
+            <a:off x="202320" y="4993200"/>
             <a:ext cx="2377440" cy="1201680"/>
           </a:xfrm>
           <a:prstGeom prst="rect">
@@ -8677,7 +8960,7 @@
                 </a:solidFill>
                 <a:latin typeface="Arial"/>
               </a:rPr>
-              <a:t>Algorithms:</a:t>
+              <a:t>Solution algorithms:</a:t>
             </a:r>
             <a:endParaRPr/>
           </a:p>

</xml_diff>